<commit_message>
se agrego la clase 1 de aplicadas 2
</commit_message>
<xml_diff>
--- a/2015-2016/clases/computacion_aplicada_2/clase_1/clase1.pptx
+++ b/2015-2016/clases/computacion_aplicada_2/clase_1/clase1.pptx
@@ -8,8 +8,23 @@
     <p:sldId id="256" r:id="rId2"/>
     <p:sldId id="257" r:id="rId3"/>
     <p:sldId id="261" r:id="rId4"/>
-    <p:sldId id="259" r:id="rId5"/>
-    <p:sldId id="260" r:id="rId6"/>
+    <p:sldId id="262" r:id="rId5"/>
+    <p:sldId id="264" r:id="rId6"/>
+    <p:sldId id="265" r:id="rId7"/>
+    <p:sldId id="263" r:id="rId8"/>
+    <p:sldId id="266" r:id="rId9"/>
+    <p:sldId id="267" r:id="rId10"/>
+    <p:sldId id="268" r:id="rId11"/>
+    <p:sldId id="269" r:id="rId12"/>
+    <p:sldId id="270" r:id="rId13"/>
+    <p:sldId id="271" r:id="rId14"/>
+    <p:sldId id="272" r:id="rId15"/>
+    <p:sldId id="259" r:id="rId16"/>
+    <p:sldId id="260" r:id="rId17"/>
+    <p:sldId id="273" r:id="rId18"/>
+    <p:sldId id="274" r:id="rId19"/>
+    <p:sldId id="275" r:id="rId20"/>
+    <p:sldId id="276" r:id="rId21"/>
   </p:sldIdLst>
   <p:sldSz cx="9144000" cy="6858000" type="screen4x3"/>
   <p:notesSz cx="6858000" cy="9144000"/>
@@ -292,7 +307,7 @@
           <a:p>
             <a:fld id="{7A847CFC-816F-41D0-AAC0-9BF4FEBC753E}" type="datetimeFigureOut">
               <a:rPr lang="es-ES" smtClean="0"/>
-              <a:t>16/05/2015</a:t>
+              <a:t>18/05/2015</a:t>
             </a:fld>
             <a:endParaRPr lang="es-ES"/>
           </a:p>
@@ -457,7 +472,7 @@
           <a:p>
             <a:fld id="{7A847CFC-816F-41D0-AAC0-9BF4FEBC753E}" type="datetimeFigureOut">
               <a:rPr lang="es-ES" smtClean="0"/>
-              <a:t>16/05/2015</a:t>
+              <a:t>18/05/2015</a:t>
             </a:fld>
             <a:endParaRPr lang="es-ES"/>
           </a:p>
@@ -632,7 +647,7 @@
           <a:p>
             <a:fld id="{7A847CFC-816F-41D0-AAC0-9BF4FEBC753E}" type="datetimeFigureOut">
               <a:rPr lang="es-ES" smtClean="0"/>
-              <a:t>16/05/2015</a:t>
+              <a:t>18/05/2015</a:t>
             </a:fld>
             <a:endParaRPr lang="es-ES"/>
           </a:p>
@@ -797,7 +812,7 @@
           <a:p>
             <a:fld id="{7A847CFC-816F-41D0-AAC0-9BF4FEBC753E}" type="datetimeFigureOut">
               <a:rPr lang="es-ES" smtClean="0"/>
-              <a:t>16/05/2015</a:t>
+              <a:t>18/05/2015</a:t>
             </a:fld>
             <a:endParaRPr lang="es-ES"/>
           </a:p>
@@ -1038,7 +1053,7 @@
           <a:p>
             <a:fld id="{7A847CFC-816F-41D0-AAC0-9BF4FEBC753E}" type="datetimeFigureOut">
               <a:rPr lang="es-ES" smtClean="0"/>
-              <a:t>16/05/2015</a:t>
+              <a:t>18/05/2015</a:t>
             </a:fld>
             <a:endParaRPr lang="es-ES"/>
           </a:p>
@@ -1321,7 +1336,7 @@
           <a:p>
             <a:fld id="{7A847CFC-816F-41D0-AAC0-9BF4FEBC753E}" type="datetimeFigureOut">
               <a:rPr lang="es-ES" smtClean="0"/>
-              <a:t>16/05/2015</a:t>
+              <a:t>18/05/2015</a:t>
             </a:fld>
             <a:endParaRPr lang="es-ES"/>
           </a:p>
@@ -1738,7 +1753,7 @@
           <a:p>
             <a:fld id="{7A847CFC-816F-41D0-AAC0-9BF4FEBC753E}" type="datetimeFigureOut">
               <a:rPr lang="es-ES" smtClean="0"/>
-              <a:t>16/05/2015</a:t>
+              <a:t>18/05/2015</a:t>
             </a:fld>
             <a:endParaRPr lang="es-ES"/>
           </a:p>
@@ -1851,7 +1866,7 @@
           <a:p>
             <a:fld id="{7A847CFC-816F-41D0-AAC0-9BF4FEBC753E}" type="datetimeFigureOut">
               <a:rPr lang="es-ES" smtClean="0"/>
-              <a:t>16/05/2015</a:t>
+              <a:t>18/05/2015</a:t>
             </a:fld>
             <a:endParaRPr lang="es-ES"/>
           </a:p>
@@ -1941,7 +1956,7 @@
           <a:p>
             <a:fld id="{7A847CFC-816F-41D0-AAC0-9BF4FEBC753E}" type="datetimeFigureOut">
               <a:rPr lang="es-ES" smtClean="0"/>
-              <a:t>16/05/2015</a:t>
+              <a:t>18/05/2015</a:t>
             </a:fld>
             <a:endParaRPr lang="es-ES"/>
           </a:p>
@@ -2213,7 +2228,7 @@
           <a:p>
             <a:fld id="{7A847CFC-816F-41D0-AAC0-9BF4FEBC753E}" type="datetimeFigureOut">
               <a:rPr lang="es-ES" smtClean="0"/>
-              <a:t>16/05/2015</a:t>
+              <a:t>18/05/2015</a:t>
             </a:fld>
             <a:endParaRPr lang="es-ES"/>
           </a:p>
@@ -2461,7 +2476,7 @@
           <a:p>
             <a:fld id="{7A847CFC-816F-41D0-AAC0-9BF4FEBC753E}" type="datetimeFigureOut">
               <a:rPr lang="es-ES" smtClean="0"/>
-              <a:t>16/05/2015</a:t>
+              <a:t>18/05/2015</a:t>
             </a:fld>
             <a:endParaRPr lang="es-ES"/>
           </a:p>
@@ -2669,7 +2684,7 @@
           <a:p>
             <a:fld id="{7A847CFC-816F-41D0-AAC0-9BF4FEBC753E}" type="datetimeFigureOut">
               <a:rPr lang="es-ES" smtClean="0"/>
-              <a:t>16/05/2015</a:t>
+              <a:t>18/05/2015</a:t>
             </a:fld>
             <a:endParaRPr lang="es-ES"/>
           </a:p>
@@ -3077,6 +3092,1736 @@
   <p:clrMapOvr>
     <a:masterClrMapping/>
   </p:clrMapOvr>
+  <p:timing>
+    <p:tnLst>
+      <p:par>
+        <p:cTn id="1" dur="indefinite" restart="never" nodeType="tmRoot"/>
+      </p:par>
+    </p:tnLst>
+  </p:timing>
+</p:sld>
+</file>
+
+<file path=ppt/slides/slide10.xml><?xml version="1.0" encoding="utf-8"?>
+<p:sld xmlns:a="http://schemas.openxmlformats.org/drawingml/2006/main" xmlns:r="http://schemas.openxmlformats.org/officeDocument/2006/relationships" xmlns:p="http://schemas.openxmlformats.org/presentationml/2006/main">
+  <p:cSld>
+    <p:spTree>
+      <p:nvGrpSpPr>
+        <p:cNvPr id="1" name=""/>
+        <p:cNvGrpSpPr/>
+        <p:nvPr/>
+      </p:nvGrpSpPr>
+      <p:grpSpPr>
+        <a:xfrm>
+          <a:off x="0" y="0"/>
+          <a:ext cx="0" cy="0"/>
+          <a:chOff x="0" y="0"/>
+          <a:chExt cx="0" cy="0"/>
+        </a:xfrm>
+      </p:grpSpPr>
+      <p:sp>
+        <p:nvSpPr>
+          <p:cNvPr id="4" name="2 Título"/>
+          <p:cNvSpPr>
+            <a:spLocks noGrp="1"/>
+          </p:cNvSpPr>
+          <p:nvPr>
+            <p:ph type="title"/>
+          </p:nvPr>
+        </p:nvSpPr>
+        <p:spPr>
+          <a:xfrm>
+            <a:off x="467544" y="260648"/>
+            <a:ext cx="7756263" cy="1054250"/>
+          </a:xfrm>
+        </p:spPr>
+        <p:txBody>
+          <a:bodyPr/>
+          <a:lstStyle/>
+          <a:p>
+            <a:r>
+              <a:rPr lang="es-ES" dirty="0" smtClean="0"/>
+              <a:t>Formato de Celdas</a:t>
+            </a:r>
+            <a:endParaRPr lang="es-ES" dirty="0"/>
+          </a:p>
+        </p:txBody>
+      </p:sp>
+      <p:sp>
+        <p:nvSpPr>
+          <p:cNvPr id="5" name="2 Título"/>
+          <p:cNvSpPr txBox="1">
+            <a:spLocks/>
+          </p:cNvSpPr>
+          <p:nvPr/>
+        </p:nvSpPr>
+        <p:spPr>
+          <a:xfrm>
+            <a:off x="0" y="1052736"/>
+            <a:ext cx="6779492" cy="1054250"/>
+          </a:xfrm>
+          <a:prstGeom prst="rect">
+            <a:avLst/>
+          </a:prstGeom>
+        </p:spPr>
+        <p:txBody>
+          <a:bodyPr vert="horz" lIns="91440" tIns="45720" rIns="91440" bIns="45720" rtlCol="0" anchor="ctr">
+            <a:noAutofit/>
+          </a:bodyPr>
+          <a:lstStyle>
+            <a:lvl1pPr algn="ctr" defTabSz="914400" rtl="0" eaLnBrk="1" latinLnBrk="0" hangingPunct="1">
+              <a:spcBef>
+                <a:spcPct val="0"/>
+              </a:spcBef>
+              <a:buNone/>
+              <a:defRPr sz="5400" kern="1200">
+                <a:solidFill>
+                  <a:schemeClr val="tx2"/>
+                </a:solidFill>
+                <a:latin typeface="+mj-lt"/>
+                <a:ea typeface="+mj-ea"/>
+                <a:cs typeface="+mj-cs"/>
+              </a:defRPr>
+            </a:lvl1pPr>
+            <a:lvl2pPr eaLnBrk="1" hangingPunct="1">
+              <a:defRPr>
+                <a:solidFill>
+                  <a:schemeClr val="tx2"/>
+                </a:solidFill>
+              </a:defRPr>
+            </a:lvl2pPr>
+            <a:lvl3pPr eaLnBrk="1" hangingPunct="1">
+              <a:defRPr>
+                <a:solidFill>
+                  <a:schemeClr val="tx2"/>
+                </a:solidFill>
+              </a:defRPr>
+            </a:lvl3pPr>
+            <a:lvl4pPr eaLnBrk="1" hangingPunct="1">
+              <a:defRPr>
+                <a:solidFill>
+                  <a:schemeClr val="tx2"/>
+                </a:solidFill>
+              </a:defRPr>
+            </a:lvl4pPr>
+            <a:lvl5pPr eaLnBrk="1" hangingPunct="1">
+              <a:defRPr>
+                <a:solidFill>
+                  <a:schemeClr val="tx2"/>
+                </a:solidFill>
+              </a:defRPr>
+            </a:lvl5pPr>
+            <a:lvl6pPr eaLnBrk="1" hangingPunct="1">
+              <a:defRPr>
+                <a:solidFill>
+                  <a:schemeClr val="tx2"/>
+                </a:solidFill>
+              </a:defRPr>
+            </a:lvl6pPr>
+            <a:lvl7pPr eaLnBrk="1" hangingPunct="1">
+              <a:defRPr>
+                <a:solidFill>
+                  <a:schemeClr val="tx2"/>
+                </a:solidFill>
+              </a:defRPr>
+            </a:lvl7pPr>
+            <a:lvl8pPr eaLnBrk="1" hangingPunct="1">
+              <a:defRPr>
+                <a:solidFill>
+                  <a:schemeClr val="tx2"/>
+                </a:solidFill>
+              </a:defRPr>
+            </a:lvl8pPr>
+            <a:lvl9pPr eaLnBrk="1" hangingPunct="1">
+              <a:defRPr>
+                <a:solidFill>
+                  <a:schemeClr val="tx2"/>
+                </a:solidFill>
+              </a:defRPr>
+            </a:lvl9pPr>
+          </a:lstStyle>
+          <a:p>
+            <a:r>
+              <a:rPr lang="es-ES" sz="3600" dirty="0" smtClean="0"/>
+              <a:t>Formato Numérico  de Celdas</a:t>
+            </a:r>
+            <a:endParaRPr lang="es-ES" sz="3600" dirty="0"/>
+          </a:p>
+        </p:txBody>
+      </p:sp>
+      <p:pic>
+        <p:nvPicPr>
+          <p:cNvPr id="6" name="5 Imagen"/>
+          <p:cNvPicPr>
+            <a:picLocks noChangeAspect="1"/>
+          </p:cNvPicPr>
+          <p:nvPr/>
+        </p:nvPicPr>
+        <p:blipFill>
+          <a:blip r:embed="rId2">
+            <a:extLst>
+              <a:ext uri="{28A0092B-C50C-407E-A947-70E740481C1C}">
+                <a14:useLocalDpi xmlns:a14="http://schemas.microsoft.com/office/drawing/2010/main" val="0"/>
+              </a:ext>
+            </a:extLst>
+          </a:blip>
+          <a:stretch>
+            <a:fillRect/>
+          </a:stretch>
+        </p:blipFill>
+        <p:spPr>
+          <a:xfrm>
+            <a:off x="395536" y="2060848"/>
+            <a:ext cx="8496944" cy="4536504"/>
+          </a:xfrm>
+          <a:prstGeom prst="rect">
+            <a:avLst/>
+          </a:prstGeom>
+        </p:spPr>
+      </p:pic>
+    </p:spTree>
+    <p:extLst>
+      <p:ext uri="{BB962C8B-B14F-4D97-AF65-F5344CB8AC3E}">
+        <p14:creationId xmlns:p14="http://schemas.microsoft.com/office/powerpoint/2010/main" val="52848873"/>
+      </p:ext>
+    </p:extLst>
+  </p:cSld>
+  <p:clrMapOvr>
+    <a:masterClrMapping/>
+  </p:clrMapOvr>
+</p:sld>
+</file>
+
+<file path=ppt/slides/slide11.xml><?xml version="1.0" encoding="utf-8"?>
+<p:sld xmlns:a="http://schemas.openxmlformats.org/drawingml/2006/main" xmlns:r="http://schemas.openxmlformats.org/officeDocument/2006/relationships" xmlns:p="http://schemas.openxmlformats.org/presentationml/2006/main">
+  <p:cSld>
+    <p:spTree>
+      <p:nvGrpSpPr>
+        <p:cNvPr id="1" name=""/>
+        <p:cNvGrpSpPr/>
+        <p:nvPr/>
+      </p:nvGrpSpPr>
+      <p:grpSpPr>
+        <a:xfrm>
+          <a:off x="0" y="0"/>
+          <a:ext cx="0" cy="0"/>
+          <a:chOff x="0" y="0"/>
+          <a:chExt cx="0" cy="0"/>
+        </a:xfrm>
+      </p:grpSpPr>
+      <p:sp>
+        <p:nvSpPr>
+          <p:cNvPr id="4" name="2 Título"/>
+          <p:cNvSpPr txBox="1">
+            <a:spLocks/>
+          </p:cNvSpPr>
+          <p:nvPr/>
+        </p:nvSpPr>
+        <p:spPr>
+          <a:xfrm>
+            <a:off x="107504" y="332656"/>
+            <a:ext cx="6779492" cy="1054250"/>
+          </a:xfrm>
+          <a:prstGeom prst="rect">
+            <a:avLst/>
+          </a:prstGeom>
+        </p:spPr>
+        <p:txBody>
+          <a:bodyPr vert="horz" lIns="91440" tIns="45720" rIns="91440" bIns="45720" rtlCol="0" anchor="ctr">
+            <a:noAutofit/>
+          </a:bodyPr>
+          <a:lstStyle>
+            <a:lvl1pPr algn="ctr" defTabSz="914400" rtl="0" eaLnBrk="1" latinLnBrk="0" hangingPunct="1">
+              <a:spcBef>
+                <a:spcPct val="0"/>
+              </a:spcBef>
+              <a:buNone/>
+              <a:defRPr sz="5400" kern="1200">
+                <a:solidFill>
+                  <a:schemeClr val="tx2"/>
+                </a:solidFill>
+                <a:latin typeface="+mj-lt"/>
+                <a:ea typeface="+mj-ea"/>
+                <a:cs typeface="+mj-cs"/>
+              </a:defRPr>
+            </a:lvl1pPr>
+            <a:lvl2pPr eaLnBrk="1" hangingPunct="1">
+              <a:defRPr>
+                <a:solidFill>
+                  <a:schemeClr val="tx2"/>
+                </a:solidFill>
+              </a:defRPr>
+            </a:lvl2pPr>
+            <a:lvl3pPr eaLnBrk="1" hangingPunct="1">
+              <a:defRPr>
+                <a:solidFill>
+                  <a:schemeClr val="tx2"/>
+                </a:solidFill>
+              </a:defRPr>
+            </a:lvl3pPr>
+            <a:lvl4pPr eaLnBrk="1" hangingPunct="1">
+              <a:defRPr>
+                <a:solidFill>
+                  <a:schemeClr val="tx2"/>
+                </a:solidFill>
+              </a:defRPr>
+            </a:lvl4pPr>
+            <a:lvl5pPr eaLnBrk="1" hangingPunct="1">
+              <a:defRPr>
+                <a:solidFill>
+                  <a:schemeClr val="tx2"/>
+                </a:solidFill>
+              </a:defRPr>
+            </a:lvl5pPr>
+            <a:lvl6pPr eaLnBrk="1" hangingPunct="1">
+              <a:defRPr>
+                <a:solidFill>
+                  <a:schemeClr val="tx2"/>
+                </a:solidFill>
+              </a:defRPr>
+            </a:lvl6pPr>
+            <a:lvl7pPr eaLnBrk="1" hangingPunct="1">
+              <a:defRPr>
+                <a:solidFill>
+                  <a:schemeClr val="tx2"/>
+                </a:solidFill>
+              </a:defRPr>
+            </a:lvl7pPr>
+            <a:lvl8pPr eaLnBrk="1" hangingPunct="1">
+              <a:defRPr>
+                <a:solidFill>
+                  <a:schemeClr val="tx2"/>
+                </a:solidFill>
+              </a:defRPr>
+            </a:lvl8pPr>
+            <a:lvl9pPr eaLnBrk="1" hangingPunct="1">
+              <a:defRPr>
+                <a:solidFill>
+                  <a:schemeClr val="tx2"/>
+                </a:solidFill>
+              </a:defRPr>
+            </a:lvl9pPr>
+          </a:lstStyle>
+          <a:p>
+            <a:r>
+              <a:rPr lang="es-ES" sz="3600" dirty="0" smtClean="0"/>
+              <a:t>Formato Alineación de Celdas</a:t>
+            </a:r>
+            <a:endParaRPr lang="es-ES" sz="3600" dirty="0"/>
+          </a:p>
+        </p:txBody>
+      </p:sp>
+      <p:pic>
+        <p:nvPicPr>
+          <p:cNvPr id="5" name="4 Imagen"/>
+          <p:cNvPicPr>
+            <a:picLocks noChangeAspect="1"/>
+          </p:cNvPicPr>
+          <p:nvPr/>
+        </p:nvPicPr>
+        <p:blipFill>
+          <a:blip r:embed="rId2">
+            <a:extLst>
+              <a:ext uri="{28A0092B-C50C-407E-A947-70E740481C1C}">
+                <a14:useLocalDpi xmlns:a14="http://schemas.microsoft.com/office/drawing/2010/main" val="0"/>
+              </a:ext>
+            </a:extLst>
+          </a:blip>
+          <a:stretch>
+            <a:fillRect/>
+          </a:stretch>
+        </p:blipFill>
+        <p:spPr>
+          <a:xfrm>
+            <a:off x="873112" y="1386906"/>
+            <a:ext cx="7299288" cy="5138438"/>
+          </a:xfrm>
+          <a:prstGeom prst="rect">
+            <a:avLst/>
+          </a:prstGeom>
+        </p:spPr>
+      </p:pic>
+    </p:spTree>
+    <p:extLst>
+      <p:ext uri="{BB962C8B-B14F-4D97-AF65-F5344CB8AC3E}">
+        <p14:creationId xmlns:p14="http://schemas.microsoft.com/office/powerpoint/2010/main" val="1045526554"/>
+      </p:ext>
+    </p:extLst>
+  </p:cSld>
+  <p:clrMapOvr>
+    <a:masterClrMapping/>
+  </p:clrMapOvr>
+</p:sld>
+</file>
+
+<file path=ppt/slides/slide12.xml><?xml version="1.0" encoding="utf-8"?>
+<p:sld xmlns:a="http://schemas.openxmlformats.org/drawingml/2006/main" xmlns:r="http://schemas.openxmlformats.org/officeDocument/2006/relationships" xmlns:p="http://schemas.openxmlformats.org/presentationml/2006/main">
+  <p:cSld>
+    <p:spTree>
+      <p:nvGrpSpPr>
+        <p:cNvPr id="1" name=""/>
+        <p:cNvGrpSpPr/>
+        <p:nvPr/>
+      </p:nvGrpSpPr>
+      <p:grpSpPr>
+        <a:xfrm>
+          <a:off x="0" y="0"/>
+          <a:ext cx="0" cy="0"/>
+          <a:chOff x="0" y="0"/>
+          <a:chExt cx="0" cy="0"/>
+        </a:xfrm>
+      </p:grpSpPr>
+      <p:sp>
+        <p:nvSpPr>
+          <p:cNvPr id="4" name="2 Título"/>
+          <p:cNvSpPr txBox="1">
+            <a:spLocks/>
+          </p:cNvSpPr>
+          <p:nvPr/>
+        </p:nvSpPr>
+        <p:spPr>
+          <a:xfrm>
+            <a:off x="107504" y="332656"/>
+            <a:ext cx="6779492" cy="1054250"/>
+          </a:xfrm>
+          <a:prstGeom prst="rect">
+            <a:avLst/>
+          </a:prstGeom>
+        </p:spPr>
+        <p:txBody>
+          <a:bodyPr vert="horz" lIns="91440" tIns="45720" rIns="91440" bIns="45720" rtlCol="0" anchor="ctr">
+            <a:noAutofit/>
+          </a:bodyPr>
+          <a:lstStyle>
+            <a:lvl1pPr algn="ctr" defTabSz="914400" rtl="0" eaLnBrk="1" latinLnBrk="0" hangingPunct="1">
+              <a:spcBef>
+                <a:spcPct val="0"/>
+              </a:spcBef>
+              <a:buNone/>
+              <a:defRPr sz="5400" kern="1200">
+                <a:solidFill>
+                  <a:schemeClr val="tx2"/>
+                </a:solidFill>
+                <a:latin typeface="+mj-lt"/>
+                <a:ea typeface="+mj-ea"/>
+                <a:cs typeface="+mj-cs"/>
+              </a:defRPr>
+            </a:lvl1pPr>
+            <a:lvl2pPr eaLnBrk="1" hangingPunct="1">
+              <a:defRPr>
+                <a:solidFill>
+                  <a:schemeClr val="tx2"/>
+                </a:solidFill>
+              </a:defRPr>
+            </a:lvl2pPr>
+            <a:lvl3pPr eaLnBrk="1" hangingPunct="1">
+              <a:defRPr>
+                <a:solidFill>
+                  <a:schemeClr val="tx2"/>
+                </a:solidFill>
+              </a:defRPr>
+            </a:lvl3pPr>
+            <a:lvl4pPr eaLnBrk="1" hangingPunct="1">
+              <a:defRPr>
+                <a:solidFill>
+                  <a:schemeClr val="tx2"/>
+                </a:solidFill>
+              </a:defRPr>
+            </a:lvl4pPr>
+            <a:lvl5pPr eaLnBrk="1" hangingPunct="1">
+              <a:defRPr>
+                <a:solidFill>
+                  <a:schemeClr val="tx2"/>
+                </a:solidFill>
+              </a:defRPr>
+            </a:lvl5pPr>
+            <a:lvl6pPr eaLnBrk="1" hangingPunct="1">
+              <a:defRPr>
+                <a:solidFill>
+                  <a:schemeClr val="tx2"/>
+                </a:solidFill>
+              </a:defRPr>
+            </a:lvl6pPr>
+            <a:lvl7pPr eaLnBrk="1" hangingPunct="1">
+              <a:defRPr>
+                <a:solidFill>
+                  <a:schemeClr val="tx2"/>
+                </a:solidFill>
+              </a:defRPr>
+            </a:lvl7pPr>
+            <a:lvl8pPr eaLnBrk="1" hangingPunct="1">
+              <a:defRPr>
+                <a:solidFill>
+                  <a:schemeClr val="tx2"/>
+                </a:solidFill>
+              </a:defRPr>
+            </a:lvl8pPr>
+            <a:lvl9pPr eaLnBrk="1" hangingPunct="1">
+              <a:defRPr>
+                <a:solidFill>
+                  <a:schemeClr val="tx2"/>
+                </a:solidFill>
+              </a:defRPr>
+            </a:lvl9pPr>
+          </a:lstStyle>
+          <a:p>
+            <a:r>
+              <a:rPr lang="es-ES" sz="3600" dirty="0" smtClean="0"/>
+              <a:t>Formato Fuente de Celdas</a:t>
+            </a:r>
+            <a:endParaRPr lang="es-ES" sz="3600" dirty="0"/>
+          </a:p>
+        </p:txBody>
+      </p:sp>
+      <p:pic>
+        <p:nvPicPr>
+          <p:cNvPr id="5" name="4 Imagen"/>
+          <p:cNvPicPr>
+            <a:picLocks noChangeAspect="1"/>
+          </p:cNvPicPr>
+          <p:nvPr/>
+        </p:nvPicPr>
+        <p:blipFill>
+          <a:blip r:embed="rId2">
+            <a:extLst>
+              <a:ext uri="{28A0092B-C50C-407E-A947-70E740481C1C}">
+                <a14:useLocalDpi xmlns:a14="http://schemas.microsoft.com/office/drawing/2010/main" val="0"/>
+              </a:ext>
+            </a:extLst>
+          </a:blip>
+          <a:stretch>
+            <a:fillRect/>
+          </a:stretch>
+        </p:blipFill>
+        <p:spPr>
+          <a:xfrm>
+            <a:off x="323528" y="1386906"/>
+            <a:ext cx="8280920" cy="5066430"/>
+          </a:xfrm>
+          <a:prstGeom prst="rect">
+            <a:avLst/>
+          </a:prstGeom>
+        </p:spPr>
+      </p:pic>
+    </p:spTree>
+    <p:extLst>
+      <p:ext uri="{BB962C8B-B14F-4D97-AF65-F5344CB8AC3E}">
+        <p14:creationId xmlns:p14="http://schemas.microsoft.com/office/powerpoint/2010/main" val="3998634603"/>
+      </p:ext>
+    </p:extLst>
+  </p:cSld>
+  <p:clrMapOvr>
+    <a:masterClrMapping/>
+  </p:clrMapOvr>
+</p:sld>
+</file>
+
+<file path=ppt/slides/slide13.xml><?xml version="1.0" encoding="utf-8"?>
+<p:sld xmlns:a="http://schemas.openxmlformats.org/drawingml/2006/main" xmlns:r="http://schemas.openxmlformats.org/officeDocument/2006/relationships" xmlns:p="http://schemas.openxmlformats.org/presentationml/2006/main">
+  <p:cSld>
+    <p:spTree>
+      <p:nvGrpSpPr>
+        <p:cNvPr id="1" name=""/>
+        <p:cNvGrpSpPr/>
+        <p:nvPr/>
+      </p:nvGrpSpPr>
+      <p:grpSpPr>
+        <a:xfrm>
+          <a:off x="0" y="0"/>
+          <a:ext cx="0" cy="0"/>
+          <a:chOff x="0" y="0"/>
+          <a:chExt cx="0" cy="0"/>
+        </a:xfrm>
+      </p:grpSpPr>
+      <p:sp>
+        <p:nvSpPr>
+          <p:cNvPr id="4" name="2 Título"/>
+          <p:cNvSpPr txBox="1">
+            <a:spLocks/>
+          </p:cNvSpPr>
+          <p:nvPr/>
+        </p:nvSpPr>
+        <p:spPr>
+          <a:xfrm>
+            <a:off x="323528" y="332656"/>
+            <a:ext cx="6779492" cy="936104"/>
+          </a:xfrm>
+          <a:prstGeom prst="rect">
+            <a:avLst/>
+          </a:prstGeom>
+        </p:spPr>
+        <p:txBody>
+          <a:bodyPr vert="horz" lIns="91440" tIns="45720" rIns="91440" bIns="45720" rtlCol="0" anchor="ctr">
+            <a:noAutofit/>
+          </a:bodyPr>
+          <a:lstStyle>
+            <a:lvl1pPr algn="ctr" defTabSz="914400" rtl="0" eaLnBrk="1" latinLnBrk="0" hangingPunct="1">
+              <a:spcBef>
+                <a:spcPct val="0"/>
+              </a:spcBef>
+              <a:buNone/>
+              <a:defRPr sz="5400" kern="1200">
+                <a:solidFill>
+                  <a:schemeClr val="tx2"/>
+                </a:solidFill>
+                <a:latin typeface="+mj-lt"/>
+                <a:ea typeface="+mj-ea"/>
+                <a:cs typeface="+mj-cs"/>
+              </a:defRPr>
+            </a:lvl1pPr>
+            <a:lvl2pPr eaLnBrk="1" hangingPunct="1">
+              <a:defRPr>
+                <a:solidFill>
+                  <a:schemeClr val="tx2"/>
+                </a:solidFill>
+              </a:defRPr>
+            </a:lvl2pPr>
+            <a:lvl3pPr eaLnBrk="1" hangingPunct="1">
+              <a:defRPr>
+                <a:solidFill>
+                  <a:schemeClr val="tx2"/>
+                </a:solidFill>
+              </a:defRPr>
+            </a:lvl3pPr>
+            <a:lvl4pPr eaLnBrk="1" hangingPunct="1">
+              <a:defRPr>
+                <a:solidFill>
+                  <a:schemeClr val="tx2"/>
+                </a:solidFill>
+              </a:defRPr>
+            </a:lvl4pPr>
+            <a:lvl5pPr eaLnBrk="1" hangingPunct="1">
+              <a:defRPr>
+                <a:solidFill>
+                  <a:schemeClr val="tx2"/>
+                </a:solidFill>
+              </a:defRPr>
+            </a:lvl5pPr>
+            <a:lvl6pPr eaLnBrk="1" hangingPunct="1">
+              <a:defRPr>
+                <a:solidFill>
+                  <a:schemeClr val="tx2"/>
+                </a:solidFill>
+              </a:defRPr>
+            </a:lvl6pPr>
+            <a:lvl7pPr eaLnBrk="1" hangingPunct="1">
+              <a:defRPr>
+                <a:solidFill>
+                  <a:schemeClr val="tx2"/>
+                </a:solidFill>
+              </a:defRPr>
+            </a:lvl7pPr>
+            <a:lvl8pPr eaLnBrk="1" hangingPunct="1">
+              <a:defRPr>
+                <a:solidFill>
+                  <a:schemeClr val="tx2"/>
+                </a:solidFill>
+              </a:defRPr>
+            </a:lvl8pPr>
+            <a:lvl9pPr eaLnBrk="1" hangingPunct="1">
+              <a:defRPr>
+                <a:solidFill>
+                  <a:schemeClr val="tx2"/>
+                </a:solidFill>
+              </a:defRPr>
+            </a:lvl9pPr>
+          </a:lstStyle>
+          <a:p>
+            <a:r>
+              <a:rPr lang="es-ES" sz="3600" dirty="0" smtClean="0"/>
+              <a:t>Formato Bordes de Celdas</a:t>
+            </a:r>
+            <a:endParaRPr lang="es-ES" sz="3600" dirty="0"/>
+          </a:p>
+        </p:txBody>
+      </p:sp>
+      <p:pic>
+        <p:nvPicPr>
+          <p:cNvPr id="5" name="4 Imagen"/>
+          <p:cNvPicPr>
+            <a:picLocks noChangeAspect="1"/>
+          </p:cNvPicPr>
+          <p:nvPr/>
+        </p:nvPicPr>
+        <p:blipFill>
+          <a:blip r:embed="rId2">
+            <a:extLst>
+              <a:ext uri="{28A0092B-C50C-407E-A947-70E740481C1C}">
+                <a14:useLocalDpi xmlns:a14="http://schemas.microsoft.com/office/drawing/2010/main" val="0"/>
+              </a:ext>
+            </a:extLst>
+          </a:blip>
+          <a:stretch>
+            <a:fillRect/>
+          </a:stretch>
+        </p:blipFill>
+        <p:spPr>
+          <a:xfrm>
+            <a:off x="611560" y="1245243"/>
+            <a:ext cx="7848872" cy="5150836"/>
+          </a:xfrm>
+          <a:prstGeom prst="rect">
+            <a:avLst/>
+          </a:prstGeom>
+        </p:spPr>
+      </p:pic>
+    </p:spTree>
+    <p:extLst>
+      <p:ext uri="{BB962C8B-B14F-4D97-AF65-F5344CB8AC3E}">
+        <p14:creationId xmlns:p14="http://schemas.microsoft.com/office/powerpoint/2010/main" val="4186644953"/>
+      </p:ext>
+    </p:extLst>
+  </p:cSld>
+  <p:clrMapOvr>
+    <a:masterClrMapping/>
+  </p:clrMapOvr>
+</p:sld>
+</file>
+
+<file path=ppt/slides/slide14.xml><?xml version="1.0" encoding="utf-8"?>
+<p:sld xmlns:a="http://schemas.openxmlformats.org/drawingml/2006/main" xmlns:r="http://schemas.openxmlformats.org/officeDocument/2006/relationships" xmlns:p="http://schemas.openxmlformats.org/presentationml/2006/main">
+  <p:cSld>
+    <p:spTree>
+      <p:nvGrpSpPr>
+        <p:cNvPr id="1" name=""/>
+        <p:cNvGrpSpPr/>
+        <p:nvPr/>
+      </p:nvGrpSpPr>
+      <p:grpSpPr>
+        <a:xfrm>
+          <a:off x="0" y="0"/>
+          <a:ext cx="0" cy="0"/>
+          <a:chOff x="0" y="0"/>
+          <a:chExt cx="0" cy="0"/>
+        </a:xfrm>
+      </p:grpSpPr>
+      <p:sp>
+        <p:nvSpPr>
+          <p:cNvPr id="4" name="2 Título"/>
+          <p:cNvSpPr txBox="1">
+            <a:spLocks/>
+          </p:cNvSpPr>
+          <p:nvPr/>
+        </p:nvSpPr>
+        <p:spPr>
+          <a:xfrm>
+            <a:off x="323528" y="332656"/>
+            <a:ext cx="6779492" cy="1054250"/>
+          </a:xfrm>
+          <a:prstGeom prst="rect">
+            <a:avLst/>
+          </a:prstGeom>
+        </p:spPr>
+        <p:txBody>
+          <a:bodyPr vert="horz" lIns="91440" tIns="45720" rIns="91440" bIns="45720" rtlCol="0" anchor="ctr">
+            <a:noAutofit/>
+          </a:bodyPr>
+          <a:lstStyle>
+            <a:lvl1pPr algn="ctr" defTabSz="914400" rtl="0" eaLnBrk="1" latinLnBrk="0" hangingPunct="1">
+              <a:spcBef>
+                <a:spcPct val="0"/>
+              </a:spcBef>
+              <a:buNone/>
+              <a:defRPr sz="5400" kern="1200">
+                <a:solidFill>
+                  <a:schemeClr val="tx2"/>
+                </a:solidFill>
+                <a:latin typeface="+mj-lt"/>
+                <a:ea typeface="+mj-ea"/>
+                <a:cs typeface="+mj-cs"/>
+              </a:defRPr>
+            </a:lvl1pPr>
+            <a:lvl2pPr eaLnBrk="1" hangingPunct="1">
+              <a:defRPr>
+                <a:solidFill>
+                  <a:schemeClr val="tx2"/>
+                </a:solidFill>
+              </a:defRPr>
+            </a:lvl2pPr>
+            <a:lvl3pPr eaLnBrk="1" hangingPunct="1">
+              <a:defRPr>
+                <a:solidFill>
+                  <a:schemeClr val="tx2"/>
+                </a:solidFill>
+              </a:defRPr>
+            </a:lvl3pPr>
+            <a:lvl4pPr eaLnBrk="1" hangingPunct="1">
+              <a:defRPr>
+                <a:solidFill>
+                  <a:schemeClr val="tx2"/>
+                </a:solidFill>
+              </a:defRPr>
+            </a:lvl4pPr>
+            <a:lvl5pPr eaLnBrk="1" hangingPunct="1">
+              <a:defRPr>
+                <a:solidFill>
+                  <a:schemeClr val="tx2"/>
+                </a:solidFill>
+              </a:defRPr>
+            </a:lvl5pPr>
+            <a:lvl6pPr eaLnBrk="1" hangingPunct="1">
+              <a:defRPr>
+                <a:solidFill>
+                  <a:schemeClr val="tx2"/>
+                </a:solidFill>
+              </a:defRPr>
+            </a:lvl6pPr>
+            <a:lvl7pPr eaLnBrk="1" hangingPunct="1">
+              <a:defRPr>
+                <a:solidFill>
+                  <a:schemeClr val="tx2"/>
+                </a:solidFill>
+              </a:defRPr>
+            </a:lvl7pPr>
+            <a:lvl8pPr eaLnBrk="1" hangingPunct="1">
+              <a:defRPr>
+                <a:solidFill>
+                  <a:schemeClr val="tx2"/>
+                </a:solidFill>
+              </a:defRPr>
+            </a:lvl8pPr>
+            <a:lvl9pPr eaLnBrk="1" hangingPunct="1">
+              <a:defRPr>
+                <a:solidFill>
+                  <a:schemeClr val="tx2"/>
+                </a:solidFill>
+              </a:defRPr>
+            </a:lvl9pPr>
+          </a:lstStyle>
+          <a:p>
+            <a:r>
+              <a:rPr lang="es-ES" sz="3600" dirty="0" smtClean="0"/>
+              <a:t>Formato Relleno de Celdas</a:t>
+            </a:r>
+            <a:endParaRPr lang="es-ES" sz="3600" dirty="0"/>
+          </a:p>
+        </p:txBody>
+      </p:sp>
+      <p:pic>
+        <p:nvPicPr>
+          <p:cNvPr id="5" name="4 Imagen"/>
+          <p:cNvPicPr>
+            <a:picLocks noChangeAspect="1"/>
+          </p:cNvPicPr>
+          <p:nvPr/>
+        </p:nvPicPr>
+        <p:blipFill>
+          <a:blip r:embed="rId2">
+            <a:extLst>
+              <a:ext uri="{28A0092B-C50C-407E-A947-70E740481C1C}">
+                <a14:useLocalDpi xmlns:a14="http://schemas.microsoft.com/office/drawing/2010/main" val="0"/>
+              </a:ext>
+            </a:extLst>
+          </a:blip>
+          <a:stretch>
+            <a:fillRect/>
+          </a:stretch>
+        </p:blipFill>
+        <p:spPr>
+          <a:xfrm>
+            <a:off x="611560" y="1372129"/>
+            <a:ext cx="7560840" cy="5081207"/>
+          </a:xfrm>
+          <a:prstGeom prst="rect">
+            <a:avLst/>
+          </a:prstGeom>
+        </p:spPr>
+      </p:pic>
+    </p:spTree>
+    <p:extLst>
+      <p:ext uri="{BB962C8B-B14F-4D97-AF65-F5344CB8AC3E}">
+        <p14:creationId xmlns:p14="http://schemas.microsoft.com/office/powerpoint/2010/main" val="1162335667"/>
+      </p:ext>
+    </p:extLst>
+  </p:cSld>
+  <p:clrMapOvr>
+    <a:masterClrMapping/>
+  </p:clrMapOvr>
+</p:sld>
+</file>
+
+<file path=ppt/slides/slide15.xml><?xml version="1.0" encoding="utf-8"?>
+<p:sld xmlns:a="http://schemas.openxmlformats.org/drawingml/2006/main" xmlns:r="http://schemas.openxmlformats.org/officeDocument/2006/relationships" xmlns:p="http://schemas.openxmlformats.org/presentationml/2006/main">
+  <p:cSld>
+    <p:spTree>
+      <p:nvGrpSpPr>
+        <p:cNvPr id="1" name=""/>
+        <p:cNvGrpSpPr/>
+        <p:nvPr/>
+      </p:nvGrpSpPr>
+      <p:grpSpPr>
+        <a:xfrm>
+          <a:off x="0" y="0"/>
+          <a:ext cx="0" cy="0"/>
+          <a:chOff x="0" y="0"/>
+          <a:chExt cx="0" cy="0"/>
+        </a:xfrm>
+      </p:grpSpPr>
+      <p:sp>
+        <p:nvSpPr>
+          <p:cNvPr id="2" name="1 Título"/>
+          <p:cNvSpPr>
+            <a:spLocks noGrp="1"/>
+          </p:cNvSpPr>
+          <p:nvPr>
+            <p:ph type="title"/>
+          </p:nvPr>
+        </p:nvSpPr>
+        <p:spPr>
+          <a:xfrm>
+            <a:off x="539552" y="2708920"/>
+            <a:ext cx="8229600" cy="1143000"/>
+          </a:xfrm>
+        </p:spPr>
+        <p:txBody>
+          <a:bodyPr>
+            <a:normAutofit/>
+          </a:bodyPr>
+          <a:lstStyle/>
+          <a:p>
+            <a:r>
+              <a:rPr lang="es-ES" dirty="0" smtClean="0"/>
+              <a:t>Formatos Condicionales</a:t>
+            </a:r>
+            <a:endParaRPr lang="es-ES" dirty="0"/>
+          </a:p>
+        </p:txBody>
+      </p:sp>
+    </p:spTree>
+    <p:extLst>
+      <p:ext uri="{BB962C8B-B14F-4D97-AF65-F5344CB8AC3E}">
+        <p14:creationId xmlns:p14="http://schemas.microsoft.com/office/powerpoint/2010/main" val="3954603691"/>
+      </p:ext>
+    </p:extLst>
+  </p:cSld>
+  <p:clrMapOvr>
+    <a:masterClrMapping/>
+  </p:clrMapOvr>
+  <p:timing>
+    <p:tnLst>
+      <p:par>
+        <p:cTn id="1" dur="indefinite" restart="never" nodeType="tmRoot"/>
+      </p:par>
+    </p:tnLst>
+  </p:timing>
+</p:sld>
+</file>
+
+<file path=ppt/slides/slide16.xml><?xml version="1.0" encoding="utf-8"?>
+<p:sld xmlns:a="http://schemas.openxmlformats.org/drawingml/2006/main" xmlns:r="http://schemas.openxmlformats.org/officeDocument/2006/relationships" xmlns:p="http://schemas.openxmlformats.org/presentationml/2006/main">
+  <p:cSld>
+    <p:spTree>
+      <p:nvGrpSpPr>
+        <p:cNvPr id="1" name=""/>
+        <p:cNvGrpSpPr/>
+        <p:nvPr/>
+      </p:nvGrpSpPr>
+      <p:grpSpPr>
+        <a:xfrm>
+          <a:off x="0" y="0"/>
+          <a:ext cx="0" cy="0"/>
+          <a:chOff x="0" y="0"/>
+          <a:chExt cx="0" cy="0"/>
+        </a:xfrm>
+      </p:grpSpPr>
+      <p:sp>
+        <p:nvSpPr>
+          <p:cNvPr id="2" name="1 Título"/>
+          <p:cNvSpPr>
+            <a:spLocks noGrp="1"/>
+          </p:cNvSpPr>
+          <p:nvPr>
+            <p:ph type="title"/>
+          </p:nvPr>
+        </p:nvSpPr>
+        <p:spPr/>
+        <p:txBody>
+          <a:bodyPr/>
+          <a:lstStyle/>
+          <a:p>
+            <a:r>
+              <a:rPr lang="es-ES" dirty="0" smtClean="0"/>
+              <a:t>Referencia a Celda</a:t>
+            </a:r>
+            <a:endParaRPr lang="es-ES" dirty="0"/>
+          </a:p>
+        </p:txBody>
+      </p:sp>
+      <p:pic>
+        <p:nvPicPr>
+          <p:cNvPr id="4" name="3 Imagen"/>
+          <p:cNvPicPr>
+            <a:picLocks noChangeAspect="1"/>
+          </p:cNvPicPr>
+          <p:nvPr/>
+        </p:nvPicPr>
+        <p:blipFill>
+          <a:blip r:embed="rId2">
+            <a:extLst>
+              <a:ext uri="{28A0092B-C50C-407E-A947-70E740481C1C}">
+                <a14:useLocalDpi xmlns:a14="http://schemas.microsoft.com/office/drawing/2010/main" val="0"/>
+              </a:ext>
+            </a:extLst>
+          </a:blip>
+          <a:stretch>
+            <a:fillRect/>
+          </a:stretch>
+        </p:blipFill>
+        <p:spPr>
+          <a:xfrm>
+            <a:off x="6372200" y="1450682"/>
+            <a:ext cx="2460701" cy="1080120"/>
+          </a:xfrm>
+          <a:prstGeom prst="rect">
+            <a:avLst/>
+          </a:prstGeom>
+        </p:spPr>
+      </p:pic>
+      <p:sp>
+        <p:nvSpPr>
+          <p:cNvPr id="5" name="2 Marcador de contenido"/>
+          <p:cNvSpPr>
+            <a:spLocks noGrp="1"/>
+          </p:cNvSpPr>
+          <p:nvPr>
+            <p:ph idx="1"/>
+          </p:nvPr>
+        </p:nvSpPr>
+        <p:spPr>
+          <a:xfrm>
+            <a:off x="251520" y="1196752"/>
+            <a:ext cx="6264696" cy="4824535"/>
+          </a:xfrm>
+        </p:spPr>
+        <p:txBody>
+          <a:bodyPr>
+            <a:normAutofit/>
+          </a:bodyPr>
+          <a:lstStyle/>
+          <a:p>
+            <a:r>
+              <a:rPr lang="es-ES" sz="2800" dirty="0" smtClean="0"/>
+              <a:t>Las referencia a celdas identifican una celda o grupo de celdas de un libro.</a:t>
+            </a:r>
+          </a:p>
+          <a:p>
+            <a:r>
+              <a:rPr lang="es-ES" sz="2800" dirty="0" smtClean="0"/>
+              <a:t>Se usan para vincular el resultado de una formula a las celdas referenciadas.</a:t>
+            </a:r>
+          </a:p>
+          <a:p>
+            <a:r>
+              <a:rPr lang="es-ES" sz="2800" dirty="0" smtClean="0"/>
+              <a:t>A través del ‘=‘, se puede referenciar la celda a operar.</a:t>
+            </a:r>
+          </a:p>
+          <a:p>
+            <a:r>
+              <a:rPr lang="es-ES" sz="2800" dirty="0" smtClean="0"/>
+              <a:t>Los rangos de celdas se introducen por medio del operador ‘:’, que separa a la referencia a la primera celda del rango, de la ultima celda.</a:t>
+            </a:r>
+            <a:endParaRPr lang="es-ES" sz="2800" dirty="0"/>
+          </a:p>
+        </p:txBody>
+      </p:sp>
+      <p:pic>
+        <p:nvPicPr>
+          <p:cNvPr id="6" name="5 Imagen"/>
+          <p:cNvPicPr>
+            <a:picLocks noChangeAspect="1"/>
+          </p:cNvPicPr>
+          <p:nvPr/>
+        </p:nvPicPr>
+        <p:blipFill>
+          <a:blip r:embed="rId3">
+            <a:extLst>
+              <a:ext uri="{28A0092B-C50C-407E-A947-70E740481C1C}">
+                <a14:useLocalDpi xmlns:a14="http://schemas.microsoft.com/office/drawing/2010/main" val="0"/>
+              </a:ext>
+            </a:extLst>
+          </a:blip>
+          <a:stretch>
+            <a:fillRect/>
+          </a:stretch>
+        </p:blipFill>
+        <p:spPr>
+          <a:xfrm>
+            <a:off x="6372200" y="2780928"/>
+            <a:ext cx="2453805" cy="2952328"/>
+          </a:xfrm>
+          <a:prstGeom prst="rect">
+            <a:avLst/>
+          </a:prstGeom>
+        </p:spPr>
+      </p:pic>
+    </p:spTree>
+    <p:extLst>
+      <p:ext uri="{BB962C8B-B14F-4D97-AF65-F5344CB8AC3E}">
+        <p14:creationId xmlns:p14="http://schemas.microsoft.com/office/powerpoint/2010/main" val="44644291"/>
+      </p:ext>
+    </p:extLst>
+  </p:cSld>
+  <p:clrMapOvr>
+    <a:masterClrMapping/>
+  </p:clrMapOvr>
+  <p:timing>
+    <p:tnLst>
+      <p:par>
+        <p:cTn id="1" dur="indefinite" restart="never" nodeType="tmRoot"/>
+      </p:par>
+    </p:tnLst>
+  </p:timing>
+</p:sld>
+</file>
+
+<file path=ppt/slides/slide17.xml><?xml version="1.0" encoding="utf-8"?>
+<p:sld xmlns:a="http://schemas.openxmlformats.org/drawingml/2006/main" xmlns:r="http://schemas.openxmlformats.org/officeDocument/2006/relationships" xmlns:p="http://schemas.openxmlformats.org/presentationml/2006/main">
+  <p:cSld>
+    <p:spTree>
+      <p:nvGrpSpPr>
+        <p:cNvPr id="1" name=""/>
+        <p:cNvGrpSpPr/>
+        <p:nvPr/>
+      </p:nvGrpSpPr>
+      <p:grpSpPr>
+        <a:xfrm>
+          <a:off x="0" y="0"/>
+          <a:ext cx="0" cy="0"/>
+          <a:chOff x="0" y="0"/>
+          <a:chExt cx="0" cy="0"/>
+        </a:xfrm>
+      </p:grpSpPr>
+      <p:sp>
+        <p:nvSpPr>
+          <p:cNvPr id="2" name="1 Título"/>
+          <p:cNvSpPr>
+            <a:spLocks noGrp="1"/>
+          </p:cNvSpPr>
+          <p:nvPr>
+            <p:ph type="title"/>
+          </p:nvPr>
+        </p:nvSpPr>
+        <p:spPr>
+          <a:xfrm>
+            <a:off x="179512" y="404664"/>
+            <a:ext cx="8784976" cy="706090"/>
+          </a:xfrm>
+        </p:spPr>
+        <p:txBody>
+          <a:bodyPr>
+            <a:noAutofit/>
+          </a:bodyPr>
+          <a:lstStyle/>
+          <a:p>
+            <a:r>
+              <a:rPr lang="es-ES" sz="3600" dirty="0"/>
+              <a:t>Asignación de nombres a una celda o rangos </a:t>
+            </a:r>
+          </a:p>
+        </p:txBody>
+      </p:sp>
+      <p:sp>
+        <p:nvSpPr>
+          <p:cNvPr id="3" name="2 Marcador de contenido"/>
+          <p:cNvSpPr>
+            <a:spLocks noGrp="1"/>
+          </p:cNvSpPr>
+          <p:nvPr>
+            <p:ph idx="1"/>
+          </p:nvPr>
+        </p:nvSpPr>
+        <p:spPr>
+          <a:xfrm>
+            <a:off x="457200" y="1600201"/>
+            <a:ext cx="5050904" cy="2208908"/>
+          </a:xfrm>
+        </p:spPr>
+        <p:txBody>
+          <a:bodyPr>
+            <a:normAutofit lnSpcReduction="10000"/>
+          </a:bodyPr>
+          <a:lstStyle/>
+          <a:p>
+            <a:pPr marL="0" indent="0">
+              <a:buNone/>
+            </a:pPr>
+            <a:r>
+              <a:rPr lang="es-ES" sz="2800" dirty="0" smtClean="0"/>
+              <a:t>Seleccione una celda o un rango de celdas y haga </a:t>
+            </a:r>
+            <a:r>
+              <a:rPr lang="es-ES" sz="2800" dirty="0" err="1" smtClean="0"/>
+              <a:t>click</a:t>
+            </a:r>
+            <a:r>
+              <a:rPr lang="es-ES" sz="2800" dirty="0" smtClean="0"/>
+              <a:t> en el cuadro nombre que se encuentra en el extremo izquierdo de la barra de formulas</a:t>
+            </a:r>
+            <a:endParaRPr lang="es-ES" sz="2800" dirty="0"/>
+          </a:p>
+        </p:txBody>
+      </p:sp>
+      <p:pic>
+        <p:nvPicPr>
+          <p:cNvPr id="4" name="3 Imagen"/>
+          <p:cNvPicPr>
+            <a:picLocks noChangeAspect="1"/>
+          </p:cNvPicPr>
+          <p:nvPr/>
+        </p:nvPicPr>
+        <p:blipFill>
+          <a:blip r:embed="rId2">
+            <a:extLst>
+              <a:ext uri="{28A0092B-C50C-407E-A947-70E740481C1C}">
+                <a14:useLocalDpi xmlns:a14="http://schemas.microsoft.com/office/drawing/2010/main" val="0"/>
+              </a:ext>
+            </a:extLst>
+          </a:blip>
+          <a:stretch>
+            <a:fillRect/>
+          </a:stretch>
+        </p:blipFill>
+        <p:spPr>
+          <a:xfrm>
+            <a:off x="5796136" y="1399656"/>
+            <a:ext cx="2973883" cy="2409453"/>
+          </a:xfrm>
+          <a:prstGeom prst="rect">
+            <a:avLst/>
+          </a:prstGeom>
+        </p:spPr>
+      </p:pic>
+      <p:sp>
+        <p:nvSpPr>
+          <p:cNvPr id="5" name="2 Marcador de contenido"/>
+          <p:cNvSpPr txBox="1">
+            <a:spLocks/>
+          </p:cNvSpPr>
+          <p:nvPr/>
+        </p:nvSpPr>
+        <p:spPr>
+          <a:xfrm>
+            <a:off x="467544" y="4221088"/>
+            <a:ext cx="5050904" cy="1357127"/>
+          </a:xfrm>
+          <a:prstGeom prst="rect">
+            <a:avLst/>
+          </a:prstGeom>
+        </p:spPr>
+        <p:txBody>
+          <a:bodyPr vert="horz" lIns="91440" tIns="45720" rIns="91440" bIns="45720" rtlCol="0">
+            <a:normAutofit/>
+          </a:bodyPr>
+          <a:lstStyle>
+            <a:lvl1pPr marL="342900" indent="-342900" algn="l" defTabSz="914400" rtl="0" eaLnBrk="1" latinLnBrk="0" hangingPunct="1">
+              <a:spcBef>
+                <a:spcPct val="20000"/>
+              </a:spcBef>
+              <a:buFont typeface="Arial" pitchFamily="34" charset="0"/>
+              <a:buChar char="•"/>
+              <a:defRPr sz="3200" kern="1200">
+                <a:solidFill>
+                  <a:schemeClr val="tx1"/>
+                </a:solidFill>
+                <a:latin typeface="+mn-lt"/>
+                <a:ea typeface="+mn-ea"/>
+                <a:cs typeface="+mn-cs"/>
+              </a:defRPr>
+            </a:lvl1pPr>
+            <a:lvl2pPr marL="742950" indent="-285750" algn="l" defTabSz="914400" rtl="0" eaLnBrk="1" latinLnBrk="0" hangingPunct="1">
+              <a:spcBef>
+                <a:spcPct val="20000"/>
+              </a:spcBef>
+              <a:buFont typeface="Arial" pitchFamily="34" charset="0"/>
+              <a:buChar char="–"/>
+              <a:defRPr sz="2800" kern="1200">
+                <a:solidFill>
+                  <a:schemeClr val="tx1"/>
+                </a:solidFill>
+                <a:latin typeface="+mn-lt"/>
+                <a:ea typeface="+mn-ea"/>
+                <a:cs typeface="+mn-cs"/>
+              </a:defRPr>
+            </a:lvl2pPr>
+            <a:lvl3pPr marL="1143000" indent="-228600" algn="l" defTabSz="914400" rtl="0" eaLnBrk="1" latinLnBrk="0" hangingPunct="1">
+              <a:spcBef>
+                <a:spcPct val="20000"/>
+              </a:spcBef>
+              <a:buFont typeface="Arial" pitchFamily="34" charset="0"/>
+              <a:buChar char="•"/>
+              <a:defRPr sz="2400" kern="1200">
+                <a:solidFill>
+                  <a:schemeClr val="tx1"/>
+                </a:solidFill>
+                <a:latin typeface="+mn-lt"/>
+                <a:ea typeface="+mn-ea"/>
+                <a:cs typeface="+mn-cs"/>
+              </a:defRPr>
+            </a:lvl3pPr>
+            <a:lvl4pPr marL="1600200" indent="-228600" algn="l" defTabSz="914400" rtl="0" eaLnBrk="1" latinLnBrk="0" hangingPunct="1">
+              <a:spcBef>
+                <a:spcPct val="20000"/>
+              </a:spcBef>
+              <a:buFont typeface="Arial" pitchFamily="34" charset="0"/>
+              <a:buChar char="–"/>
+              <a:defRPr sz="2000" kern="1200">
+                <a:solidFill>
+                  <a:schemeClr val="tx1"/>
+                </a:solidFill>
+                <a:latin typeface="+mn-lt"/>
+                <a:ea typeface="+mn-ea"/>
+                <a:cs typeface="+mn-cs"/>
+              </a:defRPr>
+            </a:lvl4pPr>
+            <a:lvl5pPr marL="2057400" indent="-228600" algn="l" defTabSz="914400" rtl="0" eaLnBrk="1" latinLnBrk="0" hangingPunct="1">
+              <a:spcBef>
+                <a:spcPct val="20000"/>
+              </a:spcBef>
+              <a:buFont typeface="Arial" pitchFamily="34" charset="0"/>
+              <a:buChar char="»"/>
+              <a:defRPr sz="2000" kern="1200">
+                <a:solidFill>
+                  <a:schemeClr val="tx1"/>
+                </a:solidFill>
+                <a:latin typeface="+mn-lt"/>
+                <a:ea typeface="+mn-ea"/>
+                <a:cs typeface="+mn-cs"/>
+              </a:defRPr>
+            </a:lvl5pPr>
+            <a:lvl6pPr marL="2514600" indent="-228600" algn="l" defTabSz="914400" rtl="0" eaLnBrk="1" latinLnBrk="0" hangingPunct="1">
+              <a:spcBef>
+                <a:spcPct val="20000"/>
+              </a:spcBef>
+              <a:buFont typeface="Arial" pitchFamily="34" charset="0"/>
+              <a:buChar char="•"/>
+              <a:defRPr sz="2000" kern="1200">
+                <a:solidFill>
+                  <a:schemeClr val="tx1"/>
+                </a:solidFill>
+                <a:latin typeface="+mn-lt"/>
+                <a:ea typeface="+mn-ea"/>
+                <a:cs typeface="+mn-cs"/>
+              </a:defRPr>
+            </a:lvl6pPr>
+            <a:lvl7pPr marL="2971800" indent="-228600" algn="l" defTabSz="914400" rtl="0" eaLnBrk="1" latinLnBrk="0" hangingPunct="1">
+              <a:spcBef>
+                <a:spcPct val="20000"/>
+              </a:spcBef>
+              <a:buFont typeface="Arial" pitchFamily="34" charset="0"/>
+              <a:buChar char="•"/>
+              <a:defRPr sz="2000" kern="1200">
+                <a:solidFill>
+                  <a:schemeClr val="tx1"/>
+                </a:solidFill>
+                <a:latin typeface="+mn-lt"/>
+                <a:ea typeface="+mn-ea"/>
+                <a:cs typeface="+mn-cs"/>
+              </a:defRPr>
+            </a:lvl7pPr>
+            <a:lvl8pPr marL="3429000" indent="-228600" algn="l" defTabSz="914400" rtl="0" eaLnBrk="1" latinLnBrk="0" hangingPunct="1">
+              <a:spcBef>
+                <a:spcPct val="20000"/>
+              </a:spcBef>
+              <a:buFont typeface="Arial" pitchFamily="34" charset="0"/>
+              <a:buChar char="•"/>
+              <a:defRPr sz="2000" kern="1200">
+                <a:solidFill>
+                  <a:schemeClr val="tx1"/>
+                </a:solidFill>
+                <a:latin typeface="+mn-lt"/>
+                <a:ea typeface="+mn-ea"/>
+                <a:cs typeface="+mn-cs"/>
+              </a:defRPr>
+            </a:lvl8pPr>
+            <a:lvl9pPr marL="3886200" indent="-228600" algn="l" defTabSz="914400" rtl="0" eaLnBrk="1" latinLnBrk="0" hangingPunct="1">
+              <a:spcBef>
+                <a:spcPct val="20000"/>
+              </a:spcBef>
+              <a:buFont typeface="Arial" pitchFamily="34" charset="0"/>
+              <a:buChar char="•"/>
+              <a:defRPr sz="2000" kern="1200">
+                <a:solidFill>
+                  <a:schemeClr val="tx1"/>
+                </a:solidFill>
+                <a:latin typeface="+mn-lt"/>
+                <a:ea typeface="+mn-ea"/>
+                <a:cs typeface="+mn-cs"/>
+              </a:defRPr>
+            </a:lvl9pPr>
+          </a:lstStyle>
+          <a:p>
+            <a:pPr marL="0" indent="0">
+              <a:buFont typeface="Arial" pitchFamily="34" charset="0"/>
+              <a:buNone/>
+            </a:pPr>
+            <a:r>
+              <a:rPr lang="es-ES" sz="2800" dirty="0" smtClean="0"/>
+              <a:t>Escriba el nombre que desee y presione </a:t>
+            </a:r>
+            <a:r>
+              <a:rPr lang="es-ES" sz="2800" dirty="0" err="1" smtClean="0"/>
+              <a:t>Enter</a:t>
+            </a:r>
+            <a:r>
+              <a:rPr lang="es-ES" sz="2800" dirty="0" smtClean="0"/>
+              <a:t>.</a:t>
+            </a:r>
+            <a:endParaRPr lang="es-ES" sz="2800" dirty="0"/>
+          </a:p>
+        </p:txBody>
+      </p:sp>
+      <p:pic>
+        <p:nvPicPr>
+          <p:cNvPr id="6" name="5 Imagen"/>
+          <p:cNvPicPr>
+            <a:picLocks noChangeAspect="1"/>
+          </p:cNvPicPr>
+          <p:nvPr/>
+        </p:nvPicPr>
+        <p:blipFill>
+          <a:blip r:embed="rId3">
+            <a:extLst>
+              <a:ext uri="{28A0092B-C50C-407E-A947-70E740481C1C}">
+                <a14:useLocalDpi xmlns:a14="http://schemas.microsoft.com/office/drawing/2010/main" val="0"/>
+              </a:ext>
+            </a:extLst>
+          </a:blip>
+          <a:stretch>
+            <a:fillRect/>
+          </a:stretch>
+        </p:blipFill>
+        <p:spPr>
+          <a:xfrm>
+            <a:off x="5796136" y="4077072"/>
+            <a:ext cx="3134766" cy="2273002"/>
+          </a:xfrm>
+          <a:prstGeom prst="rect">
+            <a:avLst/>
+          </a:prstGeom>
+        </p:spPr>
+      </p:pic>
+    </p:spTree>
+    <p:extLst>
+      <p:ext uri="{BB962C8B-B14F-4D97-AF65-F5344CB8AC3E}">
+        <p14:creationId xmlns:p14="http://schemas.microsoft.com/office/powerpoint/2010/main" val="2130699287"/>
+      </p:ext>
+    </p:extLst>
+  </p:cSld>
+  <p:clrMapOvr>
+    <a:masterClrMapping/>
+  </p:clrMapOvr>
+</p:sld>
+</file>
+
+<file path=ppt/slides/slide18.xml><?xml version="1.0" encoding="utf-8"?>
+<p:sld xmlns:a="http://schemas.openxmlformats.org/drawingml/2006/main" xmlns:r="http://schemas.openxmlformats.org/officeDocument/2006/relationships" xmlns:p="http://schemas.openxmlformats.org/presentationml/2006/main">
+  <p:cSld>
+    <p:spTree>
+      <p:nvGrpSpPr>
+        <p:cNvPr id="1" name=""/>
+        <p:cNvGrpSpPr/>
+        <p:nvPr/>
+      </p:nvGrpSpPr>
+      <p:grpSpPr>
+        <a:xfrm>
+          <a:off x="0" y="0"/>
+          <a:ext cx="0" cy="0"/>
+          <a:chOff x="0" y="0"/>
+          <a:chExt cx="0" cy="0"/>
+        </a:xfrm>
+      </p:grpSpPr>
+      <p:sp>
+        <p:nvSpPr>
+          <p:cNvPr id="2" name="1 Título"/>
+          <p:cNvSpPr>
+            <a:spLocks noGrp="1"/>
+          </p:cNvSpPr>
+          <p:nvPr>
+            <p:ph type="title"/>
+          </p:nvPr>
+        </p:nvSpPr>
+        <p:spPr/>
+        <p:txBody>
+          <a:bodyPr/>
+          <a:lstStyle/>
+          <a:p>
+            <a:r>
+              <a:rPr lang="es-ES" dirty="0" smtClean="0"/>
+              <a:t>Uso asignar Rangos</a:t>
+            </a:r>
+            <a:endParaRPr lang="es-ES" dirty="0"/>
+          </a:p>
+        </p:txBody>
+      </p:sp>
+      <p:pic>
+        <p:nvPicPr>
+          <p:cNvPr id="6" name="5 Marcador de contenido"/>
+          <p:cNvPicPr>
+            <a:picLocks noGrp="1" noChangeAspect="1"/>
+          </p:cNvPicPr>
+          <p:nvPr>
+            <p:ph idx="1"/>
+          </p:nvPr>
+        </p:nvPicPr>
+        <p:blipFill>
+          <a:blip r:embed="rId2">
+            <a:extLst>
+              <a:ext uri="{28A0092B-C50C-407E-A947-70E740481C1C}">
+                <a14:useLocalDpi xmlns:a14="http://schemas.microsoft.com/office/drawing/2010/main" val="0"/>
+              </a:ext>
+            </a:extLst>
+          </a:blip>
+          <a:stretch>
+            <a:fillRect/>
+          </a:stretch>
+        </p:blipFill>
+        <p:spPr>
+          <a:xfrm>
+            <a:off x="3491880" y="2026033"/>
+            <a:ext cx="5112568" cy="3672408"/>
+          </a:xfrm>
+        </p:spPr>
+      </p:pic>
+      <p:sp>
+        <p:nvSpPr>
+          <p:cNvPr id="8" name="2 Marcador de contenido"/>
+          <p:cNvSpPr txBox="1">
+            <a:spLocks/>
+          </p:cNvSpPr>
+          <p:nvPr/>
+        </p:nvSpPr>
+        <p:spPr>
+          <a:xfrm>
+            <a:off x="194436" y="2060848"/>
+            <a:ext cx="2721380" cy="2520280"/>
+          </a:xfrm>
+          <a:prstGeom prst="rect">
+            <a:avLst/>
+          </a:prstGeom>
+        </p:spPr>
+        <p:txBody>
+          <a:bodyPr vert="horz" lIns="91440" tIns="45720" rIns="91440" bIns="45720" rtlCol="0">
+            <a:normAutofit/>
+          </a:bodyPr>
+          <a:lstStyle>
+            <a:lvl1pPr marL="342900" indent="-342900" algn="l" defTabSz="914400" rtl="0" eaLnBrk="1" latinLnBrk="0" hangingPunct="1">
+              <a:spcBef>
+                <a:spcPct val="20000"/>
+              </a:spcBef>
+              <a:buFont typeface="Arial" pitchFamily="34" charset="0"/>
+              <a:buChar char="•"/>
+              <a:defRPr sz="3200" kern="1200">
+                <a:solidFill>
+                  <a:schemeClr val="tx1"/>
+                </a:solidFill>
+                <a:latin typeface="+mn-lt"/>
+                <a:ea typeface="+mn-ea"/>
+                <a:cs typeface="+mn-cs"/>
+              </a:defRPr>
+            </a:lvl1pPr>
+            <a:lvl2pPr marL="742950" indent="-285750" algn="l" defTabSz="914400" rtl="0" eaLnBrk="1" latinLnBrk="0" hangingPunct="1">
+              <a:spcBef>
+                <a:spcPct val="20000"/>
+              </a:spcBef>
+              <a:buFont typeface="Arial" pitchFamily="34" charset="0"/>
+              <a:buChar char="–"/>
+              <a:defRPr sz="2800" kern="1200">
+                <a:solidFill>
+                  <a:schemeClr val="tx1"/>
+                </a:solidFill>
+                <a:latin typeface="+mn-lt"/>
+                <a:ea typeface="+mn-ea"/>
+                <a:cs typeface="+mn-cs"/>
+              </a:defRPr>
+            </a:lvl2pPr>
+            <a:lvl3pPr marL="1143000" indent="-228600" algn="l" defTabSz="914400" rtl="0" eaLnBrk="1" latinLnBrk="0" hangingPunct="1">
+              <a:spcBef>
+                <a:spcPct val="20000"/>
+              </a:spcBef>
+              <a:buFont typeface="Arial" pitchFamily="34" charset="0"/>
+              <a:buChar char="•"/>
+              <a:defRPr sz="2400" kern="1200">
+                <a:solidFill>
+                  <a:schemeClr val="tx1"/>
+                </a:solidFill>
+                <a:latin typeface="+mn-lt"/>
+                <a:ea typeface="+mn-ea"/>
+                <a:cs typeface="+mn-cs"/>
+              </a:defRPr>
+            </a:lvl3pPr>
+            <a:lvl4pPr marL="1600200" indent="-228600" algn="l" defTabSz="914400" rtl="0" eaLnBrk="1" latinLnBrk="0" hangingPunct="1">
+              <a:spcBef>
+                <a:spcPct val="20000"/>
+              </a:spcBef>
+              <a:buFont typeface="Arial" pitchFamily="34" charset="0"/>
+              <a:buChar char="–"/>
+              <a:defRPr sz="2000" kern="1200">
+                <a:solidFill>
+                  <a:schemeClr val="tx1"/>
+                </a:solidFill>
+                <a:latin typeface="+mn-lt"/>
+                <a:ea typeface="+mn-ea"/>
+                <a:cs typeface="+mn-cs"/>
+              </a:defRPr>
+            </a:lvl4pPr>
+            <a:lvl5pPr marL="2057400" indent="-228600" algn="l" defTabSz="914400" rtl="0" eaLnBrk="1" latinLnBrk="0" hangingPunct="1">
+              <a:spcBef>
+                <a:spcPct val="20000"/>
+              </a:spcBef>
+              <a:buFont typeface="Arial" pitchFamily="34" charset="0"/>
+              <a:buChar char="»"/>
+              <a:defRPr sz="2000" kern="1200">
+                <a:solidFill>
+                  <a:schemeClr val="tx1"/>
+                </a:solidFill>
+                <a:latin typeface="+mn-lt"/>
+                <a:ea typeface="+mn-ea"/>
+                <a:cs typeface="+mn-cs"/>
+              </a:defRPr>
+            </a:lvl5pPr>
+            <a:lvl6pPr marL="2514600" indent="-228600" algn="l" defTabSz="914400" rtl="0" eaLnBrk="1" latinLnBrk="0" hangingPunct="1">
+              <a:spcBef>
+                <a:spcPct val="20000"/>
+              </a:spcBef>
+              <a:buFont typeface="Arial" pitchFamily="34" charset="0"/>
+              <a:buChar char="•"/>
+              <a:defRPr sz="2000" kern="1200">
+                <a:solidFill>
+                  <a:schemeClr val="tx1"/>
+                </a:solidFill>
+                <a:latin typeface="+mn-lt"/>
+                <a:ea typeface="+mn-ea"/>
+                <a:cs typeface="+mn-cs"/>
+              </a:defRPr>
+            </a:lvl6pPr>
+            <a:lvl7pPr marL="2971800" indent="-228600" algn="l" defTabSz="914400" rtl="0" eaLnBrk="1" latinLnBrk="0" hangingPunct="1">
+              <a:spcBef>
+                <a:spcPct val="20000"/>
+              </a:spcBef>
+              <a:buFont typeface="Arial" pitchFamily="34" charset="0"/>
+              <a:buChar char="•"/>
+              <a:defRPr sz="2000" kern="1200">
+                <a:solidFill>
+                  <a:schemeClr val="tx1"/>
+                </a:solidFill>
+                <a:latin typeface="+mn-lt"/>
+                <a:ea typeface="+mn-ea"/>
+                <a:cs typeface="+mn-cs"/>
+              </a:defRPr>
+            </a:lvl7pPr>
+            <a:lvl8pPr marL="3429000" indent="-228600" algn="l" defTabSz="914400" rtl="0" eaLnBrk="1" latinLnBrk="0" hangingPunct="1">
+              <a:spcBef>
+                <a:spcPct val="20000"/>
+              </a:spcBef>
+              <a:buFont typeface="Arial" pitchFamily="34" charset="0"/>
+              <a:buChar char="•"/>
+              <a:defRPr sz="2000" kern="1200">
+                <a:solidFill>
+                  <a:schemeClr val="tx1"/>
+                </a:solidFill>
+                <a:latin typeface="+mn-lt"/>
+                <a:ea typeface="+mn-ea"/>
+                <a:cs typeface="+mn-cs"/>
+              </a:defRPr>
+            </a:lvl8pPr>
+            <a:lvl9pPr marL="3886200" indent="-228600" algn="l" defTabSz="914400" rtl="0" eaLnBrk="1" latinLnBrk="0" hangingPunct="1">
+              <a:spcBef>
+                <a:spcPct val="20000"/>
+              </a:spcBef>
+              <a:buFont typeface="Arial" pitchFamily="34" charset="0"/>
+              <a:buChar char="•"/>
+              <a:defRPr sz="2000" kern="1200">
+                <a:solidFill>
+                  <a:schemeClr val="tx1"/>
+                </a:solidFill>
+                <a:latin typeface="+mn-lt"/>
+                <a:ea typeface="+mn-ea"/>
+                <a:cs typeface="+mn-cs"/>
+              </a:defRPr>
+            </a:lvl9pPr>
+          </a:lstStyle>
+          <a:p>
+            <a:pPr marL="0" indent="0">
+              <a:buFont typeface="Arial" pitchFamily="34" charset="0"/>
+              <a:buNone/>
+            </a:pPr>
+            <a:r>
+              <a:rPr lang="es-ES" sz="2800" dirty="0" smtClean="0"/>
+              <a:t>Puede Utilizar el nombre del rango dentro de cualquier formula de Excel.</a:t>
+            </a:r>
+            <a:endParaRPr lang="es-ES" sz="2800" dirty="0"/>
+          </a:p>
+        </p:txBody>
+      </p:sp>
+    </p:spTree>
+    <p:extLst>
+      <p:ext uri="{BB962C8B-B14F-4D97-AF65-F5344CB8AC3E}">
+        <p14:creationId xmlns:p14="http://schemas.microsoft.com/office/powerpoint/2010/main" val="4076384589"/>
+      </p:ext>
+    </p:extLst>
+  </p:cSld>
+  <p:clrMapOvr>
+    <a:masterClrMapping/>
+  </p:clrMapOvr>
+</p:sld>
+</file>
+
+<file path=ppt/slides/slide19.xml><?xml version="1.0" encoding="utf-8"?>
+<p:sld xmlns:a="http://schemas.openxmlformats.org/drawingml/2006/main" xmlns:r="http://schemas.openxmlformats.org/officeDocument/2006/relationships" xmlns:p="http://schemas.openxmlformats.org/presentationml/2006/main">
+  <p:cSld>
+    <p:spTree>
+      <p:nvGrpSpPr>
+        <p:cNvPr id="1" name=""/>
+        <p:cNvGrpSpPr/>
+        <p:nvPr/>
+      </p:nvGrpSpPr>
+      <p:grpSpPr>
+        <a:xfrm>
+          <a:off x="0" y="0"/>
+          <a:ext cx="0" cy="0"/>
+          <a:chOff x="0" y="0"/>
+          <a:chExt cx="0" cy="0"/>
+        </a:xfrm>
+      </p:grpSpPr>
+      <p:sp>
+        <p:nvSpPr>
+          <p:cNvPr id="2" name="1 Título"/>
+          <p:cNvSpPr>
+            <a:spLocks noGrp="1"/>
+          </p:cNvSpPr>
+          <p:nvPr>
+            <p:ph type="title"/>
+          </p:nvPr>
+        </p:nvSpPr>
+        <p:spPr>
+          <a:xfrm>
+            <a:off x="467544" y="2924944"/>
+            <a:ext cx="8229600" cy="1143000"/>
+          </a:xfrm>
+        </p:spPr>
+        <p:txBody>
+          <a:bodyPr/>
+          <a:lstStyle/>
+          <a:p>
+            <a:r>
+              <a:rPr lang="es-ES" dirty="0" smtClean="0"/>
+              <a:t>Formatos Condicionales</a:t>
+            </a:r>
+            <a:endParaRPr lang="es-ES" dirty="0"/>
+          </a:p>
+        </p:txBody>
+      </p:sp>
+    </p:spTree>
+    <p:extLst>
+      <p:ext uri="{BB962C8B-B14F-4D97-AF65-F5344CB8AC3E}">
+        <p14:creationId xmlns:p14="http://schemas.microsoft.com/office/powerpoint/2010/main" val="1460757193"/>
+      </p:ext>
+    </p:extLst>
+  </p:cSld>
+  <p:clrMapOvr>
+    <a:masterClrMapping/>
+  </p:clrMapOvr>
 </p:sld>
 </file>
 
@@ -3129,6 +4874,81 @@
     <p:extLst>
       <p:ext uri="{BB962C8B-B14F-4D97-AF65-F5344CB8AC3E}">
         <p14:creationId xmlns:p14="http://schemas.microsoft.com/office/powerpoint/2010/main" val="110443015"/>
+      </p:ext>
+    </p:extLst>
+  </p:cSld>
+  <p:clrMapOvr>
+    <a:masterClrMapping/>
+  </p:clrMapOvr>
+  <p:timing>
+    <p:tnLst>
+      <p:par>
+        <p:cTn id="1" dur="indefinite" restart="never" nodeType="tmRoot"/>
+      </p:par>
+    </p:tnLst>
+  </p:timing>
+</p:sld>
+</file>
+
+<file path=ppt/slides/slide20.xml><?xml version="1.0" encoding="utf-8"?>
+<p:sld xmlns:a="http://schemas.openxmlformats.org/drawingml/2006/main" xmlns:r="http://schemas.openxmlformats.org/officeDocument/2006/relationships" xmlns:p="http://schemas.openxmlformats.org/presentationml/2006/main">
+  <p:cSld>
+    <p:spTree>
+      <p:nvGrpSpPr>
+        <p:cNvPr id="1" name=""/>
+        <p:cNvGrpSpPr/>
+        <p:nvPr/>
+      </p:nvGrpSpPr>
+      <p:grpSpPr>
+        <a:xfrm>
+          <a:off x="0" y="0"/>
+          <a:ext cx="0" cy="0"/>
+          <a:chOff x="0" y="0"/>
+          <a:chExt cx="0" cy="0"/>
+        </a:xfrm>
+      </p:grpSpPr>
+      <p:sp>
+        <p:nvSpPr>
+          <p:cNvPr id="2" name="1 Título"/>
+          <p:cNvSpPr>
+            <a:spLocks noGrp="1"/>
+          </p:cNvSpPr>
+          <p:nvPr>
+            <p:ph type="title"/>
+          </p:nvPr>
+        </p:nvSpPr>
+        <p:spPr/>
+        <p:txBody>
+          <a:bodyPr/>
+          <a:lstStyle/>
+          <a:p>
+            <a:endParaRPr lang="es-ES"/>
+          </a:p>
+        </p:txBody>
+      </p:sp>
+      <p:sp>
+        <p:nvSpPr>
+          <p:cNvPr id="3" name="2 Marcador de contenido"/>
+          <p:cNvSpPr>
+            <a:spLocks noGrp="1"/>
+          </p:cNvSpPr>
+          <p:nvPr>
+            <p:ph idx="1"/>
+          </p:nvPr>
+        </p:nvSpPr>
+        <p:spPr/>
+        <p:txBody>
+          <a:bodyPr/>
+          <a:lstStyle/>
+          <a:p>
+            <a:endParaRPr lang="es-ES"/>
+          </a:p>
+        </p:txBody>
+      </p:sp>
+    </p:spTree>
+    <p:extLst>
+      <p:ext uri="{BB962C8B-B14F-4D97-AF65-F5344CB8AC3E}">
+        <p14:creationId xmlns:p14="http://schemas.microsoft.com/office/powerpoint/2010/main" val="2374747077"/>
       </p:ext>
     </p:extLst>
   </p:cSld>
@@ -3174,10 +4994,39 @@
               <a:rPr lang="es-ES" dirty="0"/>
               <a:t>Descripción del Entorno</a:t>
             </a:r>
-            <a:endParaRPr lang="es-ES" dirty="0"/>
-          </a:p>
-        </p:txBody>
-      </p:sp>
+          </a:p>
+        </p:txBody>
+      </p:sp>
+      <p:pic>
+        <p:nvPicPr>
+          <p:cNvPr id="3" name="2 Imagen"/>
+          <p:cNvPicPr>
+            <a:picLocks noChangeAspect="1"/>
+          </p:cNvPicPr>
+          <p:nvPr/>
+        </p:nvPicPr>
+        <p:blipFill>
+          <a:blip r:embed="rId2">
+            <a:extLst>
+              <a:ext uri="{28A0092B-C50C-407E-A947-70E740481C1C}">
+                <a14:useLocalDpi xmlns:a14="http://schemas.microsoft.com/office/drawing/2010/main" val="0"/>
+              </a:ext>
+            </a:extLst>
+          </a:blip>
+          <a:stretch>
+            <a:fillRect/>
+          </a:stretch>
+        </p:blipFill>
+        <p:spPr>
+          <a:xfrm>
+            <a:off x="179512" y="1268760"/>
+            <a:ext cx="8784976" cy="5400600"/>
+          </a:xfrm>
+          <a:prstGeom prst="rect">
+            <a:avLst/>
+          </a:prstGeom>
+        </p:spPr>
+      </p:pic>
     </p:spTree>
     <p:extLst>
       <p:ext uri="{BB962C8B-B14F-4D97-AF65-F5344CB8AC3E}">
@@ -3188,6 +5037,13 @@
   <p:clrMapOvr>
     <a:masterClrMapping/>
   </p:clrMapOvr>
+  <p:timing>
+    <p:tnLst>
+      <p:par>
+        <p:cTn id="1" dur="indefinite" restart="never" nodeType="tmRoot"/>
+      </p:par>
+    </p:tnLst>
+  </p:timing>
 </p:sld>
 </file>
 
@@ -3218,36 +5074,66 @@
             <p:ph type="title"/>
           </p:nvPr>
         </p:nvSpPr>
+        <p:spPr/>
+        <p:txBody>
+          <a:bodyPr/>
+          <a:lstStyle/>
+          <a:p>
+            <a:r>
+              <a:rPr lang="es-ES" dirty="0" smtClean="0"/>
+              <a:t>Entorno Hoja Calculo</a:t>
+            </a:r>
+            <a:endParaRPr lang="es-ES" dirty="0"/>
+          </a:p>
+        </p:txBody>
+      </p:sp>
+      <p:pic>
+        <p:nvPicPr>
+          <p:cNvPr id="5" name="4 Imagen"/>
+          <p:cNvPicPr>
+            <a:picLocks noChangeAspect="1"/>
+          </p:cNvPicPr>
+          <p:nvPr/>
+        </p:nvPicPr>
+        <p:blipFill>
+          <a:blip r:embed="rId2">
+            <a:extLst>
+              <a:ext uri="{28A0092B-C50C-407E-A947-70E740481C1C}">
+                <a14:useLocalDpi xmlns:a14="http://schemas.microsoft.com/office/drawing/2010/main" val="0"/>
+              </a:ext>
+            </a:extLst>
+          </a:blip>
+          <a:stretch>
+            <a:fillRect/>
+          </a:stretch>
+        </p:blipFill>
         <p:spPr>
           <a:xfrm>
-            <a:off x="539552" y="2708920"/>
-            <a:ext cx="8229600" cy="1143000"/>
+            <a:off x="323528" y="1124744"/>
+            <a:ext cx="8568952" cy="5544616"/>
           </a:xfrm>
+          <a:prstGeom prst="rect">
+            <a:avLst/>
+          </a:prstGeom>
         </p:spPr>
-        <p:txBody>
-          <a:bodyPr>
-            <a:normAutofit/>
-          </a:bodyPr>
-          <a:lstStyle/>
-          <a:p>
-            <a:r>
-              <a:rPr lang="es-ES" dirty="0" smtClean="0"/>
-              <a:t>Formatos Condicionales</a:t>
-            </a:r>
-            <a:endParaRPr lang="es-ES" dirty="0"/>
-          </a:p>
-        </p:txBody>
-      </p:sp>
+      </p:pic>
     </p:spTree>
     <p:extLst>
       <p:ext uri="{BB962C8B-B14F-4D97-AF65-F5344CB8AC3E}">
-        <p14:creationId xmlns:p14="http://schemas.microsoft.com/office/powerpoint/2010/main" val="3954603691"/>
+        <p14:creationId xmlns:p14="http://schemas.microsoft.com/office/powerpoint/2010/main" val="1993646868"/>
       </p:ext>
     </p:extLst>
   </p:cSld>
   <p:clrMapOvr>
     <a:masterClrMapping/>
   </p:clrMapOvr>
+  <p:timing>
+    <p:tnLst>
+      <p:par>
+        <p:cTn id="1" dur="indefinite" restart="never" nodeType="tmRoot"/>
+      </p:par>
+    </p:tnLst>
+  </p:timing>
 </p:sld>
 </file>
 
@@ -3283,7 +5169,11 @@
           <a:bodyPr/>
           <a:lstStyle/>
           <a:p>
-            <a:endParaRPr lang="es-ES"/>
+            <a:r>
+              <a:rPr lang="es-ES" dirty="0" smtClean="0"/>
+              <a:t>Conceptos Básicos</a:t>
+            </a:r>
+            <a:endParaRPr lang="es-ES" dirty="0"/>
           </a:p>
         </p:txBody>
       </p:sp>
@@ -3299,17 +5189,2705 @@
         </p:nvSpPr>
         <p:spPr/>
         <p:txBody>
-          <a:bodyPr/>
+          <a:bodyPr>
+            <a:normAutofit lnSpcReduction="10000"/>
+          </a:bodyPr>
           <a:lstStyle/>
           <a:p>
-            <a:endParaRPr lang="es-ES"/>
+            <a:pPr marL="0" indent="0">
+              <a:buNone/>
+            </a:pPr>
+            <a:r>
+              <a:rPr lang="es-ES" sz="2800" b="1" dirty="0"/>
+              <a:t>Hoja:</a:t>
+            </a:r>
+            <a:r>
+              <a:rPr lang="es-ES" sz="2800" dirty="0"/>
+              <a:t> </a:t>
+            </a:r>
+            <a:r>
+              <a:rPr lang="es-ES" sz="2800" dirty="0" smtClean="0"/>
+              <a:t>Se </a:t>
+            </a:r>
+            <a:r>
+              <a:rPr lang="es-ES" sz="2800" dirty="0"/>
+              <a:t>denomina así a la zona donde estamos trabajando. Cada hoja tiene un nombre identificativo que podemos cambiar. Los nombres de las hojas se pueden observar en la zona inferior de la pantalla. Estos nombres se pueden cambiar. </a:t>
+            </a:r>
+            <a:endParaRPr lang="es-ES" sz="2800" dirty="0" smtClean="0"/>
+          </a:p>
+          <a:p>
+            <a:pPr marL="0" indent="0">
+              <a:buNone/>
+            </a:pPr>
+            <a:r>
+              <a:rPr lang="es-ES" sz="2800" b="1" dirty="0"/>
+              <a:t>Celda:</a:t>
+            </a:r>
+            <a:r>
+              <a:rPr lang="es-ES" sz="2800" dirty="0"/>
+              <a:t> cuadro individual que forma parte de la hoja. En las celdas introduciremos los datos. </a:t>
+            </a:r>
+            <a:endParaRPr lang="es-ES" sz="2800" dirty="0" smtClean="0"/>
+          </a:p>
+          <a:p>
+            <a:pPr marL="0" indent="0">
+              <a:buNone/>
+            </a:pPr>
+            <a:endParaRPr lang="es-ES" sz="2800" dirty="0"/>
+          </a:p>
+          <a:p>
+            <a:pPr marL="0" indent="0">
+              <a:buNone/>
+            </a:pPr>
+            <a:r>
+              <a:rPr lang="es-ES" sz="2800" b="1" dirty="0" smtClean="0"/>
+              <a:t>Fila:</a:t>
+            </a:r>
+            <a:r>
+              <a:rPr lang="es-ES" sz="2800" dirty="0" smtClean="0"/>
+              <a:t> Dispuestas en horizontal, se numeran desde la 1  hasta la 16382 que es la ultima.</a:t>
+            </a:r>
+            <a:endParaRPr lang="es-ES" sz="2800" dirty="0"/>
+          </a:p>
+          <a:p>
+            <a:pPr marL="0" indent="0">
+              <a:buNone/>
+            </a:pPr>
+            <a:endParaRPr lang="es-ES" sz="2800" dirty="0"/>
           </a:p>
         </p:txBody>
       </p:sp>
     </p:spTree>
     <p:extLst>
       <p:ext uri="{BB962C8B-B14F-4D97-AF65-F5344CB8AC3E}">
-        <p14:creationId xmlns:p14="http://schemas.microsoft.com/office/powerpoint/2010/main" val="44644291"/>
+        <p14:creationId xmlns:p14="http://schemas.microsoft.com/office/powerpoint/2010/main" val="2691569817"/>
+      </p:ext>
+    </p:extLst>
+  </p:cSld>
+  <p:clrMapOvr>
+    <a:masterClrMapping/>
+  </p:clrMapOvr>
+</p:sld>
+</file>
+
+<file path=ppt/slides/slide6.xml><?xml version="1.0" encoding="utf-8"?>
+<p:sld xmlns:a="http://schemas.openxmlformats.org/drawingml/2006/main" xmlns:r="http://schemas.openxmlformats.org/officeDocument/2006/relationships" xmlns:p="http://schemas.openxmlformats.org/presentationml/2006/main">
+  <p:cSld>
+    <p:spTree>
+      <p:nvGrpSpPr>
+        <p:cNvPr id="1" name=""/>
+        <p:cNvGrpSpPr/>
+        <p:nvPr/>
+      </p:nvGrpSpPr>
+      <p:grpSpPr>
+        <a:xfrm>
+          <a:off x="0" y="0"/>
+          <a:ext cx="0" cy="0"/>
+          <a:chOff x="0" y="0"/>
+          <a:chExt cx="0" cy="0"/>
+        </a:xfrm>
+      </p:grpSpPr>
+      <p:sp>
+        <p:nvSpPr>
+          <p:cNvPr id="3" name="2 Marcador de contenido"/>
+          <p:cNvSpPr>
+            <a:spLocks noGrp="1"/>
+          </p:cNvSpPr>
+          <p:nvPr>
+            <p:ph idx="1"/>
+          </p:nvPr>
+        </p:nvSpPr>
+        <p:spPr>
+          <a:xfrm>
+            <a:off x="457200" y="476672"/>
+            <a:ext cx="8229600" cy="5649491"/>
+          </a:xfrm>
+        </p:spPr>
+        <p:txBody>
+          <a:bodyPr>
+            <a:normAutofit fontScale="92500" lnSpcReduction="20000"/>
+          </a:bodyPr>
+          <a:lstStyle/>
+          <a:p>
+            <a:pPr marL="0" indent="0">
+              <a:buNone/>
+            </a:pPr>
+            <a:r>
+              <a:rPr lang="es-ES" sz="2800" b="1" dirty="0"/>
+              <a:t>Columna:</a:t>
+            </a:r>
+            <a:r>
+              <a:rPr lang="es-ES" sz="2800" dirty="0"/>
+              <a:t> se nombran de la A </a:t>
+            </a:r>
+            <a:r>
+              <a:rPr lang="es-ES" sz="2800" dirty="0" err="1"/>
+              <a:t>a</a:t>
+            </a:r>
+            <a:r>
+              <a:rPr lang="es-ES" sz="2800" dirty="0"/>
+              <a:t> la Z y están dispuestas en vertical. Después de la columna Z, nos encontramos con la columna AA,AB,AC... y así hasta la AZ. Seguidamente, comenzaría la BA, BB.. y así hasta la última columna que es la </a:t>
+            </a:r>
+            <a:r>
+              <a:rPr lang="es-ES" sz="2800" dirty="0" smtClean="0"/>
+              <a:t>IV.</a:t>
+            </a:r>
+          </a:p>
+          <a:p>
+            <a:pPr marL="0" indent="0">
+              <a:buNone/>
+            </a:pPr>
+            <a:endParaRPr lang="es-ES" sz="2800" dirty="0"/>
+          </a:p>
+          <a:p>
+            <a:pPr marL="0" indent="0">
+              <a:buNone/>
+            </a:pPr>
+            <a:r>
+              <a:rPr lang="es-ES" sz="2800" b="1" dirty="0" smtClean="0"/>
+              <a:t>Libro </a:t>
+            </a:r>
+            <a:r>
+              <a:rPr lang="es-ES" sz="2800" b="1" dirty="0"/>
+              <a:t>de Trabajo:</a:t>
+            </a:r>
+            <a:r>
+              <a:rPr lang="es-ES" sz="2800" dirty="0"/>
+              <a:t> </a:t>
+            </a:r>
+            <a:r>
+              <a:rPr lang="es-ES" sz="2800" dirty="0" smtClean="0"/>
+              <a:t>Conjunto </a:t>
+            </a:r>
+            <a:r>
+              <a:rPr lang="es-ES" sz="2800" dirty="0"/>
+              <a:t>de hojas. Un libro puede tener varias hojas. Al grabarlo, se crea un fichero con la extensión XLS con todas las hojas que tuviese el libro. </a:t>
+            </a:r>
+            <a:endParaRPr lang="es-ES" sz="2800" dirty="0" smtClean="0"/>
+          </a:p>
+          <a:p>
+            <a:pPr marL="0" indent="0">
+              <a:buNone/>
+            </a:pPr>
+            <a:endParaRPr lang="es-ES" sz="2800" dirty="0"/>
+          </a:p>
+          <a:p>
+            <a:pPr marL="0" indent="0">
+              <a:buNone/>
+            </a:pPr>
+            <a:r>
+              <a:rPr lang="es-ES" sz="2800" b="1" dirty="0" smtClean="0"/>
+              <a:t>Rango</a:t>
+            </a:r>
+            <a:r>
+              <a:rPr lang="es-ES" sz="2800" b="1" dirty="0"/>
+              <a:t>:</a:t>
+            </a:r>
+            <a:r>
+              <a:rPr lang="es-ES" sz="2800" dirty="0"/>
+              <a:t> </a:t>
+            </a:r>
+            <a:r>
+              <a:rPr lang="es-ES" sz="2800" dirty="0" smtClean="0"/>
+              <a:t>Grupo </a:t>
+            </a:r>
+            <a:r>
+              <a:rPr lang="es-ES" sz="2800" dirty="0"/>
+              <a:t>de celdas adyacentes, es decir, que se tocan. Un rango de celdas por ejemplo que va desde la A1 hasta la A5 se reflejaría con el siguiente nombre: A1:A5 El nombre de un rango siempre hará referencia a la primera y a la última celda seleccionadas. </a:t>
+            </a:r>
+          </a:p>
+        </p:txBody>
+      </p:sp>
+    </p:spTree>
+    <p:extLst>
+      <p:ext uri="{BB962C8B-B14F-4D97-AF65-F5344CB8AC3E}">
+        <p14:creationId xmlns:p14="http://schemas.microsoft.com/office/powerpoint/2010/main" val="3165936153"/>
+      </p:ext>
+    </p:extLst>
+  </p:cSld>
+  <p:clrMapOvr>
+    <a:masterClrMapping/>
+  </p:clrMapOvr>
+</p:sld>
+</file>
+
+<file path=ppt/slides/slide7.xml><?xml version="1.0" encoding="utf-8"?>
+<p:sld xmlns:a="http://schemas.openxmlformats.org/drawingml/2006/main" xmlns:r="http://schemas.openxmlformats.org/officeDocument/2006/relationships" xmlns:p="http://schemas.openxmlformats.org/presentationml/2006/main">
+  <p:cSld>
+    <p:spTree>
+      <p:nvGrpSpPr>
+        <p:cNvPr id="1" name=""/>
+        <p:cNvGrpSpPr/>
+        <p:nvPr/>
+      </p:nvGrpSpPr>
+      <p:grpSpPr>
+        <a:xfrm>
+          <a:off x="0" y="0"/>
+          <a:ext cx="0" cy="0"/>
+          <a:chOff x="0" y="0"/>
+          <a:chExt cx="0" cy="0"/>
+        </a:xfrm>
+      </p:grpSpPr>
+      <p:sp>
+        <p:nvSpPr>
+          <p:cNvPr id="2" name="1 Título"/>
+          <p:cNvSpPr>
+            <a:spLocks noGrp="1"/>
+          </p:cNvSpPr>
+          <p:nvPr>
+            <p:ph type="title"/>
+          </p:nvPr>
+        </p:nvSpPr>
+        <p:spPr/>
+        <p:txBody>
+          <a:bodyPr/>
+          <a:lstStyle/>
+          <a:p>
+            <a:r>
+              <a:rPr lang="es-ES" dirty="0" smtClean="0"/>
+              <a:t>Diferencia Valor - Apariencia</a:t>
+            </a:r>
+            <a:endParaRPr lang="es-ES" dirty="0"/>
+          </a:p>
+        </p:txBody>
+      </p:sp>
+      <p:sp>
+        <p:nvSpPr>
+          <p:cNvPr id="4" name="1 Título"/>
+          <p:cNvSpPr txBox="1">
+            <a:spLocks/>
+          </p:cNvSpPr>
+          <p:nvPr/>
+        </p:nvSpPr>
+        <p:spPr>
+          <a:xfrm>
+            <a:off x="179512" y="1519094"/>
+            <a:ext cx="8229600" cy="613762"/>
+          </a:xfrm>
+          <a:prstGeom prst="rect">
+            <a:avLst/>
+          </a:prstGeom>
+        </p:spPr>
+        <p:txBody>
+          <a:bodyPr vert="horz" lIns="91440" tIns="45720" rIns="91440" bIns="45720" rtlCol="0" anchor="ctr">
+            <a:normAutofit lnSpcReduction="10000"/>
+          </a:bodyPr>
+          <a:lstStyle>
+            <a:lvl1pPr algn="ctr" defTabSz="914400" rtl="0" eaLnBrk="1" latinLnBrk="0" hangingPunct="1">
+              <a:spcBef>
+                <a:spcPct val="0"/>
+              </a:spcBef>
+              <a:buNone/>
+              <a:defRPr sz="4400" kern="1200">
+                <a:solidFill>
+                  <a:schemeClr val="tx1"/>
+                </a:solidFill>
+                <a:latin typeface="+mj-lt"/>
+                <a:ea typeface="+mj-ea"/>
+                <a:cs typeface="+mj-cs"/>
+              </a:defRPr>
+            </a:lvl1pPr>
+          </a:lstStyle>
+          <a:p>
+            <a:pPr algn="l"/>
+            <a:r>
+              <a:rPr lang="es-ES" sz="3600" dirty="0" smtClean="0"/>
+              <a:t>Formato de la celda</a:t>
+            </a:r>
+            <a:endParaRPr lang="es-ES" sz="3600" dirty="0"/>
+          </a:p>
+        </p:txBody>
+      </p:sp>
+      <p:pic>
+        <p:nvPicPr>
+          <p:cNvPr id="5" name="4 Imagen"/>
+          <p:cNvPicPr>
+            <a:picLocks noChangeAspect="1"/>
+          </p:cNvPicPr>
+          <p:nvPr/>
+        </p:nvPicPr>
+        <p:blipFill>
+          <a:blip r:embed="rId2">
+            <a:extLst>
+              <a:ext uri="{28A0092B-C50C-407E-A947-70E740481C1C}">
+                <a14:useLocalDpi xmlns:a14="http://schemas.microsoft.com/office/drawing/2010/main" val="0"/>
+              </a:ext>
+            </a:extLst>
+          </a:blip>
+          <a:stretch>
+            <a:fillRect/>
+          </a:stretch>
+        </p:blipFill>
+        <p:spPr>
+          <a:xfrm>
+            <a:off x="6516216" y="2924944"/>
+            <a:ext cx="2172700" cy="1485900"/>
+          </a:xfrm>
+          <a:prstGeom prst="rect">
+            <a:avLst/>
+          </a:prstGeom>
+        </p:spPr>
+      </p:pic>
+      <p:sp>
+        <p:nvSpPr>
+          <p:cNvPr id="6" name="2 Marcador de contenido"/>
+          <p:cNvSpPr>
+            <a:spLocks noGrp="1"/>
+          </p:cNvSpPr>
+          <p:nvPr>
+            <p:ph idx="1"/>
+          </p:nvPr>
+        </p:nvSpPr>
+        <p:spPr>
+          <a:xfrm>
+            <a:off x="457199" y="2420888"/>
+            <a:ext cx="5666509" cy="3705275"/>
+          </a:xfrm>
+        </p:spPr>
+        <p:txBody>
+          <a:bodyPr>
+            <a:normAutofit/>
+          </a:bodyPr>
+          <a:lstStyle/>
+          <a:p>
+            <a:r>
+              <a:rPr lang="es-ES" sz="2800" dirty="0" smtClean="0"/>
+              <a:t>El valor de la celda es 4.</a:t>
+            </a:r>
+          </a:p>
+          <a:p>
+            <a:r>
+              <a:rPr lang="es-ES" sz="2800" dirty="0" smtClean="0"/>
+              <a:t>La apariencia se ve: $4,00.</a:t>
+            </a:r>
+          </a:p>
+          <a:p>
+            <a:r>
+              <a:rPr lang="es-ES" sz="2800" dirty="0" smtClean="0"/>
+              <a:t>Este resultado se puede obtener debido al formato de la celda </a:t>
+            </a:r>
+            <a:endParaRPr lang="es-ES" sz="2800" dirty="0"/>
+          </a:p>
+        </p:txBody>
+      </p:sp>
+    </p:spTree>
+    <p:extLst>
+      <p:ext uri="{BB962C8B-B14F-4D97-AF65-F5344CB8AC3E}">
+        <p14:creationId xmlns:p14="http://schemas.microsoft.com/office/powerpoint/2010/main" val="4044913515"/>
+      </p:ext>
+    </p:extLst>
+  </p:cSld>
+  <p:clrMapOvr>
+    <a:masterClrMapping/>
+  </p:clrMapOvr>
+</p:sld>
+</file>
+
+<file path=ppt/slides/slide8.xml><?xml version="1.0" encoding="utf-8"?>
+<p:sld xmlns:a="http://schemas.openxmlformats.org/drawingml/2006/main" xmlns:r="http://schemas.openxmlformats.org/officeDocument/2006/relationships" xmlns:p="http://schemas.openxmlformats.org/presentationml/2006/main">
+  <p:cSld>
+    <p:spTree>
+      <p:nvGrpSpPr>
+        <p:cNvPr id="1" name=""/>
+        <p:cNvGrpSpPr/>
+        <p:nvPr/>
+      </p:nvGrpSpPr>
+      <p:grpSpPr>
+        <a:xfrm>
+          <a:off x="0" y="0"/>
+          <a:ext cx="0" cy="0"/>
+          <a:chOff x="0" y="0"/>
+          <a:chExt cx="0" cy="0"/>
+        </a:xfrm>
+      </p:grpSpPr>
+      <p:sp>
+        <p:nvSpPr>
+          <p:cNvPr id="4" name="2 Título"/>
+          <p:cNvSpPr>
+            <a:spLocks noGrp="1"/>
+          </p:cNvSpPr>
+          <p:nvPr>
+            <p:ph type="title"/>
+          </p:nvPr>
+        </p:nvSpPr>
+        <p:spPr>
+          <a:xfrm>
+            <a:off x="611560" y="332656"/>
+            <a:ext cx="7756263" cy="643678"/>
+          </a:xfrm>
+        </p:spPr>
+        <p:txBody>
+          <a:bodyPr>
+            <a:normAutofit fontScale="90000"/>
+          </a:bodyPr>
+          <a:lstStyle/>
+          <a:p>
+            <a:r>
+              <a:rPr lang="es-ES" dirty="0" smtClean="0"/>
+              <a:t>Tipos de Datos Excel</a:t>
+            </a:r>
+            <a:endParaRPr lang="es-ES" dirty="0"/>
+          </a:p>
+        </p:txBody>
+      </p:sp>
+      <p:grpSp>
+        <p:nvGrpSpPr>
+          <p:cNvPr id="5" name="4 Grupo"/>
+          <p:cNvGrpSpPr/>
+          <p:nvPr/>
+        </p:nvGrpSpPr>
+        <p:grpSpPr>
+          <a:xfrm>
+            <a:off x="182563" y="1101724"/>
+            <a:ext cx="8778874" cy="5495627"/>
+            <a:chOff x="182563" y="1101725"/>
+            <a:chExt cx="8778874" cy="4654550"/>
+          </a:xfrm>
+        </p:grpSpPr>
+        <p:pic>
+          <p:nvPicPr>
+            <p:cNvPr id="6" name="Picture 57"/>
+            <p:cNvPicPr>
+              <a:picLocks noChangeAspect="1" noChangeArrowheads="1"/>
+            </p:cNvPicPr>
+            <p:nvPr/>
+          </p:nvPicPr>
+          <p:blipFill>
+            <a:blip r:embed="rId2">
+              <a:extLst>
+                <a:ext uri="{28A0092B-C50C-407E-A947-70E740481C1C}">
+                  <a14:useLocalDpi xmlns:a14="http://schemas.microsoft.com/office/drawing/2010/main" val="0"/>
+                </a:ext>
+              </a:extLst>
+            </a:blip>
+            <a:srcRect l="17336" t="23895" r="6712" b="7210"/>
+            <a:stretch>
+              <a:fillRect/>
+            </a:stretch>
+          </p:blipFill>
+          <p:spPr bwMode="auto">
+            <a:xfrm>
+              <a:off x="2122487" y="1101725"/>
+              <a:ext cx="6838950" cy="4654550"/>
+            </a:xfrm>
+            <a:prstGeom prst="rect">
+              <a:avLst/>
+            </a:prstGeom>
+            <a:noFill/>
+            <a:ln>
+              <a:noFill/>
+            </a:ln>
+            <a:extLst>
+              <a:ext uri="{909E8E84-426E-40DD-AFC4-6F175D3DCCD1}">
+                <a14:hiddenFill xmlns:a14="http://schemas.microsoft.com/office/drawing/2010/main">
+                  <a:solidFill>
+                    <a:srgbClr val="FFFFFF"/>
+                  </a:solidFill>
+                </a14:hiddenFill>
+              </a:ext>
+              <a:ext uri="{91240B29-F687-4F45-9708-019B960494DF}">
+                <a14:hiddenLine xmlns:a14="http://schemas.microsoft.com/office/drawing/2010/main" w="9525">
+                  <a:solidFill>
+                    <a:srgbClr val="000000"/>
+                  </a:solidFill>
+                  <a:miter lim="800000"/>
+                  <a:headEnd/>
+                  <a:tailEnd/>
+                </a14:hiddenLine>
+              </a:ext>
+            </a:extLst>
+          </p:spPr>
+        </p:pic>
+        <p:grpSp>
+          <p:nvGrpSpPr>
+            <p:cNvPr id="7" name="Group 4"/>
+            <p:cNvGrpSpPr>
+              <a:grpSpLocks/>
+            </p:cNvGrpSpPr>
+            <p:nvPr/>
+          </p:nvGrpSpPr>
+          <p:grpSpPr bwMode="auto">
+            <a:xfrm>
+              <a:off x="3203576" y="2092326"/>
+              <a:ext cx="4022725" cy="3484563"/>
+              <a:chOff x="2517" y="1625"/>
+              <a:chExt cx="2534" cy="2195"/>
+            </a:xfrm>
+          </p:grpSpPr>
+          <p:sp>
+            <p:nvSpPr>
+              <p:cNvPr id="18" name="Line 16"/>
+              <p:cNvSpPr>
+                <a:spLocks noChangeShapeType="1"/>
+              </p:cNvSpPr>
+              <p:nvPr/>
+            </p:nvSpPr>
+            <p:spPr bwMode="auto">
+              <a:xfrm flipH="1" flipV="1">
+                <a:off x="3506" y="2326"/>
+                <a:ext cx="1390" cy="986"/>
+              </a:xfrm>
+              <a:prstGeom prst="line">
+                <a:avLst/>
+              </a:prstGeom>
+              <a:noFill/>
+              <a:ln w="28575">
+                <a:solidFill>
+                  <a:srgbClr val="FF9900"/>
+                </a:solidFill>
+                <a:round/>
+                <a:headEnd/>
+                <a:tailEnd type="triangle" w="med" len="med"/>
+              </a:ln>
+              <a:extLst>
+                <a:ext uri="{909E8E84-426E-40DD-AFC4-6F175D3DCCD1}">
+                  <a14:hiddenFill xmlns:a14="http://schemas.microsoft.com/office/drawing/2010/main">
+                    <a:noFill/>
+                  </a14:hiddenFill>
+                </a:ext>
+              </a:extLst>
+            </p:spPr>
+            <p:txBody>
+              <a:bodyPr wrap="none" anchor="ctr"/>
+              <a:lstStyle>
+                <a:defPPr>
+                  <a:defRPr lang="es-MX"/>
+                </a:defPPr>
+                <a:lvl1pPr algn="l" rtl="0" eaLnBrk="0" fontAlgn="base" hangingPunct="0">
+                  <a:spcBef>
+                    <a:spcPct val="0"/>
+                  </a:spcBef>
+                  <a:spcAft>
+                    <a:spcPct val="0"/>
+                  </a:spcAft>
+                  <a:defRPr kern="1200">
+                    <a:solidFill>
+                      <a:schemeClr val="tx1"/>
+                    </a:solidFill>
+                    <a:latin typeface="Times New Roman" pitchFamily="18" charset="0"/>
+                    <a:ea typeface="+mn-ea"/>
+                    <a:cs typeface="+mn-cs"/>
+                  </a:defRPr>
+                </a:lvl1pPr>
+                <a:lvl2pPr marL="457200" algn="l" rtl="0" eaLnBrk="0" fontAlgn="base" hangingPunct="0">
+                  <a:spcBef>
+                    <a:spcPct val="0"/>
+                  </a:spcBef>
+                  <a:spcAft>
+                    <a:spcPct val="0"/>
+                  </a:spcAft>
+                  <a:defRPr kern="1200">
+                    <a:solidFill>
+                      <a:schemeClr val="tx1"/>
+                    </a:solidFill>
+                    <a:latin typeface="Times New Roman" pitchFamily="18" charset="0"/>
+                    <a:ea typeface="+mn-ea"/>
+                    <a:cs typeface="+mn-cs"/>
+                  </a:defRPr>
+                </a:lvl2pPr>
+                <a:lvl3pPr marL="914400" algn="l" rtl="0" eaLnBrk="0" fontAlgn="base" hangingPunct="0">
+                  <a:spcBef>
+                    <a:spcPct val="0"/>
+                  </a:spcBef>
+                  <a:spcAft>
+                    <a:spcPct val="0"/>
+                  </a:spcAft>
+                  <a:defRPr kern="1200">
+                    <a:solidFill>
+                      <a:schemeClr val="tx1"/>
+                    </a:solidFill>
+                    <a:latin typeface="Times New Roman" pitchFamily="18" charset="0"/>
+                    <a:ea typeface="+mn-ea"/>
+                    <a:cs typeface="+mn-cs"/>
+                  </a:defRPr>
+                </a:lvl3pPr>
+                <a:lvl4pPr marL="1371600" algn="l" rtl="0" eaLnBrk="0" fontAlgn="base" hangingPunct="0">
+                  <a:spcBef>
+                    <a:spcPct val="0"/>
+                  </a:spcBef>
+                  <a:spcAft>
+                    <a:spcPct val="0"/>
+                  </a:spcAft>
+                  <a:defRPr kern="1200">
+                    <a:solidFill>
+                      <a:schemeClr val="tx1"/>
+                    </a:solidFill>
+                    <a:latin typeface="Times New Roman" pitchFamily="18" charset="0"/>
+                    <a:ea typeface="+mn-ea"/>
+                    <a:cs typeface="+mn-cs"/>
+                  </a:defRPr>
+                </a:lvl4pPr>
+                <a:lvl5pPr marL="1828800" algn="l" rtl="0" eaLnBrk="0" fontAlgn="base" hangingPunct="0">
+                  <a:spcBef>
+                    <a:spcPct val="0"/>
+                  </a:spcBef>
+                  <a:spcAft>
+                    <a:spcPct val="0"/>
+                  </a:spcAft>
+                  <a:defRPr kern="1200">
+                    <a:solidFill>
+                      <a:schemeClr val="tx1"/>
+                    </a:solidFill>
+                    <a:latin typeface="Times New Roman" pitchFamily="18" charset="0"/>
+                    <a:ea typeface="+mn-ea"/>
+                    <a:cs typeface="+mn-cs"/>
+                  </a:defRPr>
+                </a:lvl5pPr>
+                <a:lvl6pPr marL="2286000" algn="l" defTabSz="914400" rtl="0" eaLnBrk="1" latinLnBrk="0" hangingPunct="1">
+                  <a:defRPr kern="1200">
+                    <a:solidFill>
+                      <a:schemeClr val="tx1"/>
+                    </a:solidFill>
+                    <a:latin typeface="Times New Roman" pitchFamily="18" charset="0"/>
+                    <a:ea typeface="+mn-ea"/>
+                    <a:cs typeface="+mn-cs"/>
+                  </a:defRPr>
+                </a:lvl6pPr>
+                <a:lvl7pPr marL="2743200" algn="l" defTabSz="914400" rtl="0" eaLnBrk="1" latinLnBrk="0" hangingPunct="1">
+                  <a:defRPr kern="1200">
+                    <a:solidFill>
+                      <a:schemeClr val="tx1"/>
+                    </a:solidFill>
+                    <a:latin typeface="Times New Roman" pitchFamily="18" charset="0"/>
+                    <a:ea typeface="+mn-ea"/>
+                    <a:cs typeface="+mn-cs"/>
+                  </a:defRPr>
+                </a:lvl7pPr>
+                <a:lvl8pPr marL="3200400" algn="l" defTabSz="914400" rtl="0" eaLnBrk="1" latinLnBrk="0" hangingPunct="1">
+                  <a:defRPr kern="1200">
+                    <a:solidFill>
+                      <a:schemeClr val="tx1"/>
+                    </a:solidFill>
+                    <a:latin typeface="Times New Roman" pitchFamily="18" charset="0"/>
+                    <a:ea typeface="+mn-ea"/>
+                    <a:cs typeface="+mn-cs"/>
+                  </a:defRPr>
+                </a:lvl8pPr>
+                <a:lvl9pPr marL="3657600" algn="l" defTabSz="914400" rtl="0" eaLnBrk="1" latinLnBrk="0" hangingPunct="1">
+                  <a:defRPr kern="1200">
+                    <a:solidFill>
+                      <a:schemeClr val="tx1"/>
+                    </a:solidFill>
+                    <a:latin typeface="Times New Roman" pitchFamily="18" charset="0"/>
+                    <a:ea typeface="+mn-ea"/>
+                    <a:cs typeface="+mn-cs"/>
+                  </a:defRPr>
+                </a:lvl9pPr>
+              </a:lstStyle>
+              <a:p>
+                <a:endParaRPr lang="es-MX"/>
+              </a:p>
+            </p:txBody>
+          </p:sp>
+          <p:sp>
+            <p:nvSpPr>
+              <p:cNvPr id="19" name="Oval 17"/>
+              <p:cNvSpPr>
+                <a:spLocks noChangeArrowheads="1"/>
+              </p:cNvSpPr>
+              <p:nvPr/>
+            </p:nvSpPr>
+            <p:spPr bwMode="auto">
+              <a:xfrm>
+                <a:off x="2860" y="1625"/>
+                <a:ext cx="661" cy="240"/>
+              </a:xfrm>
+              <a:prstGeom prst="ellipse">
+                <a:avLst/>
+              </a:prstGeom>
+              <a:noFill/>
+              <a:ln w="28575">
+                <a:solidFill>
+                  <a:srgbClr val="FF9900"/>
+                </a:solidFill>
+                <a:round/>
+                <a:headEnd/>
+                <a:tailEnd/>
+              </a:ln>
+              <a:extLst>
+                <a:ext uri="{909E8E84-426E-40DD-AFC4-6F175D3DCCD1}">
+                  <a14:hiddenFill xmlns:a14="http://schemas.microsoft.com/office/drawing/2010/main">
+                    <a:solidFill>
+                      <a:srgbClr val="FFFFFF"/>
+                    </a:solidFill>
+                  </a14:hiddenFill>
+                </a:ext>
+              </a:extLst>
+            </p:spPr>
+            <p:txBody>
+              <a:bodyPr wrap="none" anchor="ctr"/>
+              <a:lstStyle>
+                <a:defPPr>
+                  <a:defRPr lang="es-MX"/>
+                </a:defPPr>
+                <a:lvl1pPr algn="l" rtl="0" eaLnBrk="0" fontAlgn="base" hangingPunct="0">
+                  <a:spcBef>
+                    <a:spcPct val="0"/>
+                  </a:spcBef>
+                  <a:spcAft>
+                    <a:spcPct val="0"/>
+                  </a:spcAft>
+                  <a:defRPr kern="1200">
+                    <a:solidFill>
+                      <a:schemeClr val="tx1"/>
+                    </a:solidFill>
+                    <a:latin typeface="Times New Roman" pitchFamily="18" charset="0"/>
+                    <a:ea typeface="+mn-ea"/>
+                    <a:cs typeface="+mn-cs"/>
+                  </a:defRPr>
+                </a:lvl1pPr>
+                <a:lvl2pPr marL="457200" algn="l" rtl="0" eaLnBrk="0" fontAlgn="base" hangingPunct="0">
+                  <a:spcBef>
+                    <a:spcPct val="0"/>
+                  </a:spcBef>
+                  <a:spcAft>
+                    <a:spcPct val="0"/>
+                  </a:spcAft>
+                  <a:defRPr kern="1200">
+                    <a:solidFill>
+                      <a:schemeClr val="tx1"/>
+                    </a:solidFill>
+                    <a:latin typeface="Times New Roman" pitchFamily="18" charset="0"/>
+                    <a:ea typeface="+mn-ea"/>
+                    <a:cs typeface="+mn-cs"/>
+                  </a:defRPr>
+                </a:lvl2pPr>
+                <a:lvl3pPr marL="914400" algn="l" rtl="0" eaLnBrk="0" fontAlgn="base" hangingPunct="0">
+                  <a:spcBef>
+                    <a:spcPct val="0"/>
+                  </a:spcBef>
+                  <a:spcAft>
+                    <a:spcPct val="0"/>
+                  </a:spcAft>
+                  <a:defRPr kern="1200">
+                    <a:solidFill>
+                      <a:schemeClr val="tx1"/>
+                    </a:solidFill>
+                    <a:latin typeface="Times New Roman" pitchFamily="18" charset="0"/>
+                    <a:ea typeface="+mn-ea"/>
+                    <a:cs typeface="+mn-cs"/>
+                  </a:defRPr>
+                </a:lvl3pPr>
+                <a:lvl4pPr marL="1371600" algn="l" rtl="0" eaLnBrk="0" fontAlgn="base" hangingPunct="0">
+                  <a:spcBef>
+                    <a:spcPct val="0"/>
+                  </a:spcBef>
+                  <a:spcAft>
+                    <a:spcPct val="0"/>
+                  </a:spcAft>
+                  <a:defRPr kern="1200">
+                    <a:solidFill>
+                      <a:schemeClr val="tx1"/>
+                    </a:solidFill>
+                    <a:latin typeface="Times New Roman" pitchFamily="18" charset="0"/>
+                    <a:ea typeface="+mn-ea"/>
+                    <a:cs typeface="+mn-cs"/>
+                  </a:defRPr>
+                </a:lvl4pPr>
+                <a:lvl5pPr marL="1828800" algn="l" rtl="0" eaLnBrk="0" fontAlgn="base" hangingPunct="0">
+                  <a:spcBef>
+                    <a:spcPct val="0"/>
+                  </a:spcBef>
+                  <a:spcAft>
+                    <a:spcPct val="0"/>
+                  </a:spcAft>
+                  <a:defRPr kern="1200">
+                    <a:solidFill>
+                      <a:schemeClr val="tx1"/>
+                    </a:solidFill>
+                    <a:latin typeface="Times New Roman" pitchFamily="18" charset="0"/>
+                    <a:ea typeface="+mn-ea"/>
+                    <a:cs typeface="+mn-cs"/>
+                  </a:defRPr>
+                </a:lvl5pPr>
+                <a:lvl6pPr marL="2286000" algn="l" defTabSz="914400" rtl="0" eaLnBrk="1" latinLnBrk="0" hangingPunct="1">
+                  <a:defRPr kern="1200">
+                    <a:solidFill>
+                      <a:schemeClr val="tx1"/>
+                    </a:solidFill>
+                    <a:latin typeface="Times New Roman" pitchFamily="18" charset="0"/>
+                    <a:ea typeface="+mn-ea"/>
+                    <a:cs typeface="+mn-cs"/>
+                  </a:defRPr>
+                </a:lvl6pPr>
+                <a:lvl7pPr marL="2743200" algn="l" defTabSz="914400" rtl="0" eaLnBrk="1" latinLnBrk="0" hangingPunct="1">
+                  <a:defRPr kern="1200">
+                    <a:solidFill>
+                      <a:schemeClr val="tx1"/>
+                    </a:solidFill>
+                    <a:latin typeface="Times New Roman" pitchFamily="18" charset="0"/>
+                    <a:ea typeface="+mn-ea"/>
+                    <a:cs typeface="+mn-cs"/>
+                  </a:defRPr>
+                </a:lvl7pPr>
+                <a:lvl8pPr marL="3200400" algn="l" defTabSz="914400" rtl="0" eaLnBrk="1" latinLnBrk="0" hangingPunct="1">
+                  <a:defRPr kern="1200">
+                    <a:solidFill>
+                      <a:schemeClr val="tx1"/>
+                    </a:solidFill>
+                    <a:latin typeface="Times New Roman" pitchFamily="18" charset="0"/>
+                    <a:ea typeface="+mn-ea"/>
+                    <a:cs typeface="+mn-cs"/>
+                  </a:defRPr>
+                </a:lvl8pPr>
+                <a:lvl9pPr marL="3657600" algn="l" defTabSz="914400" rtl="0" eaLnBrk="1" latinLnBrk="0" hangingPunct="1">
+                  <a:defRPr kern="1200">
+                    <a:solidFill>
+                      <a:schemeClr val="tx1"/>
+                    </a:solidFill>
+                    <a:latin typeface="Times New Roman" pitchFamily="18" charset="0"/>
+                    <a:ea typeface="+mn-ea"/>
+                    <a:cs typeface="+mn-cs"/>
+                  </a:defRPr>
+                </a:lvl9pPr>
+              </a:lstStyle>
+              <a:p>
+                <a:endParaRPr lang="es-MX" sz="2400"/>
+              </a:p>
+            </p:txBody>
+          </p:sp>
+          <p:sp>
+            <p:nvSpPr>
+              <p:cNvPr id="20" name="Line 18"/>
+              <p:cNvSpPr>
+                <a:spLocks noChangeShapeType="1"/>
+              </p:cNvSpPr>
+              <p:nvPr/>
+            </p:nvSpPr>
+            <p:spPr bwMode="auto">
+              <a:xfrm flipH="1" flipV="1">
+                <a:off x="4867" y="2484"/>
+                <a:ext cx="29" cy="828"/>
+              </a:xfrm>
+              <a:prstGeom prst="line">
+                <a:avLst/>
+              </a:prstGeom>
+              <a:noFill/>
+              <a:ln w="28575">
+                <a:solidFill>
+                  <a:srgbClr val="FF9900"/>
+                </a:solidFill>
+                <a:round/>
+                <a:headEnd/>
+                <a:tailEnd/>
+              </a:ln>
+              <a:extLst>
+                <a:ext uri="{909E8E84-426E-40DD-AFC4-6F175D3DCCD1}">
+                  <a14:hiddenFill xmlns:a14="http://schemas.microsoft.com/office/drawing/2010/main">
+                    <a:noFill/>
+                  </a14:hiddenFill>
+                </a:ext>
+              </a:extLst>
+            </p:spPr>
+            <p:txBody>
+              <a:bodyPr wrap="none" anchor="ctr"/>
+              <a:lstStyle>
+                <a:defPPr>
+                  <a:defRPr lang="es-MX"/>
+                </a:defPPr>
+                <a:lvl1pPr algn="l" rtl="0" eaLnBrk="0" fontAlgn="base" hangingPunct="0">
+                  <a:spcBef>
+                    <a:spcPct val="0"/>
+                  </a:spcBef>
+                  <a:spcAft>
+                    <a:spcPct val="0"/>
+                  </a:spcAft>
+                  <a:defRPr kern="1200">
+                    <a:solidFill>
+                      <a:schemeClr val="tx1"/>
+                    </a:solidFill>
+                    <a:latin typeface="Times New Roman" pitchFamily="18" charset="0"/>
+                    <a:ea typeface="+mn-ea"/>
+                    <a:cs typeface="+mn-cs"/>
+                  </a:defRPr>
+                </a:lvl1pPr>
+                <a:lvl2pPr marL="457200" algn="l" rtl="0" eaLnBrk="0" fontAlgn="base" hangingPunct="0">
+                  <a:spcBef>
+                    <a:spcPct val="0"/>
+                  </a:spcBef>
+                  <a:spcAft>
+                    <a:spcPct val="0"/>
+                  </a:spcAft>
+                  <a:defRPr kern="1200">
+                    <a:solidFill>
+                      <a:schemeClr val="tx1"/>
+                    </a:solidFill>
+                    <a:latin typeface="Times New Roman" pitchFamily="18" charset="0"/>
+                    <a:ea typeface="+mn-ea"/>
+                    <a:cs typeface="+mn-cs"/>
+                  </a:defRPr>
+                </a:lvl2pPr>
+                <a:lvl3pPr marL="914400" algn="l" rtl="0" eaLnBrk="0" fontAlgn="base" hangingPunct="0">
+                  <a:spcBef>
+                    <a:spcPct val="0"/>
+                  </a:spcBef>
+                  <a:spcAft>
+                    <a:spcPct val="0"/>
+                  </a:spcAft>
+                  <a:defRPr kern="1200">
+                    <a:solidFill>
+                      <a:schemeClr val="tx1"/>
+                    </a:solidFill>
+                    <a:latin typeface="Times New Roman" pitchFamily="18" charset="0"/>
+                    <a:ea typeface="+mn-ea"/>
+                    <a:cs typeface="+mn-cs"/>
+                  </a:defRPr>
+                </a:lvl3pPr>
+                <a:lvl4pPr marL="1371600" algn="l" rtl="0" eaLnBrk="0" fontAlgn="base" hangingPunct="0">
+                  <a:spcBef>
+                    <a:spcPct val="0"/>
+                  </a:spcBef>
+                  <a:spcAft>
+                    <a:spcPct val="0"/>
+                  </a:spcAft>
+                  <a:defRPr kern="1200">
+                    <a:solidFill>
+                      <a:schemeClr val="tx1"/>
+                    </a:solidFill>
+                    <a:latin typeface="Times New Roman" pitchFamily="18" charset="0"/>
+                    <a:ea typeface="+mn-ea"/>
+                    <a:cs typeface="+mn-cs"/>
+                  </a:defRPr>
+                </a:lvl4pPr>
+                <a:lvl5pPr marL="1828800" algn="l" rtl="0" eaLnBrk="0" fontAlgn="base" hangingPunct="0">
+                  <a:spcBef>
+                    <a:spcPct val="0"/>
+                  </a:spcBef>
+                  <a:spcAft>
+                    <a:spcPct val="0"/>
+                  </a:spcAft>
+                  <a:defRPr kern="1200">
+                    <a:solidFill>
+                      <a:schemeClr val="tx1"/>
+                    </a:solidFill>
+                    <a:latin typeface="Times New Roman" pitchFamily="18" charset="0"/>
+                    <a:ea typeface="+mn-ea"/>
+                    <a:cs typeface="+mn-cs"/>
+                  </a:defRPr>
+                </a:lvl5pPr>
+                <a:lvl6pPr marL="2286000" algn="l" defTabSz="914400" rtl="0" eaLnBrk="1" latinLnBrk="0" hangingPunct="1">
+                  <a:defRPr kern="1200">
+                    <a:solidFill>
+                      <a:schemeClr val="tx1"/>
+                    </a:solidFill>
+                    <a:latin typeface="Times New Roman" pitchFamily="18" charset="0"/>
+                    <a:ea typeface="+mn-ea"/>
+                    <a:cs typeface="+mn-cs"/>
+                  </a:defRPr>
+                </a:lvl6pPr>
+                <a:lvl7pPr marL="2743200" algn="l" defTabSz="914400" rtl="0" eaLnBrk="1" latinLnBrk="0" hangingPunct="1">
+                  <a:defRPr kern="1200">
+                    <a:solidFill>
+                      <a:schemeClr val="tx1"/>
+                    </a:solidFill>
+                    <a:latin typeface="Times New Roman" pitchFamily="18" charset="0"/>
+                    <a:ea typeface="+mn-ea"/>
+                    <a:cs typeface="+mn-cs"/>
+                  </a:defRPr>
+                </a:lvl7pPr>
+                <a:lvl8pPr marL="3200400" algn="l" defTabSz="914400" rtl="0" eaLnBrk="1" latinLnBrk="0" hangingPunct="1">
+                  <a:defRPr kern="1200">
+                    <a:solidFill>
+                      <a:schemeClr val="tx1"/>
+                    </a:solidFill>
+                    <a:latin typeface="Times New Roman" pitchFamily="18" charset="0"/>
+                    <a:ea typeface="+mn-ea"/>
+                    <a:cs typeface="+mn-cs"/>
+                  </a:defRPr>
+                </a:lvl8pPr>
+                <a:lvl9pPr marL="3657600" algn="l" defTabSz="914400" rtl="0" eaLnBrk="1" latinLnBrk="0" hangingPunct="1">
+                  <a:defRPr kern="1200">
+                    <a:solidFill>
+                      <a:schemeClr val="tx1"/>
+                    </a:solidFill>
+                    <a:latin typeface="Times New Roman" pitchFamily="18" charset="0"/>
+                    <a:ea typeface="+mn-ea"/>
+                    <a:cs typeface="+mn-cs"/>
+                  </a:defRPr>
+                </a:lvl9pPr>
+              </a:lstStyle>
+              <a:p>
+                <a:endParaRPr lang="es-MX"/>
+              </a:p>
+            </p:txBody>
+          </p:sp>
+          <p:sp>
+            <p:nvSpPr>
+              <p:cNvPr id="21" name="Line 19"/>
+              <p:cNvSpPr>
+                <a:spLocks noChangeShapeType="1"/>
+              </p:cNvSpPr>
+              <p:nvPr/>
+            </p:nvSpPr>
+            <p:spPr bwMode="auto">
+              <a:xfrm flipH="1" flipV="1">
+                <a:off x="3515" y="1754"/>
+                <a:ext cx="1360" cy="737"/>
+              </a:xfrm>
+              <a:prstGeom prst="line">
+                <a:avLst/>
+              </a:prstGeom>
+              <a:noFill/>
+              <a:ln w="28575">
+                <a:solidFill>
+                  <a:srgbClr val="FF9900"/>
+                </a:solidFill>
+                <a:round/>
+                <a:headEnd/>
+                <a:tailEnd type="triangle" w="med" len="med"/>
+              </a:ln>
+              <a:extLst>
+                <a:ext uri="{909E8E84-426E-40DD-AFC4-6F175D3DCCD1}">
+                  <a14:hiddenFill xmlns:a14="http://schemas.microsoft.com/office/drawing/2010/main">
+                    <a:noFill/>
+                  </a14:hiddenFill>
+                </a:ext>
+              </a:extLst>
+            </p:spPr>
+            <p:txBody>
+              <a:bodyPr wrap="none" anchor="ctr"/>
+              <a:lstStyle>
+                <a:defPPr>
+                  <a:defRPr lang="es-MX"/>
+                </a:defPPr>
+                <a:lvl1pPr algn="l" rtl="0" eaLnBrk="0" fontAlgn="base" hangingPunct="0">
+                  <a:spcBef>
+                    <a:spcPct val="0"/>
+                  </a:spcBef>
+                  <a:spcAft>
+                    <a:spcPct val="0"/>
+                  </a:spcAft>
+                  <a:defRPr kern="1200">
+                    <a:solidFill>
+                      <a:schemeClr val="tx1"/>
+                    </a:solidFill>
+                    <a:latin typeface="Times New Roman" pitchFamily="18" charset="0"/>
+                    <a:ea typeface="+mn-ea"/>
+                    <a:cs typeface="+mn-cs"/>
+                  </a:defRPr>
+                </a:lvl1pPr>
+                <a:lvl2pPr marL="457200" algn="l" rtl="0" eaLnBrk="0" fontAlgn="base" hangingPunct="0">
+                  <a:spcBef>
+                    <a:spcPct val="0"/>
+                  </a:spcBef>
+                  <a:spcAft>
+                    <a:spcPct val="0"/>
+                  </a:spcAft>
+                  <a:defRPr kern="1200">
+                    <a:solidFill>
+                      <a:schemeClr val="tx1"/>
+                    </a:solidFill>
+                    <a:latin typeface="Times New Roman" pitchFamily="18" charset="0"/>
+                    <a:ea typeface="+mn-ea"/>
+                    <a:cs typeface="+mn-cs"/>
+                  </a:defRPr>
+                </a:lvl2pPr>
+                <a:lvl3pPr marL="914400" algn="l" rtl="0" eaLnBrk="0" fontAlgn="base" hangingPunct="0">
+                  <a:spcBef>
+                    <a:spcPct val="0"/>
+                  </a:spcBef>
+                  <a:spcAft>
+                    <a:spcPct val="0"/>
+                  </a:spcAft>
+                  <a:defRPr kern="1200">
+                    <a:solidFill>
+                      <a:schemeClr val="tx1"/>
+                    </a:solidFill>
+                    <a:latin typeface="Times New Roman" pitchFamily="18" charset="0"/>
+                    <a:ea typeface="+mn-ea"/>
+                    <a:cs typeface="+mn-cs"/>
+                  </a:defRPr>
+                </a:lvl3pPr>
+                <a:lvl4pPr marL="1371600" algn="l" rtl="0" eaLnBrk="0" fontAlgn="base" hangingPunct="0">
+                  <a:spcBef>
+                    <a:spcPct val="0"/>
+                  </a:spcBef>
+                  <a:spcAft>
+                    <a:spcPct val="0"/>
+                  </a:spcAft>
+                  <a:defRPr kern="1200">
+                    <a:solidFill>
+                      <a:schemeClr val="tx1"/>
+                    </a:solidFill>
+                    <a:latin typeface="Times New Roman" pitchFamily="18" charset="0"/>
+                    <a:ea typeface="+mn-ea"/>
+                    <a:cs typeface="+mn-cs"/>
+                  </a:defRPr>
+                </a:lvl4pPr>
+                <a:lvl5pPr marL="1828800" algn="l" rtl="0" eaLnBrk="0" fontAlgn="base" hangingPunct="0">
+                  <a:spcBef>
+                    <a:spcPct val="0"/>
+                  </a:spcBef>
+                  <a:spcAft>
+                    <a:spcPct val="0"/>
+                  </a:spcAft>
+                  <a:defRPr kern="1200">
+                    <a:solidFill>
+                      <a:schemeClr val="tx1"/>
+                    </a:solidFill>
+                    <a:latin typeface="Times New Roman" pitchFamily="18" charset="0"/>
+                    <a:ea typeface="+mn-ea"/>
+                    <a:cs typeface="+mn-cs"/>
+                  </a:defRPr>
+                </a:lvl5pPr>
+                <a:lvl6pPr marL="2286000" algn="l" defTabSz="914400" rtl="0" eaLnBrk="1" latinLnBrk="0" hangingPunct="1">
+                  <a:defRPr kern="1200">
+                    <a:solidFill>
+                      <a:schemeClr val="tx1"/>
+                    </a:solidFill>
+                    <a:latin typeface="Times New Roman" pitchFamily="18" charset="0"/>
+                    <a:ea typeface="+mn-ea"/>
+                    <a:cs typeface="+mn-cs"/>
+                  </a:defRPr>
+                </a:lvl6pPr>
+                <a:lvl7pPr marL="2743200" algn="l" defTabSz="914400" rtl="0" eaLnBrk="1" latinLnBrk="0" hangingPunct="1">
+                  <a:defRPr kern="1200">
+                    <a:solidFill>
+                      <a:schemeClr val="tx1"/>
+                    </a:solidFill>
+                    <a:latin typeface="Times New Roman" pitchFamily="18" charset="0"/>
+                    <a:ea typeface="+mn-ea"/>
+                    <a:cs typeface="+mn-cs"/>
+                  </a:defRPr>
+                </a:lvl7pPr>
+                <a:lvl8pPr marL="3200400" algn="l" defTabSz="914400" rtl="0" eaLnBrk="1" latinLnBrk="0" hangingPunct="1">
+                  <a:defRPr kern="1200">
+                    <a:solidFill>
+                      <a:schemeClr val="tx1"/>
+                    </a:solidFill>
+                    <a:latin typeface="Times New Roman" pitchFamily="18" charset="0"/>
+                    <a:ea typeface="+mn-ea"/>
+                    <a:cs typeface="+mn-cs"/>
+                  </a:defRPr>
+                </a:lvl8pPr>
+                <a:lvl9pPr marL="3657600" algn="l" defTabSz="914400" rtl="0" eaLnBrk="1" latinLnBrk="0" hangingPunct="1">
+                  <a:defRPr kern="1200">
+                    <a:solidFill>
+                      <a:schemeClr val="tx1"/>
+                    </a:solidFill>
+                    <a:latin typeface="Times New Roman" pitchFamily="18" charset="0"/>
+                    <a:ea typeface="+mn-ea"/>
+                    <a:cs typeface="+mn-cs"/>
+                  </a:defRPr>
+                </a:lvl9pPr>
+              </a:lstStyle>
+              <a:p>
+                <a:endParaRPr lang="es-MX"/>
+              </a:p>
+            </p:txBody>
+          </p:sp>
+          <p:sp>
+            <p:nvSpPr>
+              <p:cNvPr id="22" name="Rectangle 20"/>
+              <p:cNvSpPr>
+                <a:spLocks noChangeArrowheads="1"/>
+              </p:cNvSpPr>
+              <p:nvPr/>
+            </p:nvSpPr>
+            <p:spPr bwMode="auto">
+              <a:xfrm>
+                <a:off x="2517" y="3294"/>
+                <a:ext cx="2534" cy="526"/>
+              </a:xfrm>
+              <a:prstGeom prst="rect">
+                <a:avLst/>
+              </a:prstGeom>
+              <a:solidFill>
+                <a:schemeClr val="bg1"/>
+              </a:solidFill>
+              <a:ln w="9525">
+                <a:solidFill>
+                  <a:srgbClr val="FF9900"/>
+                </a:solidFill>
+                <a:miter lim="800000"/>
+                <a:headEnd/>
+                <a:tailEnd/>
+              </a:ln>
+            </p:spPr>
+            <p:txBody>
+              <a:bodyPr wrap="none">
+                <a:spAutoFit/>
+              </a:bodyPr>
+              <a:lstStyle>
+                <a:defPPr>
+                  <a:defRPr lang="es-MX"/>
+                </a:defPPr>
+                <a:lvl1pPr algn="l" rtl="0" eaLnBrk="0" fontAlgn="base" hangingPunct="0">
+                  <a:spcBef>
+                    <a:spcPct val="0"/>
+                  </a:spcBef>
+                  <a:spcAft>
+                    <a:spcPct val="0"/>
+                  </a:spcAft>
+                  <a:defRPr kern="1200">
+                    <a:solidFill>
+                      <a:schemeClr val="tx1"/>
+                    </a:solidFill>
+                    <a:latin typeface="Times New Roman" pitchFamily="18" charset="0"/>
+                    <a:ea typeface="+mn-ea"/>
+                    <a:cs typeface="+mn-cs"/>
+                  </a:defRPr>
+                </a:lvl1pPr>
+                <a:lvl2pPr marL="457200" algn="l" rtl="0" eaLnBrk="0" fontAlgn="base" hangingPunct="0">
+                  <a:spcBef>
+                    <a:spcPct val="0"/>
+                  </a:spcBef>
+                  <a:spcAft>
+                    <a:spcPct val="0"/>
+                  </a:spcAft>
+                  <a:defRPr kern="1200">
+                    <a:solidFill>
+                      <a:schemeClr val="tx1"/>
+                    </a:solidFill>
+                    <a:latin typeface="Times New Roman" pitchFamily="18" charset="0"/>
+                    <a:ea typeface="+mn-ea"/>
+                    <a:cs typeface="+mn-cs"/>
+                  </a:defRPr>
+                </a:lvl2pPr>
+                <a:lvl3pPr marL="914400" algn="l" rtl="0" eaLnBrk="0" fontAlgn="base" hangingPunct="0">
+                  <a:spcBef>
+                    <a:spcPct val="0"/>
+                  </a:spcBef>
+                  <a:spcAft>
+                    <a:spcPct val="0"/>
+                  </a:spcAft>
+                  <a:defRPr kern="1200">
+                    <a:solidFill>
+                      <a:schemeClr val="tx1"/>
+                    </a:solidFill>
+                    <a:latin typeface="Times New Roman" pitchFamily="18" charset="0"/>
+                    <a:ea typeface="+mn-ea"/>
+                    <a:cs typeface="+mn-cs"/>
+                  </a:defRPr>
+                </a:lvl3pPr>
+                <a:lvl4pPr marL="1371600" algn="l" rtl="0" eaLnBrk="0" fontAlgn="base" hangingPunct="0">
+                  <a:spcBef>
+                    <a:spcPct val="0"/>
+                  </a:spcBef>
+                  <a:spcAft>
+                    <a:spcPct val="0"/>
+                  </a:spcAft>
+                  <a:defRPr kern="1200">
+                    <a:solidFill>
+                      <a:schemeClr val="tx1"/>
+                    </a:solidFill>
+                    <a:latin typeface="Times New Roman" pitchFamily="18" charset="0"/>
+                    <a:ea typeface="+mn-ea"/>
+                    <a:cs typeface="+mn-cs"/>
+                  </a:defRPr>
+                </a:lvl4pPr>
+                <a:lvl5pPr marL="1828800" algn="l" rtl="0" eaLnBrk="0" fontAlgn="base" hangingPunct="0">
+                  <a:spcBef>
+                    <a:spcPct val="0"/>
+                  </a:spcBef>
+                  <a:spcAft>
+                    <a:spcPct val="0"/>
+                  </a:spcAft>
+                  <a:defRPr kern="1200">
+                    <a:solidFill>
+                      <a:schemeClr val="tx1"/>
+                    </a:solidFill>
+                    <a:latin typeface="Times New Roman" pitchFamily="18" charset="0"/>
+                    <a:ea typeface="+mn-ea"/>
+                    <a:cs typeface="+mn-cs"/>
+                  </a:defRPr>
+                </a:lvl5pPr>
+                <a:lvl6pPr marL="2286000" algn="l" defTabSz="914400" rtl="0" eaLnBrk="1" latinLnBrk="0" hangingPunct="1">
+                  <a:defRPr kern="1200">
+                    <a:solidFill>
+                      <a:schemeClr val="tx1"/>
+                    </a:solidFill>
+                    <a:latin typeface="Times New Roman" pitchFamily="18" charset="0"/>
+                    <a:ea typeface="+mn-ea"/>
+                    <a:cs typeface="+mn-cs"/>
+                  </a:defRPr>
+                </a:lvl6pPr>
+                <a:lvl7pPr marL="2743200" algn="l" defTabSz="914400" rtl="0" eaLnBrk="1" latinLnBrk="0" hangingPunct="1">
+                  <a:defRPr kern="1200">
+                    <a:solidFill>
+                      <a:schemeClr val="tx1"/>
+                    </a:solidFill>
+                    <a:latin typeface="Times New Roman" pitchFamily="18" charset="0"/>
+                    <a:ea typeface="+mn-ea"/>
+                    <a:cs typeface="+mn-cs"/>
+                  </a:defRPr>
+                </a:lvl7pPr>
+                <a:lvl8pPr marL="3200400" algn="l" defTabSz="914400" rtl="0" eaLnBrk="1" latinLnBrk="0" hangingPunct="1">
+                  <a:defRPr kern="1200">
+                    <a:solidFill>
+                      <a:schemeClr val="tx1"/>
+                    </a:solidFill>
+                    <a:latin typeface="Times New Roman" pitchFamily="18" charset="0"/>
+                    <a:ea typeface="+mn-ea"/>
+                    <a:cs typeface="+mn-cs"/>
+                  </a:defRPr>
+                </a:lvl8pPr>
+                <a:lvl9pPr marL="3657600" algn="l" defTabSz="914400" rtl="0" eaLnBrk="1" latinLnBrk="0" hangingPunct="1">
+                  <a:defRPr kern="1200">
+                    <a:solidFill>
+                      <a:schemeClr val="tx1"/>
+                    </a:solidFill>
+                    <a:latin typeface="Times New Roman" pitchFamily="18" charset="0"/>
+                    <a:ea typeface="+mn-ea"/>
+                    <a:cs typeface="+mn-cs"/>
+                  </a:defRPr>
+                </a:lvl9pPr>
+              </a:lstStyle>
+              <a:p>
+                <a:r>
+                  <a:rPr lang="es-MX" sz="1600" b="1">
+                    <a:solidFill>
+                      <a:srgbClr val="6C5000"/>
+                    </a:solidFill>
+                    <a:latin typeface="Tahoma" pitchFamily="34" charset="0"/>
+                  </a:rPr>
+                  <a:t>Fórmulas: Relaciona las celdas donde</a:t>
+                </a:r>
+              </a:p>
+              <a:p>
+                <a:r>
+                  <a:rPr lang="es-MX" sz="1600" b="1">
+                    <a:solidFill>
+                      <a:srgbClr val="6C5000"/>
+                    </a:solidFill>
+                    <a:latin typeface="Tahoma" pitchFamily="34" charset="0"/>
+                  </a:rPr>
+                  <a:t>                  se encuentran los valores</a:t>
+                </a:r>
+              </a:p>
+              <a:p>
+                <a:r>
+                  <a:rPr lang="es-MX" sz="1600" b="1">
+                    <a:solidFill>
+                      <a:srgbClr val="6C5000"/>
+                    </a:solidFill>
+                    <a:latin typeface="Tahoma" pitchFamily="34" charset="0"/>
+                  </a:rPr>
+                  <a:t>                  numéricos</a:t>
+                </a:r>
+              </a:p>
+            </p:txBody>
+          </p:sp>
+        </p:grpSp>
+        <p:grpSp>
+          <p:nvGrpSpPr>
+            <p:cNvPr id="8" name="Group 5"/>
+            <p:cNvGrpSpPr>
+              <a:grpSpLocks/>
+            </p:cNvGrpSpPr>
+            <p:nvPr/>
+          </p:nvGrpSpPr>
+          <p:grpSpPr bwMode="auto">
+            <a:xfrm>
+              <a:off x="182563" y="2217745"/>
+              <a:ext cx="2979740" cy="527052"/>
+              <a:chOff x="204" y="1344"/>
+              <a:chExt cx="1877" cy="332"/>
+            </a:xfrm>
+          </p:grpSpPr>
+          <p:sp>
+            <p:nvSpPr>
+              <p:cNvPr id="16" name="Line 14"/>
+              <p:cNvSpPr>
+                <a:spLocks noChangeShapeType="1"/>
+              </p:cNvSpPr>
+              <p:nvPr/>
+            </p:nvSpPr>
+            <p:spPr bwMode="auto">
+              <a:xfrm>
+                <a:off x="1746" y="1525"/>
+                <a:ext cx="335" cy="73"/>
+              </a:xfrm>
+              <a:prstGeom prst="line">
+                <a:avLst/>
+              </a:prstGeom>
+              <a:noFill/>
+              <a:ln w="28575">
+                <a:solidFill>
+                  <a:srgbClr val="FF9900"/>
+                </a:solidFill>
+                <a:round/>
+                <a:headEnd/>
+                <a:tailEnd type="triangle" w="med" len="med"/>
+              </a:ln>
+              <a:extLst>
+                <a:ext uri="{909E8E84-426E-40DD-AFC4-6F175D3DCCD1}">
+                  <a14:hiddenFill xmlns:a14="http://schemas.microsoft.com/office/drawing/2010/main">
+                    <a:noFill/>
+                  </a14:hiddenFill>
+                </a:ext>
+              </a:extLst>
+            </p:spPr>
+            <p:txBody>
+              <a:bodyPr wrap="none" anchor="ctr"/>
+              <a:lstStyle>
+                <a:defPPr>
+                  <a:defRPr lang="es-MX"/>
+                </a:defPPr>
+                <a:lvl1pPr algn="l" rtl="0" eaLnBrk="0" fontAlgn="base" hangingPunct="0">
+                  <a:spcBef>
+                    <a:spcPct val="0"/>
+                  </a:spcBef>
+                  <a:spcAft>
+                    <a:spcPct val="0"/>
+                  </a:spcAft>
+                  <a:defRPr kern="1200">
+                    <a:solidFill>
+                      <a:schemeClr val="tx1"/>
+                    </a:solidFill>
+                    <a:latin typeface="Times New Roman" pitchFamily="18" charset="0"/>
+                    <a:ea typeface="+mn-ea"/>
+                    <a:cs typeface="+mn-cs"/>
+                  </a:defRPr>
+                </a:lvl1pPr>
+                <a:lvl2pPr marL="457200" algn="l" rtl="0" eaLnBrk="0" fontAlgn="base" hangingPunct="0">
+                  <a:spcBef>
+                    <a:spcPct val="0"/>
+                  </a:spcBef>
+                  <a:spcAft>
+                    <a:spcPct val="0"/>
+                  </a:spcAft>
+                  <a:defRPr kern="1200">
+                    <a:solidFill>
+                      <a:schemeClr val="tx1"/>
+                    </a:solidFill>
+                    <a:latin typeface="Times New Roman" pitchFamily="18" charset="0"/>
+                    <a:ea typeface="+mn-ea"/>
+                    <a:cs typeface="+mn-cs"/>
+                  </a:defRPr>
+                </a:lvl2pPr>
+                <a:lvl3pPr marL="914400" algn="l" rtl="0" eaLnBrk="0" fontAlgn="base" hangingPunct="0">
+                  <a:spcBef>
+                    <a:spcPct val="0"/>
+                  </a:spcBef>
+                  <a:spcAft>
+                    <a:spcPct val="0"/>
+                  </a:spcAft>
+                  <a:defRPr kern="1200">
+                    <a:solidFill>
+                      <a:schemeClr val="tx1"/>
+                    </a:solidFill>
+                    <a:latin typeface="Times New Roman" pitchFamily="18" charset="0"/>
+                    <a:ea typeface="+mn-ea"/>
+                    <a:cs typeface="+mn-cs"/>
+                  </a:defRPr>
+                </a:lvl3pPr>
+                <a:lvl4pPr marL="1371600" algn="l" rtl="0" eaLnBrk="0" fontAlgn="base" hangingPunct="0">
+                  <a:spcBef>
+                    <a:spcPct val="0"/>
+                  </a:spcBef>
+                  <a:spcAft>
+                    <a:spcPct val="0"/>
+                  </a:spcAft>
+                  <a:defRPr kern="1200">
+                    <a:solidFill>
+                      <a:schemeClr val="tx1"/>
+                    </a:solidFill>
+                    <a:latin typeface="Times New Roman" pitchFamily="18" charset="0"/>
+                    <a:ea typeface="+mn-ea"/>
+                    <a:cs typeface="+mn-cs"/>
+                  </a:defRPr>
+                </a:lvl4pPr>
+                <a:lvl5pPr marL="1828800" algn="l" rtl="0" eaLnBrk="0" fontAlgn="base" hangingPunct="0">
+                  <a:spcBef>
+                    <a:spcPct val="0"/>
+                  </a:spcBef>
+                  <a:spcAft>
+                    <a:spcPct val="0"/>
+                  </a:spcAft>
+                  <a:defRPr kern="1200">
+                    <a:solidFill>
+                      <a:schemeClr val="tx1"/>
+                    </a:solidFill>
+                    <a:latin typeface="Times New Roman" pitchFamily="18" charset="0"/>
+                    <a:ea typeface="+mn-ea"/>
+                    <a:cs typeface="+mn-cs"/>
+                  </a:defRPr>
+                </a:lvl5pPr>
+                <a:lvl6pPr marL="2286000" algn="l" defTabSz="914400" rtl="0" eaLnBrk="1" latinLnBrk="0" hangingPunct="1">
+                  <a:defRPr kern="1200">
+                    <a:solidFill>
+                      <a:schemeClr val="tx1"/>
+                    </a:solidFill>
+                    <a:latin typeface="Times New Roman" pitchFamily="18" charset="0"/>
+                    <a:ea typeface="+mn-ea"/>
+                    <a:cs typeface="+mn-cs"/>
+                  </a:defRPr>
+                </a:lvl6pPr>
+                <a:lvl7pPr marL="2743200" algn="l" defTabSz="914400" rtl="0" eaLnBrk="1" latinLnBrk="0" hangingPunct="1">
+                  <a:defRPr kern="1200">
+                    <a:solidFill>
+                      <a:schemeClr val="tx1"/>
+                    </a:solidFill>
+                    <a:latin typeface="Times New Roman" pitchFamily="18" charset="0"/>
+                    <a:ea typeface="+mn-ea"/>
+                    <a:cs typeface="+mn-cs"/>
+                  </a:defRPr>
+                </a:lvl7pPr>
+                <a:lvl8pPr marL="3200400" algn="l" defTabSz="914400" rtl="0" eaLnBrk="1" latinLnBrk="0" hangingPunct="1">
+                  <a:defRPr kern="1200">
+                    <a:solidFill>
+                      <a:schemeClr val="tx1"/>
+                    </a:solidFill>
+                    <a:latin typeface="Times New Roman" pitchFamily="18" charset="0"/>
+                    <a:ea typeface="+mn-ea"/>
+                    <a:cs typeface="+mn-cs"/>
+                  </a:defRPr>
+                </a:lvl8pPr>
+                <a:lvl9pPr marL="3657600" algn="l" defTabSz="914400" rtl="0" eaLnBrk="1" latinLnBrk="0" hangingPunct="1">
+                  <a:defRPr kern="1200">
+                    <a:solidFill>
+                      <a:schemeClr val="tx1"/>
+                    </a:solidFill>
+                    <a:latin typeface="Times New Roman" pitchFamily="18" charset="0"/>
+                    <a:ea typeface="+mn-ea"/>
+                    <a:cs typeface="+mn-cs"/>
+                  </a:defRPr>
+                </a:lvl9pPr>
+              </a:lstStyle>
+              <a:p>
+                <a:endParaRPr lang="es-MX"/>
+              </a:p>
+            </p:txBody>
+          </p:sp>
+          <p:sp>
+            <p:nvSpPr>
+              <p:cNvPr id="17" name="Text Box 15"/>
+              <p:cNvSpPr txBox="1">
+                <a:spLocks noChangeArrowheads="1"/>
+              </p:cNvSpPr>
+              <p:nvPr/>
+            </p:nvSpPr>
+            <p:spPr bwMode="auto">
+              <a:xfrm>
+                <a:off x="204" y="1344"/>
+                <a:ext cx="1590" cy="332"/>
+              </a:xfrm>
+              <a:prstGeom prst="rect">
+                <a:avLst/>
+              </a:prstGeom>
+              <a:solidFill>
+                <a:schemeClr val="bg1"/>
+              </a:solidFill>
+              <a:ln w="9525">
+                <a:solidFill>
+                  <a:srgbClr val="FF9900"/>
+                </a:solidFill>
+                <a:miter lim="800000"/>
+                <a:headEnd/>
+                <a:tailEnd/>
+              </a:ln>
+            </p:spPr>
+            <p:txBody>
+              <a:bodyPr wrap="none">
+                <a:spAutoFit/>
+              </a:bodyPr>
+              <a:lstStyle>
+                <a:defPPr>
+                  <a:defRPr lang="es-MX"/>
+                </a:defPPr>
+                <a:lvl1pPr algn="l" rtl="0" eaLnBrk="0" fontAlgn="base" hangingPunct="0">
+                  <a:spcBef>
+                    <a:spcPct val="0"/>
+                  </a:spcBef>
+                  <a:spcAft>
+                    <a:spcPct val="0"/>
+                  </a:spcAft>
+                  <a:defRPr kern="1200">
+                    <a:solidFill>
+                      <a:schemeClr val="tx1"/>
+                    </a:solidFill>
+                    <a:latin typeface="Times New Roman" pitchFamily="18" charset="0"/>
+                    <a:ea typeface="+mn-ea"/>
+                    <a:cs typeface="+mn-cs"/>
+                  </a:defRPr>
+                </a:lvl1pPr>
+                <a:lvl2pPr marL="457200" algn="l" rtl="0" eaLnBrk="0" fontAlgn="base" hangingPunct="0">
+                  <a:spcBef>
+                    <a:spcPct val="0"/>
+                  </a:spcBef>
+                  <a:spcAft>
+                    <a:spcPct val="0"/>
+                  </a:spcAft>
+                  <a:defRPr kern="1200">
+                    <a:solidFill>
+                      <a:schemeClr val="tx1"/>
+                    </a:solidFill>
+                    <a:latin typeface="Times New Roman" pitchFamily="18" charset="0"/>
+                    <a:ea typeface="+mn-ea"/>
+                    <a:cs typeface="+mn-cs"/>
+                  </a:defRPr>
+                </a:lvl2pPr>
+                <a:lvl3pPr marL="914400" algn="l" rtl="0" eaLnBrk="0" fontAlgn="base" hangingPunct="0">
+                  <a:spcBef>
+                    <a:spcPct val="0"/>
+                  </a:spcBef>
+                  <a:spcAft>
+                    <a:spcPct val="0"/>
+                  </a:spcAft>
+                  <a:defRPr kern="1200">
+                    <a:solidFill>
+                      <a:schemeClr val="tx1"/>
+                    </a:solidFill>
+                    <a:latin typeface="Times New Roman" pitchFamily="18" charset="0"/>
+                    <a:ea typeface="+mn-ea"/>
+                    <a:cs typeface="+mn-cs"/>
+                  </a:defRPr>
+                </a:lvl3pPr>
+                <a:lvl4pPr marL="1371600" algn="l" rtl="0" eaLnBrk="0" fontAlgn="base" hangingPunct="0">
+                  <a:spcBef>
+                    <a:spcPct val="0"/>
+                  </a:spcBef>
+                  <a:spcAft>
+                    <a:spcPct val="0"/>
+                  </a:spcAft>
+                  <a:defRPr kern="1200">
+                    <a:solidFill>
+                      <a:schemeClr val="tx1"/>
+                    </a:solidFill>
+                    <a:latin typeface="Times New Roman" pitchFamily="18" charset="0"/>
+                    <a:ea typeface="+mn-ea"/>
+                    <a:cs typeface="+mn-cs"/>
+                  </a:defRPr>
+                </a:lvl4pPr>
+                <a:lvl5pPr marL="1828800" algn="l" rtl="0" eaLnBrk="0" fontAlgn="base" hangingPunct="0">
+                  <a:spcBef>
+                    <a:spcPct val="0"/>
+                  </a:spcBef>
+                  <a:spcAft>
+                    <a:spcPct val="0"/>
+                  </a:spcAft>
+                  <a:defRPr kern="1200">
+                    <a:solidFill>
+                      <a:schemeClr val="tx1"/>
+                    </a:solidFill>
+                    <a:latin typeface="Times New Roman" pitchFamily="18" charset="0"/>
+                    <a:ea typeface="+mn-ea"/>
+                    <a:cs typeface="+mn-cs"/>
+                  </a:defRPr>
+                </a:lvl5pPr>
+                <a:lvl6pPr marL="2286000" algn="l" defTabSz="914400" rtl="0" eaLnBrk="1" latinLnBrk="0" hangingPunct="1">
+                  <a:defRPr kern="1200">
+                    <a:solidFill>
+                      <a:schemeClr val="tx1"/>
+                    </a:solidFill>
+                    <a:latin typeface="Times New Roman" pitchFamily="18" charset="0"/>
+                    <a:ea typeface="+mn-ea"/>
+                    <a:cs typeface="+mn-cs"/>
+                  </a:defRPr>
+                </a:lvl6pPr>
+                <a:lvl7pPr marL="2743200" algn="l" defTabSz="914400" rtl="0" eaLnBrk="1" latinLnBrk="0" hangingPunct="1">
+                  <a:defRPr kern="1200">
+                    <a:solidFill>
+                      <a:schemeClr val="tx1"/>
+                    </a:solidFill>
+                    <a:latin typeface="Times New Roman" pitchFamily="18" charset="0"/>
+                    <a:ea typeface="+mn-ea"/>
+                    <a:cs typeface="+mn-cs"/>
+                  </a:defRPr>
+                </a:lvl7pPr>
+                <a:lvl8pPr marL="3200400" algn="l" defTabSz="914400" rtl="0" eaLnBrk="1" latinLnBrk="0" hangingPunct="1">
+                  <a:defRPr kern="1200">
+                    <a:solidFill>
+                      <a:schemeClr val="tx1"/>
+                    </a:solidFill>
+                    <a:latin typeface="Times New Roman" pitchFamily="18" charset="0"/>
+                    <a:ea typeface="+mn-ea"/>
+                    <a:cs typeface="+mn-cs"/>
+                  </a:defRPr>
+                </a:lvl8pPr>
+                <a:lvl9pPr marL="3657600" algn="l" defTabSz="914400" rtl="0" eaLnBrk="1" latinLnBrk="0" hangingPunct="1">
+                  <a:defRPr kern="1200">
+                    <a:solidFill>
+                      <a:schemeClr val="tx1"/>
+                    </a:solidFill>
+                    <a:latin typeface="Times New Roman" pitchFamily="18" charset="0"/>
+                    <a:ea typeface="+mn-ea"/>
+                    <a:cs typeface="+mn-cs"/>
+                  </a:defRPr>
+                </a:lvl9pPr>
+              </a:lstStyle>
+              <a:p>
+                <a:pPr algn="ctr"/>
+                <a:r>
+                  <a:rPr lang="es-MX" sz="1400" b="1">
+                    <a:solidFill>
+                      <a:srgbClr val="6C5000"/>
+                    </a:solidFill>
+                    <a:latin typeface="Tahoma" pitchFamily="34" charset="0"/>
+                  </a:rPr>
+                  <a:t>Excel únicamente permite</a:t>
+                </a:r>
+              </a:p>
+              <a:p>
+                <a:pPr algn="ctr"/>
+                <a:r>
+                  <a:rPr lang="es-MX" sz="1400" b="1">
+                    <a:solidFill>
+                      <a:srgbClr val="6C5000"/>
+                    </a:solidFill>
+                    <a:latin typeface="Tahoma" pitchFamily="34" charset="0"/>
+                  </a:rPr>
+                  <a:t>un dato por celda.</a:t>
+                </a:r>
+              </a:p>
+            </p:txBody>
+          </p:sp>
+        </p:grpSp>
+        <p:grpSp>
+          <p:nvGrpSpPr>
+            <p:cNvPr id="9" name="Group 6"/>
+            <p:cNvGrpSpPr>
+              <a:grpSpLocks/>
+            </p:cNvGrpSpPr>
+            <p:nvPr/>
+          </p:nvGrpSpPr>
+          <p:grpSpPr bwMode="auto">
+            <a:xfrm>
+              <a:off x="476251" y="2838454"/>
+              <a:ext cx="3132139" cy="862013"/>
+              <a:chOff x="295" y="2131"/>
+              <a:chExt cx="1973" cy="543"/>
+            </a:xfrm>
+          </p:grpSpPr>
+          <p:sp>
+            <p:nvSpPr>
+              <p:cNvPr id="13" name="Line 11"/>
+              <p:cNvSpPr>
+                <a:spLocks noChangeShapeType="1"/>
+              </p:cNvSpPr>
+              <p:nvPr/>
+            </p:nvSpPr>
+            <p:spPr bwMode="auto">
+              <a:xfrm flipV="1">
+                <a:off x="1701" y="2131"/>
+                <a:ext cx="560" cy="256"/>
+              </a:xfrm>
+              <a:prstGeom prst="line">
+                <a:avLst/>
+              </a:prstGeom>
+              <a:noFill/>
+              <a:ln w="28575">
+                <a:solidFill>
+                  <a:srgbClr val="FF9900"/>
+                </a:solidFill>
+                <a:round/>
+                <a:headEnd/>
+                <a:tailEnd type="triangle" w="med" len="med"/>
+              </a:ln>
+              <a:extLst>
+                <a:ext uri="{909E8E84-426E-40DD-AFC4-6F175D3DCCD1}">
+                  <a14:hiddenFill xmlns:a14="http://schemas.microsoft.com/office/drawing/2010/main">
+                    <a:noFill/>
+                  </a14:hiddenFill>
+                </a:ext>
+              </a:extLst>
+            </p:spPr>
+            <p:txBody>
+              <a:bodyPr wrap="none" anchor="ctr"/>
+              <a:lstStyle>
+                <a:defPPr>
+                  <a:defRPr lang="es-MX"/>
+                </a:defPPr>
+                <a:lvl1pPr algn="l" rtl="0" eaLnBrk="0" fontAlgn="base" hangingPunct="0">
+                  <a:spcBef>
+                    <a:spcPct val="0"/>
+                  </a:spcBef>
+                  <a:spcAft>
+                    <a:spcPct val="0"/>
+                  </a:spcAft>
+                  <a:defRPr kern="1200">
+                    <a:solidFill>
+                      <a:schemeClr val="tx1"/>
+                    </a:solidFill>
+                    <a:latin typeface="Times New Roman" pitchFamily="18" charset="0"/>
+                    <a:ea typeface="+mn-ea"/>
+                    <a:cs typeface="+mn-cs"/>
+                  </a:defRPr>
+                </a:lvl1pPr>
+                <a:lvl2pPr marL="457200" algn="l" rtl="0" eaLnBrk="0" fontAlgn="base" hangingPunct="0">
+                  <a:spcBef>
+                    <a:spcPct val="0"/>
+                  </a:spcBef>
+                  <a:spcAft>
+                    <a:spcPct val="0"/>
+                  </a:spcAft>
+                  <a:defRPr kern="1200">
+                    <a:solidFill>
+                      <a:schemeClr val="tx1"/>
+                    </a:solidFill>
+                    <a:latin typeface="Times New Roman" pitchFamily="18" charset="0"/>
+                    <a:ea typeface="+mn-ea"/>
+                    <a:cs typeface="+mn-cs"/>
+                  </a:defRPr>
+                </a:lvl2pPr>
+                <a:lvl3pPr marL="914400" algn="l" rtl="0" eaLnBrk="0" fontAlgn="base" hangingPunct="0">
+                  <a:spcBef>
+                    <a:spcPct val="0"/>
+                  </a:spcBef>
+                  <a:spcAft>
+                    <a:spcPct val="0"/>
+                  </a:spcAft>
+                  <a:defRPr kern="1200">
+                    <a:solidFill>
+                      <a:schemeClr val="tx1"/>
+                    </a:solidFill>
+                    <a:latin typeface="Times New Roman" pitchFamily="18" charset="0"/>
+                    <a:ea typeface="+mn-ea"/>
+                    <a:cs typeface="+mn-cs"/>
+                  </a:defRPr>
+                </a:lvl3pPr>
+                <a:lvl4pPr marL="1371600" algn="l" rtl="0" eaLnBrk="0" fontAlgn="base" hangingPunct="0">
+                  <a:spcBef>
+                    <a:spcPct val="0"/>
+                  </a:spcBef>
+                  <a:spcAft>
+                    <a:spcPct val="0"/>
+                  </a:spcAft>
+                  <a:defRPr kern="1200">
+                    <a:solidFill>
+                      <a:schemeClr val="tx1"/>
+                    </a:solidFill>
+                    <a:latin typeface="Times New Roman" pitchFamily="18" charset="0"/>
+                    <a:ea typeface="+mn-ea"/>
+                    <a:cs typeface="+mn-cs"/>
+                  </a:defRPr>
+                </a:lvl4pPr>
+                <a:lvl5pPr marL="1828800" algn="l" rtl="0" eaLnBrk="0" fontAlgn="base" hangingPunct="0">
+                  <a:spcBef>
+                    <a:spcPct val="0"/>
+                  </a:spcBef>
+                  <a:spcAft>
+                    <a:spcPct val="0"/>
+                  </a:spcAft>
+                  <a:defRPr kern="1200">
+                    <a:solidFill>
+                      <a:schemeClr val="tx1"/>
+                    </a:solidFill>
+                    <a:latin typeface="Times New Roman" pitchFamily="18" charset="0"/>
+                    <a:ea typeface="+mn-ea"/>
+                    <a:cs typeface="+mn-cs"/>
+                  </a:defRPr>
+                </a:lvl5pPr>
+                <a:lvl6pPr marL="2286000" algn="l" defTabSz="914400" rtl="0" eaLnBrk="1" latinLnBrk="0" hangingPunct="1">
+                  <a:defRPr kern="1200">
+                    <a:solidFill>
+                      <a:schemeClr val="tx1"/>
+                    </a:solidFill>
+                    <a:latin typeface="Times New Roman" pitchFamily="18" charset="0"/>
+                    <a:ea typeface="+mn-ea"/>
+                    <a:cs typeface="+mn-cs"/>
+                  </a:defRPr>
+                </a:lvl6pPr>
+                <a:lvl7pPr marL="2743200" algn="l" defTabSz="914400" rtl="0" eaLnBrk="1" latinLnBrk="0" hangingPunct="1">
+                  <a:defRPr kern="1200">
+                    <a:solidFill>
+                      <a:schemeClr val="tx1"/>
+                    </a:solidFill>
+                    <a:latin typeface="Times New Roman" pitchFamily="18" charset="0"/>
+                    <a:ea typeface="+mn-ea"/>
+                    <a:cs typeface="+mn-cs"/>
+                  </a:defRPr>
+                </a:lvl7pPr>
+                <a:lvl8pPr marL="3200400" algn="l" defTabSz="914400" rtl="0" eaLnBrk="1" latinLnBrk="0" hangingPunct="1">
+                  <a:defRPr kern="1200">
+                    <a:solidFill>
+                      <a:schemeClr val="tx1"/>
+                    </a:solidFill>
+                    <a:latin typeface="Times New Roman" pitchFamily="18" charset="0"/>
+                    <a:ea typeface="+mn-ea"/>
+                    <a:cs typeface="+mn-cs"/>
+                  </a:defRPr>
+                </a:lvl8pPr>
+                <a:lvl9pPr marL="3657600" algn="l" defTabSz="914400" rtl="0" eaLnBrk="1" latinLnBrk="0" hangingPunct="1">
+                  <a:defRPr kern="1200">
+                    <a:solidFill>
+                      <a:schemeClr val="tx1"/>
+                    </a:solidFill>
+                    <a:latin typeface="Times New Roman" pitchFamily="18" charset="0"/>
+                    <a:ea typeface="+mn-ea"/>
+                    <a:cs typeface="+mn-cs"/>
+                  </a:defRPr>
+                </a:lvl9pPr>
+              </a:lstStyle>
+              <a:p>
+                <a:endParaRPr lang="es-MX"/>
+              </a:p>
+            </p:txBody>
+          </p:sp>
+          <p:sp>
+            <p:nvSpPr>
+              <p:cNvPr id="14" name="Line 12"/>
+              <p:cNvSpPr>
+                <a:spLocks noChangeShapeType="1"/>
+              </p:cNvSpPr>
+              <p:nvPr/>
+            </p:nvSpPr>
+            <p:spPr bwMode="auto">
+              <a:xfrm flipV="1">
+                <a:off x="1701" y="2239"/>
+                <a:ext cx="567" cy="193"/>
+              </a:xfrm>
+              <a:prstGeom prst="line">
+                <a:avLst/>
+              </a:prstGeom>
+              <a:noFill/>
+              <a:ln w="28575">
+                <a:solidFill>
+                  <a:srgbClr val="FF9900"/>
+                </a:solidFill>
+                <a:round/>
+                <a:headEnd/>
+                <a:tailEnd type="triangle" w="med" len="med"/>
+              </a:ln>
+              <a:extLst>
+                <a:ext uri="{909E8E84-426E-40DD-AFC4-6F175D3DCCD1}">
+                  <a14:hiddenFill xmlns:a14="http://schemas.microsoft.com/office/drawing/2010/main">
+                    <a:noFill/>
+                  </a14:hiddenFill>
+                </a:ext>
+              </a:extLst>
+            </p:spPr>
+            <p:txBody>
+              <a:bodyPr wrap="none" anchor="ctr"/>
+              <a:lstStyle>
+                <a:defPPr>
+                  <a:defRPr lang="es-MX"/>
+                </a:defPPr>
+                <a:lvl1pPr algn="l" rtl="0" eaLnBrk="0" fontAlgn="base" hangingPunct="0">
+                  <a:spcBef>
+                    <a:spcPct val="0"/>
+                  </a:spcBef>
+                  <a:spcAft>
+                    <a:spcPct val="0"/>
+                  </a:spcAft>
+                  <a:defRPr kern="1200">
+                    <a:solidFill>
+                      <a:schemeClr val="tx1"/>
+                    </a:solidFill>
+                    <a:latin typeface="Times New Roman" pitchFamily="18" charset="0"/>
+                    <a:ea typeface="+mn-ea"/>
+                    <a:cs typeface="+mn-cs"/>
+                  </a:defRPr>
+                </a:lvl1pPr>
+                <a:lvl2pPr marL="457200" algn="l" rtl="0" eaLnBrk="0" fontAlgn="base" hangingPunct="0">
+                  <a:spcBef>
+                    <a:spcPct val="0"/>
+                  </a:spcBef>
+                  <a:spcAft>
+                    <a:spcPct val="0"/>
+                  </a:spcAft>
+                  <a:defRPr kern="1200">
+                    <a:solidFill>
+                      <a:schemeClr val="tx1"/>
+                    </a:solidFill>
+                    <a:latin typeface="Times New Roman" pitchFamily="18" charset="0"/>
+                    <a:ea typeface="+mn-ea"/>
+                    <a:cs typeface="+mn-cs"/>
+                  </a:defRPr>
+                </a:lvl2pPr>
+                <a:lvl3pPr marL="914400" algn="l" rtl="0" eaLnBrk="0" fontAlgn="base" hangingPunct="0">
+                  <a:spcBef>
+                    <a:spcPct val="0"/>
+                  </a:spcBef>
+                  <a:spcAft>
+                    <a:spcPct val="0"/>
+                  </a:spcAft>
+                  <a:defRPr kern="1200">
+                    <a:solidFill>
+                      <a:schemeClr val="tx1"/>
+                    </a:solidFill>
+                    <a:latin typeface="Times New Roman" pitchFamily="18" charset="0"/>
+                    <a:ea typeface="+mn-ea"/>
+                    <a:cs typeface="+mn-cs"/>
+                  </a:defRPr>
+                </a:lvl3pPr>
+                <a:lvl4pPr marL="1371600" algn="l" rtl="0" eaLnBrk="0" fontAlgn="base" hangingPunct="0">
+                  <a:spcBef>
+                    <a:spcPct val="0"/>
+                  </a:spcBef>
+                  <a:spcAft>
+                    <a:spcPct val="0"/>
+                  </a:spcAft>
+                  <a:defRPr kern="1200">
+                    <a:solidFill>
+                      <a:schemeClr val="tx1"/>
+                    </a:solidFill>
+                    <a:latin typeface="Times New Roman" pitchFamily="18" charset="0"/>
+                    <a:ea typeface="+mn-ea"/>
+                    <a:cs typeface="+mn-cs"/>
+                  </a:defRPr>
+                </a:lvl4pPr>
+                <a:lvl5pPr marL="1828800" algn="l" rtl="0" eaLnBrk="0" fontAlgn="base" hangingPunct="0">
+                  <a:spcBef>
+                    <a:spcPct val="0"/>
+                  </a:spcBef>
+                  <a:spcAft>
+                    <a:spcPct val="0"/>
+                  </a:spcAft>
+                  <a:defRPr kern="1200">
+                    <a:solidFill>
+                      <a:schemeClr val="tx1"/>
+                    </a:solidFill>
+                    <a:latin typeface="Times New Roman" pitchFamily="18" charset="0"/>
+                    <a:ea typeface="+mn-ea"/>
+                    <a:cs typeface="+mn-cs"/>
+                  </a:defRPr>
+                </a:lvl5pPr>
+                <a:lvl6pPr marL="2286000" algn="l" defTabSz="914400" rtl="0" eaLnBrk="1" latinLnBrk="0" hangingPunct="1">
+                  <a:defRPr kern="1200">
+                    <a:solidFill>
+                      <a:schemeClr val="tx1"/>
+                    </a:solidFill>
+                    <a:latin typeface="Times New Roman" pitchFamily="18" charset="0"/>
+                    <a:ea typeface="+mn-ea"/>
+                    <a:cs typeface="+mn-cs"/>
+                  </a:defRPr>
+                </a:lvl6pPr>
+                <a:lvl7pPr marL="2743200" algn="l" defTabSz="914400" rtl="0" eaLnBrk="1" latinLnBrk="0" hangingPunct="1">
+                  <a:defRPr kern="1200">
+                    <a:solidFill>
+                      <a:schemeClr val="tx1"/>
+                    </a:solidFill>
+                    <a:latin typeface="Times New Roman" pitchFamily="18" charset="0"/>
+                    <a:ea typeface="+mn-ea"/>
+                    <a:cs typeface="+mn-cs"/>
+                  </a:defRPr>
+                </a:lvl7pPr>
+                <a:lvl8pPr marL="3200400" algn="l" defTabSz="914400" rtl="0" eaLnBrk="1" latinLnBrk="0" hangingPunct="1">
+                  <a:defRPr kern="1200">
+                    <a:solidFill>
+                      <a:schemeClr val="tx1"/>
+                    </a:solidFill>
+                    <a:latin typeface="Times New Roman" pitchFamily="18" charset="0"/>
+                    <a:ea typeface="+mn-ea"/>
+                    <a:cs typeface="+mn-cs"/>
+                  </a:defRPr>
+                </a:lvl8pPr>
+                <a:lvl9pPr marL="3657600" algn="l" defTabSz="914400" rtl="0" eaLnBrk="1" latinLnBrk="0" hangingPunct="1">
+                  <a:defRPr kern="1200">
+                    <a:solidFill>
+                      <a:schemeClr val="tx1"/>
+                    </a:solidFill>
+                    <a:latin typeface="Times New Roman" pitchFamily="18" charset="0"/>
+                    <a:ea typeface="+mn-ea"/>
+                    <a:cs typeface="+mn-cs"/>
+                  </a:defRPr>
+                </a:lvl9pPr>
+              </a:lstStyle>
+              <a:p>
+                <a:endParaRPr lang="es-MX"/>
+              </a:p>
+            </p:txBody>
+          </p:sp>
+          <p:sp>
+            <p:nvSpPr>
+              <p:cNvPr id="15" name="Rectangle 13"/>
+              <p:cNvSpPr>
+                <a:spLocks noChangeArrowheads="1"/>
+              </p:cNvSpPr>
+              <p:nvPr/>
+            </p:nvSpPr>
+            <p:spPr bwMode="auto">
+              <a:xfrm>
+                <a:off x="295" y="2208"/>
+                <a:ext cx="1420" cy="466"/>
+              </a:xfrm>
+              <a:prstGeom prst="rect">
+                <a:avLst/>
+              </a:prstGeom>
+              <a:solidFill>
+                <a:schemeClr val="bg1"/>
+              </a:solidFill>
+              <a:ln w="9525">
+                <a:solidFill>
+                  <a:srgbClr val="FF9900"/>
+                </a:solidFill>
+                <a:miter lim="800000"/>
+                <a:headEnd/>
+                <a:tailEnd/>
+              </a:ln>
+            </p:spPr>
+            <p:txBody>
+              <a:bodyPr wrap="none">
+                <a:spAutoFit/>
+              </a:bodyPr>
+              <a:lstStyle>
+                <a:defPPr>
+                  <a:defRPr lang="es-MX"/>
+                </a:defPPr>
+                <a:lvl1pPr algn="l" rtl="0" eaLnBrk="0" fontAlgn="base" hangingPunct="0">
+                  <a:spcBef>
+                    <a:spcPct val="0"/>
+                  </a:spcBef>
+                  <a:spcAft>
+                    <a:spcPct val="0"/>
+                  </a:spcAft>
+                  <a:defRPr kern="1200">
+                    <a:solidFill>
+                      <a:schemeClr val="tx1"/>
+                    </a:solidFill>
+                    <a:latin typeface="Times New Roman" pitchFamily="18" charset="0"/>
+                    <a:ea typeface="+mn-ea"/>
+                    <a:cs typeface="+mn-cs"/>
+                  </a:defRPr>
+                </a:lvl1pPr>
+                <a:lvl2pPr marL="457200" algn="l" rtl="0" eaLnBrk="0" fontAlgn="base" hangingPunct="0">
+                  <a:spcBef>
+                    <a:spcPct val="0"/>
+                  </a:spcBef>
+                  <a:spcAft>
+                    <a:spcPct val="0"/>
+                  </a:spcAft>
+                  <a:defRPr kern="1200">
+                    <a:solidFill>
+                      <a:schemeClr val="tx1"/>
+                    </a:solidFill>
+                    <a:latin typeface="Times New Roman" pitchFamily="18" charset="0"/>
+                    <a:ea typeface="+mn-ea"/>
+                    <a:cs typeface="+mn-cs"/>
+                  </a:defRPr>
+                </a:lvl2pPr>
+                <a:lvl3pPr marL="914400" algn="l" rtl="0" eaLnBrk="0" fontAlgn="base" hangingPunct="0">
+                  <a:spcBef>
+                    <a:spcPct val="0"/>
+                  </a:spcBef>
+                  <a:spcAft>
+                    <a:spcPct val="0"/>
+                  </a:spcAft>
+                  <a:defRPr kern="1200">
+                    <a:solidFill>
+                      <a:schemeClr val="tx1"/>
+                    </a:solidFill>
+                    <a:latin typeface="Times New Roman" pitchFamily="18" charset="0"/>
+                    <a:ea typeface="+mn-ea"/>
+                    <a:cs typeface="+mn-cs"/>
+                  </a:defRPr>
+                </a:lvl3pPr>
+                <a:lvl4pPr marL="1371600" algn="l" rtl="0" eaLnBrk="0" fontAlgn="base" hangingPunct="0">
+                  <a:spcBef>
+                    <a:spcPct val="0"/>
+                  </a:spcBef>
+                  <a:spcAft>
+                    <a:spcPct val="0"/>
+                  </a:spcAft>
+                  <a:defRPr kern="1200">
+                    <a:solidFill>
+                      <a:schemeClr val="tx1"/>
+                    </a:solidFill>
+                    <a:latin typeface="Times New Roman" pitchFamily="18" charset="0"/>
+                    <a:ea typeface="+mn-ea"/>
+                    <a:cs typeface="+mn-cs"/>
+                  </a:defRPr>
+                </a:lvl4pPr>
+                <a:lvl5pPr marL="1828800" algn="l" rtl="0" eaLnBrk="0" fontAlgn="base" hangingPunct="0">
+                  <a:spcBef>
+                    <a:spcPct val="0"/>
+                  </a:spcBef>
+                  <a:spcAft>
+                    <a:spcPct val="0"/>
+                  </a:spcAft>
+                  <a:defRPr kern="1200">
+                    <a:solidFill>
+                      <a:schemeClr val="tx1"/>
+                    </a:solidFill>
+                    <a:latin typeface="Times New Roman" pitchFamily="18" charset="0"/>
+                    <a:ea typeface="+mn-ea"/>
+                    <a:cs typeface="+mn-cs"/>
+                  </a:defRPr>
+                </a:lvl5pPr>
+                <a:lvl6pPr marL="2286000" algn="l" defTabSz="914400" rtl="0" eaLnBrk="1" latinLnBrk="0" hangingPunct="1">
+                  <a:defRPr kern="1200">
+                    <a:solidFill>
+                      <a:schemeClr val="tx1"/>
+                    </a:solidFill>
+                    <a:latin typeface="Times New Roman" pitchFamily="18" charset="0"/>
+                    <a:ea typeface="+mn-ea"/>
+                    <a:cs typeface="+mn-cs"/>
+                  </a:defRPr>
+                </a:lvl6pPr>
+                <a:lvl7pPr marL="2743200" algn="l" defTabSz="914400" rtl="0" eaLnBrk="1" latinLnBrk="0" hangingPunct="1">
+                  <a:defRPr kern="1200">
+                    <a:solidFill>
+                      <a:schemeClr val="tx1"/>
+                    </a:solidFill>
+                    <a:latin typeface="Times New Roman" pitchFamily="18" charset="0"/>
+                    <a:ea typeface="+mn-ea"/>
+                    <a:cs typeface="+mn-cs"/>
+                  </a:defRPr>
+                </a:lvl7pPr>
+                <a:lvl8pPr marL="3200400" algn="l" defTabSz="914400" rtl="0" eaLnBrk="1" latinLnBrk="0" hangingPunct="1">
+                  <a:defRPr kern="1200">
+                    <a:solidFill>
+                      <a:schemeClr val="tx1"/>
+                    </a:solidFill>
+                    <a:latin typeface="Times New Roman" pitchFamily="18" charset="0"/>
+                    <a:ea typeface="+mn-ea"/>
+                    <a:cs typeface="+mn-cs"/>
+                  </a:defRPr>
+                </a:lvl8pPr>
+                <a:lvl9pPr marL="3657600" algn="l" defTabSz="914400" rtl="0" eaLnBrk="1" latinLnBrk="0" hangingPunct="1">
+                  <a:defRPr kern="1200">
+                    <a:solidFill>
+                      <a:schemeClr val="tx1"/>
+                    </a:solidFill>
+                    <a:latin typeface="Times New Roman" pitchFamily="18" charset="0"/>
+                    <a:ea typeface="+mn-ea"/>
+                    <a:cs typeface="+mn-cs"/>
+                  </a:defRPr>
+                </a:lvl9pPr>
+              </a:lstStyle>
+              <a:p>
+                <a:r>
+                  <a:rPr lang="es-MX" sz="1400" b="1">
+                    <a:solidFill>
+                      <a:srgbClr val="6C5000"/>
+                    </a:solidFill>
+                    <a:latin typeface="Tahoma" pitchFamily="34" charset="0"/>
+                  </a:rPr>
+                  <a:t>Alfanuméricos: Títulos </a:t>
+                </a:r>
+              </a:p>
+              <a:p>
+                <a:r>
+                  <a:rPr lang="es-MX" sz="1400" b="1">
+                    <a:solidFill>
+                      <a:srgbClr val="6C5000"/>
+                    </a:solidFill>
+                    <a:latin typeface="Tahoma" pitchFamily="34" charset="0"/>
+                  </a:rPr>
+                  <a:t>nombres, direcciones,</a:t>
+                </a:r>
+              </a:p>
+              <a:p>
+                <a:r>
+                  <a:rPr lang="es-MX" sz="1400" b="1">
+                    <a:solidFill>
+                      <a:srgbClr val="6C5000"/>
+                    </a:solidFill>
+                    <a:latin typeface="Tahoma" pitchFamily="34" charset="0"/>
+                  </a:rPr>
+                  <a:t>conceptos, etc.</a:t>
+                </a:r>
+              </a:p>
+            </p:txBody>
+          </p:sp>
+        </p:grpSp>
+        <p:grpSp>
+          <p:nvGrpSpPr>
+            <p:cNvPr id="10" name="Group 7"/>
+            <p:cNvGrpSpPr>
+              <a:grpSpLocks/>
+            </p:cNvGrpSpPr>
+            <p:nvPr/>
+          </p:nvGrpSpPr>
+          <p:grpSpPr bwMode="auto">
+            <a:xfrm>
+              <a:off x="1762125" y="2905127"/>
+              <a:ext cx="4256088" cy="1689101"/>
+              <a:chOff x="1674" y="2115"/>
+              <a:chExt cx="2681" cy="1064"/>
+            </a:xfrm>
+          </p:grpSpPr>
+          <p:sp>
+            <p:nvSpPr>
+              <p:cNvPr id="11" name="Line 9"/>
+              <p:cNvSpPr>
+                <a:spLocks noChangeShapeType="1"/>
+              </p:cNvSpPr>
+              <p:nvPr/>
+            </p:nvSpPr>
+            <p:spPr bwMode="auto">
+              <a:xfrm flipV="1">
+                <a:off x="2208" y="2115"/>
+                <a:ext cx="1262" cy="813"/>
+              </a:xfrm>
+              <a:prstGeom prst="line">
+                <a:avLst/>
+              </a:prstGeom>
+              <a:noFill/>
+              <a:ln w="28575">
+                <a:solidFill>
+                  <a:srgbClr val="FF9900"/>
+                </a:solidFill>
+                <a:round/>
+                <a:headEnd/>
+                <a:tailEnd type="triangle" w="med" len="med"/>
+              </a:ln>
+              <a:extLst>
+                <a:ext uri="{909E8E84-426E-40DD-AFC4-6F175D3DCCD1}">
+                  <a14:hiddenFill xmlns:a14="http://schemas.microsoft.com/office/drawing/2010/main">
+                    <a:noFill/>
+                  </a14:hiddenFill>
+                </a:ext>
+              </a:extLst>
+            </p:spPr>
+            <p:txBody>
+              <a:bodyPr wrap="none" anchor="ctr"/>
+              <a:lstStyle>
+                <a:defPPr>
+                  <a:defRPr lang="es-MX"/>
+                </a:defPPr>
+                <a:lvl1pPr algn="l" rtl="0" eaLnBrk="0" fontAlgn="base" hangingPunct="0">
+                  <a:spcBef>
+                    <a:spcPct val="0"/>
+                  </a:spcBef>
+                  <a:spcAft>
+                    <a:spcPct val="0"/>
+                  </a:spcAft>
+                  <a:defRPr kern="1200">
+                    <a:solidFill>
+                      <a:schemeClr val="tx1"/>
+                    </a:solidFill>
+                    <a:latin typeface="Times New Roman" pitchFamily="18" charset="0"/>
+                    <a:ea typeface="+mn-ea"/>
+                    <a:cs typeface="+mn-cs"/>
+                  </a:defRPr>
+                </a:lvl1pPr>
+                <a:lvl2pPr marL="457200" algn="l" rtl="0" eaLnBrk="0" fontAlgn="base" hangingPunct="0">
+                  <a:spcBef>
+                    <a:spcPct val="0"/>
+                  </a:spcBef>
+                  <a:spcAft>
+                    <a:spcPct val="0"/>
+                  </a:spcAft>
+                  <a:defRPr kern="1200">
+                    <a:solidFill>
+                      <a:schemeClr val="tx1"/>
+                    </a:solidFill>
+                    <a:latin typeface="Times New Roman" pitchFamily="18" charset="0"/>
+                    <a:ea typeface="+mn-ea"/>
+                    <a:cs typeface="+mn-cs"/>
+                  </a:defRPr>
+                </a:lvl2pPr>
+                <a:lvl3pPr marL="914400" algn="l" rtl="0" eaLnBrk="0" fontAlgn="base" hangingPunct="0">
+                  <a:spcBef>
+                    <a:spcPct val="0"/>
+                  </a:spcBef>
+                  <a:spcAft>
+                    <a:spcPct val="0"/>
+                  </a:spcAft>
+                  <a:defRPr kern="1200">
+                    <a:solidFill>
+                      <a:schemeClr val="tx1"/>
+                    </a:solidFill>
+                    <a:latin typeface="Times New Roman" pitchFamily="18" charset="0"/>
+                    <a:ea typeface="+mn-ea"/>
+                    <a:cs typeface="+mn-cs"/>
+                  </a:defRPr>
+                </a:lvl3pPr>
+                <a:lvl4pPr marL="1371600" algn="l" rtl="0" eaLnBrk="0" fontAlgn="base" hangingPunct="0">
+                  <a:spcBef>
+                    <a:spcPct val="0"/>
+                  </a:spcBef>
+                  <a:spcAft>
+                    <a:spcPct val="0"/>
+                  </a:spcAft>
+                  <a:defRPr kern="1200">
+                    <a:solidFill>
+                      <a:schemeClr val="tx1"/>
+                    </a:solidFill>
+                    <a:latin typeface="Times New Roman" pitchFamily="18" charset="0"/>
+                    <a:ea typeface="+mn-ea"/>
+                    <a:cs typeface="+mn-cs"/>
+                  </a:defRPr>
+                </a:lvl4pPr>
+                <a:lvl5pPr marL="1828800" algn="l" rtl="0" eaLnBrk="0" fontAlgn="base" hangingPunct="0">
+                  <a:spcBef>
+                    <a:spcPct val="0"/>
+                  </a:spcBef>
+                  <a:spcAft>
+                    <a:spcPct val="0"/>
+                  </a:spcAft>
+                  <a:defRPr kern="1200">
+                    <a:solidFill>
+                      <a:schemeClr val="tx1"/>
+                    </a:solidFill>
+                    <a:latin typeface="Times New Roman" pitchFamily="18" charset="0"/>
+                    <a:ea typeface="+mn-ea"/>
+                    <a:cs typeface="+mn-cs"/>
+                  </a:defRPr>
+                </a:lvl5pPr>
+                <a:lvl6pPr marL="2286000" algn="l" defTabSz="914400" rtl="0" eaLnBrk="1" latinLnBrk="0" hangingPunct="1">
+                  <a:defRPr kern="1200">
+                    <a:solidFill>
+                      <a:schemeClr val="tx1"/>
+                    </a:solidFill>
+                    <a:latin typeface="Times New Roman" pitchFamily="18" charset="0"/>
+                    <a:ea typeface="+mn-ea"/>
+                    <a:cs typeface="+mn-cs"/>
+                  </a:defRPr>
+                </a:lvl6pPr>
+                <a:lvl7pPr marL="2743200" algn="l" defTabSz="914400" rtl="0" eaLnBrk="1" latinLnBrk="0" hangingPunct="1">
+                  <a:defRPr kern="1200">
+                    <a:solidFill>
+                      <a:schemeClr val="tx1"/>
+                    </a:solidFill>
+                    <a:latin typeface="Times New Roman" pitchFamily="18" charset="0"/>
+                    <a:ea typeface="+mn-ea"/>
+                    <a:cs typeface="+mn-cs"/>
+                  </a:defRPr>
+                </a:lvl7pPr>
+                <a:lvl8pPr marL="3200400" algn="l" defTabSz="914400" rtl="0" eaLnBrk="1" latinLnBrk="0" hangingPunct="1">
+                  <a:defRPr kern="1200">
+                    <a:solidFill>
+                      <a:schemeClr val="tx1"/>
+                    </a:solidFill>
+                    <a:latin typeface="Times New Roman" pitchFamily="18" charset="0"/>
+                    <a:ea typeface="+mn-ea"/>
+                    <a:cs typeface="+mn-cs"/>
+                  </a:defRPr>
+                </a:lvl8pPr>
+                <a:lvl9pPr marL="3657600" algn="l" defTabSz="914400" rtl="0" eaLnBrk="1" latinLnBrk="0" hangingPunct="1">
+                  <a:defRPr kern="1200">
+                    <a:solidFill>
+                      <a:schemeClr val="tx1"/>
+                    </a:solidFill>
+                    <a:latin typeface="Times New Roman" pitchFamily="18" charset="0"/>
+                    <a:ea typeface="+mn-ea"/>
+                    <a:cs typeface="+mn-cs"/>
+                  </a:defRPr>
+                </a:lvl9pPr>
+              </a:lstStyle>
+              <a:p>
+                <a:endParaRPr lang="es-MX"/>
+              </a:p>
+            </p:txBody>
+          </p:sp>
+          <p:sp>
+            <p:nvSpPr>
+              <p:cNvPr id="12" name="Rectangle 10"/>
+              <p:cNvSpPr>
+                <a:spLocks noChangeArrowheads="1"/>
+              </p:cNvSpPr>
+              <p:nvPr/>
+            </p:nvSpPr>
+            <p:spPr bwMode="auto">
+              <a:xfrm>
+                <a:off x="1674" y="2923"/>
+                <a:ext cx="2681" cy="256"/>
+              </a:xfrm>
+              <a:prstGeom prst="rect">
+                <a:avLst/>
+              </a:prstGeom>
+              <a:solidFill>
+                <a:schemeClr val="bg1"/>
+              </a:solidFill>
+              <a:ln w="9525">
+                <a:solidFill>
+                  <a:srgbClr val="FF9900"/>
+                </a:solidFill>
+                <a:miter lim="800000"/>
+                <a:headEnd/>
+                <a:tailEnd/>
+              </a:ln>
+            </p:spPr>
+            <p:txBody>
+              <a:bodyPr wrap="none">
+                <a:spAutoFit/>
+              </a:bodyPr>
+              <a:lstStyle>
+                <a:defPPr>
+                  <a:defRPr lang="es-MX"/>
+                </a:defPPr>
+                <a:lvl1pPr algn="l" rtl="0" eaLnBrk="0" fontAlgn="base" hangingPunct="0">
+                  <a:spcBef>
+                    <a:spcPct val="0"/>
+                  </a:spcBef>
+                  <a:spcAft>
+                    <a:spcPct val="0"/>
+                  </a:spcAft>
+                  <a:defRPr kern="1200">
+                    <a:solidFill>
+                      <a:schemeClr val="tx1"/>
+                    </a:solidFill>
+                    <a:latin typeface="Times New Roman" pitchFamily="18" charset="0"/>
+                    <a:ea typeface="+mn-ea"/>
+                    <a:cs typeface="+mn-cs"/>
+                  </a:defRPr>
+                </a:lvl1pPr>
+                <a:lvl2pPr marL="457200" algn="l" rtl="0" eaLnBrk="0" fontAlgn="base" hangingPunct="0">
+                  <a:spcBef>
+                    <a:spcPct val="0"/>
+                  </a:spcBef>
+                  <a:spcAft>
+                    <a:spcPct val="0"/>
+                  </a:spcAft>
+                  <a:defRPr kern="1200">
+                    <a:solidFill>
+                      <a:schemeClr val="tx1"/>
+                    </a:solidFill>
+                    <a:latin typeface="Times New Roman" pitchFamily="18" charset="0"/>
+                    <a:ea typeface="+mn-ea"/>
+                    <a:cs typeface="+mn-cs"/>
+                  </a:defRPr>
+                </a:lvl2pPr>
+                <a:lvl3pPr marL="914400" algn="l" rtl="0" eaLnBrk="0" fontAlgn="base" hangingPunct="0">
+                  <a:spcBef>
+                    <a:spcPct val="0"/>
+                  </a:spcBef>
+                  <a:spcAft>
+                    <a:spcPct val="0"/>
+                  </a:spcAft>
+                  <a:defRPr kern="1200">
+                    <a:solidFill>
+                      <a:schemeClr val="tx1"/>
+                    </a:solidFill>
+                    <a:latin typeface="Times New Roman" pitchFamily="18" charset="0"/>
+                    <a:ea typeface="+mn-ea"/>
+                    <a:cs typeface="+mn-cs"/>
+                  </a:defRPr>
+                </a:lvl3pPr>
+                <a:lvl4pPr marL="1371600" algn="l" rtl="0" eaLnBrk="0" fontAlgn="base" hangingPunct="0">
+                  <a:spcBef>
+                    <a:spcPct val="0"/>
+                  </a:spcBef>
+                  <a:spcAft>
+                    <a:spcPct val="0"/>
+                  </a:spcAft>
+                  <a:defRPr kern="1200">
+                    <a:solidFill>
+                      <a:schemeClr val="tx1"/>
+                    </a:solidFill>
+                    <a:latin typeface="Times New Roman" pitchFamily="18" charset="0"/>
+                    <a:ea typeface="+mn-ea"/>
+                    <a:cs typeface="+mn-cs"/>
+                  </a:defRPr>
+                </a:lvl4pPr>
+                <a:lvl5pPr marL="1828800" algn="l" rtl="0" eaLnBrk="0" fontAlgn="base" hangingPunct="0">
+                  <a:spcBef>
+                    <a:spcPct val="0"/>
+                  </a:spcBef>
+                  <a:spcAft>
+                    <a:spcPct val="0"/>
+                  </a:spcAft>
+                  <a:defRPr kern="1200">
+                    <a:solidFill>
+                      <a:schemeClr val="tx1"/>
+                    </a:solidFill>
+                    <a:latin typeface="Times New Roman" pitchFamily="18" charset="0"/>
+                    <a:ea typeface="+mn-ea"/>
+                    <a:cs typeface="+mn-cs"/>
+                  </a:defRPr>
+                </a:lvl5pPr>
+                <a:lvl6pPr marL="2286000" algn="l" defTabSz="914400" rtl="0" eaLnBrk="1" latinLnBrk="0" hangingPunct="1">
+                  <a:defRPr kern="1200">
+                    <a:solidFill>
+                      <a:schemeClr val="tx1"/>
+                    </a:solidFill>
+                    <a:latin typeface="Times New Roman" pitchFamily="18" charset="0"/>
+                    <a:ea typeface="+mn-ea"/>
+                    <a:cs typeface="+mn-cs"/>
+                  </a:defRPr>
+                </a:lvl6pPr>
+                <a:lvl7pPr marL="2743200" algn="l" defTabSz="914400" rtl="0" eaLnBrk="1" latinLnBrk="0" hangingPunct="1">
+                  <a:defRPr kern="1200">
+                    <a:solidFill>
+                      <a:schemeClr val="tx1"/>
+                    </a:solidFill>
+                    <a:latin typeface="Times New Roman" pitchFamily="18" charset="0"/>
+                    <a:ea typeface="+mn-ea"/>
+                    <a:cs typeface="+mn-cs"/>
+                  </a:defRPr>
+                </a:lvl7pPr>
+                <a:lvl8pPr marL="3200400" algn="l" defTabSz="914400" rtl="0" eaLnBrk="1" latinLnBrk="0" hangingPunct="1">
+                  <a:defRPr kern="1200">
+                    <a:solidFill>
+                      <a:schemeClr val="tx1"/>
+                    </a:solidFill>
+                    <a:latin typeface="Times New Roman" pitchFamily="18" charset="0"/>
+                    <a:ea typeface="+mn-ea"/>
+                    <a:cs typeface="+mn-cs"/>
+                  </a:defRPr>
+                </a:lvl8pPr>
+                <a:lvl9pPr marL="3657600" algn="l" defTabSz="914400" rtl="0" eaLnBrk="1" latinLnBrk="0" hangingPunct="1">
+                  <a:defRPr kern="1200">
+                    <a:solidFill>
+                      <a:schemeClr val="tx1"/>
+                    </a:solidFill>
+                    <a:latin typeface="Times New Roman" pitchFamily="18" charset="0"/>
+                    <a:ea typeface="+mn-ea"/>
+                    <a:cs typeface="+mn-cs"/>
+                  </a:defRPr>
+                </a:lvl9pPr>
+              </a:lstStyle>
+              <a:p>
+                <a:r>
+                  <a:rPr lang="es-MX" sz="2000" b="1">
+                    <a:solidFill>
+                      <a:srgbClr val="6C5000"/>
+                    </a:solidFill>
+                    <a:latin typeface="Tahoma" pitchFamily="34" charset="0"/>
+                  </a:rPr>
+                  <a:t>Numéricos: Enteros y decimales</a:t>
+                </a:r>
+              </a:p>
+            </p:txBody>
+          </p:sp>
+        </p:grpSp>
+      </p:grpSp>
+    </p:spTree>
+    <p:extLst>
+      <p:ext uri="{BB962C8B-B14F-4D97-AF65-F5344CB8AC3E}">
+        <p14:creationId xmlns:p14="http://schemas.microsoft.com/office/powerpoint/2010/main" val="207382128"/>
+      </p:ext>
+    </p:extLst>
+  </p:cSld>
+  <p:clrMapOvr>
+    <a:masterClrMapping/>
+  </p:clrMapOvr>
+</p:sld>
+</file>
+
+<file path=ppt/slides/slide9.xml><?xml version="1.0" encoding="utf-8"?>
+<p:sld xmlns:a="http://schemas.openxmlformats.org/drawingml/2006/main" xmlns:r="http://schemas.openxmlformats.org/officeDocument/2006/relationships" xmlns:p="http://schemas.openxmlformats.org/presentationml/2006/main">
+  <p:cSld>
+    <p:spTree>
+      <p:nvGrpSpPr>
+        <p:cNvPr id="1" name=""/>
+        <p:cNvGrpSpPr/>
+        <p:nvPr/>
+      </p:nvGrpSpPr>
+      <p:grpSpPr>
+        <a:xfrm>
+          <a:off x="0" y="0"/>
+          <a:ext cx="0" cy="0"/>
+          <a:chOff x="0" y="0"/>
+          <a:chExt cx="0" cy="0"/>
+        </a:xfrm>
+      </p:grpSpPr>
+      <p:sp>
+        <p:nvSpPr>
+          <p:cNvPr id="2" name="1 Título"/>
+          <p:cNvSpPr>
+            <a:spLocks noGrp="1"/>
+          </p:cNvSpPr>
+          <p:nvPr>
+            <p:ph type="title"/>
+          </p:nvPr>
+        </p:nvSpPr>
+        <p:spPr>
+          <a:xfrm>
+            <a:off x="611560" y="2852936"/>
+            <a:ext cx="8229600" cy="1143000"/>
+          </a:xfrm>
+        </p:spPr>
+        <p:txBody>
+          <a:bodyPr/>
+          <a:lstStyle/>
+          <a:p>
+            <a:r>
+              <a:rPr lang="es-ES" dirty="0" smtClean="0"/>
+              <a:t>Formatos</a:t>
+            </a:r>
+            <a:endParaRPr lang="es-ES" dirty="0"/>
+          </a:p>
+        </p:txBody>
+      </p:sp>
+    </p:spTree>
+    <p:extLst>
+      <p:ext uri="{BB962C8B-B14F-4D97-AF65-F5344CB8AC3E}">
+        <p14:creationId xmlns:p14="http://schemas.microsoft.com/office/powerpoint/2010/main" val="1473577499"/>
       </p:ext>
     </p:extLst>
   </p:cSld>

</xml_diff>

<commit_message>
se termino la diapositiva de aplicadas 2
</commit_message>
<xml_diff>
--- a/2015-2016/clases/computacion_aplicada_2/clase_1/clase1.pptx
+++ b/2015-2016/clases/computacion_aplicada_2/clase_1/clase1.pptx
@@ -2,7 +2,7 @@
 <file path=ppt/presentation.xml><?xml version="1.0" encoding="utf-8"?>
 <p:presentation xmlns:a="http://schemas.openxmlformats.org/drawingml/2006/main" xmlns:r="http://schemas.openxmlformats.org/officeDocument/2006/relationships" xmlns:p="http://schemas.openxmlformats.org/presentationml/2006/main" saveSubsetFonts="1">
   <p:sldMasterIdLst>
-    <p:sldMasterId id="2147483648" r:id="rId1"/>
+    <p:sldMasterId id="2147483672" r:id="rId1"/>
   </p:sldMasterIdLst>
   <p:sldIdLst>
     <p:sldId id="256" r:id="rId2"/>
@@ -25,6 +25,9 @@
     <p:sldId id="274" r:id="rId19"/>
     <p:sldId id="275" r:id="rId20"/>
     <p:sldId id="276" r:id="rId21"/>
+    <p:sldId id="277" r:id="rId22"/>
+    <p:sldId id="278" r:id="rId23"/>
+    <p:sldId id="279" r:id="rId24"/>
   </p:sldIdLst>
   <p:sldSz cx="9144000" cy="6858000" type="screen4x3"/>
   <p:notesSz cx="6858000" cy="9144000"/>
@@ -145,7 +148,78 @@
       </p:grpSpPr>
       <p:sp>
         <p:nvSpPr>
-          <p:cNvPr id="2" name="1 Título"/>
+          <p:cNvPr id="7" name="6 Triángulo isósceles"/>
+          <p:cNvSpPr/>
+          <p:nvPr/>
+        </p:nvSpPr>
+        <p:spPr>
+          <a:xfrm rot="16200000">
+            <a:off x="7554353" y="5254283"/>
+            <a:ext cx="1892949" cy="1294228"/>
+          </a:xfrm>
+          <a:prstGeom prst="triangle">
+            <a:avLst>
+              <a:gd name="adj" fmla="val 51323"/>
+            </a:avLst>
+          </a:prstGeom>
+          <a:gradFill flip="none" rotWithShape="1">
+            <a:gsLst>
+              <a:gs pos="0">
+                <a:schemeClr val="accent1">
+                  <a:shade val="30000"/>
+                  <a:satMod val="155000"/>
+                  <a:alpha val="100000"/>
+                </a:schemeClr>
+              </a:gs>
+              <a:gs pos="60000">
+                <a:schemeClr val="accent1">
+                  <a:satMod val="160000"/>
+                  <a:alpha val="100000"/>
+                </a:schemeClr>
+              </a:gs>
+              <a:gs pos="100000">
+                <a:schemeClr val="accent1">
+                  <a:tint val="70000"/>
+                  <a:satMod val="200000"/>
+                  <a:alpha val="100000"/>
+                </a:schemeClr>
+              </a:gs>
+            </a:gsLst>
+            <a:lin ang="15500000" scaled="1"/>
+            <a:tileRect/>
+          </a:gradFill>
+          <a:ln w="38100" cap="rnd" cmpd="sng" algn="ctr">
+            <a:noFill/>
+            <a:prstDash val="solid"/>
+          </a:ln>
+          <a:effectLst/>
+        </p:spPr>
+        <p:style>
+          <a:lnRef idx="3">
+            <a:schemeClr val="lt1"/>
+          </a:lnRef>
+          <a:fillRef idx="1">
+            <a:schemeClr val="accent1"/>
+          </a:fillRef>
+          <a:effectRef idx="1">
+            <a:schemeClr val="accent1"/>
+          </a:effectRef>
+          <a:fontRef idx="minor">
+            <a:schemeClr val="lt1"/>
+          </a:fontRef>
+        </p:style>
+        <p:txBody>
+          <a:bodyPr anchor="ctr"/>
+          <a:lstStyle/>
+          <a:p>
+            <a:pPr algn="ctr" eaLnBrk="1" latinLnBrk="0" hangingPunct="1"/>
+            <a:endParaRPr kumimoji="0" lang="en-US"/>
+          </a:p>
+        </p:txBody>
+      </p:sp>
+      <p:sp>
+        <p:nvSpPr>
+          <p:cNvPr id="8" name="7 Título"/>
           <p:cNvSpPr>
             <a:spLocks noGrp="1"/>
           </p:cNvSpPr>
@@ -155,25 +229,31 @@
         </p:nvSpPr>
         <p:spPr>
           <a:xfrm>
-            <a:off x="685800" y="2130425"/>
-            <a:ext cx="7772400" cy="1470025"/>
-          </a:xfrm>
-        </p:spPr>
-        <p:txBody>
-          <a:bodyPr/>
-          <a:lstStyle/>
-          <a:p>
-            <a:r>
-              <a:rPr lang="es-ES" smtClean="0"/>
+            <a:off x="540544" y="776288"/>
+            <a:ext cx="8062912" cy="1470025"/>
+          </a:xfrm>
+        </p:spPr>
+        <p:txBody>
+          <a:bodyPr anchor="b">
+            <a:normAutofit/>
+          </a:bodyPr>
+          <a:lstStyle>
+            <a:lvl1pPr algn="r">
+              <a:defRPr sz="4400"/>
+            </a:lvl1pPr>
+          </a:lstStyle>
+          <a:p>
+            <a:r>
+              <a:rPr kumimoji="0" lang="es-ES" smtClean="0"/>
               <a:t>Haga clic para modificar el estilo de título del patrón</a:t>
             </a:r>
-            <a:endParaRPr lang="es-ES"/>
-          </a:p>
-        </p:txBody>
-      </p:sp>
-      <p:sp>
-        <p:nvSpPr>
-          <p:cNvPr id="3" name="2 Subtítulo"/>
+            <a:endParaRPr kumimoji="0" lang="en-US"/>
+          </a:p>
+        </p:txBody>
+      </p:sp>
+      <p:sp>
+        <p:nvSpPr>
+          <p:cNvPr id="9" name="8 Subtítulo"/>
           <p:cNvSpPr>
             <a:spLocks noGrp="1"/>
           </p:cNvSpPr>
@@ -183,16 +263,24 @@
         </p:nvSpPr>
         <p:spPr>
           <a:xfrm>
-            <a:off x="1371600" y="3886200"/>
-            <a:ext cx="6400800" cy="1752600"/>
+            <a:off x="540544" y="2250280"/>
+            <a:ext cx="8062912" cy="1752600"/>
           </a:xfrm>
         </p:spPr>
         <p:txBody>
           <a:bodyPr/>
           <a:lstStyle>
-            <a:lvl1pPr marL="0" indent="0" algn="ctr">
+            <a:lvl1pPr marL="0" marR="36576" indent="0" algn="r">
+              <a:spcBef>
+                <a:spcPts val="0"/>
+              </a:spcBef>
               <a:buNone/>
               <a:defRPr>
+                <a:ln>
+                  <a:solidFill>
+                    <a:schemeClr val="bg2"/>
+                  </a:solidFill>
+                </a:ln>
                 <a:solidFill>
                   <a:schemeClr val="tx1">
                     <a:tint val="75000"/>
@@ -202,97 +290,41 @@
             </a:lvl1pPr>
             <a:lvl2pPr marL="457200" indent="0" algn="ctr">
               <a:buNone/>
-              <a:defRPr>
-                <a:solidFill>
-                  <a:schemeClr val="tx1">
-                    <a:tint val="75000"/>
-                  </a:schemeClr>
-                </a:solidFill>
-              </a:defRPr>
             </a:lvl2pPr>
             <a:lvl3pPr marL="914400" indent="0" algn="ctr">
               <a:buNone/>
-              <a:defRPr>
-                <a:solidFill>
-                  <a:schemeClr val="tx1">
-                    <a:tint val="75000"/>
-                  </a:schemeClr>
-                </a:solidFill>
-              </a:defRPr>
             </a:lvl3pPr>
             <a:lvl4pPr marL="1371600" indent="0" algn="ctr">
               <a:buNone/>
-              <a:defRPr>
-                <a:solidFill>
-                  <a:schemeClr val="tx1">
-                    <a:tint val="75000"/>
-                  </a:schemeClr>
-                </a:solidFill>
-              </a:defRPr>
             </a:lvl4pPr>
             <a:lvl5pPr marL="1828800" indent="0" algn="ctr">
               <a:buNone/>
-              <a:defRPr>
-                <a:solidFill>
-                  <a:schemeClr val="tx1">
-                    <a:tint val="75000"/>
-                  </a:schemeClr>
-                </a:solidFill>
-              </a:defRPr>
             </a:lvl5pPr>
             <a:lvl6pPr marL="2286000" indent="0" algn="ctr">
               <a:buNone/>
-              <a:defRPr>
-                <a:solidFill>
-                  <a:schemeClr val="tx1">
-                    <a:tint val="75000"/>
-                  </a:schemeClr>
-                </a:solidFill>
-              </a:defRPr>
             </a:lvl6pPr>
             <a:lvl7pPr marL="2743200" indent="0" algn="ctr">
               <a:buNone/>
-              <a:defRPr>
-                <a:solidFill>
-                  <a:schemeClr val="tx1">
-                    <a:tint val="75000"/>
-                  </a:schemeClr>
-                </a:solidFill>
-              </a:defRPr>
             </a:lvl7pPr>
             <a:lvl8pPr marL="3200400" indent="0" algn="ctr">
               <a:buNone/>
-              <a:defRPr>
-                <a:solidFill>
-                  <a:schemeClr val="tx1">
-                    <a:tint val="75000"/>
-                  </a:schemeClr>
-                </a:solidFill>
-              </a:defRPr>
             </a:lvl8pPr>
             <a:lvl9pPr marL="3657600" indent="0" algn="ctr">
               <a:buNone/>
-              <a:defRPr>
-                <a:solidFill>
-                  <a:schemeClr val="tx1">
-                    <a:tint val="75000"/>
-                  </a:schemeClr>
-                </a:solidFill>
-              </a:defRPr>
             </a:lvl9pPr>
           </a:lstStyle>
           <a:p>
             <a:r>
-              <a:rPr lang="es-ES" smtClean="0"/>
+              <a:rPr kumimoji="0" lang="es-ES" smtClean="0"/>
               <a:t>Haga clic para modificar el estilo de subtítulo del patrón</a:t>
             </a:r>
-            <a:endParaRPr lang="es-ES"/>
-          </a:p>
-        </p:txBody>
-      </p:sp>
-      <p:sp>
-        <p:nvSpPr>
-          <p:cNvPr id="4" name="3 Marcador de fecha"/>
+            <a:endParaRPr kumimoji="0" lang="en-US"/>
+          </a:p>
+        </p:txBody>
+      </p:sp>
+      <p:sp>
+        <p:nvSpPr>
+          <p:cNvPr id="28" name="27 Marcador de fecha"/>
           <p:cNvSpPr>
             <a:spLocks noGrp="1"/>
           </p:cNvSpPr>
@@ -300,10 +332,19 @@
             <p:ph type="dt" sz="half" idx="10"/>
           </p:nvPr>
         </p:nvSpPr>
-        <p:spPr/>
-        <p:txBody>
-          <a:bodyPr/>
-          <a:lstStyle/>
+        <p:spPr>
+          <a:xfrm>
+            <a:off x="1371600" y="6012656"/>
+            <a:ext cx="5791200" cy="365125"/>
+          </a:xfrm>
+        </p:spPr>
+        <p:txBody>
+          <a:bodyPr tIns="0" bIns="0" anchor="t"/>
+          <a:lstStyle>
+            <a:lvl1pPr algn="r">
+              <a:defRPr sz="1000"/>
+            </a:lvl1pPr>
+          </a:lstStyle>
           <a:p>
             <a:fld id="{7A847CFC-816F-41D0-AAC0-9BF4FEBC753E}" type="datetimeFigureOut">
               <a:rPr lang="es-ES" smtClean="0"/>
@@ -315,7 +356,7 @@
       </p:sp>
       <p:sp>
         <p:nvSpPr>
-          <p:cNvPr id="5" name="4 Marcador de pie de página"/>
+          <p:cNvPr id="17" name="16 Marcador de pie de página"/>
           <p:cNvSpPr>
             <a:spLocks noGrp="1"/>
           </p:cNvSpPr>
@@ -323,10 +364,19 @@
             <p:ph type="ftr" sz="quarter" idx="11"/>
           </p:nvPr>
         </p:nvSpPr>
-        <p:spPr/>
-        <p:txBody>
-          <a:bodyPr/>
-          <a:lstStyle/>
+        <p:spPr>
+          <a:xfrm>
+            <a:off x="1371600" y="5650704"/>
+            <a:ext cx="5791200" cy="365125"/>
+          </a:xfrm>
+        </p:spPr>
+        <p:txBody>
+          <a:bodyPr tIns="0" bIns="0" anchor="b"/>
+          <a:lstStyle>
+            <a:lvl1pPr algn="r">
+              <a:defRPr sz="1100"/>
+            </a:lvl1pPr>
+          </a:lstStyle>
           <a:p>
             <a:endParaRPr lang="es-ES"/>
           </a:p>
@@ -334,7 +384,7 @@
       </p:sp>
       <p:sp>
         <p:nvSpPr>
-          <p:cNvPr id="6" name="5 Marcador de número de diapositiva"/>
+          <p:cNvPr id="29" name="28 Marcador de número de diapositiva"/>
           <p:cNvSpPr>
             <a:spLocks noGrp="1"/>
           </p:cNvSpPr>
@@ -342,10 +392,23 @@
             <p:ph type="sldNum" sz="quarter" idx="12"/>
           </p:nvPr>
         </p:nvSpPr>
-        <p:spPr/>
-        <p:txBody>
-          <a:bodyPr/>
-          <a:lstStyle/>
+        <p:spPr>
+          <a:xfrm>
+            <a:off x="8392247" y="5752307"/>
+            <a:ext cx="502920" cy="365125"/>
+          </a:xfrm>
+        </p:spPr>
+        <p:txBody>
+          <a:bodyPr anchor="ctr"/>
+          <a:lstStyle>
+            <a:lvl1pPr algn="ctr">
+              <a:defRPr sz="1300">
+                <a:solidFill>
+                  <a:srgbClr val="FFFFFF"/>
+                </a:solidFill>
+              </a:defRPr>
+            </a:lvl1pPr>
+          </a:lstStyle>
           <a:p>
             <a:fld id="{132FADFE-3B8F-471C-ABF0-DBC7717ECBBC}" type="slidenum">
               <a:rPr lang="es-ES" smtClean="0"/>
@@ -396,10 +459,10 @@
           <a:lstStyle/>
           <a:p>
             <a:r>
-              <a:rPr lang="es-ES" smtClean="0"/>
+              <a:rPr kumimoji="0" lang="es-ES" smtClean="0"/>
               <a:t>Haga clic para modificar el estilo de título del patrón</a:t>
             </a:r>
-            <a:endParaRPr lang="es-ES"/>
+            <a:endParaRPr kumimoji="0" lang="en-US"/>
           </a:p>
         </p:txBody>
       </p:sp>
@@ -418,40 +481,40 @@
           <a:bodyPr vert="eaVert"/>
           <a:lstStyle/>
           <a:p>
-            <a:pPr lvl="0"/>
+            <a:pPr lvl="0" eaLnBrk="1" latinLnBrk="0" hangingPunct="1"/>
             <a:r>
               <a:rPr lang="es-ES" smtClean="0"/>
               <a:t>Haga clic para modificar el estilo de texto del patrón</a:t>
             </a:r>
           </a:p>
           <a:p>
-            <a:pPr lvl="1"/>
+            <a:pPr lvl="1" eaLnBrk="1" latinLnBrk="0" hangingPunct="1"/>
             <a:r>
               <a:rPr lang="es-ES" smtClean="0"/>
               <a:t>Segundo nivel</a:t>
             </a:r>
           </a:p>
           <a:p>
-            <a:pPr lvl="2"/>
+            <a:pPr lvl="2" eaLnBrk="1" latinLnBrk="0" hangingPunct="1"/>
             <a:r>
               <a:rPr lang="es-ES" smtClean="0"/>
               <a:t>Tercer nivel</a:t>
             </a:r>
           </a:p>
           <a:p>
-            <a:pPr lvl="3"/>
+            <a:pPr lvl="3" eaLnBrk="1" latinLnBrk="0" hangingPunct="1"/>
             <a:r>
               <a:rPr lang="es-ES" smtClean="0"/>
               <a:t>Cuarto nivel</a:t>
             </a:r>
           </a:p>
           <a:p>
-            <a:pPr lvl="4"/>
+            <a:pPr lvl="4" eaLnBrk="1" latinLnBrk="0" hangingPunct="1"/>
             <a:r>
               <a:rPr lang="es-ES" smtClean="0"/>
               <a:t>Quinto nivel</a:t>
             </a:r>
-            <a:endParaRPr lang="es-ES"/>
+            <a:endParaRPr kumimoji="0" lang="en-US"/>
           </a:p>
         </p:txBody>
       </p:sp>
@@ -557,8 +620,8 @@
         </p:nvSpPr>
         <p:spPr>
           <a:xfrm>
-            <a:off x="6629400" y="274638"/>
-            <a:ext cx="2057400" cy="5851525"/>
+            <a:off x="6781800" y="381000"/>
+            <a:ext cx="1905000" cy="5486400"/>
           </a:xfrm>
         </p:spPr>
         <p:txBody>
@@ -566,10 +629,10 @@
           <a:lstStyle/>
           <a:p>
             <a:r>
-              <a:rPr lang="es-ES" smtClean="0"/>
+              <a:rPr kumimoji="0" lang="es-ES" smtClean="0"/>
               <a:t>Haga clic para modificar el estilo de título del patrón</a:t>
             </a:r>
-            <a:endParaRPr lang="es-ES"/>
+            <a:endParaRPr kumimoji="0" lang="en-US"/>
           </a:p>
         </p:txBody>
       </p:sp>
@@ -585,48 +648,48 @@
         </p:nvSpPr>
         <p:spPr>
           <a:xfrm>
-            <a:off x="457200" y="274638"/>
-            <a:ext cx="6019800" cy="5851525"/>
+            <a:off x="457200" y="381000"/>
+            <a:ext cx="6248400" cy="5486400"/>
           </a:xfrm>
         </p:spPr>
         <p:txBody>
           <a:bodyPr vert="eaVert"/>
           <a:lstStyle/>
           <a:p>
-            <a:pPr lvl="0"/>
+            <a:pPr lvl="0" eaLnBrk="1" latinLnBrk="0" hangingPunct="1"/>
             <a:r>
               <a:rPr lang="es-ES" smtClean="0"/>
               <a:t>Haga clic para modificar el estilo de texto del patrón</a:t>
             </a:r>
           </a:p>
           <a:p>
-            <a:pPr lvl="1"/>
+            <a:pPr lvl="1" eaLnBrk="1" latinLnBrk="0" hangingPunct="1"/>
             <a:r>
               <a:rPr lang="es-ES" smtClean="0"/>
               <a:t>Segundo nivel</a:t>
             </a:r>
           </a:p>
           <a:p>
-            <a:pPr lvl="2"/>
+            <a:pPr lvl="2" eaLnBrk="1" latinLnBrk="0" hangingPunct="1"/>
             <a:r>
               <a:rPr lang="es-ES" smtClean="0"/>
               <a:t>Tercer nivel</a:t>
             </a:r>
           </a:p>
           <a:p>
-            <a:pPr lvl="3"/>
+            <a:pPr lvl="3" eaLnBrk="1" latinLnBrk="0" hangingPunct="1"/>
             <a:r>
               <a:rPr lang="es-ES" smtClean="0"/>
               <a:t>Cuarto nivel</a:t>
             </a:r>
           </a:p>
           <a:p>
-            <a:pPr lvl="4"/>
+            <a:pPr lvl="4" eaLnBrk="1" latinLnBrk="0" hangingPunct="1"/>
             <a:r>
               <a:rPr lang="es-ES" smtClean="0"/>
               <a:t>Quinto nivel</a:t>
             </a:r>
-            <a:endParaRPr lang="es-ES"/>
+            <a:endParaRPr kumimoji="0" lang="en-US"/>
           </a:p>
         </p:txBody>
       </p:sp>
@@ -730,16 +793,21 @@
             <p:ph type="title"/>
           </p:nvPr>
         </p:nvSpPr>
-        <p:spPr/>
+        <p:spPr>
+          <a:xfrm>
+            <a:off x="457200" y="267494"/>
+            <a:ext cx="8229600" cy="1399032"/>
+          </a:xfrm>
+        </p:spPr>
         <p:txBody>
           <a:bodyPr/>
           <a:lstStyle/>
           <a:p>
             <a:r>
-              <a:rPr lang="es-ES" smtClean="0"/>
+              <a:rPr kumimoji="0" lang="es-ES" smtClean="0"/>
               <a:t>Haga clic para modificar el estilo de título del patrón</a:t>
             </a:r>
-            <a:endParaRPr lang="es-ES"/>
+            <a:endParaRPr kumimoji="0" lang="en-US"/>
           </a:p>
         </p:txBody>
       </p:sp>
@@ -753,45 +821,50 @@
             <p:ph idx="1"/>
           </p:nvPr>
         </p:nvSpPr>
-        <p:spPr/>
+        <p:spPr>
+          <a:xfrm>
+            <a:off x="457200" y="1882808"/>
+            <a:ext cx="8229600" cy="4572000"/>
+          </a:xfrm>
+        </p:spPr>
         <p:txBody>
           <a:bodyPr/>
           <a:lstStyle/>
           <a:p>
-            <a:pPr lvl="0"/>
+            <a:pPr lvl="0" eaLnBrk="1" latinLnBrk="0" hangingPunct="1"/>
             <a:r>
               <a:rPr lang="es-ES" smtClean="0"/>
               <a:t>Haga clic para modificar el estilo de texto del patrón</a:t>
             </a:r>
           </a:p>
           <a:p>
-            <a:pPr lvl="1"/>
+            <a:pPr lvl="1" eaLnBrk="1" latinLnBrk="0" hangingPunct="1"/>
             <a:r>
               <a:rPr lang="es-ES" smtClean="0"/>
               <a:t>Segundo nivel</a:t>
             </a:r>
           </a:p>
           <a:p>
-            <a:pPr lvl="2"/>
+            <a:pPr lvl="2" eaLnBrk="1" latinLnBrk="0" hangingPunct="1"/>
             <a:r>
               <a:rPr lang="es-ES" smtClean="0"/>
               <a:t>Tercer nivel</a:t>
             </a:r>
           </a:p>
           <a:p>
-            <a:pPr lvl="3"/>
+            <a:pPr lvl="3" eaLnBrk="1" latinLnBrk="0" hangingPunct="1"/>
             <a:r>
               <a:rPr lang="es-ES" smtClean="0"/>
               <a:t>Cuarto nivel</a:t>
             </a:r>
           </a:p>
           <a:p>
-            <a:pPr lvl="4"/>
+            <a:pPr lvl="4" eaLnBrk="1" latinLnBrk="0" hangingPunct="1"/>
             <a:r>
               <a:rPr lang="es-ES" smtClean="0"/>
               <a:t>Quinto nivel</a:t>
             </a:r>
-            <a:endParaRPr lang="es-ES"/>
+            <a:endParaRPr kumimoji="0" lang="en-US"/>
           </a:p>
         </p:txBody>
       </p:sp>
@@ -805,7 +878,12 @@
             <p:ph type="dt" sz="half" idx="10"/>
           </p:nvPr>
         </p:nvSpPr>
-        <p:spPr/>
+        <p:spPr>
+          <a:xfrm>
+            <a:off x="4791456" y="6480048"/>
+            <a:ext cx="2133600" cy="301752"/>
+          </a:xfrm>
+        </p:spPr>
         <p:txBody>
           <a:bodyPr/>
           <a:lstStyle/>
@@ -828,7 +906,12 @@
             <p:ph type="ftr" sz="quarter" idx="11"/>
           </p:nvPr>
         </p:nvSpPr>
-        <p:spPr/>
+        <p:spPr>
+          <a:xfrm>
+            <a:off x="457200" y="6480969"/>
+            <a:ext cx="4260056" cy="300831"/>
+          </a:xfrm>
+        </p:spPr>
         <p:txBody>
           <a:bodyPr/>
           <a:lstStyle/>
@@ -869,8 +952,13 @@
 </file>
 
 <file path=ppt/slideLayouts/slideLayout3.xml><?xml version="1.0" encoding="utf-8"?>
-<p:sldLayout xmlns:a="http://schemas.openxmlformats.org/drawingml/2006/main" xmlns:r="http://schemas.openxmlformats.org/officeDocument/2006/relationships" xmlns:p="http://schemas.openxmlformats.org/presentationml/2006/main" type="secHead" preserve="1">
+<p:sldLayout xmlns:a="http://schemas.openxmlformats.org/drawingml/2006/main" xmlns:r="http://schemas.openxmlformats.org/officeDocument/2006/relationships" xmlns:p="http://schemas.openxmlformats.org/presentationml/2006/main" showMasterSp="0" type="secHead" preserve="1">
   <p:cSld name="Encabezado de sección">
+    <p:bg>
+      <p:bgRef idx="1002">
+        <a:schemeClr val="bg1"/>
+      </p:bgRef>
+    </p:bg>
     <p:spTree>
       <p:nvGrpSpPr>
         <p:cNvPr id="1" name=""/>
@@ -887,152 +975,143 @@
       </p:grpSpPr>
       <p:sp>
         <p:nvSpPr>
-          <p:cNvPr id="2" name="1 Título"/>
-          <p:cNvSpPr>
-            <a:spLocks noGrp="1"/>
-          </p:cNvSpPr>
-          <p:nvPr>
-            <p:ph type="title"/>
-          </p:nvPr>
-        </p:nvSpPr>
-        <p:spPr>
-          <a:xfrm>
-            <a:off x="722313" y="4406900"/>
-            <a:ext cx="7772400" cy="1362075"/>
-          </a:xfrm>
-        </p:spPr>
-        <p:txBody>
-          <a:bodyPr anchor="t"/>
-          <a:lstStyle>
-            <a:lvl1pPr algn="l">
-              <a:defRPr sz="4000" b="1" cap="all"/>
-            </a:lvl1pPr>
-          </a:lstStyle>
-          <a:p>
-            <a:r>
-              <a:rPr lang="es-ES" smtClean="0"/>
-              <a:t>Haga clic para modificar el estilo de título del patrón</a:t>
-            </a:r>
-            <a:endParaRPr lang="es-ES"/>
-          </a:p>
-        </p:txBody>
-      </p:sp>
-      <p:sp>
-        <p:nvSpPr>
-          <p:cNvPr id="3" name="2 Marcador de texto"/>
-          <p:cNvSpPr>
-            <a:spLocks noGrp="1"/>
-          </p:cNvSpPr>
-          <p:nvPr>
-            <p:ph type="body" idx="1"/>
-          </p:nvPr>
-        </p:nvSpPr>
-        <p:spPr>
-          <a:xfrm>
-            <a:off x="722313" y="2906713"/>
-            <a:ext cx="7772400" cy="1500187"/>
-          </a:xfrm>
-        </p:spPr>
-        <p:txBody>
-          <a:bodyPr anchor="b"/>
-          <a:lstStyle>
-            <a:lvl1pPr marL="0" indent="0">
-              <a:buNone/>
-              <a:defRPr sz="2000">
-                <a:solidFill>
-                  <a:schemeClr val="tx1">
-                    <a:tint val="75000"/>
-                  </a:schemeClr>
-                </a:solidFill>
-              </a:defRPr>
-            </a:lvl1pPr>
-            <a:lvl2pPr marL="457200" indent="0">
-              <a:buNone/>
-              <a:defRPr sz="1800">
-                <a:solidFill>
-                  <a:schemeClr val="tx1">
-                    <a:tint val="75000"/>
-                  </a:schemeClr>
-                </a:solidFill>
-              </a:defRPr>
-            </a:lvl2pPr>
-            <a:lvl3pPr marL="914400" indent="0">
-              <a:buNone/>
-              <a:defRPr sz="1600">
-                <a:solidFill>
-                  <a:schemeClr val="tx1">
-                    <a:tint val="75000"/>
-                  </a:schemeClr>
-                </a:solidFill>
-              </a:defRPr>
-            </a:lvl3pPr>
-            <a:lvl4pPr marL="1371600" indent="0">
-              <a:buNone/>
-              <a:defRPr sz="1400">
-                <a:solidFill>
-                  <a:schemeClr val="tx1">
-                    <a:tint val="75000"/>
-                  </a:schemeClr>
-                </a:solidFill>
-              </a:defRPr>
-            </a:lvl4pPr>
-            <a:lvl5pPr marL="1828800" indent="0">
-              <a:buNone/>
-              <a:defRPr sz="1400">
-                <a:solidFill>
-                  <a:schemeClr val="tx1">
-                    <a:tint val="75000"/>
-                  </a:schemeClr>
-                </a:solidFill>
-              </a:defRPr>
-            </a:lvl5pPr>
-            <a:lvl6pPr marL="2286000" indent="0">
-              <a:buNone/>
-              <a:defRPr sz="1400">
-                <a:solidFill>
-                  <a:schemeClr val="tx1">
-                    <a:tint val="75000"/>
-                  </a:schemeClr>
-                </a:solidFill>
-              </a:defRPr>
-            </a:lvl6pPr>
-            <a:lvl7pPr marL="2743200" indent="0">
-              <a:buNone/>
-              <a:defRPr sz="1400">
-                <a:solidFill>
-                  <a:schemeClr val="tx1">
-                    <a:tint val="75000"/>
-                  </a:schemeClr>
-                </a:solidFill>
-              </a:defRPr>
-            </a:lvl7pPr>
-            <a:lvl8pPr marL="3200400" indent="0">
-              <a:buNone/>
-              <a:defRPr sz="1400">
-                <a:solidFill>
-                  <a:schemeClr val="tx1">
-                    <a:tint val="75000"/>
-                  </a:schemeClr>
-                </a:solidFill>
-              </a:defRPr>
-            </a:lvl8pPr>
-            <a:lvl9pPr marL="3657600" indent="0">
-              <a:buNone/>
-              <a:defRPr sz="1400">
-                <a:solidFill>
-                  <a:schemeClr val="tx1">
-                    <a:tint val="75000"/>
-                  </a:schemeClr>
-                </a:solidFill>
-              </a:defRPr>
-            </a:lvl9pPr>
-          </a:lstStyle>
-          <a:p>
-            <a:pPr lvl="0"/>
-            <a:r>
-              <a:rPr lang="es-ES" smtClean="0"/>
-              <a:t>Haga clic para modificar el estilo de texto del patrón</a:t>
-            </a:r>
+          <p:cNvPr id="9" name="8 Triángulo rectángulo"/>
+          <p:cNvSpPr/>
+          <p:nvPr/>
+        </p:nvSpPr>
+        <p:spPr>
+          <a:xfrm flipV="1">
+            <a:off x="7034" y="7034"/>
+            <a:ext cx="9129932" cy="6836899"/>
+          </a:xfrm>
+          <a:prstGeom prst="rtTriangle">
+            <a:avLst/>
+          </a:prstGeom>
+          <a:gradFill flip="none" rotWithShape="1">
+            <a:gsLst>
+              <a:gs pos="0">
+                <a:schemeClr val="tx2">
+                  <a:alpha val="10000"/>
+                </a:schemeClr>
+              </a:gs>
+              <a:gs pos="70000">
+                <a:schemeClr val="tx2">
+                  <a:alpha val="8000"/>
+                </a:schemeClr>
+              </a:gs>
+              <a:gs pos="100000">
+                <a:schemeClr val="tx2">
+                  <a:alpha val="1000"/>
+                </a:schemeClr>
+              </a:gs>
+            </a:gsLst>
+            <a:lin ang="8000000" scaled="1"/>
+            <a:tileRect/>
+          </a:gradFill>
+          <a:ln w="38100" cap="rnd" cmpd="sng" algn="ctr">
+            <a:noFill/>
+            <a:prstDash val="solid"/>
+          </a:ln>
+          <a:effectLst/>
+        </p:spPr>
+        <p:style>
+          <a:lnRef idx="3">
+            <a:schemeClr val="lt1"/>
+          </a:lnRef>
+          <a:fillRef idx="1">
+            <a:schemeClr val="accent1"/>
+          </a:fillRef>
+          <a:effectRef idx="1">
+            <a:schemeClr val="accent1"/>
+          </a:effectRef>
+          <a:fontRef idx="minor">
+            <a:schemeClr val="lt1"/>
+          </a:fontRef>
+        </p:style>
+        <p:txBody>
+          <a:bodyPr anchor="ctr"/>
+          <a:lstStyle/>
+          <a:p>
+            <a:pPr marL="0" algn="ctr" defTabSz="914400" rtl="0" eaLnBrk="1" latinLnBrk="0" hangingPunct="1"/>
+            <a:endParaRPr kumimoji="0" lang="en-US" sz="1800" kern="1200">
+              <a:solidFill>
+                <a:schemeClr val="lt1"/>
+              </a:solidFill>
+              <a:latin typeface="+mn-lt"/>
+              <a:ea typeface="+mn-ea"/>
+              <a:cs typeface="+mn-cs"/>
+            </a:endParaRPr>
+          </a:p>
+        </p:txBody>
+      </p:sp>
+      <p:sp>
+        <p:nvSpPr>
+          <p:cNvPr id="8" name="7 Triángulo isósceles"/>
+          <p:cNvSpPr/>
+          <p:nvPr/>
+        </p:nvSpPr>
+        <p:spPr>
+          <a:xfrm rot="5400000" flipV="1">
+            <a:off x="7554353" y="309490"/>
+            <a:ext cx="1892949" cy="1294228"/>
+          </a:xfrm>
+          <a:prstGeom prst="triangle">
+            <a:avLst>
+              <a:gd name="adj" fmla="val 51323"/>
+            </a:avLst>
+          </a:prstGeom>
+          <a:gradFill flip="none" rotWithShape="1">
+            <a:gsLst>
+              <a:gs pos="0">
+                <a:schemeClr val="accent1">
+                  <a:shade val="30000"/>
+                  <a:satMod val="155000"/>
+                  <a:alpha val="100000"/>
+                </a:schemeClr>
+              </a:gs>
+              <a:gs pos="60000">
+                <a:schemeClr val="accent1">
+                  <a:satMod val="160000"/>
+                  <a:alpha val="100000"/>
+                </a:schemeClr>
+              </a:gs>
+              <a:gs pos="100000">
+                <a:schemeClr val="accent1">
+                  <a:tint val="70000"/>
+                  <a:satMod val="200000"/>
+                  <a:alpha val="100000"/>
+                </a:schemeClr>
+              </a:gs>
+            </a:gsLst>
+            <a:lin ang="15500000" scaled="1"/>
+            <a:tileRect/>
+          </a:gradFill>
+          <a:ln w="38100" cap="rnd" cmpd="sng" algn="ctr">
+            <a:noFill/>
+            <a:prstDash val="solid"/>
+          </a:ln>
+          <a:effectLst/>
+        </p:spPr>
+        <p:style>
+          <a:lnRef idx="3">
+            <a:schemeClr val="lt1"/>
+          </a:lnRef>
+          <a:fillRef idx="1">
+            <a:schemeClr val="accent1"/>
+          </a:fillRef>
+          <a:effectRef idx="1">
+            <a:schemeClr val="accent1"/>
+          </a:effectRef>
+          <a:fontRef idx="minor">
+            <a:schemeClr val="lt1"/>
+          </a:fontRef>
+        </p:style>
+        <p:txBody>
+          <a:bodyPr anchor="ctr"/>
+          <a:lstStyle/>
+          <a:p>
+            <a:pPr algn="ctr" eaLnBrk="1" latinLnBrk="0" hangingPunct="1"/>
+            <a:endParaRPr kumimoji="0" lang="en-US"/>
           </a:p>
         </p:txBody>
       </p:sp>
@@ -1046,7 +1125,12 @@
             <p:ph type="dt" sz="half" idx="10"/>
           </p:nvPr>
         </p:nvSpPr>
-        <p:spPr/>
+        <p:spPr>
+          <a:xfrm>
+            <a:off x="6955632" y="6477000"/>
+            <a:ext cx="2133600" cy="304800"/>
+          </a:xfrm>
+        </p:spPr>
         <p:txBody>
           <a:bodyPr/>
           <a:lstStyle/>
@@ -1069,7 +1153,12 @@
             <p:ph type="ftr" sz="quarter" idx="11"/>
           </p:nvPr>
         </p:nvSpPr>
-        <p:spPr/>
+        <p:spPr>
+          <a:xfrm>
+            <a:off x="2619376" y="6480969"/>
+            <a:ext cx="4260056" cy="300831"/>
+          </a:xfrm>
+        </p:spPr>
         <p:txBody>
           <a:bodyPr/>
           <a:lstStyle/>
@@ -1088,7 +1177,12 @@
             <p:ph type="sldNum" sz="quarter" idx="12"/>
           </p:nvPr>
         </p:nvSpPr>
-        <p:spPr/>
+        <p:spPr>
+          <a:xfrm>
+            <a:off x="8451056" y="809624"/>
+            <a:ext cx="502920" cy="300831"/>
+          </a:xfrm>
+        </p:spPr>
         <p:txBody>
           <a:bodyPr/>
           <a:lstStyle/>
@@ -1101,10 +1195,206 @@
           </a:p>
         </p:txBody>
       </p:sp>
+      <p:cxnSp>
+        <p:nvCxnSpPr>
+          <p:cNvPr id="11" name="10 Conector recto"/>
+          <p:cNvCxnSpPr/>
+          <p:nvPr/>
+        </p:nvCxnSpPr>
+        <p:spPr>
+          <a:xfrm rot="10800000">
+            <a:off x="6468794" y="9381"/>
+            <a:ext cx="2672861" cy="1900210"/>
+          </a:xfrm>
+          <a:prstGeom prst="line">
+            <a:avLst/>
+          </a:prstGeom>
+          <a:noFill/>
+          <a:ln w="6000" cap="rnd" cmpd="sng" algn="ctr">
+            <a:solidFill>
+              <a:schemeClr val="bg2">
+                <a:tint val="50000"/>
+                <a:satMod val="200000"/>
+                <a:alpha val="45000"/>
+              </a:schemeClr>
+            </a:solidFill>
+            <a:prstDash val="solid"/>
+          </a:ln>
+          <a:effectLst/>
+        </p:spPr>
+        <p:style>
+          <a:lnRef idx="2">
+            <a:schemeClr val="accent1"/>
+          </a:lnRef>
+          <a:fillRef idx="0">
+            <a:schemeClr val="accent1"/>
+          </a:fillRef>
+          <a:effectRef idx="1">
+            <a:schemeClr val="accent1"/>
+          </a:effectRef>
+          <a:fontRef idx="minor">
+            <a:schemeClr val="tx1"/>
+          </a:fontRef>
+        </p:style>
+      </p:cxnSp>
+      <p:cxnSp>
+        <p:nvCxnSpPr>
+          <p:cNvPr id="10" name="9 Conector recto"/>
+          <p:cNvCxnSpPr/>
+          <p:nvPr/>
+        </p:nvCxnSpPr>
+        <p:spPr>
+          <a:xfrm flipV="1">
+            <a:off x="0" y="7034"/>
+            <a:ext cx="9136966" cy="6843933"/>
+          </a:xfrm>
+          <a:prstGeom prst="line">
+            <a:avLst/>
+          </a:prstGeom>
+          <a:noFill/>
+          <a:ln w="5000" cap="rnd" cmpd="sng" algn="ctr">
+            <a:solidFill>
+              <a:schemeClr val="bg2">
+                <a:tint val="55000"/>
+                <a:satMod val="200000"/>
+                <a:alpha val="35000"/>
+              </a:schemeClr>
+            </a:solidFill>
+            <a:prstDash val="solid"/>
+          </a:ln>
+          <a:effectLst/>
+        </p:spPr>
+        <p:style>
+          <a:lnRef idx="2">
+            <a:schemeClr val="accent1"/>
+          </a:lnRef>
+          <a:fillRef idx="0">
+            <a:schemeClr val="accent1"/>
+          </a:fillRef>
+          <a:effectRef idx="1">
+            <a:schemeClr val="accent1"/>
+          </a:effectRef>
+          <a:fontRef idx="minor">
+            <a:schemeClr val="tx1"/>
+          </a:fontRef>
+        </p:style>
+      </p:cxnSp>
+      <p:sp>
+        <p:nvSpPr>
+          <p:cNvPr id="2" name="1 Título"/>
+          <p:cNvSpPr>
+            <a:spLocks noGrp="1"/>
+          </p:cNvSpPr>
+          <p:nvPr>
+            <p:ph type="title"/>
+          </p:nvPr>
+        </p:nvSpPr>
+        <p:spPr>
+          <a:xfrm>
+            <a:off x="381000" y="271464"/>
+            <a:ext cx="7239000" cy="1362075"/>
+          </a:xfrm>
+        </p:spPr>
+        <p:txBody>
+          <a:bodyPr anchor="ctr"/>
+          <a:lstStyle>
+            <a:lvl1pPr marL="0" algn="l">
+              <a:buNone/>
+              <a:defRPr sz="3600" b="1" cap="none" baseline="0"/>
+            </a:lvl1pPr>
+          </a:lstStyle>
+          <a:p>
+            <a:r>
+              <a:rPr kumimoji="0" lang="es-ES" smtClean="0"/>
+              <a:t>Haga clic para modificar el estilo de título del patrón</a:t>
+            </a:r>
+            <a:endParaRPr kumimoji="0" lang="en-US"/>
+          </a:p>
+        </p:txBody>
+      </p:sp>
+      <p:sp>
+        <p:nvSpPr>
+          <p:cNvPr id="3" name="2 Marcador de texto"/>
+          <p:cNvSpPr>
+            <a:spLocks noGrp="1"/>
+          </p:cNvSpPr>
+          <p:nvPr>
+            <p:ph type="body" idx="1"/>
+          </p:nvPr>
+        </p:nvSpPr>
+        <p:spPr>
+          <a:xfrm>
+            <a:off x="381000" y="1633536"/>
+            <a:ext cx="3886200" cy="2286000"/>
+          </a:xfrm>
+        </p:spPr>
+        <p:txBody>
+          <a:bodyPr anchor="t"/>
+          <a:lstStyle>
+            <a:lvl1pPr marL="54864" indent="0" algn="l">
+              <a:buNone/>
+              <a:defRPr sz="2000">
+                <a:solidFill>
+                  <a:schemeClr val="tx1">
+                    <a:tint val="75000"/>
+                  </a:schemeClr>
+                </a:solidFill>
+              </a:defRPr>
+            </a:lvl1pPr>
+            <a:lvl2pPr>
+              <a:buNone/>
+              <a:defRPr sz="1800">
+                <a:solidFill>
+                  <a:schemeClr val="tx1">
+                    <a:tint val="75000"/>
+                  </a:schemeClr>
+                </a:solidFill>
+              </a:defRPr>
+            </a:lvl2pPr>
+            <a:lvl3pPr>
+              <a:buNone/>
+              <a:defRPr sz="1600">
+                <a:solidFill>
+                  <a:schemeClr val="tx1">
+                    <a:tint val="75000"/>
+                  </a:schemeClr>
+                </a:solidFill>
+              </a:defRPr>
+            </a:lvl3pPr>
+            <a:lvl4pPr>
+              <a:buNone/>
+              <a:defRPr sz="1400">
+                <a:solidFill>
+                  <a:schemeClr val="tx1">
+                    <a:tint val="75000"/>
+                  </a:schemeClr>
+                </a:solidFill>
+              </a:defRPr>
+            </a:lvl4pPr>
+            <a:lvl5pPr>
+              <a:buNone/>
+              <a:defRPr sz="1400">
+                <a:solidFill>
+                  <a:schemeClr val="tx1">
+                    <a:tint val="75000"/>
+                  </a:schemeClr>
+                </a:solidFill>
+              </a:defRPr>
+            </a:lvl5pPr>
+          </a:lstStyle>
+          <a:p>
+            <a:pPr lvl="0" eaLnBrk="1" latinLnBrk="0" hangingPunct="1"/>
+            <a:r>
+              <a:rPr kumimoji="0" lang="es-ES" smtClean="0"/>
+              <a:t>Haga clic para modificar el estilo de texto del patrón</a:t>
+            </a:r>
+          </a:p>
+        </p:txBody>
+      </p:sp>
     </p:spTree>
   </p:cSld>
   <p:clrMapOvr>
-    <a:masterClrMapping/>
+    <a:overrideClrMapping bg1="dk1" tx1="lt1" bg2="dk2" tx2="lt2" accent1="accent1" accent2="accent2" accent3="accent3" accent4="accent4" accent5="accent5" accent6="accent6" hlink="hlink" folHlink="folHlink"/>
   </p:clrMapOvr>
 </p:sldLayout>
 </file>
@@ -1139,13 +1429,17 @@
         <p:spPr/>
         <p:txBody>
           <a:bodyPr/>
-          <a:lstStyle/>
-          <a:p>
-            <a:r>
-              <a:rPr lang="es-ES" smtClean="0"/>
+          <a:lstStyle>
+            <a:lvl1pPr marL="0" algn="l">
+              <a:defRPr/>
+            </a:lvl1pPr>
+          </a:lstStyle>
+          <a:p>
+            <a:r>
+              <a:rPr kumimoji="0" lang="es-ES" smtClean="0"/>
               <a:t>Haga clic para modificar el estilo de título del patrón</a:t>
             </a:r>
-            <a:endParaRPr lang="es-ES"/>
+            <a:endParaRPr kumimoji="0" lang="en-US"/>
           </a:p>
         </p:txBody>
       </p:sp>
@@ -1161,7 +1455,7 @@
         </p:nvSpPr>
         <p:spPr>
           <a:xfrm>
-            <a:off x="457200" y="1600200"/>
+            <a:off x="457200" y="1722437"/>
             <a:ext cx="4038600" cy="4525963"/>
           </a:xfrm>
         </p:spPr>
@@ -1169,7 +1463,7 @@
           <a:bodyPr/>
           <a:lstStyle>
             <a:lvl1pPr>
-              <a:defRPr sz="2800"/>
+              <a:defRPr sz="2600"/>
             </a:lvl1pPr>
             <a:lvl2pPr>
               <a:defRPr sz="2400"/>
@@ -1183,54 +1477,42 @@
             <a:lvl5pPr>
               <a:defRPr sz="1800"/>
             </a:lvl5pPr>
-            <a:lvl6pPr>
-              <a:defRPr sz="1800"/>
-            </a:lvl6pPr>
-            <a:lvl7pPr>
-              <a:defRPr sz="1800"/>
-            </a:lvl7pPr>
-            <a:lvl8pPr>
-              <a:defRPr sz="1800"/>
-            </a:lvl8pPr>
-            <a:lvl9pPr>
-              <a:defRPr sz="1800"/>
-            </a:lvl9pPr>
           </a:lstStyle>
           <a:p>
-            <a:pPr lvl="0"/>
+            <a:pPr lvl="0" eaLnBrk="1" latinLnBrk="0" hangingPunct="1"/>
             <a:r>
               <a:rPr lang="es-ES" smtClean="0"/>
               <a:t>Haga clic para modificar el estilo de texto del patrón</a:t>
             </a:r>
           </a:p>
           <a:p>
-            <a:pPr lvl="1"/>
+            <a:pPr lvl="1" eaLnBrk="1" latinLnBrk="0" hangingPunct="1"/>
             <a:r>
               <a:rPr lang="es-ES" smtClean="0"/>
               <a:t>Segundo nivel</a:t>
             </a:r>
           </a:p>
           <a:p>
-            <a:pPr lvl="2"/>
+            <a:pPr lvl="2" eaLnBrk="1" latinLnBrk="0" hangingPunct="1"/>
             <a:r>
               <a:rPr lang="es-ES" smtClean="0"/>
               <a:t>Tercer nivel</a:t>
             </a:r>
           </a:p>
           <a:p>
-            <a:pPr lvl="3"/>
+            <a:pPr lvl="3" eaLnBrk="1" latinLnBrk="0" hangingPunct="1"/>
             <a:r>
               <a:rPr lang="es-ES" smtClean="0"/>
               <a:t>Cuarto nivel</a:t>
             </a:r>
           </a:p>
           <a:p>
-            <a:pPr lvl="4"/>
+            <a:pPr lvl="4" eaLnBrk="1" latinLnBrk="0" hangingPunct="1"/>
             <a:r>
               <a:rPr lang="es-ES" smtClean="0"/>
               <a:t>Quinto nivel</a:t>
             </a:r>
-            <a:endParaRPr lang="es-ES"/>
+            <a:endParaRPr kumimoji="0" lang="en-US"/>
           </a:p>
         </p:txBody>
       </p:sp>
@@ -1246,7 +1528,7 @@
         </p:nvSpPr>
         <p:spPr>
           <a:xfrm>
-            <a:off x="4648200" y="1600200"/>
+            <a:off x="4648200" y="1722437"/>
             <a:ext cx="4038600" cy="4525963"/>
           </a:xfrm>
         </p:spPr>
@@ -1254,7 +1536,7 @@
           <a:bodyPr/>
           <a:lstStyle>
             <a:lvl1pPr>
-              <a:defRPr sz="2800"/>
+              <a:defRPr sz="2600"/>
             </a:lvl1pPr>
             <a:lvl2pPr>
               <a:defRPr sz="2400"/>
@@ -1268,54 +1550,42 @@
             <a:lvl5pPr>
               <a:defRPr sz="1800"/>
             </a:lvl5pPr>
-            <a:lvl6pPr>
-              <a:defRPr sz="1800"/>
-            </a:lvl6pPr>
-            <a:lvl7pPr>
-              <a:defRPr sz="1800"/>
-            </a:lvl7pPr>
-            <a:lvl8pPr>
-              <a:defRPr sz="1800"/>
-            </a:lvl8pPr>
-            <a:lvl9pPr>
-              <a:defRPr sz="1800"/>
-            </a:lvl9pPr>
           </a:lstStyle>
           <a:p>
-            <a:pPr lvl="0"/>
+            <a:pPr lvl="0" eaLnBrk="1" latinLnBrk="0" hangingPunct="1"/>
             <a:r>
               <a:rPr lang="es-ES" smtClean="0"/>
               <a:t>Haga clic para modificar el estilo de texto del patrón</a:t>
             </a:r>
           </a:p>
           <a:p>
-            <a:pPr lvl="1"/>
+            <a:pPr lvl="1" eaLnBrk="1" latinLnBrk="0" hangingPunct="1"/>
             <a:r>
               <a:rPr lang="es-ES" smtClean="0"/>
               <a:t>Segundo nivel</a:t>
             </a:r>
           </a:p>
           <a:p>
-            <a:pPr lvl="2"/>
+            <a:pPr lvl="2" eaLnBrk="1" latinLnBrk="0" hangingPunct="1"/>
             <a:r>
               <a:rPr lang="es-ES" smtClean="0"/>
               <a:t>Tercer nivel</a:t>
             </a:r>
           </a:p>
           <a:p>
-            <a:pPr lvl="3"/>
+            <a:pPr lvl="3" eaLnBrk="1" latinLnBrk="0" hangingPunct="1"/>
             <a:r>
               <a:rPr lang="es-ES" smtClean="0"/>
               <a:t>Cuarto nivel</a:t>
             </a:r>
           </a:p>
           <a:p>
-            <a:pPr lvl="4"/>
+            <a:pPr lvl="4" eaLnBrk="1" latinLnBrk="0" hangingPunct="1"/>
             <a:r>
               <a:rPr lang="es-ES" smtClean="0"/>
               <a:t>Quinto nivel</a:t>
             </a:r>
-            <a:endParaRPr lang="es-ES"/>
+            <a:endParaRPr kumimoji="0" lang="en-US"/>
           </a:p>
         </p:txBody>
       </p:sp>
@@ -1329,7 +1599,12 @@
             <p:ph type="dt" sz="half" idx="10"/>
           </p:nvPr>
         </p:nvSpPr>
-        <p:spPr/>
+        <p:spPr>
+          <a:xfrm>
+            <a:off x="4791456" y="6480969"/>
+            <a:ext cx="2133600" cy="301752"/>
+          </a:xfrm>
+        </p:spPr>
         <p:txBody>
           <a:bodyPr/>
           <a:lstStyle/>
@@ -1352,7 +1627,12 @@
             <p:ph type="ftr" sz="quarter" idx="11"/>
           </p:nvPr>
         </p:nvSpPr>
-        <p:spPr/>
+        <p:spPr>
+          <a:xfrm>
+            <a:off x="457200" y="6480969"/>
+            <a:ext cx="4260056" cy="301752"/>
+          </a:xfrm>
+        </p:spPr>
         <p:txBody>
           <a:bodyPr/>
           <a:lstStyle/>
@@ -1371,7 +1651,12 @@
             <p:ph type="sldNum" sz="quarter" idx="12"/>
           </p:nvPr>
         </p:nvSpPr>
-        <p:spPr/>
+        <p:spPr>
+          <a:xfrm>
+            <a:off x="7589520" y="6480969"/>
+            <a:ext cx="502920" cy="301752"/>
+          </a:xfrm>
+        </p:spPr>
         <p:txBody>
           <a:bodyPr/>
           <a:lstStyle/>
@@ -1393,8 +1678,13 @@
 </file>
 
 <file path=ppt/slideLayouts/slideLayout5.xml><?xml version="1.0" encoding="utf-8"?>
-<p:sldLayout xmlns:a="http://schemas.openxmlformats.org/drawingml/2006/main" xmlns:r="http://schemas.openxmlformats.org/officeDocument/2006/relationships" xmlns:p="http://schemas.openxmlformats.org/presentationml/2006/main" type="twoTxTwoObj" preserve="1">
+<p:sldLayout xmlns:a="http://schemas.openxmlformats.org/drawingml/2006/main" xmlns:r="http://schemas.openxmlformats.org/officeDocument/2006/relationships" xmlns:p="http://schemas.openxmlformats.org/presentationml/2006/main" showMasterSp="0" type="twoTxTwoObj" preserve="1">
   <p:cSld name="Comparación">
+    <p:bg>
+      <p:bgRef idx="1002">
+        <a:schemeClr val="bg2"/>
+      </p:bgRef>
+    </p:bg>
     <p:spTree>
       <p:nvGrpSpPr>
         <p:cNvPr id="1" name=""/>
@@ -1419,20 +1709,34 @@
             <p:ph type="title"/>
           </p:nvPr>
         </p:nvSpPr>
-        <p:spPr/>
-        <p:txBody>
-          <a:bodyPr/>
+        <p:spPr>
+          <a:xfrm>
+            <a:off x="248198" y="290732"/>
+            <a:ext cx="1066800" cy="6153912"/>
+          </a:xfrm>
+        </p:spPr>
+        <p:txBody>
+          <a:bodyPr vert="vert270" anchor="b"/>
           <a:lstStyle>
-            <a:lvl1pPr>
-              <a:defRPr/>
+            <a:lvl1pPr marL="0" algn="ctr">
+              <a:defRPr sz="3300" b="1">
+                <a:ln w="6350">
+                  <a:solidFill>
+                    <a:schemeClr val="tx1"/>
+                  </a:solidFill>
+                </a:ln>
+                <a:solidFill>
+                  <a:schemeClr val="tx1"/>
+                </a:solidFill>
+              </a:defRPr>
             </a:lvl1pPr>
           </a:lstStyle>
           <a:p>
             <a:r>
-              <a:rPr lang="es-ES" smtClean="0"/>
+              <a:rPr kumimoji="0" lang="es-ES" smtClean="0"/>
               <a:t>Haga clic para modificar el estilo de título del patrón</a:t>
             </a:r>
-            <a:endParaRPr lang="es-ES"/>
+            <a:endParaRPr kumimoji="0" lang="en-US"/>
           </a:p>
         </p:txBody>
       </p:sp>
@@ -1448,73 +1752,199 @@
         </p:nvSpPr>
         <p:spPr>
           <a:xfrm>
-            <a:off x="457200" y="1535113"/>
-            <a:ext cx="4040188" cy="639762"/>
-          </a:xfrm>
-        </p:spPr>
-        <p:txBody>
-          <a:bodyPr anchor="b"/>
+            <a:off x="1365006" y="290732"/>
+            <a:ext cx="581024" cy="3017520"/>
+          </a:xfrm>
+          <a:solidFill>
+            <a:schemeClr val="bg1"/>
+          </a:solidFill>
+          <a:ln w="12700">
+            <a:noFill/>
+          </a:ln>
+        </p:spPr>
+        <p:txBody>
+          <a:bodyPr vert="vert270" anchor="ctr"/>
           <a:lstStyle>
-            <a:lvl1pPr marL="0" indent="0">
+            <a:lvl1pPr marL="0" indent="0" algn="ctr">
               <a:buNone/>
-              <a:defRPr sz="2400" b="1"/>
+              <a:defRPr sz="1600" b="0">
+                <a:solidFill>
+                  <a:schemeClr val="tx1"/>
+                </a:solidFill>
+              </a:defRPr>
             </a:lvl1pPr>
-            <a:lvl2pPr marL="457200" indent="0">
+            <a:lvl2pPr>
               <a:buNone/>
               <a:defRPr sz="2000" b="1"/>
             </a:lvl2pPr>
-            <a:lvl3pPr marL="914400" indent="0">
+            <a:lvl3pPr>
               <a:buNone/>
               <a:defRPr sz="1800" b="1"/>
             </a:lvl3pPr>
-            <a:lvl4pPr marL="1371600" indent="0">
+            <a:lvl4pPr>
               <a:buNone/>
               <a:defRPr sz="1600" b="1"/>
             </a:lvl4pPr>
-            <a:lvl5pPr marL="1828800" indent="0">
+            <a:lvl5pPr>
               <a:buNone/>
               <a:defRPr sz="1600" b="1"/>
             </a:lvl5pPr>
-            <a:lvl6pPr marL="2286000" indent="0">
+          </a:lstStyle>
+          <a:p>
+            <a:pPr lvl="0" eaLnBrk="1" latinLnBrk="0" hangingPunct="1"/>
+            <a:r>
+              <a:rPr kumimoji="0" lang="es-ES" smtClean="0"/>
+              <a:t>Haga clic para modificar el estilo de texto del patrón</a:t>
+            </a:r>
+          </a:p>
+        </p:txBody>
+      </p:sp>
+      <p:sp>
+        <p:nvSpPr>
+          <p:cNvPr id="4" name="3 Marcador de texto"/>
+          <p:cNvSpPr>
+            <a:spLocks noGrp="1"/>
+          </p:cNvSpPr>
+          <p:nvPr>
+            <p:ph type="body" sz="half" idx="3"/>
+          </p:nvPr>
+        </p:nvSpPr>
+        <p:spPr>
+          <a:xfrm>
+            <a:off x="1365006" y="3427124"/>
+            <a:ext cx="581024" cy="3017520"/>
+          </a:xfrm>
+          <a:solidFill>
+            <a:schemeClr val="bg1"/>
+          </a:solidFill>
+          <a:ln w="12700">
+            <a:noFill/>
+          </a:ln>
+        </p:spPr>
+        <p:txBody>
+          <a:bodyPr vert="vert270" anchor="ctr"/>
+          <a:lstStyle>
+            <a:lvl1pPr marL="0" indent="0" algn="ctr">
+              <a:buNone/>
+              <a:defRPr sz="1600" b="0">
+                <a:solidFill>
+                  <a:schemeClr val="tx1"/>
+                </a:solidFill>
+              </a:defRPr>
+            </a:lvl1pPr>
+            <a:lvl2pPr>
+              <a:buNone/>
+              <a:defRPr sz="2000" b="1"/>
+            </a:lvl2pPr>
+            <a:lvl3pPr>
+              <a:buNone/>
+              <a:defRPr sz="1800" b="1"/>
+            </a:lvl3pPr>
+            <a:lvl4pPr>
               <a:buNone/>
               <a:defRPr sz="1600" b="1"/>
-            </a:lvl6pPr>
-            <a:lvl7pPr marL="2743200" indent="0">
+            </a:lvl4pPr>
+            <a:lvl5pPr>
               <a:buNone/>
               <a:defRPr sz="1600" b="1"/>
-            </a:lvl7pPr>
-            <a:lvl8pPr marL="3200400" indent="0">
-              <a:buNone/>
-              <a:defRPr sz="1600" b="1"/>
-            </a:lvl8pPr>
-            <a:lvl9pPr marL="3657600" indent="0">
-              <a:buNone/>
-              <a:defRPr sz="1600" b="1"/>
-            </a:lvl9pPr>
+            </a:lvl5pPr>
           </a:lstStyle>
           <a:p>
-            <a:pPr lvl="0"/>
+            <a:pPr lvl="0" eaLnBrk="1" latinLnBrk="0" hangingPunct="1"/>
+            <a:r>
+              <a:rPr kumimoji="0" lang="es-ES" smtClean="0"/>
+              <a:t>Haga clic para modificar el estilo de texto del patrón</a:t>
+            </a:r>
+          </a:p>
+        </p:txBody>
+      </p:sp>
+      <p:sp>
+        <p:nvSpPr>
+          <p:cNvPr id="5" name="4 Marcador de contenido"/>
+          <p:cNvSpPr>
+            <a:spLocks noGrp="1"/>
+          </p:cNvSpPr>
+          <p:nvPr>
+            <p:ph sz="quarter" idx="2"/>
+          </p:nvPr>
+        </p:nvSpPr>
+        <p:spPr>
+          <a:xfrm>
+            <a:off x="2022230" y="290732"/>
+            <a:ext cx="6858000" cy="3017520"/>
+          </a:xfrm>
+        </p:spPr>
+        <p:txBody>
+          <a:bodyPr/>
+          <a:lstStyle>
+            <a:lvl1pPr algn="l">
+              <a:defRPr sz="2400"/>
+            </a:lvl1pPr>
+            <a:lvl2pPr algn="l">
+              <a:defRPr sz="2000"/>
+            </a:lvl2pPr>
+            <a:lvl3pPr algn="l">
+              <a:defRPr sz="1800"/>
+            </a:lvl3pPr>
+            <a:lvl4pPr algn="l">
+              <a:defRPr sz="1600"/>
+            </a:lvl4pPr>
+            <a:lvl5pPr algn="l">
+              <a:defRPr sz="1600"/>
+            </a:lvl5pPr>
+          </a:lstStyle>
+          <a:p>
+            <a:pPr lvl="0" eaLnBrk="1" latinLnBrk="0" hangingPunct="1"/>
             <a:r>
               <a:rPr lang="es-ES" smtClean="0"/>
               <a:t>Haga clic para modificar el estilo de texto del patrón</a:t>
             </a:r>
           </a:p>
-        </p:txBody>
-      </p:sp>
-      <p:sp>
-        <p:nvSpPr>
-          <p:cNvPr id="4" name="3 Marcador de contenido"/>
+          <a:p>
+            <a:pPr lvl="1" eaLnBrk="1" latinLnBrk="0" hangingPunct="1"/>
+            <a:r>
+              <a:rPr lang="es-ES" smtClean="0"/>
+              <a:t>Segundo nivel</a:t>
+            </a:r>
+          </a:p>
+          <a:p>
+            <a:pPr lvl="2" eaLnBrk="1" latinLnBrk="0" hangingPunct="1"/>
+            <a:r>
+              <a:rPr lang="es-ES" smtClean="0"/>
+              <a:t>Tercer nivel</a:t>
+            </a:r>
+          </a:p>
+          <a:p>
+            <a:pPr lvl="3" eaLnBrk="1" latinLnBrk="0" hangingPunct="1"/>
+            <a:r>
+              <a:rPr lang="es-ES" smtClean="0"/>
+              <a:t>Cuarto nivel</a:t>
+            </a:r>
+          </a:p>
+          <a:p>
+            <a:pPr lvl="4" eaLnBrk="1" latinLnBrk="0" hangingPunct="1"/>
+            <a:r>
+              <a:rPr lang="es-ES" smtClean="0"/>
+              <a:t>Quinto nivel</a:t>
+            </a:r>
+            <a:endParaRPr kumimoji="0" lang="en-US"/>
+          </a:p>
+        </p:txBody>
+      </p:sp>
+      <p:sp>
+        <p:nvSpPr>
+          <p:cNvPr id="6" name="5 Marcador de contenido"/>
           <p:cNvSpPr>
             <a:spLocks noGrp="1"/>
           </p:cNvSpPr>
           <p:nvPr>
-            <p:ph sz="half" idx="2"/>
+            <p:ph sz="quarter" idx="4"/>
           </p:nvPr>
         </p:nvSpPr>
         <p:spPr>
           <a:xfrm>
-            <a:off x="457200" y="2174875"/>
-            <a:ext cx="4040188" cy="3951288"/>
+            <a:off x="2022230" y="3427124"/>
+            <a:ext cx="6858000" cy="3017520"/>
           </a:xfrm>
         </p:spPr>
         <p:txBody>
@@ -1535,204 +1965,42 @@
             <a:lvl5pPr>
               <a:defRPr sz="1600"/>
             </a:lvl5pPr>
-            <a:lvl6pPr>
-              <a:defRPr sz="1600"/>
-            </a:lvl6pPr>
-            <a:lvl7pPr>
-              <a:defRPr sz="1600"/>
-            </a:lvl7pPr>
-            <a:lvl8pPr>
-              <a:defRPr sz="1600"/>
-            </a:lvl8pPr>
-            <a:lvl9pPr>
-              <a:defRPr sz="1600"/>
-            </a:lvl9pPr>
           </a:lstStyle>
           <a:p>
-            <a:pPr lvl="0"/>
+            <a:pPr lvl="0" eaLnBrk="1" latinLnBrk="0" hangingPunct="1"/>
             <a:r>
               <a:rPr lang="es-ES" smtClean="0"/>
               <a:t>Haga clic para modificar el estilo de texto del patrón</a:t>
             </a:r>
           </a:p>
           <a:p>
-            <a:pPr lvl="1"/>
+            <a:pPr lvl="1" eaLnBrk="1" latinLnBrk="0" hangingPunct="1"/>
             <a:r>
               <a:rPr lang="es-ES" smtClean="0"/>
               <a:t>Segundo nivel</a:t>
             </a:r>
           </a:p>
           <a:p>
-            <a:pPr lvl="2"/>
+            <a:pPr lvl="2" eaLnBrk="1" latinLnBrk="0" hangingPunct="1"/>
             <a:r>
               <a:rPr lang="es-ES" smtClean="0"/>
               <a:t>Tercer nivel</a:t>
             </a:r>
           </a:p>
           <a:p>
-            <a:pPr lvl="3"/>
+            <a:pPr lvl="3" eaLnBrk="1" latinLnBrk="0" hangingPunct="1"/>
             <a:r>
               <a:rPr lang="es-ES" smtClean="0"/>
               <a:t>Cuarto nivel</a:t>
             </a:r>
           </a:p>
           <a:p>
-            <a:pPr lvl="4"/>
+            <a:pPr lvl="4" eaLnBrk="1" latinLnBrk="0" hangingPunct="1"/>
             <a:r>
               <a:rPr lang="es-ES" smtClean="0"/>
               <a:t>Quinto nivel</a:t>
             </a:r>
-            <a:endParaRPr lang="es-ES"/>
-          </a:p>
-        </p:txBody>
-      </p:sp>
-      <p:sp>
-        <p:nvSpPr>
-          <p:cNvPr id="5" name="4 Marcador de texto"/>
-          <p:cNvSpPr>
-            <a:spLocks noGrp="1"/>
-          </p:cNvSpPr>
-          <p:nvPr>
-            <p:ph type="body" sz="quarter" idx="3"/>
-          </p:nvPr>
-        </p:nvSpPr>
-        <p:spPr>
-          <a:xfrm>
-            <a:off x="4645025" y="1535113"/>
-            <a:ext cx="4041775" cy="639762"/>
-          </a:xfrm>
-        </p:spPr>
-        <p:txBody>
-          <a:bodyPr anchor="b"/>
-          <a:lstStyle>
-            <a:lvl1pPr marL="0" indent="0">
-              <a:buNone/>
-              <a:defRPr sz="2400" b="1"/>
-            </a:lvl1pPr>
-            <a:lvl2pPr marL="457200" indent="0">
-              <a:buNone/>
-              <a:defRPr sz="2000" b="1"/>
-            </a:lvl2pPr>
-            <a:lvl3pPr marL="914400" indent="0">
-              <a:buNone/>
-              <a:defRPr sz="1800" b="1"/>
-            </a:lvl3pPr>
-            <a:lvl4pPr marL="1371600" indent="0">
-              <a:buNone/>
-              <a:defRPr sz="1600" b="1"/>
-            </a:lvl4pPr>
-            <a:lvl5pPr marL="1828800" indent="0">
-              <a:buNone/>
-              <a:defRPr sz="1600" b="1"/>
-            </a:lvl5pPr>
-            <a:lvl6pPr marL="2286000" indent="0">
-              <a:buNone/>
-              <a:defRPr sz="1600" b="1"/>
-            </a:lvl6pPr>
-            <a:lvl7pPr marL="2743200" indent="0">
-              <a:buNone/>
-              <a:defRPr sz="1600" b="1"/>
-            </a:lvl7pPr>
-            <a:lvl8pPr marL="3200400" indent="0">
-              <a:buNone/>
-              <a:defRPr sz="1600" b="1"/>
-            </a:lvl8pPr>
-            <a:lvl9pPr marL="3657600" indent="0">
-              <a:buNone/>
-              <a:defRPr sz="1600" b="1"/>
-            </a:lvl9pPr>
-          </a:lstStyle>
-          <a:p>
-            <a:pPr lvl="0"/>
-            <a:r>
-              <a:rPr lang="es-ES" smtClean="0"/>
-              <a:t>Haga clic para modificar el estilo de texto del patrón</a:t>
-            </a:r>
-          </a:p>
-        </p:txBody>
-      </p:sp>
-      <p:sp>
-        <p:nvSpPr>
-          <p:cNvPr id="6" name="5 Marcador de contenido"/>
-          <p:cNvSpPr>
-            <a:spLocks noGrp="1"/>
-          </p:cNvSpPr>
-          <p:nvPr>
-            <p:ph sz="quarter" idx="4"/>
-          </p:nvPr>
-        </p:nvSpPr>
-        <p:spPr>
-          <a:xfrm>
-            <a:off x="4645025" y="2174875"/>
-            <a:ext cx="4041775" cy="3951288"/>
-          </a:xfrm>
-        </p:spPr>
-        <p:txBody>
-          <a:bodyPr/>
-          <a:lstStyle>
-            <a:lvl1pPr>
-              <a:defRPr sz="2400"/>
-            </a:lvl1pPr>
-            <a:lvl2pPr>
-              <a:defRPr sz="2000"/>
-            </a:lvl2pPr>
-            <a:lvl3pPr>
-              <a:defRPr sz="1800"/>
-            </a:lvl3pPr>
-            <a:lvl4pPr>
-              <a:defRPr sz="1600"/>
-            </a:lvl4pPr>
-            <a:lvl5pPr>
-              <a:defRPr sz="1600"/>
-            </a:lvl5pPr>
-            <a:lvl6pPr>
-              <a:defRPr sz="1600"/>
-            </a:lvl6pPr>
-            <a:lvl7pPr>
-              <a:defRPr sz="1600"/>
-            </a:lvl7pPr>
-            <a:lvl8pPr>
-              <a:defRPr sz="1600"/>
-            </a:lvl8pPr>
-            <a:lvl9pPr>
-              <a:defRPr sz="1600"/>
-            </a:lvl9pPr>
-          </a:lstStyle>
-          <a:p>
-            <a:pPr lvl="0"/>
-            <a:r>
-              <a:rPr lang="es-ES" smtClean="0"/>
-              <a:t>Haga clic para modificar el estilo de texto del patrón</a:t>
-            </a:r>
-          </a:p>
-          <a:p>
-            <a:pPr lvl="1"/>
-            <a:r>
-              <a:rPr lang="es-ES" smtClean="0"/>
-              <a:t>Segundo nivel</a:t>
-            </a:r>
-          </a:p>
-          <a:p>
-            <a:pPr lvl="2"/>
-            <a:r>
-              <a:rPr lang="es-ES" smtClean="0"/>
-              <a:t>Tercer nivel</a:t>
-            </a:r>
-          </a:p>
-          <a:p>
-            <a:pPr lvl="3"/>
-            <a:r>
-              <a:rPr lang="es-ES" smtClean="0"/>
-              <a:t>Cuarto nivel</a:t>
-            </a:r>
-          </a:p>
-          <a:p>
-            <a:pPr lvl="4"/>
-            <a:r>
-              <a:rPr lang="es-ES" smtClean="0"/>
-              <a:t>Quinto nivel</a:t>
-            </a:r>
-            <a:endParaRPr lang="es-ES"/>
+            <a:endParaRPr kumimoji="0" lang="en-US"/>
           </a:p>
         </p:txBody>
       </p:sp>
@@ -1746,7 +2014,12 @@
             <p:ph type="dt" sz="half" idx="10"/>
           </p:nvPr>
         </p:nvSpPr>
-        <p:spPr/>
+        <p:spPr>
+          <a:xfrm>
+            <a:off x="4791456" y="6480969"/>
+            <a:ext cx="2130552" cy="301752"/>
+          </a:xfrm>
+        </p:spPr>
         <p:txBody>
           <a:bodyPr/>
           <a:lstStyle/>
@@ -1769,7 +2042,12 @@
             <p:ph type="ftr" sz="quarter" idx="11"/>
           </p:nvPr>
         </p:nvSpPr>
-        <p:spPr/>
+        <p:spPr>
+          <a:xfrm>
+            <a:off x="457200" y="6480969"/>
+            <a:ext cx="4261104" cy="301752"/>
+          </a:xfrm>
+        </p:spPr>
         <p:txBody>
           <a:bodyPr/>
           <a:lstStyle/>
@@ -1788,10 +2066,19 @@
             <p:ph type="sldNum" sz="quarter" idx="12"/>
           </p:nvPr>
         </p:nvSpPr>
-        <p:spPr/>
+        <p:spPr>
+          <a:xfrm>
+            <a:off x="7589520" y="6483096"/>
+            <a:ext cx="502920" cy="301752"/>
+          </a:xfrm>
+        </p:spPr>
         <p:txBody>
           <a:bodyPr/>
-          <a:lstStyle/>
+          <a:lstStyle>
+            <a:lvl1pPr algn="ctr">
+              <a:defRPr/>
+            </a:lvl1pPr>
+          </a:lstStyle>
           <a:p>
             <a:fld id="{132FADFE-3B8F-471C-ABF0-DBC7717ECBBC}" type="slidenum">
               <a:rPr lang="es-ES" smtClean="0"/>
@@ -1804,7 +2091,7 @@
     </p:spTree>
   </p:cSld>
   <p:clrMapOvr>
-    <a:masterClrMapping/>
+    <a:overrideClrMapping bg1="dk1" tx1="lt1" bg2="dk2" tx2="lt2" accent1="accent1" accent2="accent2" accent3="accent3" accent4="accent4" accent5="accent5" accent6="accent6" hlink="hlink" folHlink="folHlink"/>
   </p:clrMapOvr>
 </p:sldLayout>
 </file>
@@ -1839,13 +2126,17 @@
         <p:spPr/>
         <p:txBody>
           <a:bodyPr/>
-          <a:lstStyle/>
-          <a:p>
-            <a:r>
-              <a:rPr lang="es-ES" smtClean="0"/>
+          <a:lstStyle>
+            <a:lvl1pPr>
+              <a:defRPr b="0"/>
+            </a:lvl1pPr>
+          </a:lstStyle>
+          <a:p>
+            <a:r>
+              <a:rPr kumimoji="0" lang="es-ES" smtClean="0"/>
               <a:t>Haga clic para modificar el estilo de título del patrón</a:t>
             </a:r>
-            <a:endParaRPr lang="es-ES"/>
+            <a:endParaRPr kumimoji="0" lang="en-US"/>
           </a:p>
         </p:txBody>
       </p:sp>
@@ -1949,7 +2240,12 @@
             <p:ph type="dt" sz="half" idx="10"/>
           </p:nvPr>
         </p:nvSpPr>
-        <p:spPr/>
+        <p:spPr>
+          <a:xfrm>
+            <a:off x="4791456" y="6480969"/>
+            <a:ext cx="2133600" cy="301752"/>
+          </a:xfrm>
+        </p:spPr>
         <p:txBody>
           <a:bodyPr/>
           <a:lstStyle/>
@@ -1972,7 +2268,12 @@
             <p:ph type="ftr" sz="quarter" idx="11"/>
           </p:nvPr>
         </p:nvSpPr>
-        <p:spPr/>
+        <p:spPr>
+          <a:xfrm>
+            <a:off x="457200" y="6481890"/>
+            <a:ext cx="4260056" cy="300831"/>
+          </a:xfrm>
+        </p:spPr>
         <p:txBody>
           <a:bodyPr/>
           <a:lstStyle/>
@@ -1991,7 +2292,12 @@
             <p:ph type="sldNum" sz="quarter" idx="12"/>
           </p:nvPr>
         </p:nvSpPr>
-        <p:spPr/>
+        <p:spPr>
+          <a:xfrm>
+            <a:off x="7589520" y="6480969"/>
+            <a:ext cx="502920" cy="301752"/>
+          </a:xfrm>
+        </p:spPr>
         <p:txBody>
           <a:bodyPr/>
           <a:lstStyle/>
@@ -2013,8 +2319,13 @@
 </file>
 
 <file path=ppt/slideLayouts/slideLayout8.xml><?xml version="1.0" encoding="utf-8"?>
-<p:sldLayout xmlns:a="http://schemas.openxmlformats.org/drawingml/2006/main" xmlns:r="http://schemas.openxmlformats.org/officeDocument/2006/relationships" xmlns:p="http://schemas.openxmlformats.org/presentationml/2006/main" type="objTx" preserve="1">
+<p:sldLayout xmlns:a="http://schemas.openxmlformats.org/drawingml/2006/main" xmlns:r="http://schemas.openxmlformats.org/officeDocument/2006/relationships" xmlns:p="http://schemas.openxmlformats.org/presentationml/2006/main" showMasterSp="0" type="objTx" preserve="1">
   <p:cSld name="Contenido con título">
+    <p:bg>
+      <p:bgRef idx="1002">
+        <a:schemeClr val="bg2"/>
+      </p:bgRef>
+    </p:bg>
     <p:spTree>
       <p:nvGrpSpPr>
         <p:cNvPr id="1" name=""/>
@@ -2041,50 +2352,109 @@
         </p:nvSpPr>
         <p:spPr>
           <a:xfrm>
-            <a:off x="457200" y="273050"/>
-            <a:ext cx="3008313" cy="1162050"/>
-          </a:xfrm>
-        </p:spPr>
-        <p:txBody>
-          <a:bodyPr anchor="b"/>
+            <a:off x="219456" y="367664"/>
+            <a:ext cx="914400" cy="5943600"/>
+          </a:xfrm>
+        </p:spPr>
+        <p:txBody>
+          <a:bodyPr vert="vert270" anchor="b"/>
           <a:lstStyle>
-            <a:lvl1pPr algn="l">
-              <a:defRPr sz="2000" b="1"/>
+            <a:lvl1pPr marL="0" marR="18288" algn="r">
+              <a:spcBef>
+                <a:spcPts val="0"/>
+              </a:spcBef>
+              <a:buNone/>
+              <a:defRPr sz="2900" b="0" cap="all" baseline="0"/>
             </a:lvl1pPr>
           </a:lstStyle>
           <a:p>
             <a:r>
-              <a:rPr lang="es-ES" smtClean="0"/>
+              <a:rPr kumimoji="0" lang="es-ES" smtClean="0"/>
               <a:t>Haga clic para modificar el estilo de título del patrón</a:t>
             </a:r>
-            <a:endParaRPr lang="es-ES"/>
-          </a:p>
-        </p:txBody>
-      </p:sp>
-      <p:sp>
-        <p:nvSpPr>
-          <p:cNvPr id="3" name="2 Marcador de contenido"/>
+            <a:endParaRPr kumimoji="0" lang="en-US"/>
+          </a:p>
+        </p:txBody>
+      </p:sp>
+      <p:sp>
+        <p:nvSpPr>
+          <p:cNvPr id="3" name="2 Marcador de texto"/>
           <p:cNvSpPr>
             <a:spLocks noGrp="1"/>
           </p:cNvSpPr>
           <p:nvPr>
-            <p:ph idx="1"/>
+            <p:ph type="body" idx="2"/>
           </p:nvPr>
         </p:nvSpPr>
         <p:spPr>
           <a:xfrm>
-            <a:off x="3575050" y="273050"/>
-            <a:ext cx="5111750" cy="5853113"/>
+            <a:off x="1135856" y="367664"/>
+            <a:ext cx="2438400" cy="5943600"/>
+          </a:xfrm>
+        </p:spPr>
+        <p:txBody>
+          <a:bodyPr anchor="t"/>
+          <a:lstStyle>
+            <a:lvl1pPr marL="0" indent="0">
+              <a:spcBef>
+                <a:spcPts val="0"/>
+              </a:spcBef>
+              <a:buNone/>
+              <a:defRPr sz="1400"/>
+            </a:lvl1pPr>
+            <a:lvl2pPr>
+              <a:buNone/>
+              <a:defRPr sz="1200"/>
+            </a:lvl2pPr>
+            <a:lvl3pPr>
+              <a:buNone/>
+              <a:defRPr sz="1000"/>
+            </a:lvl3pPr>
+            <a:lvl4pPr>
+              <a:buNone/>
+              <a:defRPr sz="900"/>
+            </a:lvl4pPr>
+            <a:lvl5pPr>
+              <a:buNone/>
+              <a:defRPr sz="900"/>
+            </a:lvl5pPr>
+          </a:lstStyle>
+          <a:p>
+            <a:pPr lvl="0" eaLnBrk="1" latinLnBrk="0" hangingPunct="1"/>
+            <a:r>
+              <a:rPr kumimoji="0" lang="es-ES" smtClean="0"/>
+              <a:t>Haga clic para modificar el estilo de texto del patrón</a:t>
+            </a:r>
+          </a:p>
+        </p:txBody>
+      </p:sp>
+      <p:sp>
+        <p:nvSpPr>
+          <p:cNvPr id="4" name="3 Marcador de contenido"/>
+          <p:cNvSpPr>
+            <a:spLocks noGrp="1"/>
+          </p:cNvSpPr>
+          <p:nvPr>
+            <p:ph sz="half" idx="1"/>
+          </p:nvPr>
+        </p:nvSpPr>
+        <p:spPr>
+          <a:xfrm>
+            <a:off x="3651250" y="320040"/>
+            <a:ext cx="5276088" cy="5989320"/>
           </a:xfrm>
         </p:spPr>
         <p:txBody>
           <a:bodyPr/>
           <a:lstStyle>
             <a:lvl1pPr>
-              <a:defRPr sz="3200"/>
+              <a:spcBef>
+                <a:spcPts val="0"/>
+              </a:spcBef>
+              <a:defRPr sz="3000"/>
             </a:lvl1pPr>
             <a:lvl2pPr>
-              <a:defRPr sz="2800"/>
+              <a:defRPr sz="2600"/>
             </a:lvl2pPr>
             <a:lvl3pPr>
               <a:defRPr sz="2400"/>
@@ -2095,119 +2465,42 @@
             <a:lvl5pPr>
               <a:defRPr sz="2000"/>
             </a:lvl5pPr>
-            <a:lvl6pPr>
-              <a:defRPr sz="2000"/>
-            </a:lvl6pPr>
-            <a:lvl7pPr>
-              <a:defRPr sz="2000"/>
-            </a:lvl7pPr>
-            <a:lvl8pPr>
-              <a:defRPr sz="2000"/>
-            </a:lvl8pPr>
-            <a:lvl9pPr>
-              <a:defRPr sz="2000"/>
-            </a:lvl9pPr>
           </a:lstStyle>
           <a:p>
-            <a:pPr lvl="0"/>
+            <a:pPr lvl="0" eaLnBrk="1" latinLnBrk="0" hangingPunct="1"/>
             <a:r>
               <a:rPr lang="es-ES" smtClean="0"/>
               <a:t>Haga clic para modificar el estilo de texto del patrón</a:t>
             </a:r>
           </a:p>
           <a:p>
-            <a:pPr lvl="1"/>
+            <a:pPr lvl="1" eaLnBrk="1" latinLnBrk="0" hangingPunct="1"/>
             <a:r>
               <a:rPr lang="es-ES" smtClean="0"/>
               <a:t>Segundo nivel</a:t>
             </a:r>
           </a:p>
           <a:p>
-            <a:pPr lvl="2"/>
+            <a:pPr lvl="2" eaLnBrk="1" latinLnBrk="0" hangingPunct="1"/>
             <a:r>
               <a:rPr lang="es-ES" smtClean="0"/>
               <a:t>Tercer nivel</a:t>
             </a:r>
           </a:p>
           <a:p>
-            <a:pPr lvl="3"/>
+            <a:pPr lvl="3" eaLnBrk="1" latinLnBrk="0" hangingPunct="1"/>
             <a:r>
               <a:rPr lang="es-ES" smtClean="0"/>
               <a:t>Cuarto nivel</a:t>
             </a:r>
           </a:p>
           <a:p>
-            <a:pPr lvl="4"/>
+            <a:pPr lvl="4" eaLnBrk="1" latinLnBrk="0" hangingPunct="1"/>
             <a:r>
               <a:rPr lang="es-ES" smtClean="0"/>
               <a:t>Quinto nivel</a:t>
             </a:r>
-            <a:endParaRPr lang="es-ES"/>
-          </a:p>
-        </p:txBody>
-      </p:sp>
-      <p:sp>
-        <p:nvSpPr>
-          <p:cNvPr id="4" name="3 Marcador de texto"/>
-          <p:cNvSpPr>
-            <a:spLocks noGrp="1"/>
-          </p:cNvSpPr>
-          <p:nvPr>
-            <p:ph type="body" sz="half" idx="2"/>
-          </p:nvPr>
-        </p:nvSpPr>
-        <p:spPr>
-          <a:xfrm>
-            <a:off x="457200" y="1435100"/>
-            <a:ext cx="3008313" cy="4691063"/>
-          </a:xfrm>
-        </p:spPr>
-        <p:txBody>
-          <a:bodyPr/>
-          <a:lstStyle>
-            <a:lvl1pPr marL="0" indent="0">
-              <a:buNone/>
-              <a:defRPr sz="1400"/>
-            </a:lvl1pPr>
-            <a:lvl2pPr marL="457200" indent="0">
-              <a:buNone/>
-              <a:defRPr sz="1200"/>
-            </a:lvl2pPr>
-            <a:lvl3pPr marL="914400" indent="0">
-              <a:buNone/>
-              <a:defRPr sz="1000"/>
-            </a:lvl3pPr>
-            <a:lvl4pPr marL="1371600" indent="0">
-              <a:buNone/>
-              <a:defRPr sz="900"/>
-            </a:lvl4pPr>
-            <a:lvl5pPr marL="1828800" indent="0">
-              <a:buNone/>
-              <a:defRPr sz="900"/>
-            </a:lvl5pPr>
-            <a:lvl6pPr marL="2286000" indent="0">
-              <a:buNone/>
-              <a:defRPr sz="900"/>
-            </a:lvl6pPr>
-            <a:lvl7pPr marL="2743200" indent="0">
-              <a:buNone/>
-              <a:defRPr sz="900"/>
-            </a:lvl7pPr>
-            <a:lvl8pPr marL="3200400" indent="0">
-              <a:buNone/>
-              <a:defRPr sz="900"/>
-            </a:lvl8pPr>
-            <a:lvl9pPr marL="3657600" indent="0">
-              <a:buNone/>
-              <a:defRPr sz="900"/>
-            </a:lvl9pPr>
-          </a:lstStyle>
-          <a:p>
-            <a:pPr lvl="0"/>
-            <a:r>
-              <a:rPr lang="es-ES" smtClean="0"/>
-              <a:t>Haga clic para modificar el estilo de texto del patrón</a:t>
-            </a:r>
+            <a:endParaRPr kumimoji="0" lang="en-US"/>
           </a:p>
         </p:txBody>
       </p:sp>
@@ -2221,10 +2514,19 @@
             <p:ph type="dt" sz="half" idx="10"/>
           </p:nvPr>
         </p:nvSpPr>
-        <p:spPr/>
+        <p:spPr>
+          <a:xfrm>
+            <a:off x="6278976" y="6556248"/>
+            <a:ext cx="2133600" cy="301752"/>
+          </a:xfrm>
+        </p:spPr>
         <p:txBody>
           <a:bodyPr/>
-          <a:lstStyle/>
+          <a:lstStyle>
+            <a:lvl1pPr>
+              <a:defRPr sz="900"/>
+            </a:lvl1pPr>
+          </a:lstStyle>
           <a:p>
             <a:fld id="{7A847CFC-816F-41D0-AAC0-9BF4FEBC753E}" type="datetimeFigureOut">
               <a:rPr lang="es-ES" smtClean="0"/>
@@ -2244,10 +2546,19 @@
             <p:ph type="ftr" sz="quarter" idx="11"/>
           </p:nvPr>
         </p:nvSpPr>
-        <p:spPr/>
+        <p:spPr>
+          <a:xfrm>
+            <a:off x="1135856" y="6556248"/>
+            <a:ext cx="5143120" cy="301752"/>
+          </a:xfrm>
+        </p:spPr>
         <p:txBody>
           <a:bodyPr/>
-          <a:lstStyle/>
+          <a:lstStyle>
+            <a:lvl1pPr>
+              <a:defRPr sz="900"/>
+            </a:lvl1pPr>
+          </a:lstStyle>
           <a:p>
             <a:endParaRPr lang="es-ES"/>
           </a:p>
@@ -2263,10 +2574,19 @@
             <p:ph type="sldNum" sz="quarter" idx="12"/>
           </p:nvPr>
         </p:nvSpPr>
-        <p:spPr/>
+        <p:spPr>
+          <a:xfrm>
+            <a:off x="8410576" y="6556248"/>
+            <a:ext cx="502920" cy="301752"/>
+          </a:xfrm>
+        </p:spPr>
         <p:txBody>
           <a:bodyPr/>
-          <a:lstStyle/>
+          <a:lstStyle>
+            <a:lvl1pPr>
+              <a:defRPr sz="900"/>
+            </a:lvl1pPr>
+          </a:lstStyle>
           <a:p>
             <a:fld id="{132FADFE-3B8F-471C-ABF0-DBC7717ECBBC}" type="slidenum">
               <a:rPr lang="es-ES" smtClean="0"/>
@@ -2279,264 +2599,16 @@
     </p:spTree>
   </p:cSld>
   <p:clrMapOvr>
-    <a:masterClrMapping/>
+    <a:overrideClrMapping bg1="dk1" tx1="lt1" bg2="dk2" tx2="lt2" accent1="accent1" accent2="accent2" accent3="accent3" accent4="accent4" accent5="accent5" accent6="accent6" hlink="hlink" folHlink="folHlink"/>
   </p:clrMapOvr>
 </p:sldLayout>
 </file>
 
 <file path=ppt/slideLayouts/slideLayout9.xml><?xml version="1.0" encoding="utf-8"?>
-<p:sldLayout xmlns:a="http://schemas.openxmlformats.org/drawingml/2006/main" xmlns:r="http://schemas.openxmlformats.org/officeDocument/2006/relationships" xmlns:p="http://schemas.openxmlformats.org/presentationml/2006/main" type="picTx" preserve="1">
+<p:sldLayout xmlns:a="http://schemas.openxmlformats.org/drawingml/2006/main" xmlns:r="http://schemas.openxmlformats.org/officeDocument/2006/relationships" xmlns:p="http://schemas.openxmlformats.org/presentationml/2006/main" showMasterSp="0" type="picTx" preserve="1">
   <p:cSld name="Imagen con título">
-    <p:spTree>
-      <p:nvGrpSpPr>
-        <p:cNvPr id="1" name=""/>
-        <p:cNvGrpSpPr/>
-        <p:nvPr/>
-      </p:nvGrpSpPr>
-      <p:grpSpPr>
-        <a:xfrm>
-          <a:off x="0" y="0"/>
-          <a:ext cx="0" cy="0"/>
-          <a:chOff x="0" y="0"/>
-          <a:chExt cx="0" cy="0"/>
-        </a:xfrm>
-      </p:grpSpPr>
-      <p:sp>
-        <p:nvSpPr>
-          <p:cNvPr id="2" name="1 Título"/>
-          <p:cNvSpPr>
-            <a:spLocks noGrp="1"/>
-          </p:cNvSpPr>
-          <p:nvPr>
-            <p:ph type="title"/>
-          </p:nvPr>
-        </p:nvSpPr>
-        <p:spPr>
-          <a:xfrm>
-            <a:off x="1792288" y="4800600"/>
-            <a:ext cx="5486400" cy="566738"/>
-          </a:xfrm>
-        </p:spPr>
-        <p:txBody>
-          <a:bodyPr anchor="b"/>
-          <a:lstStyle>
-            <a:lvl1pPr algn="l">
-              <a:defRPr sz="2000" b="1"/>
-            </a:lvl1pPr>
-          </a:lstStyle>
-          <a:p>
-            <a:r>
-              <a:rPr lang="es-ES" smtClean="0"/>
-              <a:t>Haga clic para modificar el estilo de título del patrón</a:t>
-            </a:r>
-            <a:endParaRPr lang="es-ES"/>
-          </a:p>
-        </p:txBody>
-      </p:sp>
-      <p:sp>
-        <p:nvSpPr>
-          <p:cNvPr id="3" name="2 Marcador de posición de imagen"/>
-          <p:cNvSpPr>
-            <a:spLocks noGrp="1"/>
-          </p:cNvSpPr>
-          <p:nvPr>
-            <p:ph type="pic" idx="1"/>
-          </p:nvPr>
-        </p:nvSpPr>
-        <p:spPr>
-          <a:xfrm>
-            <a:off x="1792288" y="612775"/>
-            <a:ext cx="5486400" cy="4114800"/>
-          </a:xfrm>
-        </p:spPr>
-        <p:txBody>
-          <a:bodyPr/>
-          <a:lstStyle>
-            <a:lvl1pPr marL="0" indent="0">
-              <a:buNone/>
-              <a:defRPr sz="3200"/>
-            </a:lvl1pPr>
-            <a:lvl2pPr marL="457200" indent="0">
-              <a:buNone/>
-              <a:defRPr sz="2800"/>
-            </a:lvl2pPr>
-            <a:lvl3pPr marL="914400" indent="0">
-              <a:buNone/>
-              <a:defRPr sz="2400"/>
-            </a:lvl3pPr>
-            <a:lvl4pPr marL="1371600" indent="0">
-              <a:buNone/>
-              <a:defRPr sz="2000"/>
-            </a:lvl4pPr>
-            <a:lvl5pPr marL="1828800" indent="0">
-              <a:buNone/>
-              <a:defRPr sz="2000"/>
-            </a:lvl5pPr>
-            <a:lvl6pPr marL="2286000" indent="0">
-              <a:buNone/>
-              <a:defRPr sz="2000"/>
-            </a:lvl6pPr>
-            <a:lvl7pPr marL="2743200" indent="0">
-              <a:buNone/>
-              <a:defRPr sz="2000"/>
-            </a:lvl7pPr>
-            <a:lvl8pPr marL="3200400" indent="0">
-              <a:buNone/>
-              <a:defRPr sz="2000"/>
-            </a:lvl8pPr>
-            <a:lvl9pPr marL="3657600" indent="0">
-              <a:buNone/>
-              <a:defRPr sz="2000"/>
-            </a:lvl9pPr>
-          </a:lstStyle>
-          <a:p>
-            <a:endParaRPr lang="es-ES"/>
-          </a:p>
-        </p:txBody>
-      </p:sp>
-      <p:sp>
-        <p:nvSpPr>
-          <p:cNvPr id="4" name="3 Marcador de texto"/>
-          <p:cNvSpPr>
-            <a:spLocks noGrp="1"/>
-          </p:cNvSpPr>
-          <p:nvPr>
-            <p:ph type="body" sz="half" idx="2"/>
-          </p:nvPr>
-        </p:nvSpPr>
-        <p:spPr>
-          <a:xfrm>
-            <a:off x="1792288" y="5367338"/>
-            <a:ext cx="5486400" cy="804862"/>
-          </a:xfrm>
-        </p:spPr>
-        <p:txBody>
-          <a:bodyPr/>
-          <a:lstStyle>
-            <a:lvl1pPr marL="0" indent="0">
-              <a:buNone/>
-              <a:defRPr sz="1400"/>
-            </a:lvl1pPr>
-            <a:lvl2pPr marL="457200" indent="0">
-              <a:buNone/>
-              <a:defRPr sz="1200"/>
-            </a:lvl2pPr>
-            <a:lvl3pPr marL="914400" indent="0">
-              <a:buNone/>
-              <a:defRPr sz="1000"/>
-            </a:lvl3pPr>
-            <a:lvl4pPr marL="1371600" indent="0">
-              <a:buNone/>
-              <a:defRPr sz="900"/>
-            </a:lvl4pPr>
-            <a:lvl5pPr marL="1828800" indent="0">
-              <a:buNone/>
-              <a:defRPr sz="900"/>
-            </a:lvl5pPr>
-            <a:lvl6pPr marL="2286000" indent="0">
-              <a:buNone/>
-              <a:defRPr sz="900"/>
-            </a:lvl6pPr>
-            <a:lvl7pPr marL="2743200" indent="0">
-              <a:buNone/>
-              <a:defRPr sz="900"/>
-            </a:lvl7pPr>
-            <a:lvl8pPr marL="3200400" indent="0">
-              <a:buNone/>
-              <a:defRPr sz="900"/>
-            </a:lvl8pPr>
-            <a:lvl9pPr marL="3657600" indent="0">
-              <a:buNone/>
-              <a:defRPr sz="900"/>
-            </a:lvl9pPr>
-          </a:lstStyle>
-          <a:p>
-            <a:pPr lvl="0"/>
-            <a:r>
-              <a:rPr lang="es-ES" smtClean="0"/>
-              <a:t>Haga clic para modificar el estilo de texto del patrón</a:t>
-            </a:r>
-          </a:p>
-        </p:txBody>
-      </p:sp>
-      <p:sp>
-        <p:nvSpPr>
-          <p:cNvPr id="5" name="4 Marcador de fecha"/>
-          <p:cNvSpPr>
-            <a:spLocks noGrp="1"/>
-          </p:cNvSpPr>
-          <p:nvPr>
-            <p:ph type="dt" sz="half" idx="10"/>
-          </p:nvPr>
-        </p:nvSpPr>
-        <p:spPr/>
-        <p:txBody>
-          <a:bodyPr/>
-          <a:lstStyle/>
-          <a:p>
-            <a:fld id="{7A847CFC-816F-41D0-AAC0-9BF4FEBC753E}" type="datetimeFigureOut">
-              <a:rPr lang="es-ES" smtClean="0"/>
-              <a:t>18/05/2015</a:t>
-            </a:fld>
-            <a:endParaRPr lang="es-ES"/>
-          </a:p>
-        </p:txBody>
-      </p:sp>
-      <p:sp>
-        <p:nvSpPr>
-          <p:cNvPr id="6" name="5 Marcador de pie de página"/>
-          <p:cNvSpPr>
-            <a:spLocks noGrp="1"/>
-          </p:cNvSpPr>
-          <p:nvPr>
-            <p:ph type="ftr" sz="quarter" idx="11"/>
-          </p:nvPr>
-        </p:nvSpPr>
-        <p:spPr/>
-        <p:txBody>
-          <a:bodyPr/>
-          <a:lstStyle/>
-          <a:p>
-            <a:endParaRPr lang="es-ES"/>
-          </a:p>
-        </p:txBody>
-      </p:sp>
-      <p:sp>
-        <p:nvSpPr>
-          <p:cNvPr id="7" name="6 Marcador de número de diapositiva"/>
-          <p:cNvSpPr>
-            <a:spLocks noGrp="1"/>
-          </p:cNvSpPr>
-          <p:nvPr>
-            <p:ph type="sldNum" sz="quarter" idx="12"/>
-          </p:nvPr>
-        </p:nvSpPr>
-        <p:spPr/>
-        <p:txBody>
-          <a:bodyPr/>
-          <a:lstStyle/>
-          <a:p>
-            <a:fld id="{132FADFE-3B8F-471C-ABF0-DBC7717ECBBC}" type="slidenum">
-              <a:rPr lang="es-ES" smtClean="0"/>
-              <a:t>‹Nº›</a:t>
-            </a:fld>
-            <a:endParaRPr lang="es-ES"/>
-          </a:p>
-        </p:txBody>
-      </p:sp>
-    </p:spTree>
-  </p:cSld>
-  <p:clrMapOvr>
-    <a:masterClrMapping/>
-  </p:clrMapOvr>
-</p:sldLayout>
-</file>
-
-<file path=ppt/slideMasters/slideMaster1.xml><?xml version="1.0" encoding="utf-8"?>
-<p:sldMaster xmlns:a="http://schemas.openxmlformats.org/drawingml/2006/main" xmlns:r="http://schemas.openxmlformats.org/officeDocument/2006/relationships" xmlns:p="http://schemas.openxmlformats.org/presentationml/2006/main">
-  <p:cSld>
     <p:bg>
-      <p:bgRef idx="1001">
+      <p:bgRef idx="1002">
         <a:schemeClr val="bg1"/>
       </p:bgRef>
     </p:bg>
@@ -2556,7 +2628,7 @@
       </p:grpSpPr>
       <p:sp>
         <p:nvSpPr>
-          <p:cNvPr id="2" name="1 Marcador de título"/>
+          <p:cNvPr id="2" name="1 Título"/>
           <p:cNvSpPr>
             <a:spLocks noGrp="1"/>
           </p:cNvSpPr>
@@ -2566,119 +2638,145 @@
         </p:nvSpPr>
         <p:spPr>
           <a:xfrm>
-            <a:off x="457200" y="274638"/>
-            <a:ext cx="8229600" cy="1143000"/>
-          </a:xfrm>
-          <a:prstGeom prst="rect">
-            <a:avLst/>
-          </a:prstGeom>
-        </p:spPr>
-        <p:txBody>
-          <a:bodyPr vert="horz" lIns="91440" tIns="45720" rIns="91440" bIns="45720" rtlCol="0" anchor="ctr">
-            <a:normAutofit/>
-          </a:bodyPr>
-          <a:lstStyle/>
-          <a:p>
-            <a:r>
-              <a:rPr lang="es-ES" smtClean="0"/>
+            <a:off x="219456" y="150896"/>
+            <a:ext cx="914400" cy="6400800"/>
+          </a:xfrm>
+        </p:spPr>
+        <p:txBody>
+          <a:bodyPr vert="vert270" anchor="b"/>
+          <a:lstStyle>
+            <a:lvl1pPr marL="0" algn="l">
+              <a:buNone/>
+              <a:defRPr sz="3000" b="0" cap="all" baseline="0"/>
+            </a:lvl1pPr>
+          </a:lstStyle>
+          <a:p>
+            <a:r>
+              <a:rPr kumimoji="0" lang="es-ES" smtClean="0"/>
               <a:t>Haga clic para modificar el estilo de título del patrón</a:t>
             </a:r>
-            <a:endParaRPr lang="es-ES"/>
-          </a:p>
-        </p:txBody>
-      </p:sp>
-      <p:sp>
-        <p:nvSpPr>
-          <p:cNvPr id="3" name="2 Marcador de texto"/>
+            <a:endParaRPr kumimoji="0" lang="en-US"/>
+          </a:p>
+        </p:txBody>
+      </p:sp>
+      <p:sp>
+        <p:nvSpPr>
+          <p:cNvPr id="3" name="2 Marcador de posición de imagen"/>
           <p:cNvSpPr>
             <a:spLocks noGrp="1"/>
           </p:cNvSpPr>
           <p:nvPr>
-            <p:ph type="body" idx="1"/>
+            <p:ph type="pic" idx="1"/>
           </p:nvPr>
         </p:nvSpPr>
         <p:spPr>
           <a:xfrm>
-            <a:off x="457200" y="1600200"/>
-            <a:ext cx="8229600" cy="4525963"/>
-          </a:xfrm>
-          <a:prstGeom prst="rect">
-            <a:avLst/>
-          </a:prstGeom>
-        </p:spPr>
-        <p:txBody>
-          <a:bodyPr vert="horz" lIns="91440" tIns="45720" rIns="91440" bIns="45720" rtlCol="0">
-            <a:normAutofit/>
-          </a:bodyPr>
-          <a:lstStyle/>
-          <a:p>
-            <a:pPr lvl="0"/>
-            <a:r>
-              <a:rPr lang="es-ES" smtClean="0"/>
-              <a:t>Haga clic para modificar el estilo de texto del patrón</a:t>
-            </a:r>
-          </a:p>
-          <a:p>
-            <a:pPr lvl="1"/>
-            <a:r>
-              <a:rPr lang="es-ES" smtClean="0"/>
-              <a:t>Segundo nivel</a:t>
-            </a:r>
-          </a:p>
-          <a:p>
-            <a:pPr lvl="2"/>
-            <a:r>
-              <a:rPr lang="es-ES" smtClean="0"/>
-              <a:t>Tercer nivel</a:t>
-            </a:r>
-          </a:p>
-          <a:p>
-            <a:pPr lvl="3"/>
-            <a:r>
-              <a:rPr lang="es-ES" smtClean="0"/>
-              <a:t>Cuarto nivel</a:t>
-            </a:r>
-          </a:p>
-          <a:p>
-            <a:pPr lvl="4"/>
-            <a:r>
-              <a:rPr lang="es-ES" smtClean="0"/>
-              <a:t>Quinto nivel</a:t>
-            </a:r>
-            <a:endParaRPr lang="es-ES"/>
-          </a:p>
-        </p:txBody>
-      </p:sp>
-      <p:sp>
-        <p:nvSpPr>
-          <p:cNvPr id="4" name="3 Marcador de fecha"/>
+            <a:off x="1138237" y="373966"/>
+            <a:ext cx="7333488" cy="5486400"/>
+          </a:xfrm>
+          <a:solidFill>
+            <a:schemeClr val="bg2">
+              <a:shade val="50000"/>
+            </a:schemeClr>
+          </a:solidFill>
+        </p:spPr>
+        <p:txBody>
+          <a:bodyPr/>
+          <a:lstStyle>
+            <a:lvl1pPr marL="0" indent="0">
+              <a:buNone/>
+              <a:defRPr sz="3200"/>
+            </a:lvl1pPr>
+          </a:lstStyle>
+          <a:p>
+            <a:r>
+              <a:rPr kumimoji="0" lang="es-ES" smtClean="0"/>
+              <a:t>Haga clic en el icono para agregar una imagen</a:t>
+            </a:r>
+            <a:endParaRPr kumimoji="0" lang="en-US" dirty="0"/>
+          </a:p>
+        </p:txBody>
+      </p:sp>
+      <p:sp>
+        <p:nvSpPr>
+          <p:cNvPr id="4" name="3 Marcador de texto"/>
           <p:cNvSpPr>
             <a:spLocks noGrp="1"/>
           </p:cNvSpPr>
           <p:nvPr>
-            <p:ph type="dt" sz="half" idx="2"/>
+            <p:ph type="body" sz="half" idx="2"/>
           </p:nvPr>
         </p:nvSpPr>
         <p:spPr>
           <a:xfrm>
-            <a:off x="457200" y="6356350"/>
-            <a:ext cx="2133600" cy="365125"/>
-          </a:xfrm>
-          <a:prstGeom prst="rect">
-            <a:avLst/>
-          </a:prstGeom>
-        </p:spPr>
-        <p:txBody>
-          <a:bodyPr vert="horz" lIns="91440" tIns="45720" rIns="91440" bIns="45720" rtlCol="0" anchor="ctr"/>
+            <a:off x="1143000" y="5867400"/>
+            <a:ext cx="7333488" cy="685800"/>
+          </a:xfrm>
+          <a:solidFill>
+            <a:schemeClr val="accent1">
+              <a:alpha val="15000"/>
+            </a:schemeClr>
+          </a:solidFill>
+          <a:ln>
+            <a:solidFill>
+              <a:schemeClr val="accent1"/>
+            </a:solidFill>
+            <a:miter lim="800000"/>
+          </a:ln>
+        </p:spPr>
+        <p:txBody>
+          <a:bodyPr/>
           <a:lstStyle>
-            <a:lvl1pPr algn="l">
-              <a:defRPr sz="1200">
-                <a:solidFill>
-                  <a:schemeClr val="tx1">
-                    <a:tint val="75000"/>
-                  </a:schemeClr>
-                </a:solidFill>
-              </a:defRPr>
+            <a:lvl1pPr marL="0" indent="0">
+              <a:spcBef>
+                <a:spcPts val="0"/>
+              </a:spcBef>
+              <a:buNone/>
+              <a:defRPr sz="1400"/>
+            </a:lvl1pPr>
+            <a:lvl2pPr>
+              <a:defRPr sz="1200"/>
+            </a:lvl2pPr>
+            <a:lvl3pPr>
+              <a:defRPr sz="1000"/>
+            </a:lvl3pPr>
+            <a:lvl4pPr>
+              <a:defRPr sz="900"/>
+            </a:lvl4pPr>
+            <a:lvl5pPr>
+              <a:defRPr sz="900"/>
+            </a:lvl5pPr>
+          </a:lstStyle>
+          <a:p>
+            <a:pPr lvl="0" eaLnBrk="1" latinLnBrk="0" hangingPunct="1"/>
+            <a:r>
+              <a:rPr kumimoji="0" lang="es-ES" smtClean="0"/>
+              <a:t>Haga clic para modificar el estilo de texto del patrón</a:t>
+            </a:r>
+          </a:p>
+        </p:txBody>
+      </p:sp>
+      <p:sp>
+        <p:nvSpPr>
+          <p:cNvPr id="5" name="4 Marcador de fecha"/>
+          <p:cNvSpPr>
+            <a:spLocks noGrp="1"/>
+          </p:cNvSpPr>
+          <p:nvPr>
+            <p:ph type="dt" sz="half" idx="10"/>
+          </p:nvPr>
+        </p:nvSpPr>
+        <p:spPr>
+          <a:xfrm>
+            <a:off x="6108192" y="6556248"/>
+            <a:ext cx="2103120" cy="301752"/>
+          </a:xfrm>
+        </p:spPr>
+        <p:txBody>
+          <a:bodyPr/>
+          <a:lstStyle>
+            <a:lvl1pPr>
+              <a:defRPr sz="900"/>
             </a:lvl1pPr>
           </a:lstStyle>
           <a:p>
@@ -2692,71 +2790,53 @@
       </p:sp>
       <p:sp>
         <p:nvSpPr>
-          <p:cNvPr id="5" name="4 Marcador de pie de página"/>
+          <p:cNvPr id="6" name="5 Marcador de pie de página"/>
           <p:cNvSpPr>
             <a:spLocks noGrp="1"/>
           </p:cNvSpPr>
           <p:nvPr>
-            <p:ph type="ftr" sz="quarter" idx="3"/>
+            <p:ph type="ftr" sz="quarter" idx="11"/>
           </p:nvPr>
         </p:nvSpPr>
         <p:spPr>
           <a:xfrm>
-            <a:off x="3124200" y="6356350"/>
-            <a:ext cx="2895600" cy="365125"/>
-          </a:xfrm>
-          <a:prstGeom prst="rect">
-            <a:avLst/>
-          </a:prstGeom>
-        </p:spPr>
-        <p:txBody>
-          <a:bodyPr vert="horz" lIns="91440" tIns="45720" rIns="91440" bIns="45720" rtlCol="0" anchor="ctr"/>
+            <a:off x="1170432" y="6557169"/>
+            <a:ext cx="4948072" cy="301752"/>
+          </a:xfrm>
+        </p:spPr>
+        <p:txBody>
+          <a:bodyPr/>
+          <a:lstStyle>
+            <a:lvl1pPr>
+              <a:defRPr sz="900"/>
+            </a:lvl1pPr>
+          </a:lstStyle>
+          <a:p>
+            <a:endParaRPr lang="es-ES"/>
+          </a:p>
+        </p:txBody>
+      </p:sp>
+      <p:sp>
+        <p:nvSpPr>
+          <p:cNvPr id="7" name="6 Marcador de número de diapositiva"/>
+          <p:cNvSpPr>
+            <a:spLocks noGrp="1"/>
+          </p:cNvSpPr>
+          <p:nvPr>
+            <p:ph type="sldNum" sz="quarter" idx="12"/>
+          </p:nvPr>
+        </p:nvSpPr>
+        <p:spPr>
+          <a:xfrm>
+            <a:off x="8217192" y="6556248"/>
+            <a:ext cx="365760" cy="301752"/>
+          </a:xfrm>
+        </p:spPr>
+        <p:txBody>
+          <a:bodyPr/>
           <a:lstStyle>
             <a:lvl1pPr algn="ctr">
-              <a:defRPr sz="1200">
-                <a:solidFill>
-                  <a:schemeClr val="tx1">
-                    <a:tint val="75000"/>
-                  </a:schemeClr>
-                </a:solidFill>
-              </a:defRPr>
-            </a:lvl1pPr>
-          </a:lstStyle>
-          <a:p>
-            <a:endParaRPr lang="es-ES"/>
-          </a:p>
-        </p:txBody>
-      </p:sp>
-      <p:sp>
-        <p:nvSpPr>
-          <p:cNvPr id="6" name="5 Marcador de número de diapositiva"/>
-          <p:cNvSpPr>
-            <a:spLocks noGrp="1"/>
-          </p:cNvSpPr>
-          <p:nvPr>
-            <p:ph type="sldNum" sz="quarter" idx="4"/>
-          </p:nvPr>
-        </p:nvSpPr>
-        <p:spPr>
-          <a:xfrm>
-            <a:off x="6553200" y="6356350"/>
-            <a:ext cx="2133600" cy="365125"/>
-          </a:xfrm>
-          <a:prstGeom prst="rect">
-            <a:avLst/>
-          </a:prstGeom>
-        </p:spPr>
-        <p:txBody>
-          <a:bodyPr vert="horz" lIns="91440" tIns="45720" rIns="91440" bIns="45720" rtlCol="0" anchor="ctr"/>
-          <a:lstStyle>
-            <a:lvl1pPr algn="r">
-              <a:defRPr sz="1200">
-                <a:solidFill>
-                  <a:schemeClr val="tx1">
-                    <a:tint val="75000"/>
-                  </a:schemeClr>
-                </a:solidFill>
-              </a:defRPr>
+              <a:defRPr sz="900"/>
             </a:lvl1pPr>
           </a:lstStyle>
           <a:p>
@@ -2770,31 +2850,434 @@
       </p:sp>
     </p:spTree>
   </p:cSld>
-  <p:clrMap bg1="lt1" tx1="dk1" bg2="lt2" tx2="dk2" accent1="accent1" accent2="accent2" accent3="accent3" accent4="accent4" accent5="accent5" accent6="accent6" hlink="hlink" folHlink="folHlink"/>
+  <p:clrMapOvr>
+    <a:overrideClrMapping bg1="dk1" tx1="lt1" bg2="dk2" tx2="lt2" accent1="accent1" accent2="accent2" accent3="accent3" accent4="accent4" accent5="accent5" accent6="accent6" hlink="hlink" folHlink="folHlink"/>
+  </p:clrMapOvr>
+</p:sldLayout>
+</file>
+
+<file path=ppt/slideMasters/slideMaster1.xml><?xml version="1.0" encoding="utf-8"?>
+<p:sldMaster xmlns:a="http://schemas.openxmlformats.org/drawingml/2006/main" xmlns:r="http://schemas.openxmlformats.org/officeDocument/2006/relationships" xmlns:p="http://schemas.openxmlformats.org/presentationml/2006/main">
+  <p:cSld>
+    <p:bg>
+      <p:bgRef idx="1002">
+        <a:schemeClr val="bg2"/>
+      </p:bgRef>
+    </p:bg>
+    <p:spTree>
+      <p:nvGrpSpPr>
+        <p:cNvPr id="1" name=""/>
+        <p:cNvGrpSpPr/>
+        <p:nvPr/>
+      </p:nvGrpSpPr>
+      <p:grpSpPr>
+        <a:xfrm>
+          <a:off x="0" y="0"/>
+          <a:ext cx="0" cy="0"/>
+          <a:chOff x="0" y="0"/>
+          <a:chExt cx="0" cy="0"/>
+        </a:xfrm>
+      </p:grpSpPr>
+      <p:sp>
+        <p:nvSpPr>
+          <p:cNvPr id="11" name="10 Triángulo rectángulo"/>
+          <p:cNvSpPr/>
+          <p:nvPr/>
+        </p:nvSpPr>
+        <p:spPr>
+          <a:xfrm>
+            <a:off x="7034" y="14068"/>
+            <a:ext cx="9129932" cy="6836899"/>
+          </a:xfrm>
+          <a:prstGeom prst="rtTriangle">
+            <a:avLst/>
+          </a:prstGeom>
+          <a:gradFill flip="none" rotWithShape="1">
+            <a:gsLst>
+              <a:gs pos="0">
+                <a:schemeClr val="tx2">
+                  <a:alpha val="10000"/>
+                </a:schemeClr>
+              </a:gs>
+              <a:gs pos="70000">
+                <a:schemeClr val="tx2">
+                  <a:alpha val="8000"/>
+                </a:schemeClr>
+              </a:gs>
+              <a:gs pos="100000">
+                <a:schemeClr val="tx2">
+                  <a:alpha val="1000"/>
+                </a:schemeClr>
+              </a:gs>
+            </a:gsLst>
+            <a:lin ang="8000000" scaled="1"/>
+            <a:tileRect/>
+          </a:gradFill>
+          <a:ln w="38100" cap="rnd" cmpd="sng" algn="ctr">
+            <a:noFill/>
+            <a:prstDash val="solid"/>
+          </a:ln>
+          <a:effectLst/>
+        </p:spPr>
+        <p:style>
+          <a:lnRef idx="3">
+            <a:schemeClr val="lt1"/>
+          </a:lnRef>
+          <a:fillRef idx="1">
+            <a:schemeClr val="accent1"/>
+          </a:fillRef>
+          <a:effectRef idx="1">
+            <a:schemeClr val="accent1"/>
+          </a:effectRef>
+          <a:fontRef idx="minor">
+            <a:schemeClr val="lt1"/>
+          </a:fontRef>
+        </p:style>
+        <p:txBody>
+          <a:bodyPr anchor="ctr"/>
+          <a:lstStyle/>
+          <a:p>
+            <a:pPr algn="ctr" eaLnBrk="1" latinLnBrk="0" hangingPunct="1"/>
+            <a:endParaRPr kumimoji="0" lang="en-US"/>
+          </a:p>
+        </p:txBody>
+      </p:sp>
+      <p:cxnSp>
+        <p:nvCxnSpPr>
+          <p:cNvPr id="8" name="7 Conector recto"/>
+          <p:cNvCxnSpPr/>
+          <p:nvPr/>
+        </p:nvCxnSpPr>
+        <p:spPr>
+          <a:xfrm>
+            <a:off x="0" y="7034"/>
+            <a:ext cx="9136966" cy="6843933"/>
+          </a:xfrm>
+          <a:prstGeom prst="line">
+            <a:avLst/>
+          </a:prstGeom>
+          <a:noFill/>
+          <a:ln w="5000" cap="rnd" cmpd="sng" algn="ctr">
+            <a:solidFill>
+              <a:schemeClr val="bg2">
+                <a:tint val="55000"/>
+                <a:satMod val="200000"/>
+                <a:alpha val="35000"/>
+              </a:schemeClr>
+            </a:solidFill>
+            <a:prstDash val="solid"/>
+          </a:ln>
+          <a:effectLst/>
+        </p:spPr>
+        <p:style>
+          <a:lnRef idx="2">
+            <a:schemeClr val="accent1"/>
+          </a:lnRef>
+          <a:fillRef idx="0">
+            <a:schemeClr val="accent1"/>
+          </a:fillRef>
+          <a:effectRef idx="1">
+            <a:schemeClr val="accent1"/>
+          </a:effectRef>
+          <a:fontRef idx="minor">
+            <a:schemeClr val="tx1"/>
+          </a:fontRef>
+        </p:style>
+      </p:cxnSp>
+      <p:cxnSp>
+        <p:nvCxnSpPr>
+          <p:cNvPr id="9" name="8 Conector recto"/>
+          <p:cNvCxnSpPr/>
+          <p:nvPr/>
+        </p:nvCxnSpPr>
+        <p:spPr>
+          <a:xfrm rot="10800000" flipV="1">
+            <a:off x="6468794" y="4948410"/>
+            <a:ext cx="2672861" cy="1900210"/>
+          </a:xfrm>
+          <a:prstGeom prst="line">
+            <a:avLst/>
+          </a:prstGeom>
+          <a:noFill/>
+          <a:ln w="6000" cap="rnd" cmpd="sng" algn="ctr">
+            <a:solidFill>
+              <a:schemeClr val="bg2">
+                <a:tint val="50000"/>
+                <a:satMod val="200000"/>
+                <a:alpha val="45000"/>
+              </a:schemeClr>
+            </a:solidFill>
+            <a:prstDash val="solid"/>
+          </a:ln>
+          <a:effectLst/>
+        </p:spPr>
+        <p:style>
+          <a:lnRef idx="2">
+            <a:schemeClr val="accent1"/>
+          </a:lnRef>
+          <a:fillRef idx="0">
+            <a:schemeClr val="accent1"/>
+          </a:fillRef>
+          <a:effectRef idx="1">
+            <a:schemeClr val="accent1"/>
+          </a:effectRef>
+          <a:fontRef idx="minor">
+            <a:schemeClr val="tx1"/>
+          </a:fontRef>
+        </p:style>
+      </p:cxnSp>
+      <p:sp>
+        <p:nvSpPr>
+          <p:cNvPr id="22" name="21 Marcador de título"/>
+          <p:cNvSpPr>
+            <a:spLocks noGrp="1"/>
+          </p:cNvSpPr>
+          <p:nvPr>
+            <p:ph type="title"/>
+          </p:nvPr>
+        </p:nvSpPr>
+        <p:spPr>
+          <a:xfrm>
+            <a:off x="457200" y="267494"/>
+            <a:ext cx="8229600" cy="1399032"/>
+          </a:xfrm>
+          <a:prstGeom prst="rect">
+            <a:avLst/>
+          </a:prstGeom>
+        </p:spPr>
+        <p:txBody>
+          <a:bodyPr vert="horz" anchor="ctr">
+            <a:normAutofit/>
+          </a:bodyPr>
+          <a:lstStyle/>
+          <a:p>
+            <a:r>
+              <a:rPr kumimoji="0" lang="es-ES" smtClean="0"/>
+              <a:t>Haga clic para modificar el estilo de título del patrón</a:t>
+            </a:r>
+            <a:endParaRPr kumimoji="0" lang="en-US"/>
+          </a:p>
+        </p:txBody>
+      </p:sp>
+      <p:sp>
+        <p:nvSpPr>
+          <p:cNvPr id="13" name="12 Marcador de texto"/>
+          <p:cNvSpPr>
+            <a:spLocks noGrp="1"/>
+          </p:cNvSpPr>
+          <p:nvPr>
+            <p:ph type="body" idx="1"/>
+          </p:nvPr>
+        </p:nvSpPr>
+        <p:spPr>
+          <a:xfrm>
+            <a:off x="457200" y="1882808"/>
+            <a:ext cx="8229600" cy="4572000"/>
+          </a:xfrm>
+          <a:prstGeom prst="rect">
+            <a:avLst/>
+          </a:prstGeom>
+        </p:spPr>
+        <p:txBody>
+          <a:bodyPr vert="horz" anchor="t">
+            <a:normAutofit/>
+          </a:bodyPr>
+          <a:lstStyle/>
+          <a:p>
+            <a:pPr lvl="0" eaLnBrk="1" latinLnBrk="0" hangingPunct="1"/>
+            <a:r>
+              <a:rPr kumimoji="0" lang="es-ES" smtClean="0"/>
+              <a:t>Haga clic para modificar el estilo de texto del patrón</a:t>
+            </a:r>
+          </a:p>
+          <a:p>
+            <a:pPr lvl="1" eaLnBrk="1" latinLnBrk="0" hangingPunct="1"/>
+            <a:r>
+              <a:rPr kumimoji="0" lang="es-ES" smtClean="0"/>
+              <a:t>Segundo nivel</a:t>
+            </a:r>
+          </a:p>
+          <a:p>
+            <a:pPr lvl="2" eaLnBrk="1" latinLnBrk="0" hangingPunct="1"/>
+            <a:r>
+              <a:rPr kumimoji="0" lang="es-ES" smtClean="0"/>
+              <a:t>Tercer nivel</a:t>
+            </a:r>
+          </a:p>
+          <a:p>
+            <a:pPr lvl="3" eaLnBrk="1" latinLnBrk="0" hangingPunct="1"/>
+            <a:r>
+              <a:rPr kumimoji="0" lang="es-ES" smtClean="0"/>
+              <a:t>Cuarto nivel</a:t>
+            </a:r>
+          </a:p>
+          <a:p>
+            <a:pPr lvl="4" eaLnBrk="1" latinLnBrk="0" hangingPunct="1"/>
+            <a:r>
+              <a:rPr kumimoji="0" lang="es-ES" smtClean="0"/>
+              <a:t>Quinto nivel</a:t>
+            </a:r>
+            <a:endParaRPr kumimoji="0" lang="en-US"/>
+          </a:p>
+        </p:txBody>
+      </p:sp>
+      <p:sp>
+        <p:nvSpPr>
+          <p:cNvPr id="14" name="13 Marcador de fecha"/>
+          <p:cNvSpPr>
+            <a:spLocks noGrp="1"/>
+          </p:cNvSpPr>
+          <p:nvPr>
+            <p:ph type="dt" sz="half" idx="2"/>
+          </p:nvPr>
+        </p:nvSpPr>
+        <p:spPr>
+          <a:xfrm>
+            <a:off x="4791456" y="6480969"/>
+            <a:ext cx="2133600" cy="301752"/>
+          </a:xfrm>
+          <a:prstGeom prst="rect">
+            <a:avLst/>
+          </a:prstGeom>
+        </p:spPr>
+        <p:txBody>
+          <a:bodyPr vert="horz" anchor="b"/>
+          <a:lstStyle>
+            <a:lvl1pPr algn="l" eaLnBrk="1" latinLnBrk="0" hangingPunct="1">
+              <a:defRPr kumimoji="0" sz="1000" b="0">
+                <a:solidFill>
+                  <a:schemeClr val="tx1"/>
+                </a:solidFill>
+              </a:defRPr>
+            </a:lvl1pPr>
+          </a:lstStyle>
+          <a:p>
+            <a:fld id="{7A847CFC-816F-41D0-AAC0-9BF4FEBC753E}" type="datetimeFigureOut">
+              <a:rPr lang="es-ES" smtClean="0"/>
+              <a:t>18/05/2015</a:t>
+            </a:fld>
+            <a:endParaRPr lang="es-ES"/>
+          </a:p>
+        </p:txBody>
+      </p:sp>
+      <p:sp>
+        <p:nvSpPr>
+          <p:cNvPr id="3" name="2 Marcador de pie de página"/>
+          <p:cNvSpPr>
+            <a:spLocks noGrp="1"/>
+          </p:cNvSpPr>
+          <p:nvPr>
+            <p:ph type="ftr" sz="quarter" idx="3"/>
+          </p:nvPr>
+        </p:nvSpPr>
+        <p:spPr>
+          <a:xfrm>
+            <a:off x="457200" y="6481890"/>
+            <a:ext cx="4260056" cy="300831"/>
+          </a:xfrm>
+          <a:prstGeom prst="rect">
+            <a:avLst/>
+          </a:prstGeom>
+        </p:spPr>
+        <p:txBody>
+          <a:bodyPr vert="horz" anchor="b"/>
+          <a:lstStyle>
+            <a:lvl1pPr algn="r" eaLnBrk="1" latinLnBrk="0" hangingPunct="1">
+              <a:defRPr kumimoji="0" sz="1000">
+                <a:solidFill>
+                  <a:schemeClr val="tx1"/>
+                </a:solidFill>
+              </a:defRPr>
+            </a:lvl1pPr>
+          </a:lstStyle>
+          <a:p>
+            <a:endParaRPr lang="es-ES"/>
+          </a:p>
+        </p:txBody>
+      </p:sp>
+      <p:sp>
+        <p:nvSpPr>
+          <p:cNvPr id="23" name="22 Marcador de número de diapositiva"/>
+          <p:cNvSpPr>
+            <a:spLocks noGrp="1"/>
+          </p:cNvSpPr>
+          <p:nvPr>
+            <p:ph type="sldNum" sz="quarter" idx="4"/>
+          </p:nvPr>
+        </p:nvSpPr>
+        <p:spPr>
+          <a:xfrm>
+            <a:off x="7589520" y="6480969"/>
+            <a:ext cx="502920" cy="301752"/>
+          </a:xfrm>
+          <a:prstGeom prst="rect">
+            <a:avLst/>
+          </a:prstGeom>
+        </p:spPr>
+        <p:txBody>
+          <a:bodyPr vert="horz" anchor="b"/>
+          <a:lstStyle>
+            <a:lvl1pPr algn="ctr" eaLnBrk="1" latinLnBrk="0" hangingPunct="1">
+              <a:defRPr kumimoji="0" sz="1200">
+                <a:solidFill>
+                  <a:schemeClr val="tx1"/>
+                </a:solidFill>
+              </a:defRPr>
+            </a:lvl1pPr>
+          </a:lstStyle>
+          <a:p>
+            <a:fld id="{132FADFE-3B8F-471C-ABF0-DBC7717ECBBC}" type="slidenum">
+              <a:rPr lang="es-ES" smtClean="0"/>
+              <a:t>‹Nº›</a:t>
+            </a:fld>
+            <a:endParaRPr lang="es-ES"/>
+          </a:p>
+        </p:txBody>
+      </p:sp>
+    </p:spTree>
+  </p:cSld>
+  <p:clrMap bg1="dk1" tx1="lt1" bg2="dk2" tx2="lt2" accent1="accent1" accent2="accent2" accent3="accent3" accent4="accent4" accent5="accent5" accent6="accent6" hlink="hlink" folHlink="folHlink"/>
   <p:sldLayoutIdLst>
-    <p:sldLayoutId id="2147483649" r:id="rId1"/>
-    <p:sldLayoutId id="2147483650" r:id="rId2"/>
-    <p:sldLayoutId id="2147483651" r:id="rId3"/>
-    <p:sldLayoutId id="2147483652" r:id="rId4"/>
-    <p:sldLayoutId id="2147483653" r:id="rId5"/>
-    <p:sldLayoutId id="2147483654" r:id="rId6"/>
-    <p:sldLayoutId id="2147483655" r:id="rId7"/>
-    <p:sldLayoutId id="2147483656" r:id="rId8"/>
-    <p:sldLayoutId id="2147483657" r:id="rId9"/>
-    <p:sldLayoutId id="2147483658" r:id="rId10"/>
-    <p:sldLayoutId id="2147483659" r:id="rId11"/>
+    <p:sldLayoutId id="2147483673" r:id="rId1"/>
+    <p:sldLayoutId id="2147483674" r:id="rId2"/>
+    <p:sldLayoutId id="2147483675" r:id="rId3"/>
+    <p:sldLayoutId id="2147483676" r:id="rId4"/>
+    <p:sldLayoutId id="2147483677" r:id="rId5"/>
+    <p:sldLayoutId id="2147483678" r:id="rId6"/>
+    <p:sldLayoutId id="2147483679" r:id="rId7"/>
+    <p:sldLayoutId id="2147483680" r:id="rId8"/>
+    <p:sldLayoutId id="2147483681" r:id="rId9"/>
+    <p:sldLayoutId id="2147483682" r:id="rId10"/>
+    <p:sldLayoutId id="2147483683" r:id="rId11"/>
   </p:sldLayoutIdLst>
   <p:txStyles>
     <p:titleStyle>
-      <a:lvl1pPr algn="ctr" defTabSz="914400" rtl="0" eaLnBrk="1" latinLnBrk="0" hangingPunct="1">
+      <a:lvl1pPr marL="484632" algn="l" rtl="0" eaLnBrk="1" latinLnBrk="0" hangingPunct="1">
         <a:spcBef>
           <a:spcPct val="0"/>
         </a:spcBef>
         <a:buNone/>
-        <a:defRPr sz="4400" kern="1200">
+        <a:defRPr kumimoji="0" sz="4200" kern="1200">
+          <a:ln w="6350">
+            <a:solidFill>
+              <a:schemeClr val="accent1">
+                <a:shade val="43000"/>
+              </a:schemeClr>
+            </a:solidFill>
+          </a:ln>
           <a:solidFill>
-            <a:schemeClr val="tx1"/>
+            <a:schemeClr val="accent1">
+              <a:tint val="83000"/>
+              <a:satMod val="150000"/>
+            </a:schemeClr>
           </a:solidFill>
+          <a:effectLst>
+            <a:outerShdw blurRad="26000" dist="26000" dir="14500000" algn="tl" rotWithShape="0">
+              <a:srgbClr val="000000">
+                <a:alpha val="40000"/>
+              </a:srgbClr>
+            </a:outerShdw>
+          </a:effectLst>
           <a:latin typeface="+mj-lt"/>
           <a:ea typeface="+mj-ea"/>
           <a:cs typeface="+mj-cs"/>
@@ -2802,13 +3285,17 @@
       </a:lvl1pPr>
     </p:titleStyle>
     <p:bodyStyle>
-      <a:lvl1pPr marL="342900" indent="-342900" algn="l" defTabSz="914400" rtl="0" eaLnBrk="1" latinLnBrk="0" hangingPunct="1">
+      <a:lvl1pPr marL="448056" indent="-384048" algn="l" rtl="0" eaLnBrk="1" latinLnBrk="0" hangingPunct="1">
         <a:spcBef>
           <a:spcPct val="20000"/>
         </a:spcBef>
-        <a:buFont typeface="Arial" pitchFamily="34" charset="0"/>
-        <a:buChar char="•"/>
-        <a:defRPr sz="3200" kern="1200">
+        <a:buClr>
+          <a:schemeClr val="accent1"/>
+        </a:buClr>
+        <a:buSzPct val="80000"/>
+        <a:buFont typeface="Wingdings 2"/>
+        <a:buChar char=""/>
+        <a:defRPr kumimoji="0" sz="3000" kern="1200">
           <a:solidFill>
             <a:schemeClr val="tx1"/>
           </a:solidFill>
@@ -2817,13 +3304,17 @@
           <a:cs typeface="+mn-cs"/>
         </a:defRPr>
       </a:lvl1pPr>
-      <a:lvl2pPr marL="742950" indent="-285750" algn="l" defTabSz="914400" rtl="0" eaLnBrk="1" latinLnBrk="0" hangingPunct="1">
+      <a:lvl2pPr marL="822960" indent="-285750" algn="l" rtl="0" eaLnBrk="1" latinLnBrk="0" hangingPunct="1">
         <a:spcBef>
           <a:spcPct val="20000"/>
         </a:spcBef>
-        <a:buFont typeface="Arial" pitchFamily="34" charset="0"/>
-        <a:buChar char="–"/>
-        <a:defRPr sz="2800" kern="1200">
+        <a:buClr>
+          <a:schemeClr val="accent1"/>
+        </a:buClr>
+        <a:buSzPct val="95000"/>
+        <a:buFont typeface="Verdana"/>
+        <a:buChar char="›"/>
+        <a:defRPr kumimoji="0" sz="2600" kern="1200">
           <a:solidFill>
             <a:schemeClr val="tx1"/>
           </a:solidFill>
@@ -2832,13 +3323,16 @@
           <a:cs typeface="+mn-cs"/>
         </a:defRPr>
       </a:lvl2pPr>
-      <a:lvl3pPr marL="1143000" indent="-228600" algn="l" defTabSz="914400" rtl="0" eaLnBrk="1" latinLnBrk="0" hangingPunct="1">
+      <a:lvl3pPr marL="1106424" indent="-228600" algn="l" rtl="0" eaLnBrk="1" latinLnBrk="0" hangingPunct="1">
         <a:spcBef>
           <a:spcPct val="20000"/>
         </a:spcBef>
-        <a:buFont typeface="Arial" pitchFamily="34" charset="0"/>
-        <a:buChar char="•"/>
-        <a:defRPr sz="2400" kern="1200">
+        <a:buClr>
+          <a:schemeClr val="accent1"/>
+        </a:buClr>
+        <a:buFont typeface="Wingdings 2"/>
+        <a:buChar char=""/>
+        <a:defRPr kumimoji="0" sz="2400" kern="1200">
           <a:solidFill>
             <a:schemeClr val="tx1"/>
           </a:solidFill>
@@ -2847,13 +3341,16 @@
           <a:cs typeface="+mn-cs"/>
         </a:defRPr>
       </a:lvl3pPr>
-      <a:lvl4pPr marL="1600200" indent="-228600" algn="l" defTabSz="914400" rtl="0" eaLnBrk="1" latinLnBrk="0" hangingPunct="1">
+      <a:lvl4pPr marL="1371600" indent="-210312" algn="l" rtl="0" eaLnBrk="1" latinLnBrk="0" hangingPunct="1">
         <a:spcBef>
           <a:spcPct val="20000"/>
         </a:spcBef>
-        <a:buFont typeface="Arial" pitchFamily="34" charset="0"/>
-        <a:buChar char="–"/>
-        <a:defRPr sz="2000" kern="1200">
+        <a:buClr>
+          <a:schemeClr val="accent1"/>
+        </a:buClr>
+        <a:buFont typeface="Wingdings 2"/>
+        <a:buChar char=""/>
+        <a:defRPr kumimoji="0" sz="2000" kern="1200">
           <a:solidFill>
             <a:schemeClr val="tx1"/>
           </a:solidFill>
@@ -2862,13 +3359,18 @@
           <a:cs typeface="+mn-cs"/>
         </a:defRPr>
       </a:lvl4pPr>
-      <a:lvl5pPr marL="2057400" indent="-228600" algn="l" defTabSz="914400" rtl="0" eaLnBrk="1" latinLnBrk="0" hangingPunct="1">
+      <a:lvl5pPr marL="1600200" indent="-210312" algn="l" rtl="0" eaLnBrk="1" latinLnBrk="0" hangingPunct="1">
         <a:spcBef>
           <a:spcPct val="20000"/>
         </a:spcBef>
-        <a:buFont typeface="Arial" pitchFamily="34" charset="0"/>
-        <a:buChar char="»"/>
-        <a:defRPr sz="2000" kern="1200">
+        <a:buClr>
+          <a:schemeClr val="accent1">
+            <a:tint val="75000"/>
+          </a:schemeClr>
+        </a:buClr>
+        <a:buFont typeface="Wingdings 2"/>
+        <a:buChar char=""/>
+        <a:defRPr kumimoji="0" sz="1900" kern="1200">
           <a:solidFill>
             <a:schemeClr val="tx1"/>
           </a:solidFill>
@@ -2877,13 +3379,18 @@
           <a:cs typeface="+mn-cs"/>
         </a:defRPr>
       </a:lvl5pPr>
-      <a:lvl6pPr marL="2514600" indent="-228600" algn="l" defTabSz="914400" rtl="0" eaLnBrk="1" latinLnBrk="0" hangingPunct="1">
+      <a:lvl6pPr marL="1828800" indent="-210312" algn="l" rtl="0" eaLnBrk="1" latinLnBrk="0" hangingPunct="1">
         <a:spcBef>
           <a:spcPct val="20000"/>
         </a:spcBef>
-        <a:buFont typeface="Arial" pitchFamily="34" charset="0"/>
-        <a:buChar char="•"/>
-        <a:defRPr sz="2000" kern="1200">
+        <a:buClr>
+          <a:schemeClr val="accent1">
+            <a:tint val="75000"/>
+          </a:schemeClr>
+        </a:buClr>
+        <a:buFont typeface="Wingdings 2"/>
+        <a:buChar char=""/>
+        <a:defRPr kumimoji="0" sz="1800" kern="1200">
           <a:solidFill>
             <a:schemeClr val="tx1"/>
           </a:solidFill>
@@ -2892,13 +3399,18 @@
           <a:cs typeface="+mn-cs"/>
         </a:defRPr>
       </a:lvl6pPr>
-      <a:lvl7pPr marL="2971800" indent="-228600" algn="l" defTabSz="914400" rtl="0" eaLnBrk="1" latinLnBrk="0" hangingPunct="1">
+      <a:lvl7pPr marL="2084832" indent="-210312" algn="l" rtl="0" eaLnBrk="1" latinLnBrk="0" hangingPunct="1">
         <a:spcBef>
           <a:spcPct val="20000"/>
         </a:spcBef>
-        <a:buFont typeface="Arial" pitchFamily="34" charset="0"/>
-        <a:buChar char="•"/>
-        <a:defRPr sz="2000" kern="1200">
+        <a:buClr>
+          <a:schemeClr val="accent1">
+            <a:tint val="75000"/>
+          </a:schemeClr>
+        </a:buClr>
+        <a:buFont typeface="Wingdings 2"/>
+        <a:buChar char=""/>
+        <a:defRPr kumimoji="0" sz="1600" kern="1200">
           <a:solidFill>
             <a:schemeClr val="tx1"/>
           </a:solidFill>
@@ -2907,13 +3419,18 @@
           <a:cs typeface="+mn-cs"/>
         </a:defRPr>
       </a:lvl7pPr>
-      <a:lvl8pPr marL="3429000" indent="-228600" algn="l" defTabSz="914400" rtl="0" eaLnBrk="1" latinLnBrk="0" hangingPunct="1">
+      <a:lvl8pPr marL="2286000" indent="-182880" algn="l" rtl="0" eaLnBrk="1" latinLnBrk="0" hangingPunct="1">
         <a:spcBef>
           <a:spcPct val="20000"/>
         </a:spcBef>
-        <a:buFont typeface="Arial" pitchFamily="34" charset="0"/>
-        <a:buChar char="•"/>
-        <a:defRPr sz="2000" kern="1200">
+        <a:buClr>
+          <a:schemeClr val="accent1">
+            <a:tint val="75000"/>
+          </a:schemeClr>
+        </a:buClr>
+        <a:buFont typeface="Wingdings 2"/>
+        <a:buChar char=""/>
+        <a:defRPr kumimoji="0" sz="1600" kern="1200">
           <a:solidFill>
             <a:schemeClr val="tx1"/>
           </a:solidFill>
@@ -2922,13 +3439,18 @@
           <a:cs typeface="+mn-cs"/>
         </a:defRPr>
       </a:lvl8pPr>
-      <a:lvl9pPr marL="3886200" indent="-228600" algn="l" defTabSz="914400" rtl="0" eaLnBrk="1" latinLnBrk="0" hangingPunct="1">
+      <a:lvl9pPr marL="2514600" indent="-182880" algn="l" rtl="0" eaLnBrk="1" latinLnBrk="0" hangingPunct="1">
         <a:spcBef>
           <a:spcPct val="20000"/>
         </a:spcBef>
-        <a:buFont typeface="Arial" pitchFamily="34" charset="0"/>
-        <a:buChar char="•"/>
-        <a:defRPr sz="2000" kern="1200">
+        <a:buClr>
+          <a:schemeClr val="accent1">
+            <a:tint val="75000"/>
+          </a:schemeClr>
+        </a:buClr>
+        <a:buFont typeface="Wingdings 2"/>
+        <a:buChar char=""/>
+        <a:defRPr kumimoji="0" sz="1600" kern="1200">
           <a:solidFill>
             <a:schemeClr val="tx1"/>
           </a:solidFill>
@@ -2939,11 +3461,8 @@
       </a:lvl9pPr>
     </p:bodyStyle>
     <p:otherStyle>
-      <a:defPPr>
-        <a:defRPr lang="es-ES"/>
-      </a:defPPr>
-      <a:lvl1pPr marL="0" algn="l" defTabSz="914400" rtl="0" eaLnBrk="1" latinLnBrk="0" hangingPunct="1">
-        <a:defRPr sz="1800" kern="1200">
+      <a:lvl1pPr marL="0" algn="l" rtl="0" eaLnBrk="1" latinLnBrk="0" hangingPunct="1">
+        <a:defRPr kumimoji="0" kern="1200">
           <a:solidFill>
             <a:schemeClr val="tx1"/>
           </a:solidFill>
@@ -2952,8 +3471,8 @@
           <a:cs typeface="+mn-cs"/>
         </a:defRPr>
       </a:lvl1pPr>
-      <a:lvl2pPr marL="457200" algn="l" defTabSz="914400" rtl="0" eaLnBrk="1" latinLnBrk="0" hangingPunct="1">
-        <a:defRPr sz="1800" kern="1200">
+      <a:lvl2pPr marL="457200" algn="l" rtl="0" eaLnBrk="1" latinLnBrk="0" hangingPunct="1">
+        <a:defRPr kumimoji="0" kern="1200">
           <a:solidFill>
             <a:schemeClr val="tx1"/>
           </a:solidFill>
@@ -2962,8 +3481,8 @@
           <a:cs typeface="+mn-cs"/>
         </a:defRPr>
       </a:lvl2pPr>
-      <a:lvl3pPr marL="914400" algn="l" defTabSz="914400" rtl="0" eaLnBrk="1" latinLnBrk="0" hangingPunct="1">
-        <a:defRPr sz="1800" kern="1200">
+      <a:lvl3pPr marL="914400" algn="l" rtl="0" eaLnBrk="1" latinLnBrk="0" hangingPunct="1">
+        <a:defRPr kumimoji="0" kern="1200">
           <a:solidFill>
             <a:schemeClr val="tx1"/>
           </a:solidFill>
@@ -2972,8 +3491,8 @@
           <a:cs typeface="+mn-cs"/>
         </a:defRPr>
       </a:lvl3pPr>
-      <a:lvl4pPr marL="1371600" algn="l" defTabSz="914400" rtl="0" eaLnBrk="1" latinLnBrk="0" hangingPunct="1">
-        <a:defRPr sz="1800" kern="1200">
+      <a:lvl4pPr marL="1371600" algn="l" rtl="0" eaLnBrk="1" latinLnBrk="0" hangingPunct="1">
+        <a:defRPr kumimoji="0" kern="1200">
           <a:solidFill>
             <a:schemeClr val="tx1"/>
           </a:solidFill>
@@ -2982,8 +3501,8 @@
           <a:cs typeface="+mn-cs"/>
         </a:defRPr>
       </a:lvl4pPr>
-      <a:lvl5pPr marL="1828800" algn="l" defTabSz="914400" rtl="0" eaLnBrk="1" latinLnBrk="0" hangingPunct="1">
-        <a:defRPr sz="1800" kern="1200">
+      <a:lvl5pPr marL="1828800" algn="l" rtl="0" eaLnBrk="1" latinLnBrk="0" hangingPunct="1">
+        <a:defRPr kumimoji="0" kern="1200">
           <a:solidFill>
             <a:schemeClr val="tx1"/>
           </a:solidFill>
@@ -2992,8 +3511,8 @@
           <a:cs typeface="+mn-cs"/>
         </a:defRPr>
       </a:lvl5pPr>
-      <a:lvl6pPr marL="2286000" algn="l" defTabSz="914400" rtl="0" eaLnBrk="1" latinLnBrk="0" hangingPunct="1">
-        <a:defRPr sz="1800" kern="1200">
+      <a:lvl6pPr marL="2286000" algn="l" rtl="0" eaLnBrk="1" latinLnBrk="0" hangingPunct="1">
+        <a:defRPr kumimoji="0" kern="1200">
           <a:solidFill>
             <a:schemeClr val="tx1"/>
           </a:solidFill>
@@ -3002,8 +3521,8 @@
           <a:cs typeface="+mn-cs"/>
         </a:defRPr>
       </a:lvl6pPr>
-      <a:lvl7pPr marL="2743200" algn="l" defTabSz="914400" rtl="0" eaLnBrk="1" latinLnBrk="0" hangingPunct="1">
-        <a:defRPr sz="1800" kern="1200">
+      <a:lvl7pPr marL="2743200" algn="l" rtl="0" eaLnBrk="1" latinLnBrk="0" hangingPunct="1">
+        <a:defRPr kumimoji="0" kern="1200">
           <a:solidFill>
             <a:schemeClr val="tx1"/>
           </a:solidFill>
@@ -3012,8 +3531,8 @@
           <a:cs typeface="+mn-cs"/>
         </a:defRPr>
       </a:lvl7pPr>
-      <a:lvl8pPr marL="3200400" algn="l" defTabSz="914400" rtl="0" eaLnBrk="1" latinLnBrk="0" hangingPunct="1">
-        <a:defRPr sz="1800" kern="1200">
+      <a:lvl8pPr marL="3200400" algn="l" rtl="0" eaLnBrk="1" latinLnBrk="0" hangingPunct="1">
+        <a:defRPr kumimoji="0" kern="1200">
           <a:solidFill>
             <a:schemeClr val="tx1"/>
           </a:solidFill>
@@ -3022,8 +3541,8 @@
           <a:cs typeface="+mn-cs"/>
         </a:defRPr>
       </a:lvl8pPr>
-      <a:lvl9pPr marL="3657600" algn="l" defTabSz="914400" rtl="0" eaLnBrk="1" latinLnBrk="0" hangingPunct="1">
-        <a:defRPr sz="1800" kern="1200">
+      <a:lvl9pPr marL="3657600" algn="l" rtl="0" eaLnBrk="1" latinLnBrk="0" hangingPunct="1">
+        <a:defRPr kumimoji="0" kern="1200">
           <a:solidFill>
             <a:schemeClr val="tx1"/>
           </a:solidFill>
@@ -3158,7 +3677,7 @@
         <p:spPr>
           <a:xfrm>
             <a:off x="0" y="1052736"/>
-            <a:ext cx="6779492" cy="1054250"/>
+            <a:ext cx="8460432" cy="1054250"/>
           </a:xfrm>
           <a:prstGeom prst="rect">
             <a:avLst/>
@@ -3320,7 +3839,7 @@
         <p:spPr>
           <a:xfrm>
             <a:off x="107504" y="332656"/>
-            <a:ext cx="6779492" cy="1054250"/>
+            <a:ext cx="8496944" cy="1054250"/>
           </a:xfrm>
           <a:prstGeom prst="rect">
             <a:avLst/>
@@ -4047,6 +4566,54 @@
           </a:p>
         </p:txBody>
       </p:sp>
+      <p:sp>
+        <p:nvSpPr>
+          <p:cNvPr id="5" name="2 Marcador de contenido"/>
+          <p:cNvSpPr>
+            <a:spLocks noGrp="1"/>
+          </p:cNvSpPr>
+          <p:nvPr>
+            <p:ph idx="1"/>
+          </p:nvPr>
+        </p:nvSpPr>
+        <p:spPr>
+          <a:xfrm>
+            <a:off x="251520" y="1196752"/>
+            <a:ext cx="6264696" cy="4824535"/>
+          </a:xfrm>
+        </p:spPr>
+        <p:txBody>
+          <a:bodyPr>
+            <a:normAutofit fontScale="92500" lnSpcReduction="20000"/>
+          </a:bodyPr>
+          <a:lstStyle/>
+          <a:p>
+            <a:r>
+              <a:rPr lang="es-ES" sz="2800" dirty="0" smtClean="0"/>
+              <a:t>Las referencia a celdas identifican una celda o grupo de celdas de un libro.</a:t>
+            </a:r>
+          </a:p>
+          <a:p>
+            <a:r>
+              <a:rPr lang="es-ES" sz="2800" dirty="0" smtClean="0"/>
+              <a:t>Se usan para vincular el resultado de una formula a las celdas referenciadas.</a:t>
+            </a:r>
+          </a:p>
+          <a:p>
+            <a:r>
+              <a:rPr lang="es-ES" sz="2800" dirty="0" smtClean="0"/>
+              <a:t>A través del ‘=‘, se puede referenciar la celda a operar.</a:t>
+            </a:r>
+          </a:p>
+          <a:p>
+            <a:r>
+              <a:rPr lang="es-ES" sz="2800" dirty="0" smtClean="0"/>
+              <a:t>Los rangos de celdas se introducen por medio del operador ‘:’, que separa a la referencia a la primera celda del rango, de la ultima celda.</a:t>
+            </a:r>
+            <a:endParaRPr lang="es-ES" sz="2800" dirty="0"/>
+          </a:p>
+        </p:txBody>
+      </p:sp>
       <p:pic>
         <p:nvPicPr>
           <p:cNvPr id="4" name="3 Imagen"/>
@@ -4077,54 +4644,6 @@
           </a:prstGeom>
         </p:spPr>
       </p:pic>
-      <p:sp>
-        <p:nvSpPr>
-          <p:cNvPr id="5" name="2 Marcador de contenido"/>
-          <p:cNvSpPr>
-            <a:spLocks noGrp="1"/>
-          </p:cNvSpPr>
-          <p:nvPr>
-            <p:ph idx="1"/>
-          </p:nvPr>
-        </p:nvSpPr>
-        <p:spPr>
-          <a:xfrm>
-            <a:off x="251520" y="1196752"/>
-            <a:ext cx="6264696" cy="4824535"/>
-          </a:xfrm>
-        </p:spPr>
-        <p:txBody>
-          <a:bodyPr>
-            <a:normAutofit/>
-          </a:bodyPr>
-          <a:lstStyle/>
-          <a:p>
-            <a:r>
-              <a:rPr lang="es-ES" sz="2800" dirty="0" smtClean="0"/>
-              <a:t>Las referencia a celdas identifican una celda o grupo de celdas de un libro.</a:t>
-            </a:r>
-          </a:p>
-          <a:p>
-            <a:r>
-              <a:rPr lang="es-ES" sz="2800" dirty="0" smtClean="0"/>
-              <a:t>Se usan para vincular el resultado de una formula a las celdas referenciadas.</a:t>
-            </a:r>
-          </a:p>
-          <a:p>
-            <a:r>
-              <a:rPr lang="es-ES" sz="2800" dirty="0" smtClean="0"/>
-              <a:t>A través del ‘=‘, se puede referenciar la celda a operar.</a:t>
-            </a:r>
-          </a:p>
-          <a:p>
-            <a:r>
-              <a:rPr lang="es-ES" sz="2800" dirty="0" smtClean="0"/>
-              <a:t>Los rangos de celdas se introducen por medio del operador ‘:’, que separa a la referencia a la primera celda del rango, de la ultima celda.</a:t>
-            </a:r>
-            <a:endParaRPr lang="es-ES" sz="2800" dirty="0"/>
-          </a:p>
-        </p:txBody>
-      </p:sp>
       <p:pic>
         <p:nvPicPr>
           <p:cNvPr id="6" name="5 Imagen"/>
@@ -4239,7 +4758,7 @@
         </p:spPr>
         <p:txBody>
           <a:bodyPr>
-            <a:normAutofit lnSpcReduction="10000"/>
+            <a:normAutofit fontScale="92500" lnSpcReduction="20000"/>
           </a:bodyPr>
           <a:lstStyle/>
           <a:p>
@@ -4578,8 +5097,8 @@
         </p:blipFill>
         <p:spPr>
           <a:xfrm>
-            <a:off x="3491880" y="2026033"/>
-            <a:ext cx="5112568" cy="3672408"/>
+            <a:off x="2519362" y="3273425"/>
+            <a:ext cx="4105275" cy="1790700"/>
           </a:xfrm>
         </p:spPr>
       </p:pic>
@@ -4602,7 +5121,7 @@
         </p:spPr>
         <p:txBody>
           <a:bodyPr vert="horz" lIns="91440" tIns="45720" rIns="91440" bIns="45720" rtlCol="0">
-            <a:normAutofit/>
+            <a:normAutofit lnSpcReduction="10000"/>
           </a:bodyPr>
           <a:lstStyle>
             <a:lvl1pPr marL="342900" indent="-342900" algn="l" defTabSz="914400" rtl="0" eaLnBrk="1" latinLnBrk="0" hangingPunct="1">
@@ -4822,6 +5341,13 @@
   <p:clrMapOvr>
     <a:masterClrMapping/>
   </p:clrMapOvr>
+  <p:timing>
+    <p:tnLst>
+      <p:par>
+        <p:cTn id="1" dur="indefinite" restart="never" nodeType="tmRoot"/>
+      </p:par>
+    </p:tnLst>
+  </p:timing>
 </p:sld>
 </file>
 
@@ -4917,38 +5443,494 @@
             <p:ph type="title"/>
           </p:nvPr>
         </p:nvSpPr>
-        <p:spPr/>
-        <p:txBody>
-          <a:bodyPr/>
+        <p:spPr>
+          <a:xfrm>
+            <a:off x="446856" y="476672"/>
+            <a:ext cx="8229600" cy="778098"/>
+          </a:xfrm>
+        </p:spPr>
+        <p:txBody>
+          <a:bodyPr>
+            <a:noAutofit/>
+          </a:bodyPr>
           <a:lstStyle/>
           <a:p>
-            <a:endParaRPr lang="es-ES"/>
-          </a:p>
-        </p:txBody>
-      </p:sp>
-      <p:sp>
-        <p:nvSpPr>
-          <p:cNvPr id="3" name="2 Marcador de contenido"/>
-          <p:cNvSpPr>
-            <a:spLocks noGrp="1"/>
-          </p:cNvSpPr>
-          <p:nvPr>
-            <p:ph idx="1"/>
-          </p:nvPr>
-        </p:nvSpPr>
-        <p:spPr/>
-        <p:txBody>
-          <a:bodyPr/>
-          <a:lstStyle/>
-          <a:p>
-            <a:endParaRPr lang="es-ES"/>
-          </a:p>
-        </p:txBody>
-      </p:sp>
+            <a:r>
+              <a:rPr lang="es-ES" sz="3600" dirty="0"/>
+              <a:t>Formato Condicional por Valor de Celda </a:t>
+            </a:r>
+            <a:br>
+              <a:rPr lang="es-ES" sz="3600" dirty="0"/>
+            </a:br>
+            <a:endParaRPr lang="es-ES" sz="3600" dirty="0"/>
+          </a:p>
+        </p:txBody>
+      </p:sp>
+      <p:sp>
+        <p:nvSpPr>
+          <p:cNvPr id="4" name="2 Marcador de contenido"/>
+          <p:cNvSpPr txBox="1">
+            <a:spLocks/>
+          </p:cNvSpPr>
+          <p:nvPr/>
+        </p:nvSpPr>
+        <p:spPr>
+          <a:xfrm>
+            <a:off x="374010" y="1844824"/>
+            <a:ext cx="4248472" cy="3456384"/>
+          </a:xfrm>
+          <a:prstGeom prst="rect">
+            <a:avLst/>
+          </a:prstGeom>
+        </p:spPr>
+        <p:txBody>
+          <a:bodyPr vert="horz" lIns="91440" tIns="45720" rIns="91440" bIns="45720" rtlCol="0">
+            <a:normAutofit/>
+          </a:bodyPr>
+          <a:lstStyle>
+            <a:lvl1pPr marL="342900" indent="-342900" algn="l" defTabSz="914400" rtl="0" eaLnBrk="1" latinLnBrk="0" hangingPunct="1">
+              <a:spcBef>
+                <a:spcPct val="20000"/>
+              </a:spcBef>
+              <a:buFont typeface="Arial" pitchFamily="34" charset="0"/>
+              <a:buChar char="•"/>
+              <a:defRPr sz="3200" kern="1200">
+                <a:solidFill>
+                  <a:schemeClr val="tx1"/>
+                </a:solidFill>
+                <a:latin typeface="+mn-lt"/>
+                <a:ea typeface="+mn-ea"/>
+                <a:cs typeface="+mn-cs"/>
+              </a:defRPr>
+            </a:lvl1pPr>
+            <a:lvl2pPr marL="742950" indent="-285750" algn="l" defTabSz="914400" rtl="0" eaLnBrk="1" latinLnBrk="0" hangingPunct="1">
+              <a:spcBef>
+                <a:spcPct val="20000"/>
+              </a:spcBef>
+              <a:buFont typeface="Arial" pitchFamily="34" charset="0"/>
+              <a:buChar char="–"/>
+              <a:defRPr sz="2800" kern="1200">
+                <a:solidFill>
+                  <a:schemeClr val="tx1"/>
+                </a:solidFill>
+                <a:latin typeface="+mn-lt"/>
+                <a:ea typeface="+mn-ea"/>
+                <a:cs typeface="+mn-cs"/>
+              </a:defRPr>
+            </a:lvl2pPr>
+            <a:lvl3pPr marL="1143000" indent="-228600" algn="l" defTabSz="914400" rtl="0" eaLnBrk="1" latinLnBrk="0" hangingPunct="1">
+              <a:spcBef>
+                <a:spcPct val="20000"/>
+              </a:spcBef>
+              <a:buFont typeface="Arial" pitchFamily="34" charset="0"/>
+              <a:buChar char="•"/>
+              <a:defRPr sz="2400" kern="1200">
+                <a:solidFill>
+                  <a:schemeClr val="tx1"/>
+                </a:solidFill>
+                <a:latin typeface="+mn-lt"/>
+                <a:ea typeface="+mn-ea"/>
+                <a:cs typeface="+mn-cs"/>
+              </a:defRPr>
+            </a:lvl3pPr>
+            <a:lvl4pPr marL="1600200" indent="-228600" algn="l" defTabSz="914400" rtl="0" eaLnBrk="1" latinLnBrk="0" hangingPunct="1">
+              <a:spcBef>
+                <a:spcPct val="20000"/>
+              </a:spcBef>
+              <a:buFont typeface="Arial" pitchFamily="34" charset="0"/>
+              <a:buChar char="–"/>
+              <a:defRPr sz="2000" kern="1200">
+                <a:solidFill>
+                  <a:schemeClr val="tx1"/>
+                </a:solidFill>
+                <a:latin typeface="+mn-lt"/>
+                <a:ea typeface="+mn-ea"/>
+                <a:cs typeface="+mn-cs"/>
+              </a:defRPr>
+            </a:lvl4pPr>
+            <a:lvl5pPr marL="2057400" indent="-228600" algn="l" defTabSz="914400" rtl="0" eaLnBrk="1" latinLnBrk="0" hangingPunct="1">
+              <a:spcBef>
+                <a:spcPct val="20000"/>
+              </a:spcBef>
+              <a:buFont typeface="Arial" pitchFamily="34" charset="0"/>
+              <a:buChar char="»"/>
+              <a:defRPr sz="2000" kern="1200">
+                <a:solidFill>
+                  <a:schemeClr val="tx1"/>
+                </a:solidFill>
+                <a:latin typeface="+mn-lt"/>
+                <a:ea typeface="+mn-ea"/>
+                <a:cs typeface="+mn-cs"/>
+              </a:defRPr>
+            </a:lvl5pPr>
+            <a:lvl6pPr marL="2514600" indent="-228600" algn="l" defTabSz="914400" rtl="0" eaLnBrk="1" latinLnBrk="0" hangingPunct="1">
+              <a:spcBef>
+                <a:spcPct val="20000"/>
+              </a:spcBef>
+              <a:buFont typeface="Arial" pitchFamily="34" charset="0"/>
+              <a:buChar char="•"/>
+              <a:defRPr sz="2000" kern="1200">
+                <a:solidFill>
+                  <a:schemeClr val="tx1"/>
+                </a:solidFill>
+                <a:latin typeface="+mn-lt"/>
+                <a:ea typeface="+mn-ea"/>
+                <a:cs typeface="+mn-cs"/>
+              </a:defRPr>
+            </a:lvl6pPr>
+            <a:lvl7pPr marL="2971800" indent="-228600" algn="l" defTabSz="914400" rtl="0" eaLnBrk="1" latinLnBrk="0" hangingPunct="1">
+              <a:spcBef>
+                <a:spcPct val="20000"/>
+              </a:spcBef>
+              <a:buFont typeface="Arial" pitchFamily="34" charset="0"/>
+              <a:buChar char="•"/>
+              <a:defRPr sz="2000" kern="1200">
+                <a:solidFill>
+                  <a:schemeClr val="tx1"/>
+                </a:solidFill>
+                <a:latin typeface="+mn-lt"/>
+                <a:ea typeface="+mn-ea"/>
+                <a:cs typeface="+mn-cs"/>
+              </a:defRPr>
+            </a:lvl7pPr>
+            <a:lvl8pPr marL="3429000" indent="-228600" algn="l" defTabSz="914400" rtl="0" eaLnBrk="1" latinLnBrk="0" hangingPunct="1">
+              <a:spcBef>
+                <a:spcPct val="20000"/>
+              </a:spcBef>
+              <a:buFont typeface="Arial" pitchFamily="34" charset="0"/>
+              <a:buChar char="•"/>
+              <a:defRPr sz="2000" kern="1200">
+                <a:solidFill>
+                  <a:schemeClr val="tx1"/>
+                </a:solidFill>
+                <a:latin typeface="+mn-lt"/>
+                <a:ea typeface="+mn-ea"/>
+                <a:cs typeface="+mn-cs"/>
+              </a:defRPr>
+            </a:lvl8pPr>
+            <a:lvl9pPr marL="3886200" indent="-228600" algn="l" defTabSz="914400" rtl="0" eaLnBrk="1" latinLnBrk="0" hangingPunct="1">
+              <a:spcBef>
+                <a:spcPct val="20000"/>
+              </a:spcBef>
+              <a:buFont typeface="Arial" pitchFamily="34" charset="0"/>
+              <a:buChar char="•"/>
+              <a:defRPr sz="2000" kern="1200">
+                <a:solidFill>
+                  <a:schemeClr val="tx1"/>
+                </a:solidFill>
+                <a:latin typeface="+mn-lt"/>
+                <a:ea typeface="+mn-ea"/>
+                <a:cs typeface="+mn-cs"/>
+              </a:defRPr>
+            </a:lvl9pPr>
+          </a:lstStyle>
+          <a:p>
+            <a:r>
+              <a:rPr lang="es-ES" sz="2800" dirty="0" smtClean="0"/>
+              <a:t>Seleccionar la celda a aplicar formato.</a:t>
+            </a:r>
+          </a:p>
+          <a:p>
+            <a:r>
+              <a:rPr lang="es-ES" sz="2800" dirty="0" smtClean="0"/>
+              <a:t>Formato Condicional -&gt; Nueva Regla.</a:t>
+            </a:r>
+          </a:p>
+          <a:p>
+            <a:endParaRPr lang="es-ES" sz="2800" dirty="0"/>
+          </a:p>
+        </p:txBody>
+      </p:sp>
+      <p:pic>
+        <p:nvPicPr>
+          <p:cNvPr id="5" name="4 Imagen"/>
+          <p:cNvPicPr>
+            <a:picLocks noChangeAspect="1"/>
+          </p:cNvPicPr>
+          <p:nvPr/>
+        </p:nvPicPr>
+        <p:blipFill>
+          <a:blip r:embed="rId2">
+            <a:extLst>
+              <a:ext uri="{28A0092B-C50C-407E-A947-70E740481C1C}">
+                <a14:useLocalDpi xmlns:a14="http://schemas.microsoft.com/office/drawing/2010/main" val="0"/>
+              </a:ext>
+            </a:extLst>
+          </a:blip>
+          <a:stretch>
+            <a:fillRect/>
+          </a:stretch>
+        </p:blipFill>
+        <p:spPr>
+          <a:xfrm>
+            <a:off x="4860032" y="1052736"/>
+            <a:ext cx="3816424" cy="5400600"/>
+          </a:xfrm>
+          <a:prstGeom prst="rect">
+            <a:avLst/>
+          </a:prstGeom>
+        </p:spPr>
+      </p:pic>
     </p:spTree>
     <p:extLst>
       <p:ext uri="{BB962C8B-B14F-4D97-AF65-F5344CB8AC3E}">
         <p14:creationId xmlns:p14="http://schemas.microsoft.com/office/powerpoint/2010/main" val="2374747077"/>
+      </p:ext>
+    </p:extLst>
+  </p:cSld>
+  <p:clrMapOvr>
+    <a:masterClrMapping/>
+  </p:clrMapOvr>
+  <p:timing>
+    <p:tnLst>
+      <p:par>
+        <p:cTn id="1" dur="indefinite" restart="never" nodeType="tmRoot"/>
+      </p:par>
+    </p:tnLst>
+  </p:timing>
+</p:sld>
+</file>
+
+<file path=ppt/slides/slide21.xml><?xml version="1.0" encoding="utf-8"?>
+<p:sld xmlns:a="http://schemas.openxmlformats.org/drawingml/2006/main" xmlns:r="http://schemas.openxmlformats.org/officeDocument/2006/relationships" xmlns:p="http://schemas.openxmlformats.org/presentationml/2006/main">
+  <p:cSld>
+    <p:spTree>
+      <p:nvGrpSpPr>
+        <p:cNvPr id="1" name=""/>
+        <p:cNvGrpSpPr/>
+        <p:nvPr/>
+      </p:nvGrpSpPr>
+      <p:grpSpPr>
+        <a:xfrm>
+          <a:off x="0" y="0"/>
+          <a:ext cx="0" cy="0"/>
+          <a:chOff x="0" y="0"/>
+          <a:chExt cx="0" cy="0"/>
+        </a:xfrm>
+      </p:grpSpPr>
+      <p:sp>
+        <p:nvSpPr>
+          <p:cNvPr id="3" name="2 Marcador de contenido"/>
+          <p:cNvSpPr>
+            <a:spLocks noGrp="1"/>
+          </p:cNvSpPr>
+          <p:nvPr>
+            <p:ph idx="1"/>
+          </p:nvPr>
+        </p:nvSpPr>
+        <p:spPr>
+          <a:xfrm>
+            <a:off x="457200" y="548680"/>
+            <a:ext cx="3610744" cy="6120680"/>
+          </a:xfrm>
+        </p:spPr>
+        <p:txBody>
+          <a:bodyPr>
+            <a:normAutofit fontScale="92500" lnSpcReduction="10000"/>
+          </a:bodyPr>
+          <a:lstStyle/>
+          <a:p>
+            <a:r>
+              <a:rPr lang="es-ES" dirty="0"/>
+              <a:t>Utilice una formula que determine la celdas para aplicar formato.</a:t>
+            </a:r>
+          </a:p>
+          <a:p>
+            <a:r>
+              <a:rPr lang="es-ES" dirty="0"/>
+              <a:t>Colocar la formula condicional.</a:t>
+            </a:r>
+          </a:p>
+          <a:p>
+            <a:r>
+              <a:rPr lang="es-ES" dirty="0"/>
+              <a:t>Colocar el formato para las celdas que cumplen la condición.</a:t>
+            </a:r>
+          </a:p>
+          <a:p>
+            <a:r>
+              <a:rPr lang="es-ES" dirty="0"/>
+              <a:t>Presionar </a:t>
+            </a:r>
+            <a:r>
+              <a:rPr lang="es-ES" dirty="0" err="1"/>
+              <a:t>click</a:t>
+            </a:r>
+            <a:r>
+              <a:rPr lang="es-ES" dirty="0"/>
+              <a:t> en Aceptar.</a:t>
+            </a:r>
+          </a:p>
+          <a:p>
+            <a:endParaRPr lang="es-ES" dirty="0"/>
+          </a:p>
+        </p:txBody>
+      </p:sp>
+      <p:pic>
+        <p:nvPicPr>
+          <p:cNvPr id="4" name="3 Imagen"/>
+          <p:cNvPicPr>
+            <a:picLocks noChangeAspect="1"/>
+          </p:cNvPicPr>
+          <p:nvPr/>
+        </p:nvPicPr>
+        <p:blipFill>
+          <a:blip r:embed="rId2">
+            <a:extLst>
+              <a:ext uri="{28A0092B-C50C-407E-A947-70E740481C1C}">
+                <a14:useLocalDpi xmlns:a14="http://schemas.microsoft.com/office/drawing/2010/main" val="0"/>
+              </a:ext>
+            </a:extLst>
+          </a:blip>
+          <a:stretch>
+            <a:fillRect/>
+          </a:stretch>
+        </p:blipFill>
+        <p:spPr>
+          <a:xfrm>
+            <a:off x="4280917" y="404664"/>
+            <a:ext cx="4854699" cy="6192688"/>
+          </a:xfrm>
+          <a:prstGeom prst="rect">
+            <a:avLst/>
+          </a:prstGeom>
+        </p:spPr>
+      </p:pic>
+    </p:spTree>
+    <p:extLst>
+      <p:ext uri="{BB962C8B-B14F-4D97-AF65-F5344CB8AC3E}">
+        <p14:creationId xmlns:p14="http://schemas.microsoft.com/office/powerpoint/2010/main" val="49662109"/>
+      </p:ext>
+    </p:extLst>
+  </p:cSld>
+  <p:clrMapOvr>
+    <a:masterClrMapping/>
+  </p:clrMapOvr>
+  <p:timing>
+    <p:tnLst>
+      <p:par>
+        <p:cTn id="1" dur="indefinite" restart="never" nodeType="tmRoot"/>
+      </p:par>
+    </p:tnLst>
+  </p:timing>
+</p:sld>
+</file>
+
+<file path=ppt/slides/slide22.xml><?xml version="1.0" encoding="utf-8"?>
+<p:sld xmlns:a="http://schemas.openxmlformats.org/drawingml/2006/main" xmlns:r="http://schemas.openxmlformats.org/officeDocument/2006/relationships" xmlns:p="http://schemas.openxmlformats.org/presentationml/2006/main">
+  <p:cSld>
+    <p:spTree>
+      <p:nvGrpSpPr>
+        <p:cNvPr id="1" name=""/>
+        <p:cNvGrpSpPr/>
+        <p:nvPr/>
+      </p:nvGrpSpPr>
+      <p:grpSpPr>
+        <a:xfrm>
+          <a:off x="0" y="0"/>
+          <a:ext cx="0" cy="0"/>
+          <a:chOff x="0" y="0"/>
+          <a:chExt cx="0" cy="0"/>
+        </a:xfrm>
+      </p:grpSpPr>
+      <p:sp>
+        <p:nvSpPr>
+          <p:cNvPr id="2" name="1 Título"/>
+          <p:cNvSpPr>
+            <a:spLocks noGrp="1"/>
+          </p:cNvSpPr>
+          <p:nvPr>
+            <p:ph type="title"/>
+          </p:nvPr>
+        </p:nvSpPr>
+        <p:spPr>
+          <a:xfrm>
+            <a:off x="611560" y="2996952"/>
+            <a:ext cx="8229600" cy="1143000"/>
+          </a:xfrm>
+        </p:spPr>
+        <p:txBody>
+          <a:bodyPr/>
+          <a:lstStyle/>
+          <a:p>
+            <a:r>
+              <a:rPr lang="es-ES" dirty="0" smtClean="0"/>
+              <a:t>Ejemplo</a:t>
+            </a:r>
+            <a:endParaRPr lang="es-ES" dirty="0"/>
+          </a:p>
+        </p:txBody>
+      </p:sp>
+    </p:spTree>
+    <p:extLst>
+      <p:ext uri="{BB962C8B-B14F-4D97-AF65-F5344CB8AC3E}">
+        <p14:creationId xmlns:p14="http://schemas.microsoft.com/office/powerpoint/2010/main" val="679948610"/>
+      </p:ext>
+    </p:extLst>
+  </p:cSld>
+  <p:clrMapOvr>
+    <a:masterClrMapping/>
+  </p:clrMapOvr>
+</p:sld>
+</file>
+
+<file path=ppt/slides/slide23.xml><?xml version="1.0" encoding="utf-8"?>
+<p:sld xmlns:a="http://schemas.openxmlformats.org/drawingml/2006/main" xmlns:r="http://schemas.openxmlformats.org/officeDocument/2006/relationships" xmlns:p="http://schemas.openxmlformats.org/presentationml/2006/main">
+  <p:cSld>
+    <p:spTree>
+      <p:nvGrpSpPr>
+        <p:cNvPr id="1" name=""/>
+        <p:cNvGrpSpPr/>
+        <p:nvPr/>
+      </p:nvGrpSpPr>
+      <p:grpSpPr>
+        <a:xfrm>
+          <a:off x="0" y="0"/>
+          <a:ext cx="0" cy="0"/>
+          <a:chOff x="0" y="0"/>
+          <a:chExt cx="0" cy="0"/>
+        </a:xfrm>
+      </p:grpSpPr>
+      <p:sp>
+        <p:nvSpPr>
+          <p:cNvPr id="3" name="2 Marcador de contenido"/>
+          <p:cNvSpPr>
+            <a:spLocks noGrp="1"/>
+          </p:cNvSpPr>
+          <p:nvPr>
+            <p:ph idx="1"/>
+          </p:nvPr>
+        </p:nvSpPr>
+        <p:spPr>
+          <a:xfrm>
+            <a:off x="457200" y="548681"/>
+            <a:ext cx="8229600" cy="3456384"/>
+          </a:xfrm>
+        </p:spPr>
+        <p:txBody>
+          <a:bodyPr/>
+          <a:lstStyle/>
+          <a:p>
+            <a:r>
+              <a:rPr lang="es-ES" dirty="0" smtClean="0"/>
+              <a:t>Escriba 10 nombres y apellidos de entre sus familiares, y luego coloque las edades de cada uno de ellos en la siguiente celda.</a:t>
+            </a:r>
+          </a:p>
+          <a:p>
+            <a:r>
+              <a:rPr lang="es-ES" dirty="0" smtClean="0"/>
+              <a:t>Para los familiares que son menor a 20 años, coloque un formato de color verde en su fila.</a:t>
+            </a:r>
+          </a:p>
+          <a:p>
+            <a:endParaRPr lang="es-ES" dirty="0"/>
+          </a:p>
+        </p:txBody>
+      </p:sp>
+    </p:spTree>
+    <p:extLst>
+      <p:ext uri="{BB962C8B-B14F-4D97-AF65-F5344CB8AC3E}">
+        <p14:creationId xmlns:p14="http://schemas.microsoft.com/office/powerpoint/2010/main" val="2462256379"/>
       </p:ext>
     </p:extLst>
   </p:cSld>
@@ -5074,7 +6056,12 @@
             <p:ph type="title"/>
           </p:nvPr>
         </p:nvSpPr>
-        <p:spPr/>
+        <p:spPr>
+          <a:xfrm>
+            <a:off x="457200" y="267494"/>
+            <a:ext cx="8229600" cy="857250"/>
+          </a:xfrm>
+        </p:spPr>
         <p:txBody>
           <a:bodyPr/>
           <a:lstStyle/>
@@ -5190,7 +6177,7 @@
         <p:spPr/>
         <p:txBody>
           <a:bodyPr>
-            <a:normAutofit lnSpcReduction="10000"/>
+            <a:normAutofit fontScale="92500" lnSpcReduction="10000"/>
           </a:bodyPr>
           <a:lstStyle/>
           <a:p>
@@ -5305,7 +6292,7 @@
         </p:spPr>
         <p:txBody>
           <a:bodyPr>
-            <a:normAutofit fontScale="92500" lnSpcReduction="20000"/>
+            <a:normAutofit fontScale="85000" lnSpcReduction="20000"/>
           </a:bodyPr>
           <a:lstStyle/>
           <a:p>
@@ -5440,7 +6427,9 @@
         </p:nvSpPr>
         <p:spPr/>
         <p:txBody>
-          <a:bodyPr/>
+          <a:bodyPr>
+            <a:normAutofit/>
+          </a:bodyPr>
           <a:lstStyle/>
           <a:p>
             <a:r>
@@ -5448,6 +6437,48 @@
               <a:t>Diferencia Valor - Apariencia</a:t>
             </a:r>
             <a:endParaRPr lang="es-ES" dirty="0"/>
+          </a:p>
+        </p:txBody>
+      </p:sp>
+      <p:sp>
+        <p:nvSpPr>
+          <p:cNvPr id="6" name="2 Marcador de contenido"/>
+          <p:cNvSpPr>
+            <a:spLocks noGrp="1"/>
+          </p:cNvSpPr>
+          <p:nvPr>
+            <p:ph idx="1"/>
+          </p:nvPr>
+        </p:nvSpPr>
+        <p:spPr>
+          <a:xfrm>
+            <a:off x="457199" y="2420888"/>
+            <a:ext cx="5666509" cy="3705275"/>
+          </a:xfrm>
+        </p:spPr>
+        <p:txBody>
+          <a:bodyPr>
+            <a:normAutofit/>
+          </a:bodyPr>
+          <a:lstStyle/>
+          <a:p>
+            <a:r>
+              <a:rPr lang="es-ES" sz="2800" dirty="0" smtClean="0"/>
+              <a:t>El valor de la celda es 4.</a:t>
+            </a:r>
+          </a:p>
+          <a:p>
+            <a:r>
+              <a:rPr lang="es-ES" sz="2800" dirty="0" smtClean="0"/>
+              <a:t>La apariencia se ve: $4,00.</a:t>
+            </a:r>
+          </a:p>
+          <a:p>
+            <a:r>
+              <a:rPr lang="es-ES" sz="2800" dirty="0" smtClean="0"/>
+              <a:t>Este resultado se puede obtener debido al formato de la celda </a:t>
+            </a:r>
+            <a:endParaRPr lang="es-ES" sz="2800" dirty="0"/>
           </a:p>
         </p:txBody>
       </p:sp>
@@ -5528,48 +6559,6 @@
           </a:prstGeom>
         </p:spPr>
       </p:pic>
-      <p:sp>
-        <p:nvSpPr>
-          <p:cNvPr id="6" name="2 Marcador de contenido"/>
-          <p:cNvSpPr>
-            <a:spLocks noGrp="1"/>
-          </p:cNvSpPr>
-          <p:nvPr>
-            <p:ph idx="1"/>
-          </p:nvPr>
-        </p:nvSpPr>
-        <p:spPr>
-          <a:xfrm>
-            <a:off x="457199" y="2420888"/>
-            <a:ext cx="5666509" cy="3705275"/>
-          </a:xfrm>
-        </p:spPr>
-        <p:txBody>
-          <a:bodyPr>
-            <a:normAutofit/>
-          </a:bodyPr>
-          <a:lstStyle/>
-          <a:p>
-            <a:r>
-              <a:rPr lang="es-ES" sz="2800" dirty="0" smtClean="0"/>
-              <a:t>El valor de la celda es 4.</a:t>
-            </a:r>
-          </a:p>
-          <a:p>
-            <a:r>
-              <a:rPr lang="es-ES" sz="2800" dirty="0" smtClean="0"/>
-              <a:t>La apariencia se ve: $4,00.</a:t>
-            </a:r>
-          </a:p>
-          <a:p>
-            <a:r>
-              <a:rPr lang="es-ES" sz="2800" dirty="0" smtClean="0"/>
-              <a:t>Este resultado se puede obtener debido al formato de la celda </a:t>
-            </a:r>
-            <a:endParaRPr lang="es-ES" sz="2800" dirty="0"/>
-          </a:p>
-        </p:txBody>
-      </p:sp>
     </p:spTree>
     <p:extLst>
       <p:ext uri="{BB962C8B-B14F-4D97-AF65-F5344CB8AC3E}">
@@ -7898,9 +8887,9 @@
 </file>
 
 <file path=ppt/theme/theme1.xml><?xml version="1.0" encoding="utf-8"?>
-<a:theme xmlns:a="http://schemas.openxmlformats.org/drawingml/2006/main" name="Tema de Office">
+<a:theme xmlns:a="http://schemas.openxmlformats.org/drawingml/2006/main" name="Brío">
   <a:themeElements>
-    <a:clrScheme name="Oficina">
+    <a:clrScheme name="Brío">
       <a:dk1>
         <a:sysClr val="windowText" lastClr="000000"/>
       </a:dk1>
@@ -7908,82 +8897,48 @@
         <a:sysClr val="window" lastClr="FFFFFF"/>
       </a:lt1>
       <a:dk2>
-        <a:srgbClr val="1F497D"/>
+        <a:srgbClr val="666666"/>
       </a:dk2>
       <a:lt2>
-        <a:srgbClr val="EEECE1"/>
+        <a:srgbClr val="D2D2D2"/>
       </a:lt2>
       <a:accent1>
-        <a:srgbClr val="4F81BD"/>
+        <a:srgbClr val="FF388C"/>
       </a:accent1>
       <a:accent2>
-        <a:srgbClr val="C0504D"/>
+        <a:srgbClr val="E40059"/>
       </a:accent2>
       <a:accent3>
-        <a:srgbClr val="9BBB59"/>
+        <a:srgbClr val="9C007F"/>
       </a:accent3>
       <a:accent4>
-        <a:srgbClr val="8064A2"/>
+        <a:srgbClr val="68007F"/>
       </a:accent4>
       <a:accent5>
-        <a:srgbClr val="4BACC6"/>
+        <a:srgbClr val="005BD3"/>
       </a:accent5>
       <a:accent6>
-        <a:srgbClr val="F79646"/>
+        <a:srgbClr val="00349E"/>
       </a:accent6>
       <a:hlink>
-        <a:srgbClr val="0000FF"/>
+        <a:srgbClr val="17BBFD"/>
       </a:hlink>
       <a:folHlink>
-        <a:srgbClr val="800080"/>
+        <a:srgbClr val="FF79C2"/>
       </a:folHlink>
     </a:clrScheme>
-    <a:fontScheme name="Oficina">
+    <a:fontScheme name="Brío">
       <a:majorFont>
-        <a:latin typeface="Calibri"/>
+        <a:latin typeface="Century Gothic"/>
         <a:ea typeface=""/>
         <a:cs typeface=""/>
-        <a:font script="Jpan" typeface="ＭＳ Ｐゴシック"/>
-        <a:font script="Hang" typeface="맑은 고딕"/>
-        <a:font script="Hans" typeface="宋体"/>
-        <a:font script="Hant" typeface="新細明體"/>
-        <a:font script="Arab" typeface="Times New Roman"/>
-        <a:font script="Hebr" typeface="Times New Roman"/>
-        <a:font script="Thai" typeface="Angsana New"/>
-        <a:font script="Ethi" typeface="Nyala"/>
-        <a:font script="Beng" typeface="Vrinda"/>
-        <a:font script="Gujr" typeface="Shruti"/>
-        <a:font script="Khmr" typeface="MoolBoran"/>
-        <a:font script="Knda" typeface="Tunga"/>
-        <a:font script="Guru" typeface="Raavi"/>
-        <a:font script="Cans" typeface="Euphemia"/>
-        <a:font script="Cher" typeface="Plantagenet Cherokee"/>
-        <a:font script="Yiii" typeface="Microsoft Yi Baiti"/>
-        <a:font script="Tibt" typeface="Microsoft Himalaya"/>
-        <a:font script="Thaa" typeface="MV Boli"/>
-        <a:font script="Deva" typeface="Mangal"/>
-        <a:font script="Telu" typeface="Gautami"/>
-        <a:font script="Taml" typeface="Latha"/>
-        <a:font script="Syrc" typeface="Estrangelo Edessa"/>
-        <a:font script="Orya" typeface="Kalinga"/>
-        <a:font script="Mlym" typeface="Kartika"/>
-        <a:font script="Laoo" typeface="DokChampa"/>
-        <a:font script="Sinh" typeface="Iskoola Pota"/>
-        <a:font script="Mong" typeface="Mongolian Baiti"/>
-        <a:font script="Viet" typeface="Times New Roman"/>
-        <a:font script="Uigh" typeface="Microsoft Uighur"/>
-      </a:majorFont>
-      <a:minorFont>
-        <a:latin typeface="Calibri"/>
-        <a:ea typeface=""/>
-        <a:cs typeface=""/>
-        <a:font script="Jpan" typeface="ＭＳ Ｐゴシック"/>
-        <a:font script="Hang" typeface="맑은 고딕"/>
-        <a:font script="Hans" typeface="宋体"/>
-        <a:font script="Hant" typeface="新細明體"/>
-        <a:font script="Arab" typeface="Arial"/>
-        <a:font script="Hebr" typeface="Arial"/>
-        <a:font script="Thai" typeface="Cordia New"/>
+        <a:font script="Jpan" typeface="HGｺﾞｼｯｸM"/>
+        <a:font script="Hang" typeface="HY중고딕"/>
+        <a:font script="Hans" typeface="幼圆"/>
+        <a:font script="Hant" typeface="微軟正黑體"/>
+        <a:font script="Arab" typeface="Tahoma"/>
+        <a:font script="Hebr" typeface="Gisha"/>
+        <a:font script="Thai" typeface="DilleniaUPC"/>
         <a:font script="Ethi" typeface="Nyala"/>
         <a:font script="Beng" typeface="Vrinda"/>
         <a:font script="Gujr" typeface="Shruti"/>
@@ -8004,11 +8959,47 @@
         <a:font script="Laoo" typeface="DokChampa"/>
         <a:font script="Sinh" typeface="Iskoola Pota"/>
         <a:font script="Mong" typeface="Mongolian Baiti"/>
-        <a:font script="Viet" typeface="Arial"/>
+        <a:font script="Viet" typeface="Tahoma"/>
         <a:font script="Uigh" typeface="Microsoft Uighur"/>
+        <a:font script="Geor" typeface="Sylfaen"/>
+      </a:majorFont>
+      <a:minorFont>
+        <a:latin typeface="Century Gothic"/>
+        <a:ea typeface=""/>
+        <a:cs typeface=""/>
+        <a:font script="Jpan" typeface="ＭＳ ゴシック"/>
+        <a:font script="Hang" typeface="HY중고딕"/>
+        <a:font script="Hans" typeface="幼圆"/>
+        <a:font script="Hant" typeface="微軟正黑體"/>
+        <a:font script="Arab" typeface="Tahoma"/>
+        <a:font script="Hebr" typeface="Gisha"/>
+        <a:font script="Thai" typeface="DilleniaUPC"/>
+        <a:font script="Ethi" typeface="Nyala"/>
+        <a:font script="Beng" typeface="Vrinda"/>
+        <a:font script="Gujr" typeface="Shruti"/>
+        <a:font script="Khmr" typeface="DaunPenh"/>
+        <a:font script="Knda" typeface="Tunga"/>
+        <a:font script="Guru" typeface="Raavi"/>
+        <a:font script="Cans" typeface="Euphemia"/>
+        <a:font script="Cher" typeface="Plantagenet Cherokee"/>
+        <a:font script="Yiii" typeface="Microsoft Yi Baiti"/>
+        <a:font script="Tibt" typeface="Microsoft Himalaya"/>
+        <a:font script="Thaa" typeface="MV Boli"/>
+        <a:font script="Deva" typeface="Mangal"/>
+        <a:font script="Telu" typeface="Gautami"/>
+        <a:font script="Taml" typeface="Latha"/>
+        <a:font script="Syrc" typeface="Estrangelo Edessa"/>
+        <a:font script="Orya" typeface="Kalinga"/>
+        <a:font script="Mlym" typeface="Kartika"/>
+        <a:font script="Laoo" typeface="DokChampa"/>
+        <a:font script="Sinh" typeface="Iskoola Pota"/>
+        <a:font script="Mong" typeface="Mongolian Baiti"/>
+        <a:font script="Viet" typeface="Verdana"/>
+        <a:font script="Uigh" typeface="Microsoft Uighur"/>
+        <a:font script="Geor" typeface="Sylfaen"/>
       </a:minorFont>
     </a:fontScheme>
-    <a:fmtScheme name="Oficina">
+    <a:fmtScheme name="Brío">
       <a:fillStyleLst>
         <a:solidFill>
           <a:schemeClr val="phClr"/>
@@ -8017,55 +9008,58 @@
           <a:gsLst>
             <a:gs pos="0">
               <a:schemeClr val="phClr">
-                <a:tint val="50000"/>
+                <a:tint val="10000"/>
                 <a:satMod val="300000"/>
               </a:schemeClr>
             </a:gs>
-            <a:gs pos="35000">
+            <a:gs pos="34000">
               <a:schemeClr val="phClr">
-                <a:tint val="37000"/>
-                <a:satMod val="300000"/>
+                <a:tint val="13500"/>
+                <a:satMod val="250000"/>
               </a:schemeClr>
             </a:gs>
             <a:gs pos="100000">
               <a:schemeClr val="phClr">
-                <a:tint val="15000"/>
-                <a:satMod val="350000"/>
+                <a:tint val="60000"/>
+                <a:satMod val="200000"/>
               </a:schemeClr>
             </a:gs>
           </a:gsLst>
-          <a:lin ang="16200000" scaled="1"/>
+          <a:path path="circle">
+            <a:fillToRect l="50000" t="155000" r="50000" b="-55000"/>
+          </a:path>
         </a:gradFill>
         <a:gradFill rotWithShape="1">
           <a:gsLst>
             <a:gs pos="0">
               <a:schemeClr val="phClr">
-                <a:shade val="51000"/>
-                <a:satMod val="130000"/>
+                <a:tint val="60000"/>
+                <a:satMod val="160000"/>
               </a:schemeClr>
             </a:gs>
-            <a:gs pos="80000">
+            <a:gs pos="46000">
               <a:schemeClr val="phClr">
-                <a:shade val="93000"/>
-                <a:satMod val="130000"/>
+                <a:tint val="86000"/>
+                <a:satMod val="160000"/>
               </a:schemeClr>
             </a:gs>
             <a:gs pos="100000">
               <a:schemeClr val="phClr">
-                <a:shade val="94000"/>
-                <a:satMod val="135000"/>
+                <a:shade val="40000"/>
+                <a:satMod val="160000"/>
               </a:schemeClr>
             </a:gs>
           </a:gsLst>
-          <a:lin ang="16200000" scaled="0"/>
+          <a:path path="circle">
+            <a:fillToRect l="50000" t="155000" r="50000" b="-55000"/>
+          </a:path>
         </a:gradFill>
       </a:fillStyleLst>
       <a:lnStyleLst>
         <a:ln w="9525" cap="flat" cmpd="sng" algn="ctr">
           <a:solidFill>
             <a:schemeClr val="phClr">
-              <a:shade val="95000"/>
-              <a:satMod val="105000"/>
+              <a:satMod val="120000"/>
             </a:schemeClr>
           </a:solidFill>
           <a:prstDash val="solid"/>
@@ -8086,40 +9080,43 @@
       <a:effectStyleLst>
         <a:effectStyle>
           <a:effectLst>
-            <a:outerShdw blurRad="40000" dist="20000" dir="5400000" rotWithShape="0">
+            <a:outerShdw blurRad="63500" dist="25400" dir="14700000" algn="t" rotWithShape="0">
               <a:srgbClr val="000000">
-                <a:alpha val="38000"/>
+                <a:alpha val="50000"/>
               </a:srgbClr>
             </a:outerShdw>
           </a:effectLst>
         </a:effectStyle>
         <a:effectStyle>
           <a:effectLst>
-            <a:outerShdw blurRad="40000" dist="23000" dir="5400000" rotWithShape="0">
+            <a:outerShdw blurRad="50800" dist="38100" dir="14700000" algn="t" rotWithShape="0">
               <a:srgbClr val="000000">
-                <a:alpha val="35000"/>
+                <a:alpha val="60000"/>
               </a:srgbClr>
             </a:outerShdw>
           </a:effectLst>
         </a:effectStyle>
         <a:effectStyle>
           <a:effectLst>
-            <a:outerShdw blurRad="40000" dist="23000" dir="5400000" rotWithShape="0">
+            <a:outerShdw blurRad="50800" dist="38100" dir="14700000" algn="t" rotWithShape="0">
               <a:srgbClr val="000000">
-                <a:alpha val="35000"/>
+                <a:alpha val="60000"/>
               </a:srgbClr>
             </a:outerShdw>
           </a:effectLst>
           <a:scene3d>
-            <a:camera prst="orthographicFront">
+            <a:camera prst="orthographicFront" fov="0">
               <a:rot lat="0" lon="0" rev="0"/>
             </a:camera>
-            <a:lightRig rig="threePt" dir="t">
-              <a:rot lat="0" lon="0" rev="1200000"/>
+            <a:lightRig rig="contrasting" dir="t">
+              <a:rot lat="0" lon="0" rev="3600000"/>
             </a:lightRig>
           </a:scene3d>
-          <a:sp3d>
-            <a:bevelT w="63500" h="25400"/>
+          <a:sp3d prstMaterial="plastic">
+            <a:bevelT w="127000" h="38200" prst="relaxedInset"/>
+            <a:contourClr>
+              <a:schemeClr val="phClr"/>
+            </a:contourClr>
           </a:sp3d>
         </a:effectStyle>
       </a:effectStyleLst>
@@ -8131,47 +9128,40 @@
           <a:gsLst>
             <a:gs pos="0">
               <a:schemeClr val="phClr">
-                <a:tint val="40000"/>
-                <a:satMod val="350000"/>
+                <a:shade val="48000"/>
+                <a:satMod val="230000"/>
               </a:schemeClr>
             </a:gs>
-            <a:gs pos="40000">
+            <a:gs pos="60000">
               <a:schemeClr val="phClr">
-                <a:tint val="45000"/>
-                <a:shade val="99000"/>
-                <a:satMod val="350000"/>
+                <a:shade val="92000"/>
+                <a:satMod val="230000"/>
               </a:schemeClr>
             </a:gs>
             <a:gs pos="100000">
               <a:schemeClr val="phClr">
-                <a:shade val="20000"/>
-                <a:satMod val="255000"/>
+                <a:tint val="85000"/>
+                <a:satMod val="400000"/>
               </a:schemeClr>
             </a:gs>
           </a:gsLst>
-          <a:path path="circle">
-            <a:fillToRect l="50000" t="-80000" r="50000" b="180000"/>
-          </a:path>
+          <a:lin ang="5400000" scaled="0"/>
         </a:gradFill>
-        <a:gradFill rotWithShape="1">
-          <a:gsLst>
-            <a:gs pos="0">
+        <a:blipFill>
+          <a:blip xmlns:r="http://schemas.openxmlformats.org/officeDocument/2006/relationships" r:embed="rId1">
+            <a:duotone>
               <a:schemeClr val="phClr">
-                <a:tint val="80000"/>
-                <a:satMod val="300000"/>
+                <a:shade val="1200"/>
+                <a:satMod val="150000"/>
               </a:schemeClr>
-            </a:gs>
-            <a:gs pos="100000">
               <a:schemeClr val="phClr">
-                <a:shade val="30000"/>
-                <a:satMod val="200000"/>
+                <a:tint val="90000"/>
+                <a:satMod val="150000"/>
               </a:schemeClr>
-            </a:gs>
-          </a:gsLst>
-          <a:path path="circle">
-            <a:fillToRect l="50000" t="50000" r="50000" b="50000"/>
-          </a:path>
-        </a:gradFill>
+            </a:duotone>
+          </a:blip>
+          <a:tile tx="0" ty="0" sx="70000" sy="70000" flip="none" algn="tl"/>
+        </a:blipFill>
       </a:bgFillStyleLst>
     </a:fmtScheme>
   </a:themeElements>

</xml_diff>

<commit_message>
se esta realizando la clase 2 de aplicadas 2
</commit_message>
<xml_diff>
--- a/2015-2016/clases/computacion_aplicada_2/clase_1/clase1.pptx
+++ b/2015-2016/clases/computacion_aplicada_2/clase_1/clase1.pptx
@@ -5908,22 +5908,33 @@
           </a:xfrm>
         </p:spPr>
         <p:txBody>
-          <a:bodyPr/>
+          <a:bodyPr>
+            <a:noAutofit/>
+          </a:bodyPr>
           <a:lstStyle/>
           <a:p>
             <a:r>
-              <a:rPr lang="es-ES" dirty="0" smtClean="0"/>
+              <a:rPr lang="es-ES" sz="3200" dirty="0" smtClean="0"/>
               <a:t>Escriba 10 nombres y apellidos de entre sus familiares, y luego coloque las edades de cada uno de ellos en la siguiente celda.</a:t>
             </a:r>
           </a:p>
           <a:p>
             <a:r>
-              <a:rPr lang="es-ES" dirty="0" smtClean="0"/>
+              <a:rPr lang="es-ES" sz="3200" dirty="0" smtClean="0"/>
               <a:t>Para los familiares que son menor a 20 años, coloque un formato de color verde en su fila.</a:t>
             </a:r>
           </a:p>
           <a:p>
-            <a:endParaRPr lang="es-ES" dirty="0"/>
+            <a:r>
+              <a:rPr lang="es-ES" sz="3200" dirty="0" smtClean="0"/>
+              <a:t>Asignar un rango de edades y sacar su promedio con el nombre del rango</a:t>
+            </a:r>
+          </a:p>
+          <a:p>
+            <a:endParaRPr lang="es-ES" sz="3200" dirty="0" smtClean="0"/>
+          </a:p>
+          <a:p>
+            <a:endParaRPr lang="es-ES" sz="3200" dirty="0"/>
           </a:p>
         </p:txBody>
       </p:sp>
@@ -6254,6 +6265,13 @@
   <p:clrMapOvr>
     <a:masterClrMapping/>
   </p:clrMapOvr>
+  <p:timing>
+    <p:tnLst>
+      <p:par>
+        <p:cTn id="1" dur="indefinite" restart="never" nodeType="tmRoot"/>
+      </p:par>
+    </p:tnLst>
+  </p:timing>
 </p:sld>
 </file>
 
@@ -6395,6 +6413,13 @@
   <p:clrMapOvr>
     <a:masterClrMapping/>
   </p:clrMapOvr>
+  <p:timing>
+    <p:tnLst>
+      <p:par>
+        <p:cTn id="1" dur="indefinite" restart="never" nodeType="tmRoot"/>
+      </p:par>
+    </p:tnLst>
+  </p:timing>
 </p:sld>
 </file>
 
@@ -6569,6 +6594,13 @@
   <p:clrMapOvr>
     <a:masterClrMapping/>
   </p:clrMapOvr>
+  <p:timing>
+    <p:tnLst>
+      <p:par>
+        <p:cTn id="1" dur="indefinite" restart="never" nodeType="tmRoot"/>
+      </p:par>
+    </p:tnLst>
+  </p:timing>
 </p:sld>
 </file>
 
@@ -8825,6 +8857,13 @@
   <p:clrMapOvr>
     <a:masterClrMapping/>
   </p:clrMapOvr>
+  <p:timing>
+    <p:tnLst>
+      <p:par>
+        <p:cTn id="1" dur="indefinite" restart="never" nodeType="tmRoot"/>
+      </p:par>
+    </p:tnLst>
+  </p:timing>
 </p:sld>
 </file>
 

</xml_diff>